<commit_message>
Update on presentation and minimal code changes
</commit_message>
<xml_diff>
--- a/presentation/wanderoo – Gruppe 3.pptx
+++ b/presentation/wanderoo – Gruppe 3.pptx
@@ -7,7 +7,11 @@
   <p:sldIdLst>
     <p:sldId id="256" r:id="rId2"/>
     <p:sldId id="257" r:id="rId3"/>
-    <p:sldId id="258" r:id="rId4"/>
+    <p:sldId id="259" r:id="rId4"/>
+    <p:sldId id="262" r:id="rId5"/>
+    <p:sldId id="260" r:id="rId6"/>
+    <p:sldId id="261" r:id="rId7"/>
+    <p:sldId id="263" r:id="rId8"/>
   </p:sldIdLst>
   <p:sldSz cx="12192000" cy="6858000"/>
   <p:notesSz cx="6858000" cy="9144000"/>
@@ -106,6 +110,11 @@
       </a:defRPr>
     </a:lvl9pPr>
   </p:defaultTextStyle>
+  <p:extLst>
+    <p:ext uri="{EFAFB233-063F-42B5-8137-9DF3F51BA10A}">
+      <p15:sldGuideLst xmlns:p15="http://schemas.microsoft.com/office/powerpoint/2012/main"/>
+    </p:ext>
+  </p:extLst>
 </p:presentation>
 </file>
 
@@ -831,7 +840,7 @@
           <a:p>
             <a:fld id="{0CEDED08-CADF-44F9-A3BB-3FCFEFB05A4A}" type="datetimeFigureOut">
               <a:rPr lang="en-US" smtClean="0"/>
-              <a:t>9/5/2020</a:t>
+              <a:t>9/7/2020</a:t>
             </a:fld>
             <a:endParaRPr lang="en-US"/>
           </a:p>
@@ -1082,7 +1091,7 @@
           <a:p>
             <a:fld id="{0CEDED08-CADF-44F9-A3BB-3FCFEFB05A4A}" type="datetimeFigureOut">
               <a:rPr lang="en-US" smtClean="0"/>
-              <a:t>9/5/2020</a:t>
+              <a:t>9/7/2020</a:t>
             </a:fld>
             <a:endParaRPr lang="en-US"/>
           </a:p>
@@ -1396,7 +1405,7 @@
           <a:p>
             <a:fld id="{0CEDED08-CADF-44F9-A3BB-3FCFEFB05A4A}" type="datetimeFigureOut">
               <a:rPr lang="en-US" smtClean="0"/>
-              <a:t>9/5/2020</a:t>
+              <a:t>9/7/2020</a:t>
             </a:fld>
             <a:endParaRPr lang="en-US"/>
           </a:p>
@@ -1737,7 +1746,7 @@
           <a:p>
             <a:fld id="{0CEDED08-CADF-44F9-A3BB-3FCFEFB05A4A}" type="datetimeFigureOut">
               <a:rPr lang="en-US" smtClean="0"/>
-              <a:t>9/5/2020</a:t>
+              <a:t>9/7/2020</a:t>
             </a:fld>
             <a:endParaRPr lang="en-US"/>
           </a:p>
@@ -2051,7 +2060,7 @@
           <a:p>
             <a:fld id="{0CEDED08-CADF-44F9-A3BB-3FCFEFB05A4A}" type="datetimeFigureOut">
               <a:rPr lang="en-US" smtClean="0"/>
-              <a:t>9/5/2020</a:t>
+              <a:t>9/7/2020</a:t>
             </a:fld>
             <a:endParaRPr lang="en-US"/>
           </a:p>
@@ -2444,7 +2453,7 @@
           <a:p>
             <a:fld id="{0CEDED08-CADF-44F9-A3BB-3FCFEFB05A4A}" type="datetimeFigureOut">
               <a:rPr lang="en-US" smtClean="0"/>
-              <a:t>9/5/2020</a:t>
+              <a:t>9/7/2020</a:t>
             </a:fld>
             <a:endParaRPr lang="en-US"/>
           </a:p>
@@ -2614,7 +2623,7 @@
           <a:p>
             <a:fld id="{0CEDED08-CADF-44F9-A3BB-3FCFEFB05A4A}" type="datetimeFigureOut">
               <a:rPr lang="en-US" smtClean="0"/>
-              <a:t>9/5/2020</a:t>
+              <a:t>9/7/2020</a:t>
             </a:fld>
             <a:endParaRPr lang="en-US"/>
           </a:p>
@@ -2794,7 +2803,7 @@
           <a:p>
             <a:fld id="{0CEDED08-CADF-44F9-A3BB-3FCFEFB05A4A}" type="datetimeFigureOut">
               <a:rPr lang="en-US" smtClean="0"/>
-              <a:t>9/5/2020</a:t>
+              <a:t>9/7/2020</a:t>
             </a:fld>
             <a:endParaRPr lang="en-US"/>
           </a:p>
@@ -2970,7 +2979,7 @@
           <a:p>
             <a:fld id="{0CEDED08-CADF-44F9-A3BB-3FCFEFB05A4A}" type="datetimeFigureOut">
               <a:rPr lang="en-US" smtClean="0"/>
-              <a:t>9/5/2020</a:t>
+              <a:t>9/7/2020</a:t>
             </a:fld>
             <a:endParaRPr lang="en-US"/>
           </a:p>
@@ -3217,7 +3226,7 @@
           <a:p>
             <a:fld id="{0CEDED08-CADF-44F9-A3BB-3FCFEFB05A4A}" type="datetimeFigureOut">
               <a:rPr lang="en-US" smtClean="0"/>
-              <a:t>9/5/2020</a:t>
+              <a:t>9/7/2020</a:t>
             </a:fld>
             <a:endParaRPr lang="en-US"/>
           </a:p>
@@ -3449,7 +3458,7 @@
           <a:p>
             <a:fld id="{0CEDED08-CADF-44F9-A3BB-3FCFEFB05A4A}" type="datetimeFigureOut">
               <a:rPr lang="en-US" smtClean="0"/>
-              <a:t>9/5/2020</a:t>
+              <a:t>9/7/2020</a:t>
             </a:fld>
             <a:endParaRPr lang="en-US"/>
           </a:p>
@@ -3823,7 +3832,7 @@
           <a:p>
             <a:fld id="{0CEDED08-CADF-44F9-A3BB-3FCFEFB05A4A}" type="datetimeFigureOut">
               <a:rPr lang="en-US" smtClean="0"/>
-              <a:t>9/5/2020</a:t>
+              <a:t>9/7/2020</a:t>
             </a:fld>
             <a:endParaRPr lang="en-US"/>
           </a:p>
@@ -3946,7 +3955,7 @@
           <a:p>
             <a:fld id="{0CEDED08-CADF-44F9-A3BB-3FCFEFB05A4A}" type="datetimeFigureOut">
               <a:rPr lang="en-US" smtClean="0"/>
-              <a:t>9/5/2020</a:t>
+              <a:t>9/7/2020</a:t>
             </a:fld>
             <a:endParaRPr lang="en-US"/>
           </a:p>
@@ -4041,7 +4050,7 @@
           <a:p>
             <a:fld id="{0CEDED08-CADF-44F9-A3BB-3FCFEFB05A4A}" type="datetimeFigureOut">
               <a:rPr lang="en-US" smtClean="0"/>
-              <a:t>9/5/2020</a:t>
+              <a:t>9/7/2020</a:t>
             </a:fld>
             <a:endParaRPr lang="en-US"/>
           </a:p>
@@ -4296,7 +4305,7 @@
           <a:p>
             <a:fld id="{0CEDED08-CADF-44F9-A3BB-3FCFEFB05A4A}" type="datetimeFigureOut">
               <a:rPr lang="en-US" smtClean="0"/>
-              <a:t>9/5/2020</a:t>
+              <a:t>9/7/2020</a:t>
             </a:fld>
             <a:endParaRPr lang="en-US"/>
           </a:p>
@@ -4559,7 +4568,7 @@
           <a:p>
             <a:fld id="{0CEDED08-CADF-44F9-A3BB-3FCFEFB05A4A}" type="datetimeFigureOut">
               <a:rPr lang="en-US" smtClean="0"/>
-              <a:t>9/5/2020</a:t>
+              <a:t>9/7/2020</a:t>
             </a:fld>
             <a:endParaRPr lang="en-US"/>
           </a:p>
@@ -5302,7 +5311,7 @@
           <a:p>
             <a:fld id="{0CEDED08-CADF-44F9-A3BB-3FCFEFB05A4A}" type="datetimeFigureOut">
               <a:rPr lang="en-US" smtClean="0"/>
-              <a:t>9/5/2020</a:t>
+              <a:t>9/7/2020</a:t>
             </a:fld>
             <a:endParaRPr lang="en-US"/>
           </a:p>
@@ -6042,34 +6051,7 @@
           <a:p>
             <a:r>
               <a:rPr lang="en-US" dirty="0"/>
-              <a:t>So </a:t>
-            </a:r>
-            <a:r>
-              <a:rPr lang="en-US" dirty="0" err="1"/>
-              <a:t>sieht</a:t>
-            </a:r>
-            <a:r>
-              <a:rPr lang="en-US" dirty="0"/>
-              <a:t> die </a:t>
-            </a:r>
-            <a:r>
-              <a:rPr lang="en-US" dirty="0" err="1"/>
-              <a:t>Lösung</a:t>
-            </a:r>
-            <a:r>
-              <a:rPr lang="en-US" dirty="0"/>
-              <a:t> </a:t>
-            </a:r>
-            <a:r>
-              <a:rPr lang="en-US" dirty="0" err="1"/>
-              <a:t>aus</a:t>
-            </a:r>
-            <a:endParaRPr lang="en-US" dirty="0"/>
-          </a:p>
-          <a:p>
-            <a:r>
-              <a:rPr lang="en-US" dirty="0"/>
-              <a:t>Demo</a:t>
+              <a:t>App-Demo</a:t>
             </a:r>
           </a:p>
         </p:txBody>
@@ -6109,7 +6091,7 @@
           <p:cNvPr id="2" name="Title 1">
             <a:extLst>
               <a:ext uri="{FF2B5EF4-FFF2-40B4-BE49-F238E27FC236}">
-                <a16:creationId xmlns:a16="http://schemas.microsoft.com/office/drawing/2014/main" id="{F49091B3-15E7-4E02-A50E-10F6DF816410}"/>
+                <a16:creationId xmlns:a16="http://schemas.microsoft.com/office/drawing/2014/main" id="{DCDAEDCC-9CB3-4BAD-A1F0-8DC7B816A7F0}"/>
               </a:ext>
             </a:extLst>
           </p:cNvPr>
@@ -6125,7 +6107,363 @@
           <a:bodyPr/>
           <a:lstStyle/>
           <a:p>
+            <a:r>
+              <a:rPr lang="en-US" dirty="0" err="1"/>
+              <a:t>Wozu</a:t>
+            </a:r>
+            <a:r>
+              <a:rPr lang="en-US" dirty="0"/>
+              <a:t> </a:t>
+            </a:r>
+            <a:r>
+              <a:rPr lang="en-US" dirty="0" err="1"/>
+              <a:t>eine</a:t>
+            </a:r>
+            <a:r>
+              <a:rPr lang="en-US" dirty="0"/>
+              <a:t> </a:t>
+            </a:r>
+            <a:r>
+              <a:rPr lang="en-US" dirty="0" err="1"/>
+              <a:t>Wanderführer</a:t>
+            </a:r>
+            <a:r>
+              <a:rPr lang="en-US" dirty="0"/>
+              <a:t>-App?</a:t>
+            </a:r>
+          </a:p>
+        </p:txBody>
+      </p:sp>
+      <p:sp>
+        <p:nvSpPr>
+          <p:cNvPr id="4" name="Content Placeholder 3">
+            <a:extLst>
+              <a:ext uri="{FF2B5EF4-FFF2-40B4-BE49-F238E27FC236}">
+                <a16:creationId xmlns:a16="http://schemas.microsoft.com/office/drawing/2014/main" id="{00A16F92-1166-464A-8CD3-7BB27E20159C}"/>
+              </a:ext>
+            </a:extLst>
+          </p:cNvPr>
+          <p:cNvSpPr>
+            <a:spLocks noGrp="1"/>
+          </p:cNvSpPr>
+          <p:nvPr>
+            <p:ph sz="half" idx="2"/>
+          </p:nvPr>
+        </p:nvSpPr>
+        <p:spPr>
+          <a:xfrm>
+            <a:off x="677334" y="1941223"/>
+            <a:ext cx="4185623" cy="3304117"/>
+          </a:xfrm>
+        </p:spPr>
+        <p:txBody>
+          <a:bodyPr/>
+          <a:lstStyle/>
+          <a:p>
+            <a:r>
+              <a:rPr lang="en-US" dirty="0"/>
+              <a:t>Inspiration und </a:t>
+            </a:r>
+            <a:r>
+              <a:rPr lang="en-US" dirty="0" err="1"/>
+              <a:t>Impulsgeber</a:t>
+            </a:r>
+            <a:r>
+              <a:rPr lang="en-US" dirty="0"/>
+              <a:t> </a:t>
+            </a:r>
+            <a:r>
+              <a:rPr lang="en-US" dirty="0" err="1"/>
+              <a:t>für</a:t>
+            </a:r>
+            <a:r>
+              <a:rPr lang="en-US" dirty="0"/>
+              <a:t> die </a:t>
+            </a:r>
+            <a:r>
+              <a:rPr lang="en-US" dirty="0" err="1"/>
+              <a:t>Wanderung</a:t>
+            </a:r>
+            <a:r>
+              <a:rPr lang="en-US" dirty="0"/>
+              <a:t> sei </a:t>
+            </a:r>
+            <a:r>
+              <a:rPr lang="en-US" dirty="0" err="1"/>
+              <a:t>bei</a:t>
+            </a:r>
+            <a:r>
+              <a:rPr lang="en-US" dirty="0"/>
+              <a:t> 42% der </a:t>
+            </a:r>
+            <a:r>
+              <a:rPr lang="en-US" dirty="0" err="1"/>
+              <a:t>Befragten</a:t>
+            </a:r>
+            <a:r>
+              <a:rPr lang="en-US" dirty="0"/>
+              <a:t> das Internet</a:t>
+            </a:r>
+          </a:p>
+          <a:p>
             <a:endParaRPr lang="en-US" dirty="0"/>
+          </a:p>
+          <a:p>
+            <a:r>
+              <a:rPr lang="en-US" dirty="0"/>
+              <a:t>Apps </a:t>
+            </a:r>
+            <a:r>
+              <a:rPr lang="en-US" dirty="0" err="1"/>
+              <a:t>beim</a:t>
+            </a:r>
+            <a:r>
+              <a:rPr lang="en-US" dirty="0"/>
+              <a:t> </a:t>
+            </a:r>
+            <a:r>
+              <a:rPr lang="en-US" dirty="0" err="1"/>
+              <a:t>Wandern</a:t>
+            </a:r>
+            <a:r>
+              <a:rPr lang="en-US" dirty="0"/>
+              <a:t> </a:t>
+            </a:r>
+            <a:r>
+              <a:rPr lang="en-US" dirty="0" err="1"/>
+              <a:t>sind</a:t>
+            </a:r>
+            <a:r>
+              <a:rPr lang="en-US" dirty="0"/>
+              <a:t> </a:t>
+            </a:r>
+            <a:r>
+              <a:rPr lang="en-US" dirty="0" err="1"/>
+              <a:t>beliebt</a:t>
+            </a:r>
+            <a:r>
+              <a:rPr lang="en-US" dirty="0"/>
+              <a:t> und </a:t>
+            </a:r>
+            <a:r>
+              <a:rPr lang="en-US" dirty="0" err="1"/>
+              <a:t>helfen</a:t>
+            </a:r>
+            <a:r>
+              <a:rPr lang="en-US" dirty="0"/>
+              <a:t> </a:t>
+            </a:r>
+            <a:r>
+              <a:rPr lang="en-US" dirty="0" err="1"/>
+              <a:t>beim</a:t>
+            </a:r>
+            <a:r>
+              <a:rPr lang="en-US" dirty="0"/>
+              <a:t> </a:t>
+            </a:r>
+            <a:r>
+              <a:rPr lang="en-US" dirty="0" err="1"/>
+              <a:t>Wandern</a:t>
+            </a:r>
+            <a:endParaRPr lang="en-US" dirty="0"/>
+          </a:p>
+          <a:p>
+            <a:endParaRPr lang="en-US" dirty="0"/>
+          </a:p>
+        </p:txBody>
+      </p:sp>
+      <p:pic>
+        <p:nvPicPr>
+          <p:cNvPr id="7" name="Grafik 20">
+            <a:extLst>
+              <a:ext uri="{FF2B5EF4-FFF2-40B4-BE49-F238E27FC236}">
+                <a16:creationId xmlns:a16="http://schemas.microsoft.com/office/drawing/2014/main" id="{824D0525-466F-4136-9F9A-9C79F707AEFF}"/>
+              </a:ext>
+            </a:extLst>
+          </p:cNvPr>
+          <p:cNvPicPr>
+            <a:picLocks noGrp="1"/>
+          </p:cNvPicPr>
+          <p:nvPr>
+            <p:ph sz="quarter" idx="4"/>
+          </p:nvPr>
+        </p:nvPicPr>
+        <p:blipFill>
+          <a:blip r:embed="rId2"/>
+          <a:stretch>
+            <a:fillRect/>
+          </a:stretch>
+        </p:blipFill>
+        <p:spPr>
+          <a:xfrm>
+            <a:off x="4975667" y="1954969"/>
+            <a:ext cx="4162455" cy="1638312"/>
+          </a:xfrm>
+          <a:prstGeom prst="rect">
+            <a:avLst/>
+          </a:prstGeom>
+        </p:spPr>
+      </p:pic>
+      <p:pic>
+        <p:nvPicPr>
+          <p:cNvPr id="8" name="Grafik 23">
+            <a:extLst>
+              <a:ext uri="{FF2B5EF4-FFF2-40B4-BE49-F238E27FC236}">
+                <a16:creationId xmlns:a16="http://schemas.microsoft.com/office/drawing/2014/main" id="{386B3949-B3FD-4F1C-A4CC-F92BDC6A34B9}"/>
+              </a:ext>
+            </a:extLst>
+          </p:cNvPr>
+          <p:cNvPicPr/>
+          <p:nvPr/>
+        </p:nvPicPr>
+        <p:blipFill>
+          <a:blip r:embed="rId3"/>
+          <a:stretch>
+            <a:fillRect/>
+          </a:stretch>
+        </p:blipFill>
+        <p:spPr>
+          <a:xfrm>
+            <a:off x="4975667" y="3617850"/>
+            <a:ext cx="4185623" cy="2630550"/>
+          </a:xfrm>
+          <a:prstGeom prst="rect">
+            <a:avLst/>
+          </a:prstGeom>
+        </p:spPr>
+      </p:pic>
+      <p:sp>
+        <p:nvSpPr>
+          <p:cNvPr id="9" name="Rectangle 8">
+            <a:extLst>
+              <a:ext uri="{FF2B5EF4-FFF2-40B4-BE49-F238E27FC236}">
+                <a16:creationId xmlns:a16="http://schemas.microsoft.com/office/drawing/2014/main" id="{9866596A-8C96-4BB2-B8C8-2342E2878D1C}"/>
+              </a:ext>
+            </a:extLst>
+          </p:cNvPr>
+          <p:cNvSpPr/>
+          <p:nvPr/>
+        </p:nvSpPr>
+        <p:spPr>
+          <a:xfrm>
+            <a:off x="405468" y="6379151"/>
+            <a:ext cx="7874466" cy="478849"/>
+          </a:xfrm>
+          <a:prstGeom prst="rect">
+            <a:avLst/>
+          </a:prstGeom>
+        </p:spPr>
+        <p:txBody>
+          <a:bodyPr wrap="square">
+            <a:spAutoFit/>
+          </a:bodyPr>
+          <a:lstStyle/>
+          <a:p>
+            <a:pPr marL="342900" lvl="0" indent="-342900">
+              <a:lnSpc>
+                <a:spcPct val="107000"/>
+              </a:lnSpc>
+              <a:spcAft>
+                <a:spcPts val="800"/>
+              </a:spcAft>
+              <a:buFont typeface="Courier New" panose="02070309020205020404" pitchFamily="49" charset="0"/>
+              <a:buChar char="o"/>
+            </a:pPr>
+            <a:r>
+              <a:rPr lang="de-DE" sz="1200" u="sng" dirty="0">
+                <a:solidFill>
+                  <a:srgbClr val="0000FF"/>
+                </a:solidFill>
+                <a:latin typeface="Calibri" panose="020F0502020204030204" pitchFamily="34" charset="0"/>
+                <a:ea typeface="Calibri" panose="020F0502020204030204" pitchFamily="34" charset="0"/>
+                <a:cs typeface="Calibri" panose="020F0502020204030204" pitchFamily="34" charset="0"/>
+                <a:hlinkClick r:id="rId4"/>
+              </a:rPr>
+              <a:t>https://rlp.tourismusnetzwerk.info/2018/09/13/studie-zum-digitalen-verhalten-der-wanderer-bte-stell-ergebnisse-vor/</a:t>
+            </a:r>
+            <a:endParaRPr lang="de-DE" sz="1200" dirty="0">
+              <a:latin typeface="Calibri" panose="020F0502020204030204" pitchFamily="34" charset="0"/>
+              <a:ea typeface="Calibri" panose="020F0502020204030204" pitchFamily="34" charset="0"/>
+              <a:cs typeface="Times New Roman" panose="02020603050405020304" pitchFamily="18" charset="0"/>
+            </a:endParaRPr>
+          </a:p>
+        </p:txBody>
+      </p:sp>
+    </p:spTree>
+    <p:extLst>
+      <p:ext uri="{BB962C8B-B14F-4D97-AF65-F5344CB8AC3E}">
+        <p14:creationId xmlns:p14="http://schemas.microsoft.com/office/powerpoint/2010/main" val="902159870"/>
+      </p:ext>
+    </p:extLst>
+  </p:cSld>
+  <p:clrMapOvr>
+    <a:masterClrMapping/>
+  </p:clrMapOvr>
+</p:sld>
+</file>
+
+<file path=ppt/slides/slide4.xml><?xml version="1.0" encoding="utf-8"?>
+<p:sld xmlns:a="http://schemas.openxmlformats.org/drawingml/2006/main" xmlns:r="http://schemas.openxmlformats.org/officeDocument/2006/relationships" xmlns:p="http://schemas.openxmlformats.org/presentationml/2006/main">
+  <p:cSld>
+    <p:spTree>
+      <p:nvGrpSpPr>
+        <p:cNvPr id="1" name=""/>
+        <p:cNvGrpSpPr/>
+        <p:nvPr/>
+      </p:nvGrpSpPr>
+      <p:grpSpPr>
+        <a:xfrm>
+          <a:off x="0" y="0"/>
+          <a:ext cx="0" cy="0"/>
+          <a:chOff x="0" y="0"/>
+          <a:chExt cx="0" cy="0"/>
+        </a:xfrm>
+      </p:grpSpPr>
+      <p:sp>
+        <p:nvSpPr>
+          <p:cNvPr id="2" name="Title 1">
+            <a:extLst>
+              <a:ext uri="{FF2B5EF4-FFF2-40B4-BE49-F238E27FC236}">
+                <a16:creationId xmlns:a16="http://schemas.microsoft.com/office/drawing/2014/main" id="{CFFE2447-123E-4594-A012-D3166F2FA738}"/>
+              </a:ext>
+            </a:extLst>
+          </p:cNvPr>
+          <p:cNvSpPr>
+            <a:spLocks noGrp="1"/>
+          </p:cNvSpPr>
+          <p:nvPr>
+            <p:ph type="title"/>
+          </p:nvPr>
+        </p:nvSpPr>
+        <p:spPr/>
+        <p:txBody>
+          <a:bodyPr/>
+          <a:lstStyle/>
+          <a:p>
+            <a:r>
+              <a:rPr lang="en-US" dirty="0" err="1"/>
+              <a:t>Wozu</a:t>
+            </a:r>
+            <a:r>
+              <a:rPr lang="en-US" dirty="0"/>
+              <a:t> </a:t>
+            </a:r>
+            <a:r>
+              <a:rPr lang="en-US" dirty="0" err="1"/>
+              <a:t>eine</a:t>
+            </a:r>
+            <a:r>
+              <a:rPr lang="en-US" dirty="0"/>
+              <a:t> </a:t>
+            </a:r>
+            <a:r>
+              <a:rPr lang="en-US" dirty="0" err="1"/>
+              <a:t>Wanderführer</a:t>
+            </a:r>
+            <a:r>
+              <a:rPr lang="en-US" dirty="0"/>
+              <a:t>-App?</a:t>
+            </a:r>
           </a:p>
         </p:txBody>
       </p:sp>
@@ -6134,7 +6472,7 @@
           <p:cNvPr id="3" name="Content Placeholder 2">
             <a:extLst>
               <a:ext uri="{FF2B5EF4-FFF2-40B4-BE49-F238E27FC236}">
-                <a16:creationId xmlns:a16="http://schemas.microsoft.com/office/drawing/2014/main" id="{59D73574-DAD1-4FB9-9048-6696A3F681EA}"/>
+                <a16:creationId xmlns:a16="http://schemas.microsoft.com/office/drawing/2014/main" id="{35A35F08-81B4-4BD4-B1FC-BDC5AFE63A70}"/>
               </a:ext>
             </a:extLst>
           </p:cNvPr>
@@ -6150,14 +6488,1692 @@
           <a:bodyPr/>
           <a:lstStyle/>
           <a:p>
-            <a:endParaRPr lang="en-US"/>
+            <a:r>
+              <a:rPr lang="en-US" dirty="0"/>
+              <a:t>39% der </a:t>
+            </a:r>
+            <a:r>
+              <a:rPr lang="en-US" dirty="0" err="1"/>
+              <a:t>Befragten</a:t>
+            </a:r>
+            <a:r>
+              <a:rPr lang="en-US" dirty="0"/>
+              <a:t> </a:t>
+            </a:r>
+            <a:r>
+              <a:rPr lang="en-US" dirty="0" err="1"/>
+              <a:t>verzichten</a:t>
+            </a:r>
+            <a:r>
+              <a:rPr lang="en-US" dirty="0"/>
+              <a:t> </a:t>
+            </a:r>
+            <a:r>
+              <a:rPr lang="en-US" dirty="0" err="1"/>
+              <a:t>bewusst</a:t>
+            </a:r>
+            <a:r>
+              <a:rPr lang="en-US" dirty="0"/>
+              <a:t> </a:t>
+            </a:r>
+            <a:r>
+              <a:rPr lang="en-US" dirty="0" err="1"/>
+              <a:t>beim</a:t>
+            </a:r>
+            <a:r>
+              <a:rPr lang="en-US" dirty="0"/>
+              <a:t> </a:t>
+            </a:r>
+            <a:r>
+              <a:rPr lang="en-US" dirty="0" err="1"/>
+              <a:t>Wandern</a:t>
+            </a:r>
+            <a:r>
+              <a:rPr lang="en-US" dirty="0"/>
+              <a:t> auf </a:t>
+            </a:r>
+            <a:r>
+              <a:rPr lang="en-US" dirty="0" err="1"/>
+              <a:t>ihr</a:t>
+            </a:r>
+            <a:r>
+              <a:rPr lang="en-US" dirty="0"/>
+              <a:t> Smartphone</a:t>
+            </a:r>
+          </a:p>
+          <a:p>
+            <a:pPr lvl="1"/>
+            <a:r>
+              <a:rPr lang="en-US" dirty="0" err="1"/>
+              <a:t>Daraus</a:t>
+            </a:r>
+            <a:r>
+              <a:rPr lang="en-US" dirty="0"/>
+              <a:t> </a:t>
+            </a:r>
+            <a:r>
+              <a:rPr lang="en-US" dirty="0" err="1"/>
+              <a:t>kann</a:t>
+            </a:r>
+            <a:r>
+              <a:rPr lang="en-US" dirty="0"/>
+              <a:t> man </a:t>
+            </a:r>
+            <a:r>
+              <a:rPr lang="en-US" dirty="0" err="1"/>
+              <a:t>aber</a:t>
+            </a:r>
+            <a:r>
+              <a:rPr lang="en-US" dirty="0"/>
+              <a:t> </a:t>
+            </a:r>
+            <a:r>
+              <a:rPr lang="en-US" dirty="0" err="1"/>
+              <a:t>auch</a:t>
+            </a:r>
+            <a:r>
+              <a:rPr lang="en-US" dirty="0"/>
+              <a:t> </a:t>
+            </a:r>
+            <a:r>
+              <a:rPr lang="en-US" dirty="0" err="1"/>
+              <a:t>schließen</a:t>
+            </a:r>
+            <a:r>
+              <a:rPr lang="en-US" dirty="0"/>
+              <a:t>, </a:t>
+            </a:r>
+            <a:r>
+              <a:rPr lang="en-US" dirty="0" err="1"/>
+              <a:t>dass</a:t>
+            </a:r>
+            <a:r>
+              <a:rPr lang="en-US" dirty="0"/>
+              <a:t> </a:t>
+            </a:r>
+            <a:r>
+              <a:rPr lang="en-US" dirty="0" err="1"/>
+              <a:t>viele</a:t>
+            </a:r>
+            <a:r>
+              <a:rPr lang="en-US" dirty="0"/>
+              <a:t> Wanderer </a:t>
+            </a:r>
+            <a:r>
+              <a:rPr lang="en-US" dirty="0" err="1"/>
+              <a:t>ihr</a:t>
+            </a:r>
+            <a:r>
+              <a:rPr lang="en-US" dirty="0"/>
+              <a:t> Smartphone </a:t>
+            </a:r>
+            <a:r>
+              <a:rPr lang="en-US" dirty="0" err="1"/>
+              <a:t>beim</a:t>
+            </a:r>
+            <a:r>
+              <a:rPr lang="en-US" dirty="0"/>
+              <a:t> </a:t>
+            </a:r>
+            <a:r>
+              <a:rPr lang="en-US" dirty="0" err="1"/>
+              <a:t>Wandern</a:t>
+            </a:r>
+            <a:r>
+              <a:rPr lang="en-US" dirty="0"/>
+              <a:t> </a:t>
+            </a:r>
+            <a:r>
+              <a:rPr lang="en-US" dirty="0" err="1"/>
+              <a:t>nutzen</a:t>
+            </a:r>
+            <a:endParaRPr lang="en-US" dirty="0"/>
+          </a:p>
+          <a:p>
+            <a:r>
+              <a:rPr lang="en-US" dirty="0"/>
+              <a:t>Eine App, die </a:t>
+            </a:r>
+            <a:r>
+              <a:rPr lang="en-US" dirty="0" err="1"/>
+              <a:t>genutzte</a:t>
+            </a:r>
+            <a:r>
+              <a:rPr lang="en-US" dirty="0"/>
+              <a:t> </a:t>
+            </a:r>
+            <a:r>
+              <a:rPr lang="en-US" dirty="0" err="1"/>
+              <a:t>Angebote</a:t>
+            </a:r>
+            <a:r>
+              <a:rPr lang="en-US" dirty="0"/>
+              <a:t> </a:t>
+            </a:r>
+            <a:r>
+              <a:rPr lang="en-US" dirty="0" err="1"/>
+              <a:t>aus</a:t>
+            </a:r>
+            <a:r>
+              <a:rPr lang="en-US" dirty="0"/>
+              <a:t> </a:t>
+            </a:r>
+            <a:r>
+              <a:rPr lang="en-US" dirty="0" err="1"/>
+              <a:t>verschiedenen</a:t>
+            </a:r>
+            <a:r>
+              <a:rPr lang="en-US" dirty="0"/>
+              <a:t> Apps </a:t>
+            </a:r>
+            <a:r>
+              <a:rPr lang="en-US" dirty="0" err="1"/>
+              <a:t>kombiniert</a:t>
+            </a:r>
+            <a:endParaRPr lang="en-US" dirty="0"/>
+          </a:p>
+          <a:p>
+            <a:endParaRPr lang="en-US" dirty="0"/>
+          </a:p>
+          <a:p>
+            <a:r>
+              <a:rPr lang="en-US" dirty="0" err="1"/>
+              <a:t>Zukunft</a:t>
+            </a:r>
+            <a:r>
+              <a:rPr lang="en-US" dirty="0"/>
+              <a:t>: </a:t>
+            </a:r>
+            <a:r>
+              <a:rPr lang="en-US" dirty="0" err="1"/>
+              <a:t>Gerade</a:t>
+            </a:r>
+            <a:r>
+              <a:rPr lang="en-US" dirty="0"/>
+              <a:t> der </a:t>
+            </a:r>
+            <a:r>
+              <a:rPr lang="en-US" dirty="0" err="1"/>
+              <a:t>jüngeren</a:t>
+            </a:r>
+            <a:r>
+              <a:rPr lang="en-US" dirty="0"/>
+              <a:t> Generation </a:t>
+            </a:r>
+            <a:r>
+              <a:rPr lang="en-US" dirty="0" err="1"/>
+              <a:t>könnte</a:t>
+            </a:r>
+            <a:r>
+              <a:rPr lang="en-US" dirty="0"/>
+              <a:t> man </a:t>
+            </a:r>
+            <a:r>
+              <a:rPr lang="en-US" dirty="0" err="1"/>
+              <a:t>durch</a:t>
+            </a:r>
+            <a:r>
+              <a:rPr lang="en-US" dirty="0"/>
+              <a:t> </a:t>
+            </a:r>
+            <a:r>
+              <a:rPr lang="en-US" dirty="0" err="1"/>
+              <a:t>solch</a:t>
+            </a:r>
+            <a:r>
+              <a:rPr lang="en-US" dirty="0"/>
+              <a:t> </a:t>
+            </a:r>
+            <a:r>
+              <a:rPr lang="en-US" dirty="0" err="1"/>
+              <a:t>eine</a:t>
+            </a:r>
+            <a:r>
+              <a:rPr lang="en-US" dirty="0"/>
+              <a:t> App das </a:t>
+            </a:r>
+            <a:r>
+              <a:rPr lang="en-US" dirty="0" err="1"/>
+              <a:t>Wandern</a:t>
+            </a:r>
+            <a:r>
+              <a:rPr lang="en-US" dirty="0"/>
+              <a:t> </a:t>
+            </a:r>
+            <a:r>
+              <a:rPr lang="en-US" dirty="0" err="1"/>
+              <a:t>näher</a:t>
+            </a:r>
+            <a:r>
+              <a:rPr lang="en-US" dirty="0"/>
+              <a:t> </a:t>
+            </a:r>
+            <a:r>
+              <a:rPr lang="en-US" dirty="0" err="1"/>
+              <a:t>bringen</a:t>
+            </a:r>
+            <a:endParaRPr lang="en-US" dirty="0"/>
+          </a:p>
+        </p:txBody>
+      </p:sp>
+      <p:sp>
+        <p:nvSpPr>
+          <p:cNvPr id="4" name="Rectangle 3">
+            <a:extLst>
+              <a:ext uri="{FF2B5EF4-FFF2-40B4-BE49-F238E27FC236}">
+                <a16:creationId xmlns:a16="http://schemas.microsoft.com/office/drawing/2014/main" id="{D64176F1-8059-48A8-B95C-128E01FEAE2C}"/>
+              </a:ext>
+            </a:extLst>
+          </p:cNvPr>
+          <p:cNvSpPr/>
+          <p:nvPr/>
+        </p:nvSpPr>
+        <p:spPr>
+          <a:xfrm>
+            <a:off x="405468" y="6379151"/>
+            <a:ext cx="7874466" cy="478849"/>
+          </a:xfrm>
+          <a:prstGeom prst="rect">
+            <a:avLst/>
+          </a:prstGeom>
+        </p:spPr>
+        <p:txBody>
+          <a:bodyPr wrap="square">
+            <a:spAutoFit/>
+          </a:bodyPr>
+          <a:lstStyle/>
+          <a:p>
+            <a:pPr marL="342900" lvl="0" indent="-342900">
+              <a:lnSpc>
+                <a:spcPct val="107000"/>
+              </a:lnSpc>
+              <a:spcAft>
+                <a:spcPts val="800"/>
+              </a:spcAft>
+              <a:buFont typeface="Courier New" panose="02070309020205020404" pitchFamily="49" charset="0"/>
+              <a:buChar char="o"/>
+            </a:pPr>
+            <a:r>
+              <a:rPr lang="de-DE" sz="1200" u="sng" dirty="0">
+                <a:solidFill>
+                  <a:srgbClr val="0000FF"/>
+                </a:solidFill>
+                <a:latin typeface="Calibri" panose="020F0502020204030204" pitchFamily="34" charset="0"/>
+                <a:ea typeface="Calibri" panose="020F0502020204030204" pitchFamily="34" charset="0"/>
+                <a:cs typeface="Calibri" panose="020F0502020204030204" pitchFamily="34" charset="0"/>
+                <a:hlinkClick r:id="rId2"/>
+              </a:rPr>
+              <a:t>https://rlp.tourismusnetzwerk.info/2018/09/13/studie-zum-digitalen-verhalten-der-wanderer-bte-stell-ergebnisse-vor/</a:t>
+            </a:r>
+            <a:endParaRPr lang="de-DE" sz="1200" dirty="0">
+              <a:latin typeface="Calibri" panose="020F0502020204030204" pitchFamily="34" charset="0"/>
+              <a:ea typeface="Calibri" panose="020F0502020204030204" pitchFamily="34" charset="0"/>
+              <a:cs typeface="Times New Roman" panose="02020603050405020304" pitchFamily="18" charset="0"/>
+            </a:endParaRPr>
           </a:p>
         </p:txBody>
       </p:sp>
     </p:spTree>
     <p:extLst>
       <p:ext uri="{BB962C8B-B14F-4D97-AF65-F5344CB8AC3E}">
-        <p14:creationId xmlns:p14="http://schemas.microsoft.com/office/powerpoint/2010/main" val="2161597223"/>
+        <p14:creationId xmlns:p14="http://schemas.microsoft.com/office/powerpoint/2010/main" val="740188723"/>
+      </p:ext>
+    </p:extLst>
+  </p:cSld>
+  <p:clrMapOvr>
+    <a:masterClrMapping/>
+  </p:clrMapOvr>
+</p:sld>
+</file>
+
+<file path=ppt/slides/slide5.xml><?xml version="1.0" encoding="utf-8"?>
+<p:sld xmlns:a="http://schemas.openxmlformats.org/drawingml/2006/main" xmlns:r="http://schemas.openxmlformats.org/officeDocument/2006/relationships" xmlns:p="http://schemas.openxmlformats.org/presentationml/2006/main">
+  <p:cSld>
+    <p:spTree>
+      <p:nvGrpSpPr>
+        <p:cNvPr id="1" name=""/>
+        <p:cNvGrpSpPr/>
+        <p:nvPr/>
+      </p:nvGrpSpPr>
+      <p:grpSpPr>
+        <a:xfrm>
+          <a:off x="0" y="0"/>
+          <a:ext cx="0" cy="0"/>
+          <a:chOff x="0" y="0"/>
+          <a:chExt cx="0" cy="0"/>
+        </a:xfrm>
+      </p:grpSpPr>
+      <p:sp>
+        <p:nvSpPr>
+          <p:cNvPr id="2" name="Title 1">
+            <a:extLst>
+              <a:ext uri="{FF2B5EF4-FFF2-40B4-BE49-F238E27FC236}">
+                <a16:creationId xmlns:a16="http://schemas.microsoft.com/office/drawing/2014/main" id="{159EC839-CD46-40FA-8D7C-362FAED1595C}"/>
+              </a:ext>
+            </a:extLst>
+          </p:cNvPr>
+          <p:cNvSpPr>
+            <a:spLocks noGrp="1"/>
+          </p:cNvSpPr>
+          <p:nvPr>
+            <p:ph type="ctrTitle"/>
+          </p:nvPr>
+        </p:nvSpPr>
+        <p:spPr/>
+        <p:txBody>
+          <a:bodyPr/>
+          <a:lstStyle/>
+          <a:p>
+            <a:r>
+              <a:rPr lang="en-US" dirty="0" err="1"/>
+              <a:t>Prototyp</a:t>
+            </a:r>
+            <a:r>
+              <a:rPr lang="en-US" dirty="0"/>
+              <a:t> Demo</a:t>
+            </a:r>
+          </a:p>
+        </p:txBody>
+      </p:sp>
+    </p:spTree>
+    <p:extLst>
+      <p:ext uri="{BB962C8B-B14F-4D97-AF65-F5344CB8AC3E}">
+        <p14:creationId xmlns:p14="http://schemas.microsoft.com/office/powerpoint/2010/main" val="25900140"/>
+      </p:ext>
+    </p:extLst>
+  </p:cSld>
+  <p:clrMapOvr>
+    <a:masterClrMapping/>
+  </p:clrMapOvr>
+</p:sld>
+</file>
+
+<file path=ppt/slides/slide6.xml><?xml version="1.0" encoding="utf-8"?>
+<p:sld xmlns:a="http://schemas.openxmlformats.org/drawingml/2006/main" xmlns:r="http://schemas.openxmlformats.org/officeDocument/2006/relationships" xmlns:p="http://schemas.openxmlformats.org/presentationml/2006/main">
+  <p:cSld>
+    <p:spTree>
+      <p:nvGrpSpPr>
+        <p:cNvPr id="1" name=""/>
+        <p:cNvGrpSpPr/>
+        <p:nvPr/>
+      </p:nvGrpSpPr>
+      <p:grpSpPr>
+        <a:xfrm>
+          <a:off x="0" y="0"/>
+          <a:ext cx="0" cy="0"/>
+          <a:chOff x="0" y="0"/>
+          <a:chExt cx="0" cy="0"/>
+        </a:xfrm>
+      </p:grpSpPr>
+      <p:sp>
+        <p:nvSpPr>
+          <p:cNvPr id="2" name="Title 1">
+            <a:extLst>
+              <a:ext uri="{FF2B5EF4-FFF2-40B4-BE49-F238E27FC236}">
+                <a16:creationId xmlns:a16="http://schemas.microsoft.com/office/drawing/2014/main" id="{D7294F32-E0B9-4BF7-BAD9-69A5AD76B717}"/>
+              </a:ext>
+            </a:extLst>
+          </p:cNvPr>
+          <p:cNvSpPr>
+            <a:spLocks noGrp="1"/>
+          </p:cNvSpPr>
+          <p:nvPr>
+            <p:ph type="title"/>
+          </p:nvPr>
+        </p:nvSpPr>
+        <p:spPr/>
+        <p:txBody>
+          <a:bodyPr/>
+          <a:lstStyle/>
+          <a:p>
+            <a:r>
+              <a:rPr lang="en-US" dirty="0"/>
+              <a:t>So </a:t>
+            </a:r>
+            <a:r>
+              <a:rPr lang="en-US" dirty="0" err="1"/>
+              <a:t>wurde</a:t>
+            </a:r>
+            <a:r>
+              <a:rPr lang="en-US" dirty="0"/>
+              <a:t> </a:t>
+            </a:r>
+            <a:r>
+              <a:rPr lang="en-US" dirty="0" err="1"/>
+              <a:t>implementiert</a:t>
+            </a:r>
+            <a:endParaRPr lang="en-US" dirty="0"/>
+          </a:p>
+        </p:txBody>
+      </p:sp>
+      <p:sp>
+        <p:nvSpPr>
+          <p:cNvPr id="3" name="Content Placeholder 2">
+            <a:extLst>
+              <a:ext uri="{FF2B5EF4-FFF2-40B4-BE49-F238E27FC236}">
+                <a16:creationId xmlns:a16="http://schemas.microsoft.com/office/drawing/2014/main" id="{4690A1CA-2F06-4FCF-9DDB-2EBC49DF2237}"/>
+              </a:ext>
+            </a:extLst>
+          </p:cNvPr>
+          <p:cNvSpPr>
+            <a:spLocks noGrp="1"/>
+          </p:cNvSpPr>
+          <p:nvPr>
+            <p:ph idx="1"/>
+          </p:nvPr>
+        </p:nvSpPr>
+        <p:spPr>
+          <a:xfrm>
+            <a:off x="677334" y="1686187"/>
+            <a:ext cx="8596668" cy="5058562"/>
+          </a:xfrm>
+        </p:spPr>
+        <p:txBody>
+          <a:bodyPr>
+            <a:normAutofit/>
+          </a:bodyPr>
+          <a:lstStyle/>
+          <a:p>
+            <a:r>
+              <a:rPr lang="en-US" dirty="0"/>
+              <a:t>Login</a:t>
+            </a:r>
+          </a:p>
+          <a:p>
+            <a:r>
+              <a:rPr lang="en-US" dirty="0" err="1"/>
+              <a:t>Menü</a:t>
+            </a:r>
+            <a:endParaRPr lang="en-US" dirty="0"/>
+          </a:p>
+          <a:p>
+            <a:r>
+              <a:rPr lang="en-US" dirty="0" err="1"/>
+              <a:t>Karte</a:t>
+            </a:r>
+            <a:endParaRPr lang="en-US" dirty="0"/>
+          </a:p>
+          <a:p>
+            <a:r>
+              <a:rPr lang="en-US" dirty="0" err="1"/>
+              <a:t>Attraktionen</a:t>
+            </a:r>
+            <a:endParaRPr lang="en-US" dirty="0"/>
+          </a:p>
+          <a:p>
+            <a:r>
+              <a:rPr lang="en-US" dirty="0"/>
+              <a:t>Blog</a:t>
+            </a:r>
+          </a:p>
+          <a:p>
+            <a:r>
+              <a:rPr lang="en-US" dirty="0" err="1"/>
+              <a:t>Mountainbiking</a:t>
+            </a:r>
+            <a:endParaRPr lang="en-US" dirty="0"/>
+          </a:p>
+          <a:p>
+            <a:r>
+              <a:rPr lang="en-US" dirty="0"/>
+              <a:t>Geocaching</a:t>
+            </a:r>
+          </a:p>
+          <a:p>
+            <a:r>
+              <a:rPr lang="en-US" dirty="0"/>
+              <a:t>QR-Code</a:t>
+            </a:r>
+          </a:p>
+          <a:p>
+            <a:r>
+              <a:rPr lang="en-US" dirty="0" err="1"/>
+              <a:t>Hundebesitzer</a:t>
+            </a:r>
+            <a:endParaRPr lang="en-US" dirty="0"/>
+          </a:p>
+          <a:p>
+            <a:r>
+              <a:rPr lang="en-US" dirty="0"/>
+              <a:t> Mein </a:t>
+            </a:r>
+            <a:r>
+              <a:rPr lang="en-US" dirty="0" err="1"/>
+              <a:t>Profil</a:t>
+            </a:r>
+            <a:endParaRPr lang="en-US" dirty="0"/>
+          </a:p>
+          <a:p>
+            <a:r>
+              <a:rPr lang="en-US" dirty="0" err="1"/>
+              <a:t>Audioguide</a:t>
+            </a:r>
+            <a:endParaRPr lang="en-US" dirty="0"/>
+          </a:p>
+          <a:p>
+            <a:r>
+              <a:rPr lang="en-US" dirty="0"/>
+              <a:t>Live-Stream</a:t>
+            </a:r>
+          </a:p>
+          <a:p>
+            <a:endParaRPr lang="en-US" dirty="0"/>
+          </a:p>
+        </p:txBody>
+      </p:sp>
+      <p:pic>
+        <p:nvPicPr>
+          <p:cNvPr id="5" name="Graphic 4" descr="Checkmark">
+            <a:extLst>
+              <a:ext uri="{FF2B5EF4-FFF2-40B4-BE49-F238E27FC236}">
+                <a16:creationId xmlns:a16="http://schemas.microsoft.com/office/drawing/2014/main" id="{32AA2425-5688-48A3-8619-75AF2BEEED10}"/>
+              </a:ext>
+            </a:extLst>
+          </p:cNvPr>
+          <p:cNvPicPr>
+            <a:picLocks noChangeAspect="1"/>
+          </p:cNvPicPr>
+          <p:nvPr/>
+        </p:nvPicPr>
+        <p:blipFill>
+          <a:blip r:embed="rId2">
+            <a:extLst>
+              <a:ext uri="{96DAC541-7B7A-43D3-8B79-37D633B846F1}">
+                <asvg:svgBlip xmlns:asvg="http://schemas.microsoft.com/office/drawing/2016/SVG/main" r:embed="rId3"/>
+              </a:ext>
+            </a:extLst>
+          </a:blip>
+          <a:stretch>
+            <a:fillRect/>
+          </a:stretch>
+        </p:blipFill>
+        <p:spPr>
+          <a:xfrm>
+            <a:off x="3025426" y="1686187"/>
+            <a:ext cx="350441" cy="350441"/>
+          </a:xfrm>
+          <a:prstGeom prst="rect">
+            <a:avLst/>
+          </a:prstGeom>
+        </p:spPr>
+      </p:pic>
+      <p:pic>
+        <p:nvPicPr>
+          <p:cNvPr id="6" name="Graphic 5" descr="Checkmark">
+            <a:extLst>
+              <a:ext uri="{FF2B5EF4-FFF2-40B4-BE49-F238E27FC236}">
+                <a16:creationId xmlns:a16="http://schemas.microsoft.com/office/drawing/2014/main" id="{F40798E0-F277-4BFD-A409-5C9DF38B4658}"/>
+              </a:ext>
+            </a:extLst>
+          </p:cNvPr>
+          <p:cNvPicPr>
+            <a:picLocks noChangeAspect="1"/>
+          </p:cNvPicPr>
+          <p:nvPr/>
+        </p:nvPicPr>
+        <p:blipFill>
+          <a:blip r:embed="rId2">
+            <a:extLst>
+              <a:ext uri="{96DAC541-7B7A-43D3-8B79-37D633B846F1}">
+                <asvg:svgBlip xmlns:asvg="http://schemas.microsoft.com/office/drawing/2016/SVG/main" r:embed="rId3"/>
+              </a:ext>
+            </a:extLst>
+          </a:blip>
+          <a:stretch>
+            <a:fillRect/>
+          </a:stretch>
+        </p:blipFill>
+        <p:spPr>
+          <a:xfrm>
+            <a:off x="3025426" y="2076591"/>
+            <a:ext cx="350441" cy="350441"/>
+          </a:xfrm>
+          <a:prstGeom prst="rect">
+            <a:avLst/>
+          </a:prstGeom>
+        </p:spPr>
+      </p:pic>
+      <p:pic>
+        <p:nvPicPr>
+          <p:cNvPr id="7" name="Graphic 6" descr="Checkmark">
+            <a:extLst>
+              <a:ext uri="{FF2B5EF4-FFF2-40B4-BE49-F238E27FC236}">
+                <a16:creationId xmlns:a16="http://schemas.microsoft.com/office/drawing/2014/main" id="{5812D613-A1E5-4BF7-9F0E-4469FE27DEFA}"/>
+              </a:ext>
+            </a:extLst>
+          </p:cNvPr>
+          <p:cNvPicPr>
+            <a:picLocks noChangeAspect="1"/>
+          </p:cNvPicPr>
+          <p:nvPr/>
+        </p:nvPicPr>
+        <p:blipFill>
+          <a:blip r:embed="rId2">
+            <a:extLst>
+              <a:ext uri="{96DAC541-7B7A-43D3-8B79-37D633B846F1}">
+                <asvg:svgBlip xmlns:asvg="http://schemas.microsoft.com/office/drawing/2016/SVG/main" r:embed="rId4"/>
+              </a:ext>
+            </a:extLst>
+          </a:blip>
+          <a:stretch>
+            <a:fillRect/>
+          </a:stretch>
+        </p:blipFill>
+        <p:spPr>
+          <a:xfrm>
+            <a:off x="2977998" y="5322887"/>
+            <a:ext cx="350441" cy="350441"/>
+          </a:xfrm>
+          <a:prstGeom prst="rect">
+            <a:avLst/>
+          </a:prstGeom>
+        </p:spPr>
+      </p:pic>
+      <p:pic>
+        <p:nvPicPr>
+          <p:cNvPr id="11" name="Graphic 10" descr="Close">
+            <a:extLst>
+              <a:ext uri="{FF2B5EF4-FFF2-40B4-BE49-F238E27FC236}">
+                <a16:creationId xmlns:a16="http://schemas.microsoft.com/office/drawing/2014/main" id="{E620055F-BC3D-4AB2-9106-EC7D3263426D}"/>
+              </a:ext>
+            </a:extLst>
+          </p:cNvPr>
+          <p:cNvPicPr>
+            <a:picLocks noChangeAspect="1"/>
+          </p:cNvPicPr>
+          <p:nvPr/>
+        </p:nvPicPr>
+        <p:blipFill>
+          <a:blip r:embed="rId5">
+            <a:extLst>
+              <a:ext uri="{96DAC541-7B7A-43D3-8B79-37D633B846F1}">
+                <asvg:svgBlip xmlns:asvg="http://schemas.microsoft.com/office/drawing/2016/SVG/main" r:embed="rId6"/>
+              </a:ext>
+            </a:extLst>
+          </a:blip>
+          <a:stretch>
+            <a:fillRect/>
+          </a:stretch>
+        </p:blipFill>
+        <p:spPr>
+          <a:xfrm>
+            <a:off x="2954677" y="2477156"/>
+            <a:ext cx="425723" cy="425723"/>
+          </a:xfrm>
+          <a:prstGeom prst="rect">
+            <a:avLst/>
+          </a:prstGeom>
+        </p:spPr>
+      </p:pic>
+      <p:pic>
+        <p:nvPicPr>
+          <p:cNvPr id="12" name="Graphic 11" descr="Close">
+            <a:extLst>
+              <a:ext uri="{FF2B5EF4-FFF2-40B4-BE49-F238E27FC236}">
+                <a16:creationId xmlns:a16="http://schemas.microsoft.com/office/drawing/2014/main" id="{C9DBD8D1-A101-4923-AFD7-214613E99585}"/>
+              </a:ext>
+            </a:extLst>
+          </p:cNvPr>
+          <p:cNvPicPr>
+            <a:picLocks noChangeAspect="1"/>
+          </p:cNvPicPr>
+          <p:nvPr/>
+        </p:nvPicPr>
+        <p:blipFill>
+          <a:blip r:embed="rId5">
+            <a:extLst>
+              <a:ext uri="{96DAC541-7B7A-43D3-8B79-37D633B846F1}">
+                <asvg:svgBlip xmlns:asvg="http://schemas.microsoft.com/office/drawing/2016/SVG/main" r:embed="rId6"/>
+              </a:ext>
+            </a:extLst>
+          </a:blip>
+          <a:stretch>
+            <a:fillRect/>
+          </a:stretch>
+        </p:blipFill>
+        <p:spPr>
+          <a:xfrm>
+            <a:off x="2943845" y="3681737"/>
+            <a:ext cx="425723" cy="425723"/>
+          </a:xfrm>
+          <a:prstGeom prst="rect">
+            <a:avLst/>
+          </a:prstGeom>
+        </p:spPr>
+      </p:pic>
+      <p:pic>
+        <p:nvPicPr>
+          <p:cNvPr id="13" name="Graphic 12" descr="Close">
+            <a:extLst>
+              <a:ext uri="{FF2B5EF4-FFF2-40B4-BE49-F238E27FC236}">
+                <a16:creationId xmlns:a16="http://schemas.microsoft.com/office/drawing/2014/main" id="{64A9108D-F926-4B6B-A11E-AD463E9A9331}"/>
+              </a:ext>
+            </a:extLst>
+          </p:cNvPr>
+          <p:cNvPicPr>
+            <a:picLocks noChangeAspect="1"/>
+          </p:cNvPicPr>
+          <p:nvPr/>
+        </p:nvPicPr>
+        <p:blipFill>
+          <a:blip r:embed="rId7">
+            <a:extLst>
+              <a:ext uri="{96DAC541-7B7A-43D3-8B79-37D633B846F1}">
+                <asvg:svgBlip xmlns:asvg="http://schemas.microsoft.com/office/drawing/2016/SVG/main" r:embed="rId8"/>
+              </a:ext>
+            </a:extLst>
+          </a:blip>
+          <a:stretch>
+            <a:fillRect/>
+          </a:stretch>
+        </p:blipFill>
+        <p:spPr>
+          <a:xfrm>
+            <a:off x="2943844" y="2894947"/>
+            <a:ext cx="425723" cy="425723"/>
+          </a:xfrm>
+          <a:prstGeom prst="rect">
+            <a:avLst/>
+          </a:prstGeom>
+        </p:spPr>
+      </p:pic>
+      <p:pic>
+        <p:nvPicPr>
+          <p:cNvPr id="14" name="Graphic 13" descr="Close">
+            <a:extLst>
+              <a:ext uri="{FF2B5EF4-FFF2-40B4-BE49-F238E27FC236}">
+                <a16:creationId xmlns:a16="http://schemas.microsoft.com/office/drawing/2014/main" id="{B1EDF40C-3291-4553-8446-9E43E4340D42}"/>
+              </a:ext>
+            </a:extLst>
+          </p:cNvPr>
+          <p:cNvPicPr>
+            <a:picLocks noChangeAspect="1"/>
+          </p:cNvPicPr>
+          <p:nvPr/>
+        </p:nvPicPr>
+        <p:blipFill>
+          <a:blip r:embed="rId7">
+            <a:extLst>
+              <a:ext uri="{96DAC541-7B7A-43D3-8B79-37D633B846F1}">
+                <asvg:svgBlip xmlns:asvg="http://schemas.microsoft.com/office/drawing/2016/SVG/main" r:embed="rId8"/>
+              </a:ext>
+            </a:extLst>
+          </a:blip>
+          <a:stretch>
+            <a:fillRect/>
+          </a:stretch>
+        </p:blipFill>
+        <p:spPr>
+          <a:xfrm>
+            <a:off x="2943844" y="3290757"/>
+            <a:ext cx="425723" cy="425723"/>
+          </a:xfrm>
+          <a:prstGeom prst="rect">
+            <a:avLst/>
+          </a:prstGeom>
+        </p:spPr>
+      </p:pic>
+      <p:pic>
+        <p:nvPicPr>
+          <p:cNvPr id="15" name="Graphic 14" descr="Close">
+            <a:extLst>
+              <a:ext uri="{FF2B5EF4-FFF2-40B4-BE49-F238E27FC236}">
+                <a16:creationId xmlns:a16="http://schemas.microsoft.com/office/drawing/2014/main" id="{CD89538A-8006-4A19-B422-6E4E92C2898E}"/>
+              </a:ext>
+            </a:extLst>
+          </p:cNvPr>
+          <p:cNvPicPr>
+            <a:picLocks noChangeAspect="1"/>
+          </p:cNvPicPr>
+          <p:nvPr/>
+        </p:nvPicPr>
+        <p:blipFill>
+          <a:blip r:embed="rId7">
+            <a:extLst>
+              <a:ext uri="{96DAC541-7B7A-43D3-8B79-37D633B846F1}">
+                <asvg:svgBlip xmlns:asvg="http://schemas.microsoft.com/office/drawing/2016/SVG/main" r:embed="rId8"/>
+              </a:ext>
+            </a:extLst>
+          </a:blip>
+          <a:stretch>
+            <a:fillRect/>
+          </a:stretch>
+        </p:blipFill>
+        <p:spPr>
+          <a:xfrm>
+            <a:off x="2954677" y="4097317"/>
+            <a:ext cx="425723" cy="425723"/>
+          </a:xfrm>
+          <a:prstGeom prst="rect">
+            <a:avLst/>
+          </a:prstGeom>
+        </p:spPr>
+      </p:pic>
+      <p:pic>
+        <p:nvPicPr>
+          <p:cNvPr id="16" name="Graphic 15" descr="Close">
+            <a:extLst>
+              <a:ext uri="{FF2B5EF4-FFF2-40B4-BE49-F238E27FC236}">
+                <a16:creationId xmlns:a16="http://schemas.microsoft.com/office/drawing/2014/main" id="{F63B2284-7BB7-4B99-AC8B-B4B7D8143612}"/>
+              </a:ext>
+            </a:extLst>
+          </p:cNvPr>
+          <p:cNvPicPr>
+            <a:picLocks noChangeAspect="1"/>
+          </p:cNvPicPr>
+          <p:nvPr/>
+        </p:nvPicPr>
+        <p:blipFill>
+          <a:blip r:embed="rId7">
+            <a:extLst>
+              <a:ext uri="{96DAC541-7B7A-43D3-8B79-37D633B846F1}">
+                <asvg:svgBlip xmlns:asvg="http://schemas.microsoft.com/office/drawing/2016/SVG/main" r:embed="rId8"/>
+              </a:ext>
+            </a:extLst>
+          </a:blip>
+          <a:stretch>
+            <a:fillRect/>
+          </a:stretch>
+        </p:blipFill>
+        <p:spPr>
+          <a:xfrm>
+            <a:off x="2940358" y="4484600"/>
+            <a:ext cx="425723" cy="425723"/>
+          </a:xfrm>
+          <a:prstGeom prst="rect">
+            <a:avLst/>
+          </a:prstGeom>
+        </p:spPr>
+      </p:pic>
+      <p:pic>
+        <p:nvPicPr>
+          <p:cNvPr id="17" name="Graphic 16" descr="Close">
+            <a:extLst>
+              <a:ext uri="{FF2B5EF4-FFF2-40B4-BE49-F238E27FC236}">
+                <a16:creationId xmlns:a16="http://schemas.microsoft.com/office/drawing/2014/main" id="{CF99AAE1-ABF3-4EA7-A51F-53B1E0763FFF}"/>
+              </a:ext>
+            </a:extLst>
+          </p:cNvPr>
+          <p:cNvPicPr>
+            <a:picLocks noChangeAspect="1"/>
+          </p:cNvPicPr>
+          <p:nvPr/>
+        </p:nvPicPr>
+        <p:blipFill>
+          <a:blip r:embed="rId7">
+            <a:extLst>
+              <a:ext uri="{96DAC541-7B7A-43D3-8B79-37D633B846F1}">
+                <asvg:svgBlip xmlns:asvg="http://schemas.microsoft.com/office/drawing/2016/SVG/main" r:embed="rId8"/>
+              </a:ext>
+            </a:extLst>
+          </a:blip>
+          <a:stretch>
+            <a:fillRect/>
+          </a:stretch>
+        </p:blipFill>
+        <p:spPr>
+          <a:xfrm>
+            <a:off x="2947517" y="4858388"/>
+            <a:ext cx="425723" cy="425723"/>
+          </a:xfrm>
+          <a:prstGeom prst="rect">
+            <a:avLst/>
+          </a:prstGeom>
+        </p:spPr>
+      </p:pic>
+      <p:pic>
+        <p:nvPicPr>
+          <p:cNvPr id="18" name="Graphic 17" descr="Close">
+            <a:extLst>
+              <a:ext uri="{FF2B5EF4-FFF2-40B4-BE49-F238E27FC236}">
+                <a16:creationId xmlns:a16="http://schemas.microsoft.com/office/drawing/2014/main" id="{D190FB3B-B1D7-427E-B5B1-B866DD35884D}"/>
+              </a:ext>
+            </a:extLst>
+          </p:cNvPr>
+          <p:cNvPicPr>
+            <a:picLocks noChangeAspect="1"/>
+          </p:cNvPicPr>
+          <p:nvPr/>
+        </p:nvPicPr>
+        <p:blipFill>
+          <a:blip r:embed="rId7">
+            <a:extLst>
+              <a:ext uri="{96DAC541-7B7A-43D3-8B79-37D633B846F1}">
+                <asvg:svgBlip xmlns:asvg="http://schemas.microsoft.com/office/drawing/2016/SVG/main" r:embed="rId8"/>
+              </a:ext>
+            </a:extLst>
+          </a:blip>
+          <a:stretch>
+            <a:fillRect/>
+          </a:stretch>
+        </p:blipFill>
+        <p:spPr>
+          <a:xfrm>
+            <a:off x="2902716" y="5686970"/>
+            <a:ext cx="425723" cy="425723"/>
+          </a:xfrm>
+          <a:prstGeom prst="rect">
+            <a:avLst/>
+          </a:prstGeom>
+        </p:spPr>
+      </p:pic>
+      <p:pic>
+        <p:nvPicPr>
+          <p:cNvPr id="19" name="Graphic 18" descr="Close">
+            <a:extLst>
+              <a:ext uri="{FF2B5EF4-FFF2-40B4-BE49-F238E27FC236}">
+                <a16:creationId xmlns:a16="http://schemas.microsoft.com/office/drawing/2014/main" id="{D558CBC3-ECDB-465A-831E-7BA16FE7DA45}"/>
+              </a:ext>
+            </a:extLst>
+          </p:cNvPr>
+          <p:cNvPicPr>
+            <a:picLocks noChangeAspect="1"/>
+          </p:cNvPicPr>
+          <p:nvPr/>
+        </p:nvPicPr>
+        <p:blipFill>
+          <a:blip r:embed="rId7">
+            <a:extLst>
+              <a:ext uri="{96DAC541-7B7A-43D3-8B79-37D633B846F1}">
+                <asvg:svgBlip xmlns:asvg="http://schemas.microsoft.com/office/drawing/2016/SVG/main" r:embed="rId8"/>
+              </a:ext>
+            </a:extLst>
+          </a:blip>
+          <a:stretch>
+            <a:fillRect/>
+          </a:stretch>
+        </p:blipFill>
+        <p:spPr>
+          <a:xfrm>
+            <a:off x="2902715" y="6119372"/>
+            <a:ext cx="425723" cy="425723"/>
+          </a:xfrm>
+          <a:prstGeom prst="rect">
+            <a:avLst/>
+          </a:prstGeom>
+        </p:spPr>
+      </p:pic>
+    </p:spTree>
+    <p:extLst>
+      <p:ext uri="{BB962C8B-B14F-4D97-AF65-F5344CB8AC3E}">
+        <p14:creationId xmlns:p14="http://schemas.microsoft.com/office/powerpoint/2010/main" val="3518847134"/>
+      </p:ext>
+    </p:extLst>
+  </p:cSld>
+  <p:clrMapOvr>
+    <a:masterClrMapping/>
+  </p:clrMapOvr>
+  <p:timing>
+    <p:tnLst>
+      <p:par>
+        <p:cTn id="1" dur="indefinite" restart="never" nodeType="tmRoot">
+          <p:childTnLst>
+            <p:seq concurrent="1" nextAc="seek">
+              <p:cTn id="2" dur="indefinite" nodeType="mainSeq">
+                <p:childTnLst>
+                  <p:par>
+                    <p:cTn id="3" fill="hold">
+                      <p:stCondLst>
+                        <p:cond delay="indefinite"/>
+                      </p:stCondLst>
+                      <p:childTnLst>
+                        <p:par>
+                          <p:cTn id="4" fill="hold">
+                            <p:stCondLst>
+                              <p:cond delay="0"/>
+                            </p:stCondLst>
+                            <p:childTnLst>
+                              <p:par>
+                                <p:cTn id="5" presetID="1" presetClass="entr" presetSubtype="0" fill="hold" nodeType="clickEffect">
+                                  <p:stCondLst>
+                                    <p:cond delay="0"/>
+                                  </p:stCondLst>
+                                  <p:childTnLst>
+                                    <p:set>
+                                      <p:cBhvr>
+                                        <p:cTn id="6" dur="1" fill="hold">
+                                          <p:stCondLst>
+                                            <p:cond delay="0"/>
+                                          </p:stCondLst>
+                                        </p:cTn>
+                                        <p:tgtEl>
+                                          <p:spTgt spid="5"/>
+                                        </p:tgtEl>
+                                        <p:attrNameLst>
+                                          <p:attrName>style.visibility</p:attrName>
+                                        </p:attrNameLst>
+                                      </p:cBhvr>
+                                      <p:to>
+                                        <p:strVal val="visible"/>
+                                      </p:to>
+                                    </p:set>
+                                  </p:childTnLst>
+                                </p:cTn>
+                              </p:par>
+                            </p:childTnLst>
+                          </p:cTn>
+                        </p:par>
+                      </p:childTnLst>
+                    </p:cTn>
+                  </p:par>
+                  <p:par>
+                    <p:cTn id="7" fill="hold">
+                      <p:stCondLst>
+                        <p:cond delay="indefinite"/>
+                      </p:stCondLst>
+                      <p:childTnLst>
+                        <p:par>
+                          <p:cTn id="8" fill="hold">
+                            <p:stCondLst>
+                              <p:cond delay="0"/>
+                            </p:stCondLst>
+                            <p:childTnLst>
+                              <p:par>
+                                <p:cTn id="9" presetID="1" presetClass="entr" presetSubtype="0" fill="hold" nodeType="clickEffect">
+                                  <p:stCondLst>
+                                    <p:cond delay="0"/>
+                                  </p:stCondLst>
+                                  <p:childTnLst>
+                                    <p:set>
+                                      <p:cBhvr>
+                                        <p:cTn id="10" dur="1" fill="hold">
+                                          <p:stCondLst>
+                                            <p:cond delay="0"/>
+                                          </p:stCondLst>
+                                        </p:cTn>
+                                        <p:tgtEl>
+                                          <p:spTgt spid="6"/>
+                                        </p:tgtEl>
+                                        <p:attrNameLst>
+                                          <p:attrName>style.visibility</p:attrName>
+                                        </p:attrNameLst>
+                                      </p:cBhvr>
+                                      <p:to>
+                                        <p:strVal val="visible"/>
+                                      </p:to>
+                                    </p:set>
+                                  </p:childTnLst>
+                                </p:cTn>
+                              </p:par>
+                            </p:childTnLst>
+                          </p:cTn>
+                        </p:par>
+                      </p:childTnLst>
+                    </p:cTn>
+                  </p:par>
+                  <p:par>
+                    <p:cTn id="11" fill="hold">
+                      <p:stCondLst>
+                        <p:cond delay="indefinite"/>
+                      </p:stCondLst>
+                      <p:childTnLst>
+                        <p:par>
+                          <p:cTn id="12" fill="hold">
+                            <p:stCondLst>
+                              <p:cond delay="0"/>
+                            </p:stCondLst>
+                            <p:childTnLst>
+                              <p:par>
+                                <p:cTn id="13" presetID="1" presetClass="entr" presetSubtype="0" fill="hold" nodeType="clickEffect">
+                                  <p:stCondLst>
+                                    <p:cond delay="0"/>
+                                  </p:stCondLst>
+                                  <p:childTnLst>
+                                    <p:set>
+                                      <p:cBhvr>
+                                        <p:cTn id="14" dur="1" fill="hold">
+                                          <p:stCondLst>
+                                            <p:cond delay="0"/>
+                                          </p:stCondLst>
+                                        </p:cTn>
+                                        <p:tgtEl>
+                                          <p:spTgt spid="11"/>
+                                        </p:tgtEl>
+                                        <p:attrNameLst>
+                                          <p:attrName>style.visibility</p:attrName>
+                                        </p:attrNameLst>
+                                      </p:cBhvr>
+                                      <p:to>
+                                        <p:strVal val="visible"/>
+                                      </p:to>
+                                    </p:set>
+                                  </p:childTnLst>
+                                </p:cTn>
+                              </p:par>
+                            </p:childTnLst>
+                          </p:cTn>
+                        </p:par>
+                      </p:childTnLst>
+                    </p:cTn>
+                  </p:par>
+                  <p:par>
+                    <p:cTn id="15" fill="hold">
+                      <p:stCondLst>
+                        <p:cond delay="indefinite"/>
+                      </p:stCondLst>
+                      <p:childTnLst>
+                        <p:par>
+                          <p:cTn id="16" fill="hold">
+                            <p:stCondLst>
+                              <p:cond delay="0"/>
+                            </p:stCondLst>
+                            <p:childTnLst>
+                              <p:par>
+                                <p:cTn id="17" presetID="1" presetClass="entr" presetSubtype="0" fill="hold" nodeType="clickEffect">
+                                  <p:stCondLst>
+                                    <p:cond delay="0"/>
+                                  </p:stCondLst>
+                                  <p:childTnLst>
+                                    <p:set>
+                                      <p:cBhvr>
+                                        <p:cTn id="18" dur="1" fill="hold">
+                                          <p:stCondLst>
+                                            <p:cond delay="0"/>
+                                          </p:stCondLst>
+                                        </p:cTn>
+                                        <p:tgtEl>
+                                          <p:spTgt spid="13"/>
+                                        </p:tgtEl>
+                                        <p:attrNameLst>
+                                          <p:attrName>style.visibility</p:attrName>
+                                        </p:attrNameLst>
+                                      </p:cBhvr>
+                                      <p:to>
+                                        <p:strVal val="visible"/>
+                                      </p:to>
+                                    </p:set>
+                                  </p:childTnLst>
+                                </p:cTn>
+                              </p:par>
+                            </p:childTnLst>
+                          </p:cTn>
+                        </p:par>
+                      </p:childTnLst>
+                    </p:cTn>
+                  </p:par>
+                  <p:par>
+                    <p:cTn id="19" fill="hold">
+                      <p:stCondLst>
+                        <p:cond delay="indefinite"/>
+                      </p:stCondLst>
+                      <p:childTnLst>
+                        <p:par>
+                          <p:cTn id="20" fill="hold">
+                            <p:stCondLst>
+                              <p:cond delay="0"/>
+                            </p:stCondLst>
+                            <p:childTnLst>
+                              <p:par>
+                                <p:cTn id="21" presetID="1" presetClass="entr" presetSubtype="0" fill="hold" nodeType="clickEffect">
+                                  <p:stCondLst>
+                                    <p:cond delay="0"/>
+                                  </p:stCondLst>
+                                  <p:childTnLst>
+                                    <p:set>
+                                      <p:cBhvr>
+                                        <p:cTn id="22" dur="1" fill="hold">
+                                          <p:stCondLst>
+                                            <p:cond delay="0"/>
+                                          </p:stCondLst>
+                                        </p:cTn>
+                                        <p:tgtEl>
+                                          <p:spTgt spid="14"/>
+                                        </p:tgtEl>
+                                        <p:attrNameLst>
+                                          <p:attrName>style.visibility</p:attrName>
+                                        </p:attrNameLst>
+                                      </p:cBhvr>
+                                      <p:to>
+                                        <p:strVal val="visible"/>
+                                      </p:to>
+                                    </p:set>
+                                  </p:childTnLst>
+                                </p:cTn>
+                              </p:par>
+                            </p:childTnLst>
+                          </p:cTn>
+                        </p:par>
+                      </p:childTnLst>
+                    </p:cTn>
+                  </p:par>
+                  <p:par>
+                    <p:cTn id="23" fill="hold">
+                      <p:stCondLst>
+                        <p:cond delay="indefinite"/>
+                      </p:stCondLst>
+                      <p:childTnLst>
+                        <p:par>
+                          <p:cTn id="24" fill="hold">
+                            <p:stCondLst>
+                              <p:cond delay="0"/>
+                            </p:stCondLst>
+                            <p:childTnLst>
+                              <p:par>
+                                <p:cTn id="25" presetID="1" presetClass="entr" presetSubtype="0" fill="hold" nodeType="clickEffect">
+                                  <p:stCondLst>
+                                    <p:cond delay="0"/>
+                                  </p:stCondLst>
+                                  <p:childTnLst>
+                                    <p:set>
+                                      <p:cBhvr>
+                                        <p:cTn id="26" dur="1" fill="hold">
+                                          <p:stCondLst>
+                                            <p:cond delay="0"/>
+                                          </p:stCondLst>
+                                        </p:cTn>
+                                        <p:tgtEl>
+                                          <p:spTgt spid="12"/>
+                                        </p:tgtEl>
+                                        <p:attrNameLst>
+                                          <p:attrName>style.visibility</p:attrName>
+                                        </p:attrNameLst>
+                                      </p:cBhvr>
+                                      <p:to>
+                                        <p:strVal val="visible"/>
+                                      </p:to>
+                                    </p:set>
+                                  </p:childTnLst>
+                                </p:cTn>
+                              </p:par>
+                            </p:childTnLst>
+                          </p:cTn>
+                        </p:par>
+                      </p:childTnLst>
+                    </p:cTn>
+                  </p:par>
+                  <p:par>
+                    <p:cTn id="27" fill="hold">
+                      <p:stCondLst>
+                        <p:cond delay="indefinite"/>
+                      </p:stCondLst>
+                      <p:childTnLst>
+                        <p:par>
+                          <p:cTn id="28" fill="hold">
+                            <p:stCondLst>
+                              <p:cond delay="0"/>
+                            </p:stCondLst>
+                            <p:childTnLst>
+                              <p:par>
+                                <p:cTn id="29" presetID="1" presetClass="entr" presetSubtype="0" fill="hold" nodeType="clickEffect">
+                                  <p:stCondLst>
+                                    <p:cond delay="0"/>
+                                  </p:stCondLst>
+                                  <p:childTnLst>
+                                    <p:set>
+                                      <p:cBhvr>
+                                        <p:cTn id="30" dur="1" fill="hold">
+                                          <p:stCondLst>
+                                            <p:cond delay="0"/>
+                                          </p:stCondLst>
+                                        </p:cTn>
+                                        <p:tgtEl>
+                                          <p:spTgt spid="15"/>
+                                        </p:tgtEl>
+                                        <p:attrNameLst>
+                                          <p:attrName>style.visibility</p:attrName>
+                                        </p:attrNameLst>
+                                      </p:cBhvr>
+                                      <p:to>
+                                        <p:strVal val="visible"/>
+                                      </p:to>
+                                    </p:set>
+                                  </p:childTnLst>
+                                </p:cTn>
+                              </p:par>
+                            </p:childTnLst>
+                          </p:cTn>
+                        </p:par>
+                      </p:childTnLst>
+                    </p:cTn>
+                  </p:par>
+                  <p:par>
+                    <p:cTn id="31" fill="hold">
+                      <p:stCondLst>
+                        <p:cond delay="indefinite"/>
+                      </p:stCondLst>
+                      <p:childTnLst>
+                        <p:par>
+                          <p:cTn id="32" fill="hold">
+                            <p:stCondLst>
+                              <p:cond delay="0"/>
+                            </p:stCondLst>
+                            <p:childTnLst>
+                              <p:par>
+                                <p:cTn id="33" presetID="1" presetClass="entr" presetSubtype="0" fill="hold" nodeType="clickEffect">
+                                  <p:stCondLst>
+                                    <p:cond delay="0"/>
+                                  </p:stCondLst>
+                                  <p:childTnLst>
+                                    <p:set>
+                                      <p:cBhvr>
+                                        <p:cTn id="34" dur="1" fill="hold">
+                                          <p:stCondLst>
+                                            <p:cond delay="0"/>
+                                          </p:stCondLst>
+                                        </p:cTn>
+                                        <p:tgtEl>
+                                          <p:spTgt spid="16"/>
+                                        </p:tgtEl>
+                                        <p:attrNameLst>
+                                          <p:attrName>style.visibility</p:attrName>
+                                        </p:attrNameLst>
+                                      </p:cBhvr>
+                                      <p:to>
+                                        <p:strVal val="visible"/>
+                                      </p:to>
+                                    </p:set>
+                                  </p:childTnLst>
+                                </p:cTn>
+                              </p:par>
+                            </p:childTnLst>
+                          </p:cTn>
+                        </p:par>
+                      </p:childTnLst>
+                    </p:cTn>
+                  </p:par>
+                  <p:par>
+                    <p:cTn id="35" fill="hold">
+                      <p:stCondLst>
+                        <p:cond delay="indefinite"/>
+                      </p:stCondLst>
+                      <p:childTnLst>
+                        <p:par>
+                          <p:cTn id="36" fill="hold">
+                            <p:stCondLst>
+                              <p:cond delay="0"/>
+                            </p:stCondLst>
+                            <p:childTnLst>
+                              <p:par>
+                                <p:cTn id="37" presetID="1" presetClass="entr" presetSubtype="0" fill="hold" nodeType="clickEffect">
+                                  <p:stCondLst>
+                                    <p:cond delay="0"/>
+                                  </p:stCondLst>
+                                  <p:childTnLst>
+                                    <p:set>
+                                      <p:cBhvr>
+                                        <p:cTn id="38" dur="1" fill="hold">
+                                          <p:stCondLst>
+                                            <p:cond delay="0"/>
+                                          </p:stCondLst>
+                                        </p:cTn>
+                                        <p:tgtEl>
+                                          <p:spTgt spid="17"/>
+                                        </p:tgtEl>
+                                        <p:attrNameLst>
+                                          <p:attrName>style.visibility</p:attrName>
+                                        </p:attrNameLst>
+                                      </p:cBhvr>
+                                      <p:to>
+                                        <p:strVal val="visible"/>
+                                      </p:to>
+                                    </p:set>
+                                  </p:childTnLst>
+                                </p:cTn>
+                              </p:par>
+                            </p:childTnLst>
+                          </p:cTn>
+                        </p:par>
+                      </p:childTnLst>
+                    </p:cTn>
+                  </p:par>
+                  <p:par>
+                    <p:cTn id="39" fill="hold">
+                      <p:stCondLst>
+                        <p:cond delay="indefinite"/>
+                      </p:stCondLst>
+                      <p:childTnLst>
+                        <p:par>
+                          <p:cTn id="40" fill="hold">
+                            <p:stCondLst>
+                              <p:cond delay="0"/>
+                            </p:stCondLst>
+                            <p:childTnLst>
+                              <p:par>
+                                <p:cTn id="41" presetID="1" presetClass="entr" presetSubtype="0" fill="hold" nodeType="clickEffect">
+                                  <p:stCondLst>
+                                    <p:cond delay="0"/>
+                                  </p:stCondLst>
+                                  <p:childTnLst>
+                                    <p:set>
+                                      <p:cBhvr>
+                                        <p:cTn id="42" dur="1" fill="hold">
+                                          <p:stCondLst>
+                                            <p:cond delay="0"/>
+                                          </p:stCondLst>
+                                        </p:cTn>
+                                        <p:tgtEl>
+                                          <p:spTgt spid="7"/>
+                                        </p:tgtEl>
+                                        <p:attrNameLst>
+                                          <p:attrName>style.visibility</p:attrName>
+                                        </p:attrNameLst>
+                                      </p:cBhvr>
+                                      <p:to>
+                                        <p:strVal val="visible"/>
+                                      </p:to>
+                                    </p:set>
+                                  </p:childTnLst>
+                                </p:cTn>
+                              </p:par>
+                            </p:childTnLst>
+                          </p:cTn>
+                        </p:par>
+                      </p:childTnLst>
+                    </p:cTn>
+                  </p:par>
+                  <p:par>
+                    <p:cTn id="43" fill="hold">
+                      <p:stCondLst>
+                        <p:cond delay="indefinite"/>
+                      </p:stCondLst>
+                      <p:childTnLst>
+                        <p:par>
+                          <p:cTn id="44" fill="hold">
+                            <p:stCondLst>
+                              <p:cond delay="0"/>
+                            </p:stCondLst>
+                            <p:childTnLst>
+                              <p:par>
+                                <p:cTn id="45" presetID="1" presetClass="entr" presetSubtype="0" fill="hold" nodeType="clickEffect">
+                                  <p:stCondLst>
+                                    <p:cond delay="0"/>
+                                  </p:stCondLst>
+                                  <p:childTnLst>
+                                    <p:set>
+                                      <p:cBhvr>
+                                        <p:cTn id="46" dur="1" fill="hold">
+                                          <p:stCondLst>
+                                            <p:cond delay="0"/>
+                                          </p:stCondLst>
+                                        </p:cTn>
+                                        <p:tgtEl>
+                                          <p:spTgt spid="18"/>
+                                        </p:tgtEl>
+                                        <p:attrNameLst>
+                                          <p:attrName>style.visibility</p:attrName>
+                                        </p:attrNameLst>
+                                      </p:cBhvr>
+                                      <p:to>
+                                        <p:strVal val="visible"/>
+                                      </p:to>
+                                    </p:set>
+                                  </p:childTnLst>
+                                </p:cTn>
+                              </p:par>
+                            </p:childTnLst>
+                          </p:cTn>
+                        </p:par>
+                      </p:childTnLst>
+                    </p:cTn>
+                  </p:par>
+                  <p:par>
+                    <p:cTn id="47" fill="hold">
+                      <p:stCondLst>
+                        <p:cond delay="indefinite"/>
+                      </p:stCondLst>
+                      <p:childTnLst>
+                        <p:par>
+                          <p:cTn id="48" fill="hold">
+                            <p:stCondLst>
+                              <p:cond delay="0"/>
+                            </p:stCondLst>
+                            <p:childTnLst>
+                              <p:par>
+                                <p:cTn id="49" presetID="1" presetClass="entr" presetSubtype="0" fill="hold" nodeType="clickEffect">
+                                  <p:stCondLst>
+                                    <p:cond delay="0"/>
+                                  </p:stCondLst>
+                                  <p:childTnLst>
+                                    <p:set>
+                                      <p:cBhvr>
+                                        <p:cTn id="50" dur="1" fill="hold">
+                                          <p:stCondLst>
+                                            <p:cond delay="0"/>
+                                          </p:stCondLst>
+                                        </p:cTn>
+                                        <p:tgtEl>
+                                          <p:spTgt spid="19"/>
+                                        </p:tgtEl>
+                                        <p:attrNameLst>
+                                          <p:attrName>style.visibility</p:attrName>
+                                        </p:attrNameLst>
+                                      </p:cBhvr>
+                                      <p:to>
+                                        <p:strVal val="visible"/>
+                                      </p:to>
+                                    </p:set>
+                                  </p:childTnLst>
+                                </p:cTn>
+                              </p:par>
+                            </p:childTnLst>
+                          </p:cTn>
+                        </p:par>
+                      </p:childTnLst>
+                    </p:cTn>
+                  </p:par>
+                </p:childTnLst>
+              </p:cTn>
+              <p:prevCondLst>
+                <p:cond evt="onPrev" delay="0">
+                  <p:tgtEl>
+                    <p:sldTgt/>
+                  </p:tgtEl>
+                </p:cond>
+              </p:prevCondLst>
+              <p:nextCondLst>
+                <p:cond evt="onNext" delay="0">
+                  <p:tgtEl>
+                    <p:sldTgt/>
+                  </p:tgtEl>
+                </p:cond>
+              </p:nextCondLst>
+            </p:seq>
+          </p:childTnLst>
+        </p:cTn>
+      </p:par>
+    </p:tnLst>
+  </p:timing>
+</p:sld>
+</file>
+
+<file path=ppt/slides/slide7.xml><?xml version="1.0" encoding="utf-8"?>
+<p:sld xmlns:a="http://schemas.openxmlformats.org/drawingml/2006/main" xmlns:r="http://schemas.openxmlformats.org/officeDocument/2006/relationships" xmlns:p="http://schemas.openxmlformats.org/presentationml/2006/main">
+  <p:cSld>
+    <p:spTree>
+      <p:nvGrpSpPr>
+        <p:cNvPr id="1" name=""/>
+        <p:cNvGrpSpPr/>
+        <p:nvPr/>
+      </p:nvGrpSpPr>
+      <p:grpSpPr>
+        <a:xfrm>
+          <a:off x="0" y="0"/>
+          <a:ext cx="0" cy="0"/>
+          <a:chOff x="0" y="0"/>
+          <a:chExt cx="0" cy="0"/>
+        </a:xfrm>
+      </p:grpSpPr>
+      <p:sp>
+        <p:nvSpPr>
+          <p:cNvPr id="2" name="Title 1">
+            <a:extLst>
+              <a:ext uri="{FF2B5EF4-FFF2-40B4-BE49-F238E27FC236}">
+                <a16:creationId xmlns:a16="http://schemas.microsoft.com/office/drawing/2014/main" id="{8E1C6C46-E723-4487-8FAA-27EA8E6D921A}"/>
+              </a:ext>
+            </a:extLst>
+          </p:cNvPr>
+          <p:cNvSpPr>
+            <a:spLocks noGrp="1"/>
+          </p:cNvSpPr>
+          <p:nvPr>
+            <p:ph type="title"/>
+          </p:nvPr>
+        </p:nvSpPr>
+        <p:spPr/>
+        <p:txBody>
+          <a:bodyPr/>
+          <a:lstStyle/>
+          <a:p>
+            <a:r>
+              <a:rPr lang="en-US" dirty="0"/>
+              <a:t>App-Demo	</a:t>
+            </a:r>
+          </a:p>
+        </p:txBody>
+      </p:sp>
+      <p:sp>
+        <p:nvSpPr>
+          <p:cNvPr id="3" name="Text Placeholder 2">
+            <a:extLst>
+              <a:ext uri="{FF2B5EF4-FFF2-40B4-BE49-F238E27FC236}">
+                <a16:creationId xmlns:a16="http://schemas.microsoft.com/office/drawing/2014/main" id="{4D0F4875-D43D-43C5-8207-AF4354D75E62}"/>
+              </a:ext>
+            </a:extLst>
+          </p:cNvPr>
+          <p:cNvSpPr>
+            <a:spLocks noGrp="1"/>
+          </p:cNvSpPr>
+          <p:nvPr>
+            <p:ph type="body" idx="1"/>
+          </p:nvPr>
+        </p:nvSpPr>
+        <p:spPr/>
+        <p:txBody>
+          <a:bodyPr/>
+          <a:lstStyle/>
+          <a:p>
+            <a:r>
+              <a:rPr lang="en-US" dirty="0"/>
+              <a:t>So </a:t>
+            </a:r>
+            <a:r>
+              <a:rPr lang="en-US" dirty="0" err="1"/>
+              <a:t>sieht</a:t>
+            </a:r>
+            <a:r>
+              <a:rPr lang="en-US" dirty="0"/>
+              <a:t> das </a:t>
+            </a:r>
+            <a:r>
+              <a:rPr lang="en-US" dirty="0" err="1"/>
+              <a:t>Ergebnis</a:t>
+            </a:r>
+            <a:r>
+              <a:rPr lang="en-US" dirty="0"/>
+              <a:t> </a:t>
+            </a:r>
+            <a:r>
+              <a:rPr lang="en-US" dirty="0" err="1"/>
+              <a:t>aus</a:t>
+            </a:r>
+            <a:endParaRPr lang="en-US" dirty="0"/>
+          </a:p>
+        </p:txBody>
+      </p:sp>
+    </p:spTree>
+    <p:extLst>
+      <p:ext uri="{BB962C8B-B14F-4D97-AF65-F5344CB8AC3E}">
+        <p14:creationId xmlns:p14="http://schemas.microsoft.com/office/powerpoint/2010/main" val="551848983"/>
       </p:ext>
     </p:extLst>
   </p:cSld>

</xml_diff>

<commit_message>
made some changes to the presentation
</commit_message>
<xml_diff>
--- a/presentation/wanderoo – Gruppe 3.pptx
+++ b/presentation/wanderoo – Gruppe 3.pptx
@@ -12,6 +12,8 @@
     <p:sldId id="260" r:id="rId6"/>
     <p:sldId id="261" r:id="rId7"/>
     <p:sldId id="263" r:id="rId8"/>
+    <p:sldId id="264" r:id="rId9"/>
+    <p:sldId id="265" r:id="rId10"/>
   </p:sldIdLst>
   <p:sldSz cx="12192000" cy="6858000"/>
   <p:notesSz cx="6858000" cy="9144000"/>
@@ -5912,7 +5914,23 @@
           <a:p>
             <a:r>
               <a:rPr lang="en-US" dirty="0"/>
-              <a:t>(Luisa)</a:t>
+              <a:t>(Luisa hat das </a:t>
+            </a:r>
+            <a:r>
+              <a:rPr lang="en-US" dirty="0" err="1"/>
+              <a:t>Studium</a:t>
+            </a:r>
+            <a:r>
+              <a:rPr lang="en-US" dirty="0"/>
+              <a:t> </a:t>
+            </a:r>
+            <a:r>
+              <a:rPr lang="en-US" dirty="0" err="1"/>
+              <a:t>abgebroch</a:t>
+            </a:r>
+            <a:r>
+              <a:rPr lang="en-US" dirty="0"/>
+              <a:t>)</a:t>
             </a:r>
           </a:p>
         </p:txBody>
@@ -6843,6 +6861,40 @@
           <a:chExt cx="0" cy="0"/>
         </a:xfrm>
       </p:grpSpPr>
+      <p:pic>
+        <p:nvPicPr>
+          <p:cNvPr id="4" name="Picture 3">
+            <a:extLst>
+              <a:ext uri="{FF2B5EF4-FFF2-40B4-BE49-F238E27FC236}">
+                <a16:creationId xmlns:a16="http://schemas.microsoft.com/office/drawing/2014/main" id="{27B3B49E-FBD3-42A1-B9D5-39B7FF4E39BD}"/>
+              </a:ext>
+            </a:extLst>
+          </p:cNvPr>
+          <p:cNvPicPr>
+            <a:picLocks noChangeAspect="1"/>
+          </p:cNvPicPr>
+          <p:nvPr/>
+        </p:nvPicPr>
+        <p:blipFill rotWithShape="1">
+          <a:blip r:embed="rId2"/>
+          <a:srcRect l="-1" r="49" b="276"/>
+          <a:stretch/>
+        </p:blipFill>
+        <p:spPr>
+          <a:xfrm>
+            <a:off x="829355" y="265220"/>
+            <a:ext cx="8843151" cy="5613545"/>
+          </a:xfrm>
+          <a:prstGeom prst="rect">
+            <a:avLst/>
+          </a:prstGeom>
+          <a:ln>
+            <a:solidFill>
+              <a:schemeClr val="accent1"/>
+            </a:solidFill>
+          </a:ln>
+        </p:spPr>
+      </p:pic>
       <p:sp>
         <p:nvSpPr>
           <p:cNvPr id="2" name="Title 1">
@@ -6859,18 +6911,19 @@
             <p:ph type="ctrTitle"/>
           </p:nvPr>
         </p:nvSpPr>
-        <p:spPr/>
+        <p:spPr>
+          <a:xfrm>
+            <a:off x="1750348" y="2404534"/>
+            <a:ext cx="7766936" cy="1646302"/>
+          </a:xfrm>
+        </p:spPr>
         <p:txBody>
           <a:bodyPr/>
           <a:lstStyle/>
           <a:p>
             <a:r>
-              <a:rPr lang="en-US" dirty="0" err="1"/>
-              <a:t>Prototyp</a:t>
-            </a:r>
-            <a:r>
-              <a:rPr lang="en-US" dirty="0"/>
-              <a:t> Demo</a:t>
+              <a:rPr lang="en-US" dirty="0"/>
+              <a:t>Prototype Demo</a:t>
             </a:r>
           </a:p>
         </p:txBody>
@@ -8170,10 +8223,644 @@
           </a:p>
         </p:txBody>
       </p:sp>
+      <p:pic>
+        <p:nvPicPr>
+          <p:cNvPr id="4" name="Picture 3">
+            <a:extLst>
+              <a:ext uri="{FF2B5EF4-FFF2-40B4-BE49-F238E27FC236}">
+                <a16:creationId xmlns:a16="http://schemas.microsoft.com/office/drawing/2014/main" id="{EC34116E-A0C7-4056-9C3A-084E5F145011}"/>
+              </a:ext>
+            </a:extLst>
+          </p:cNvPr>
+          <p:cNvPicPr>
+            <a:picLocks noChangeAspect="1"/>
+          </p:cNvPicPr>
+          <p:nvPr/>
+        </p:nvPicPr>
+        <p:blipFill>
+          <a:blip r:embed="rId2"/>
+          <a:stretch>
+            <a:fillRect/>
+          </a:stretch>
+        </p:blipFill>
+        <p:spPr>
+          <a:xfrm>
+            <a:off x="4337644" y="232838"/>
+            <a:ext cx="3516712" cy="6392324"/>
+          </a:xfrm>
+          <a:prstGeom prst="rect">
+            <a:avLst/>
+          </a:prstGeom>
+        </p:spPr>
+      </p:pic>
     </p:spTree>
     <p:extLst>
       <p:ext uri="{BB962C8B-B14F-4D97-AF65-F5344CB8AC3E}">
         <p14:creationId xmlns:p14="http://schemas.microsoft.com/office/powerpoint/2010/main" val="551848983"/>
+      </p:ext>
+    </p:extLst>
+  </p:cSld>
+  <p:clrMapOvr>
+    <a:masterClrMapping/>
+  </p:clrMapOvr>
+</p:sld>
+</file>
+
+<file path=ppt/slides/slide8.xml><?xml version="1.0" encoding="utf-8"?>
+<p:sld xmlns:a="http://schemas.openxmlformats.org/drawingml/2006/main" xmlns:r="http://schemas.openxmlformats.org/officeDocument/2006/relationships" xmlns:p="http://schemas.openxmlformats.org/presentationml/2006/main">
+  <p:cSld>
+    <p:spTree>
+      <p:nvGrpSpPr>
+        <p:cNvPr id="1" name=""/>
+        <p:cNvGrpSpPr/>
+        <p:nvPr/>
+      </p:nvGrpSpPr>
+      <p:grpSpPr>
+        <a:xfrm>
+          <a:off x="0" y="0"/>
+          <a:ext cx="0" cy="0"/>
+          <a:chOff x="0" y="0"/>
+          <a:chExt cx="0" cy="0"/>
+        </a:xfrm>
+      </p:grpSpPr>
+      <p:sp>
+        <p:nvSpPr>
+          <p:cNvPr id="2" name="Title 1">
+            <a:extLst>
+              <a:ext uri="{FF2B5EF4-FFF2-40B4-BE49-F238E27FC236}">
+                <a16:creationId xmlns:a16="http://schemas.microsoft.com/office/drawing/2014/main" id="{A533C930-62BB-49CD-A689-73D96C0BFBBB}"/>
+              </a:ext>
+            </a:extLst>
+          </p:cNvPr>
+          <p:cNvSpPr>
+            <a:spLocks noGrp="1"/>
+          </p:cNvSpPr>
+          <p:nvPr>
+            <p:ph type="title"/>
+          </p:nvPr>
+        </p:nvSpPr>
+        <p:spPr/>
+        <p:txBody>
+          <a:bodyPr/>
+          <a:lstStyle/>
+          <a:p>
+            <a:r>
+              <a:rPr lang="en-US" dirty="0"/>
+              <a:t>Aufbau</a:t>
+            </a:r>
+          </a:p>
+        </p:txBody>
+      </p:sp>
+      <p:pic>
+        <p:nvPicPr>
+          <p:cNvPr id="4" name="Picture 3">
+            <a:extLst>
+              <a:ext uri="{FF2B5EF4-FFF2-40B4-BE49-F238E27FC236}">
+                <a16:creationId xmlns:a16="http://schemas.microsoft.com/office/drawing/2014/main" id="{AD68B0E1-41E1-4EB3-A65A-63E5C69892B2}"/>
+              </a:ext>
+            </a:extLst>
+          </p:cNvPr>
+          <p:cNvPicPr>
+            <a:picLocks noChangeAspect="1"/>
+          </p:cNvPicPr>
+          <p:nvPr/>
+        </p:nvPicPr>
+        <p:blipFill>
+          <a:blip r:embed="rId2">
+            <a:extLst>
+              <a:ext uri="{BEBA8EAE-BF5A-486C-A8C5-ECC9F3942E4B}">
+                <a14:imgProps xmlns:a14="http://schemas.microsoft.com/office/drawing/2010/main">
+                  <a14:imgLayer r:embed="rId3">
+                    <a14:imgEffect>
+                      <a14:backgroundRemoval t="0" b="99752" l="190" r="99621">
+                        <a14:foregroundMark x1="18009" y1="1613" x2="9573" y2="620"/>
+                        <a14:foregroundMark x1="9573" y1="620" x2="2180" y2="2978"/>
+                        <a14:foregroundMark x1="2180" y1="2978" x2="1327" y2="12903"/>
+                        <a14:foregroundMark x1="1327" y1="12903" x2="5592" y2="21464"/>
+                        <a14:foregroundMark x1="5592" y1="21464" x2="13175" y2="22333"/>
+                        <a14:foregroundMark x1="13175" y1="22333" x2="19905" y2="17246"/>
+                        <a14:foregroundMark x1="19905" y1="17246" x2="17536" y2="620"/>
+                        <a14:foregroundMark x1="3128" y1="1737" x2="4834" y2="20099"/>
+                        <a14:foregroundMark x1="4834" y1="30273" x2="14313" y2="32134"/>
+                        <a14:foregroundMark x1="18104" y1="28660" x2="8626" y2="27916"/>
+                        <a14:foregroundMark x1="38673" y1="4467" x2="46161" y2="5707"/>
+                        <a14:foregroundMark x1="46161" y1="5707" x2="49384" y2="15136"/>
+                        <a14:foregroundMark x1="49384" y1="15136" x2="42559" y2="18983"/>
+                        <a14:foregroundMark x1="42559" y1="18983" x2="39147" y2="10174"/>
+                        <a14:foregroundMark x1="39147" y1="10174" x2="39147" y2="4839"/>
+                        <a14:foregroundMark x1="24076" y1="29901" x2="38009" y2="17246"/>
+                        <a14:foregroundMark x1="38104" y1="17246" x2="36493" y2="18362"/>
+                        <a14:foregroundMark x1="37156" y1="17990" x2="23128" y2="29280"/>
+                        <a14:foregroundMark x1="14882" y1="55707" x2="29763" y2="54094"/>
+                        <a14:foregroundMark x1="29763" y1="54094" x2="33175" y2="55087"/>
+                        <a14:foregroundMark x1="41896" y1="87717" x2="46919" y2="95409"/>
+                        <a14:foregroundMark x1="46919" y1="95409" x2="54597" y2="95285"/>
+                        <a14:foregroundMark x1="54597" y1="95285" x2="61801" y2="96402"/>
+                        <a14:foregroundMark x1="68531" y1="47022" x2="69194" y2="79032"/>
+                        <a14:foregroundMark x1="69194" y1="79032" x2="74218" y2="86104"/>
+                        <a14:foregroundMark x1="74218" y1="86104" x2="81706" y2="85112"/>
+                        <a14:foregroundMark x1="81706" y1="85112" x2="89194" y2="85484"/>
+                        <a14:foregroundMark x1="89194" y1="85484" x2="93934" y2="77419"/>
+                        <a14:foregroundMark x1="93934" y1="77419" x2="93649" y2="56948"/>
+                        <a14:foregroundMark x1="93649" y1="56948" x2="90995" y2="47643"/>
+                        <a14:foregroundMark x1="90995" y1="47643" x2="68815" y2="47643"/>
+                        <a14:foregroundMark x1="95829" y1="46898" x2="95829" y2="85112"/>
+                        <a14:foregroundMark x1="95829" y1="85112" x2="93460" y2="87221"/>
+                        <a14:foregroundMark x1="55545" y1="28660" x2="47962" y2="28784"/>
+                        <a14:foregroundMark x1="47962" y1="28784" x2="45877" y2="28164"/>
+                        <a14:foregroundMark x1="29100" y1="27543" x2="59621" y2="28908"/>
+                        <a14:foregroundMark x1="59621" y1="28908" x2="51754" y2="28412"/>
+                        <a14:foregroundMark x1="51754" y1="28412" x2="59621" y2="28784"/>
+                        <a14:foregroundMark x1="59621" y1="28784" x2="61232" y2="28536"/>
+                        <a14:foregroundMark x1="69668" y1="28164" x2="77156" y2="28288"/>
+                        <a14:foregroundMark x1="77156" y1="28288" x2="88531" y2="27419"/>
+                        <a14:foregroundMark x1="67773" y1="45906" x2="52607" y2="23945"/>
+                        <a14:foregroundMark x1="52607" y1="23945" x2="50142" y2="21836"/>
+                        <a14:foregroundMark x1="46445" y1="21464" x2="49194" y2="28660"/>
+                        <a14:foregroundMark x1="50237" y1="22457" x2="55545" y2="28536"/>
+                        <a14:foregroundMark x1="42370" y1="20720" x2="39052" y2="29653"/>
+                        <a14:foregroundMark x1="40284" y1="19851" x2="37251" y2="28908"/>
+                        <a14:foregroundMark x1="49668" y1="15757" x2="69858" y2="28908"/>
+                        <a14:foregroundMark x1="69858" y1="28908" x2="70142" y2="29529"/>
+                        <a14:foregroundMark x1="48815" y1="16129" x2="62085" y2="24318"/>
+                        <a14:foregroundMark x1="62085" y1="24318" x2="49858" y2="16998"/>
+                        <a14:foregroundMark x1="73649" y1="85484" x2="68626" y2="85856"/>
+                        <a14:foregroundMark x1="89953" y1="45161" x2="89289" y2="35112"/>
+                        <a14:foregroundMark x1="89289" y1="35112" x2="84455" y2="27543"/>
+                        <a14:foregroundMark x1="84455" y1="27543" x2="67204" y2="27047"/>
+                        <a14:foregroundMark x1="22370" y1="52730" x2="1327" y2="51985"/>
+                        <a14:foregroundMark x1="14502" y1="53226" x2="6730" y2="54467"/>
+                        <a14:foregroundMark x1="6730" y1="54467" x2="284" y2="52357"/>
+                        <a14:foregroundMark x1="26161" y1="25434" x2="20284" y2="25682"/>
+                        <a14:foregroundMark x1="37536" y1="16253" x2="36398" y2="6203"/>
+                        <a14:foregroundMark x1="36398" y1="6203" x2="43128" y2="1737"/>
+                        <a14:foregroundMark x1="43128" y1="1737" x2="50521" y2="1985"/>
+                        <a14:foregroundMark x1="50521" y1="1985" x2="50806" y2="14516"/>
+                        <a14:foregroundMark x1="90237" y1="45285" x2="97156" y2="48759"/>
+                        <a14:foregroundMark x1="20474" y1="620" x2="22085" y2="10298"/>
+                        <a14:foregroundMark x1="22085" y1="10298" x2="20948" y2="22953"/>
+                        <a14:foregroundMark x1="14882" y1="56203" x2="12701" y2="86352"/>
+                        <a14:foregroundMark x1="12701" y1="86352" x2="18294" y2="93548"/>
+                        <a14:foregroundMark x1="18294" y1="93548" x2="25592" y2="92928"/>
+                        <a14:foregroundMark x1="25592" y1="92928" x2="33649" y2="92928"/>
+                        <a14:foregroundMark x1="33649" y1="92928" x2="41043" y2="91811"/>
+                        <a14:foregroundMark x1="41043" y1="91811" x2="43412" y2="92184"/>
+                        <a14:foregroundMark x1="62559" y1="90695" x2="69384" y2="94789"/>
+                        <a14:foregroundMark x1="69384" y1="94789" x2="70427" y2="99752"/>
+                        <a14:foregroundMark x1="18578" y1="93548" x2="13934" y2="88337"/>
+                        <a14:foregroundMark x1="16493" y1="92928" x2="14313" y2="88337"/>
+                        <a14:foregroundMark x1="70711" y1="26179" x2="86445" y2="27792"/>
+                        <a14:foregroundMark x1="86445" y1="27792" x2="99621" y2="49007"/>
+                        <a14:foregroundMark x1="90711" y1="33127" x2="89668" y2="27543"/>
+                        <a14:foregroundMark x1="89100" y1="28164" x2="80190" y2="26055"/>
+                        <a14:foregroundMark x1="60474" y1="20347" x2="51090" y2="14020"/>
+                        <a14:foregroundMark x1="67014" y1="47643" x2="61801" y2="39578"/>
+                        <a14:foregroundMark x1="66919" y1="25682" x2="82085" y2="24814"/>
+                        <a14:foregroundMark x1="82085" y1="24814" x2="89763" y2="25931"/>
+                        <a14:foregroundMark x1="89763" y1="25931" x2="95355" y2="36725"/>
+                        <a14:foregroundMark x1="35355" y1="51985" x2="39716" y2="60298"/>
+                        <a14:foregroundMark x1="39716" y1="60298" x2="39905" y2="88958"/>
+                        <a14:foregroundMark x1="67678" y1="88337" x2="75355" y2="88710"/>
+                        <a14:foregroundMark x1="75355" y1="88710" x2="83412" y2="87965"/>
+                        <a14:foregroundMark x1="83412" y1="87965" x2="90806" y2="88089"/>
+                        <a14:foregroundMark x1="90806" y1="88089" x2="96872" y2="82010"/>
+                        <a14:foregroundMark x1="96872" y1="82010" x2="96777" y2="52357"/>
+                        <a14:foregroundMark x1="96777" y1="52357" x2="97441" y2="49132"/>
+                        <a14:foregroundMark x1="13744" y1="89082" x2="18104" y2="95782"/>
+                        <a14:foregroundMark x1="96588" y1="83002" x2="90047" y2="88337"/>
+                        <a14:foregroundMark x1="90047" y1="88337" x2="89668" y2="88337"/>
+                        <a14:foregroundMark x1="96872" y1="83623" x2="91185" y2="89082"/>
+                        <a14:foregroundMark x1="96682" y1="83995" x2="92133" y2="88958"/>
+                        <a14:foregroundMark x1="96872" y1="85484" x2="95355" y2="92184"/>
+                        <a14:backgroundMark x1="96121" y1="92473" x2="86066" y2="99380"/>
+                        <a14:backgroundMark x1="99431" y1="90199" x2="97128" y2="91781"/>
+                        <a14:backgroundMark x1="86066" y1="99380" x2="86066" y2="99380"/>
+                      </a14:backgroundRemoval>
+                    </a14:imgEffect>
+                  </a14:imgLayer>
+                </a14:imgProps>
+              </a:ext>
+            </a:extLst>
+          </a:blip>
+          <a:stretch>
+            <a:fillRect/>
+          </a:stretch>
+        </p:blipFill>
+        <p:spPr>
+          <a:xfrm>
+            <a:off x="3132387" y="84030"/>
+            <a:ext cx="6522615" cy="4983154"/>
+          </a:xfrm>
+          <a:prstGeom prst="rect">
+            <a:avLst/>
+          </a:prstGeom>
+        </p:spPr>
+      </p:pic>
+      <p:sp>
+        <p:nvSpPr>
+          <p:cNvPr id="5" name="TextBox 4">
+            <a:extLst>
+              <a:ext uri="{FF2B5EF4-FFF2-40B4-BE49-F238E27FC236}">
+                <a16:creationId xmlns:a16="http://schemas.microsoft.com/office/drawing/2014/main" id="{7FDF7188-C07D-448D-A4A7-2BC551B56E6A}"/>
+              </a:ext>
+            </a:extLst>
+          </p:cNvPr>
+          <p:cNvSpPr txBox="1"/>
+          <p:nvPr/>
+        </p:nvSpPr>
+        <p:spPr>
+          <a:xfrm>
+            <a:off x="571500" y="5410200"/>
+            <a:ext cx="7928774" cy="646331"/>
+          </a:xfrm>
+          <a:prstGeom prst="rect">
+            <a:avLst/>
+          </a:prstGeom>
+          <a:noFill/>
+        </p:spPr>
+        <p:txBody>
+          <a:bodyPr wrap="none" rtlCol="0">
+            <a:spAutoFit/>
+          </a:bodyPr>
+          <a:lstStyle/>
+          <a:p>
+            <a:r>
+              <a:rPr lang="en-US" dirty="0" err="1"/>
+              <a:t>Auffällig</a:t>
+            </a:r>
+            <a:r>
+              <a:rPr lang="en-US" dirty="0"/>
+              <a:t> </a:t>
+            </a:r>
+            <a:r>
+              <a:rPr lang="en-US" dirty="0" err="1"/>
+              <a:t>ist</a:t>
+            </a:r>
+            <a:r>
+              <a:rPr lang="en-US" dirty="0"/>
+              <a:t>, </a:t>
+            </a:r>
+            <a:r>
+              <a:rPr lang="en-US" dirty="0" err="1"/>
+              <a:t>dass</a:t>
+            </a:r>
+            <a:r>
+              <a:rPr lang="en-US" dirty="0"/>
+              <a:t> die </a:t>
+            </a:r>
+            <a:r>
+              <a:rPr lang="en-US" dirty="0" err="1"/>
+              <a:t>Funktionen</a:t>
+            </a:r>
+            <a:r>
+              <a:rPr lang="en-US" dirty="0"/>
+              <a:t> von den Design-Klassen </a:t>
+            </a:r>
+            <a:r>
+              <a:rPr lang="en-US" dirty="0" err="1"/>
+              <a:t>getrennt</a:t>
+            </a:r>
+            <a:r>
+              <a:rPr lang="en-US" dirty="0"/>
+              <a:t> </a:t>
+            </a:r>
+            <a:r>
+              <a:rPr lang="en-US" dirty="0" err="1"/>
+              <a:t>wurden</a:t>
+            </a:r>
+            <a:r>
+              <a:rPr lang="en-US" dirty="0"/>
+              <a:t>.</a:t>
+            </a:r>
+            <a:br>
+              <a:rPr lang="en-US" dirty="0"/>
+            </a:br>
+            <a:r>
+              <a:rPr lang="en-US" dirty="0"/>
+              <a:t>Die </a:t>
+            </a:r>
+            <a:r>
+              <a:rPr lang="en-US" dirty="0" err="1"/>
+              <a:t>Logik</a:t>
+            </a:r>
+            <a:r>
+              <a:rPr lang="en-US" dirty="0"/>
+              <a:t> </a:t>
+            </a:r>
+            <a:r>
+              <a:rPr lang="en-US" dirty="0" err="1"/>
+              <a:t>wird</a:t>
+            </a:r>
+            <a:r>
+              <a:rPr lang="en-US" dirty="0"/>
+              <a:t> in extra Klassen </a:t>
+            </a:r>
+            <a:r>
+              <a:rPr lang="en-US" dirty="0" err="1"/>
+              <a:t>implementiert</a:t>
+            </a:r>
+            <a:r>
+              <a:rPr lang="en-US" dirty="0"/>
+              <a:t>, die </a:t>
+            </a:r>
+            <a:r>
+              <a:rPr lang="en-US" dirty="0" err="1"/>
+              <a:t>getrennt</a:t>
+            </a:r>
+            <a:r>
+              <a:rPr lang="en-US" dirty="0"/>
+              <a:t> von der UI </a:t>
+            </a:r>
+            <a:r>
+              <a:rPr lang="en-US" dirty="0" err="1"/>
+              <a:t>sind</a:t>
+            </a:r>
+            <a:endParaRPr lang="en-US" dirty="0"/>
+          </a:p>
+        </p:txBody>
+      </p:sp>
+    </p:spTree>
+    <p:extLst>
+      <p:ext uri="{BB962C8B-B14F-4D97-AF65-F5344CB8AC3E}">
+        <p14:creationId xmlns:p14="http://schemas.microsoft.com/office/powerpoint/2010/main" val="870046311"/>
+      </p:ext>
+    </p:extLst>
+  </p:cSld>
+  <p:clrMapOvr>
+    <a:masterClrMapping/>
+  </p:clrMapOvr>
+</p:sld>
+</file>
+
+<file path=ppt/slides/slide9.xml><?xml version="1.0" encoding="utf-8"?>
+<p:sld xmlns:a="http://schemas.openxmlformats.org/drawingml/2006/main" xmlns:r="http://schemas.openxmlformats.org/officeDocument/2006/relationships" xmlns:p="http://schemas.openxmlformats.org/presentationml/2006/main">
+  <p:cSld>
+    <p:spTree>
+      <p:nvGrpSpPr>
+        <p:cNvPr id="1" name=""/>
+        <p:cNvGrpSpPr/>
+        <p:nvPr/>
+      </p:nvGrpSpPr>
+      <p:grpSpPr>
+        <a:xfrm>
+          <a:off x="0" y="0"/>
+          <a:ext cx="0" cy="0"/>
+          <a:chOff x="0" y="0"/>
+          <a:chExt cx="0" cy="0"/>
+        </a:xfrm>
+      </p:grpSpPr>
+      <p:sp>
+        <p:nvSpPr>
+          <p:cNvPr id="2" name="Title 1">
+            <a:extLst>
+              <a:ext uri="{FF2B5EF4-FFF2-40B4-BE49-F238E27FC236}">
+                <a16:creationId xmlns:a16="http://schemas.microsoft.com/office/drawing/2014/main" id="{BFFE73E4-B193-441D-8A54-09AA7DF89A89}"/>
+              </a:ext>
+            </a:extLst>
+          </p:cNvPr>
+          <p:cNvSpPr>
+            <a:spLocks noGrp="1"/>
+          </p:cNvSpPr>
+          <p:nvPr>
+            <p:ph type="title"/>
+          </p:nvPr>
+        </p:nvSpPr>
+        <p:spPr/>
+        <p:txBody>
+          <a:bodyPr/>
+          <a:lstStyle/>
+          <a:p>
+            <a:r>
+              <a:rPr lang="en-US" dirty="0" err="1"/>
+              <a:t>Datenbank</a:t>
+            </a:r>
+            <a:endParaRPr lang="en-US" dirty="0"/>
+          </a:p>
+        </p:txBody>
+      </p:sp>
+      <p:sp>
+        <p:nvSpPr>
+          <p:cNvPr id="3" name="Content Placeholder 2">
+            <a:extLst>
+              <a:ext uri="{FF2B5EF4-FFF2-40B4-BE49-F238E27FC236}">
+                <a16:creationId xmlns:a16="http://schemas.microsoft.com/office/drawing/2014/main" id="{CD885E91-C09C-4371-8168-295BAD48D188}"/>
+              </a:ext>
+            </a:extLst>
+          </p:cNvPr>
+          <p:cNvSpPr>
+            <a:spLocks noGrp="1"/>
+          </p:cNvSpPr>
+          <p:nvPr>
+            <p:ph idx="1"/>
+          </p:nvPr>
+        </p:nvSpPr>
+        <p:spPr>
+          <a:xfrm>
+            <a:off x="677334" y="3657601"/>
+            <a:ext cx="8596668" cy="2383762"/>
+          </a:xfrm>
+        </p:spPr>
+        <p:txBody>
+          <a:bodyPr/>
+          <a:lstStyle/>
+          <a:p>
+            <a:r>
+              <a:rPr lang="en-US" dirty="0" err="1"/>
+              <a:t>Als</a:t>
+            </a:r>
+            <a:r>
+              <a:rPr lang="en-US" dirty="0"/>
+              <a:t> </a:t>
+            </a:r>
+            <a:r>
+              <a:rPr lang="en-US" dirty="0" err="1"/>
+              <a:t>Datenbanklösung</a:t>
+            </a:r>
+            <a:r>
+              <a:rPr lang="en-US" dirty="0"/>
+              <a:t> </a:t>
+            </a:r>
+            <a:r>
+              <a:rPr lang="en-US" dirty="0" err="1"/>
+              <a:t>nutzen</a:t>
+            </a:r>
+            <a:r>
+              <a:rPr lang="en-US" dirty="0"/>
+              <a:t> </a:t>
+            </a:r>
+            <a:r>
+              <a:rPr lang="en-US" dirty="0" err="1"/>
+              <a:t>wir</a:t>
+            </a:r>
+            <a:r>
+              <a:rPr lang="en-US" dirty="0"/>
+              <a:t> </a:t>
+            </a:r>
+            <a:r>
+              <a:rPr lang="en-US" dirty="0" err="1"/>
+              <a:t>als</a:t>
+            </a:r>
+            <a:r>
+              <a:rPr lang="en-US" dirty="0"/>
+              <a:t> </a:t>
+            </a:r>
+            <a:r>
+              <a:rPr lang="en-US" dirty="0" err="1"/>
+              <a:t>LocalHost</a:t>
+            </a:r>
+            <a:r>
+              <a:rPr lang="en-US" dirty="0"/>
+              <a:t> </a:t>
+            </a:r>
+            <a:r>
+              <a:rPr lang="en-US" dirty="0" err="1"/>
+              <a:t>eine</a:t>
+            </a:r>
+            <a:r>
+              <a:rPr lang="en-US" dirty="0"/>
+              <a:t> MySQL-</a:t>
+            </a:r>
+            <a:r>
+              <a:rPr lang="en-US" dirty="0" err="1"/>
+              <a:t>Datenbank</a:t>
+            </a:r>
+            <a:endParaRPr lang="en-US" dirty="0"/>
+          </a:p>
+          <a:p>
+            <a:r>
+              <a:rPr lang="en-US" dirty="0"/>
+              <a:t>Die </a:t>
+            </a:r>
+            <a:r>
+              <a:rPr lang="en-US" dirty="0" err="1"/>
+              <a:t>Anbindung</a:t>
+            </a:r>
+            <a:r>
+              <a:rPr lang="en-US" dirty="0"/>
+              <a:t> an </a:t>
+            </a:r>
+            <a:r>
+              <a:rPr lang="en-US" dirty="0" err="1"/>
+              <a:t>einen</a:t>
+            </a:r>
+            <a:r>
+              <a:rPr lang="en-US" dirty="0"/>
+              <a:t> Server </a:t>
+            </a:r>
+            <a:r>
+              <a:rPr lang="en-US" dirty="0" err="1"/>
+              <a:t>wäre</a:t>
+            </a:r>
+            <a:r>
+              <a:rPr lang="en-US" dirty="0"/>
+              <a:t> </a:t>
+            </a:r>
+            <a:r>
+              <a:rPr lang="en-US" dirty="0" err="1"/>
+              <a:t>möglich</a:t>
+            </a:r>
+            <a:r>
+              <a:rPr lang="en-US" dirty="0"/>
+              <a:t>, </a:t>
+            </a:r>
+            <a:r>
+              <a:rPr lang="en-US" dirty="0" err="1"/>
+              <a:t>soll</a:t>
+            </a:r>
+            <a:r>
+              <a:rPr lang="en-US" dirty="0"/>
+              <a:t> </a:t>
+            </a:r>
+            <a:r>
+              <a:rPr lang="en-US" dirty="0" err="1"/>
+              <a:t>jedoch</a:t>
+            </a:r>
+            <a:r>
+              <a:rPr lang="en-US" dirty="0"/>
+              <a:t> </a:t>
+            </a:r>
+            <a:r>
+              <a:rPr lang="en-US" dirty="0" err="1"/>
+              <a:t>nicht</a:t>
+            </a:r>
+            <a:r>
+              <a:rPr lang="en-US" dirty="0"/>
+              <a:t> </a:t>
+            </a:r>
+            <a:r>
+              <a:rPr lang="en-US" dirty="0" err="1"/>
+              <a:t>öffentlich</a:t>
+            </a:r>
+            <a:r>
+              <a:rPr lang="en-US" dirty="0"/>
+              <a:t> auf dem git </a:t>
+            </a:r>
+            <a:r>
+              <a:rPr lang="en-US" dirty="0" err="1"/>
+              <a:t>liegen</a:t>
+            </a:r>
+            <a:r>
+              <a:rPr lang="en-US" dirty="0"/>
+              <a:t>, da der Server </a:t>
+            </a:r>
+            <a:r>
+              <a:rPr lang="en-US" dirty="0" err="1"/>
+              <a:t>privat</a:t>
+            </a:r>
+            <a:r>
+              <a:rPr lang="en-US" dirty="0"/>
+              <a:t> </a:t>
+            </a:r>
+            <a:r>
+              <a:rPr lang="en-US" dirty="0" err="1"/>
+              <a:t>aufgesetzt</a:t>
+            </a:r>
+            <a:r>
+              <a:rPr lang="en-US" dirty="0"/>
+              <a:t> </a:t>
+            </a:r>
+            <a:r>
+              <a:rPr lang="en-US" dirty="0" err="1"/>
+              <a:t>wurde</a:t>
+            </a:r>
+            <a:endParaRPr lang="en-US" dirty="0"/>
+          </a:p>
+        </p:txBody>
+      </p:sp>
+      <p:pic>
+        <p:nvPicPr>
+          <p:cNvPr id="4" name="Picture 3">
+            <a:extLst>
+              <a:ext uri="{FF2B5EF4-FFF2-40B4-BE49-F238E27FC236}">
+                <a16:creationId xmlns:a16="http://schemas.microsoft.com/office/drawing/2014/main" id="{66089CA0-A29D-43F4-A41A-874B20FB4C08}"/>
+              </a:ext>
+            </a:extLst>
+          </p:cNvPr>
+          <p:cNvPicPr>
+            <a:picLocks noChangeAspect="1"/>
+          </p:cNvPicPr>
+          <p:nvPr/>
+        </p:nvPicPr>
+        <p:blipFill>
+          <a:blip r:embed="rId2"/>
+          <a:stretch>
+            <a:fillRect/>
+          </a:stretch>
+        </p:blipFill>
+        <p:spPr>
+          <a:xfrm>
+            <a:off x="571500" y="1526194"/>
+            <a:ext cx="8596668" cy="1935537"/>
+          </a:xfrm>
+          <a:prstGeom prst="rect">
+            <a:avLst/>
+          </a:prstGeom>
+        </p:spPr>
+      </p:pic>
+    </p:spTree>
+    <p:extLst>
+      <p:ext uri="{BB962C8B-B14F-4D97-AF65-F5344CB8AC3E}">
+        <p14:creationId xmlns:p14="http://schemas.microsoft.com/office/powerpoint/2010/main" val="1952191566"/>
       </p:ext>
     </p:extLst>
   </p:cSld>

</xml_diff>

<commit_message>
Revert "Merge branch 'master' of https://github.com/NicoGep/Programming_Project"
This reverts commit 6583d66fbdf40e39294531cfbf768c9e74fa4470, reversing
changes made to 5d9dc7d428f24e7c96c9188bf6b563f486025c45.
</commit_message>
<xml_diff>
--- a/presentation/wanderoo – Gruppe 3.pptx
+++ b/presentation/wanderoo – Gruppe 3.pptx
@@ -5,7 +5,7 @@
     <p:sldMasterId id="2147483660" r:id="rId1"/>
   </p:sldMasterIdLst>
   <p:notesMasterIdLst>
-    <p:notesMasterId r:id="rId14"/>
+    <p:notesMasterId r:id="rId15"/>
   </p:notesMasterIdLst>
   <p:sldIdLst>
     <p:sldId id="256" r:id="rId2"/>
@@ -18,8 +18,9 @@
     <p:sldId id="260" r:id="rId9"/>
     <p:sldId id="261" r:id="rId10"/>
     <p:sldId id="263" r:id="rId11"/>
-    <p:sldId id="264" r:id="rId12"/>
-    <p:sldId id="265" r:id="rId13"/>
+    <p:sldId id="269" r:id="rId12"/>
+    <p:sldId id="264" r:id="rId13"/>
+    <p:sldId id="265" r:id="rId14"/>
   </p:sldIdLst>
   <p:sldSz cx="12192000" cy="6858000"/>
   <p:notesSz cx="6858000" cy="9144000"/>
@@ -208,7 +209,7 @@
           <a:p>
             <a:fld id="{91C987E9-D846-45D7-B0BA-09A404DDD18F}" type="datetimeFigureOut">
               <a:rPr lang="en-US" smtClean="0"/>
-              <a:t>9/12/2020</a:t>
+              <a:t>10/29/2020</a:t>
             </a:fld>
             <a:endParaRPr lang="en-US"/>
           </a:p>
@@ -1527,7 +1528,7 @@
           <a:p>
             <a:fld id="{F7B45734-1697-4AB7-959A-59021CEE7C63}" type="datetime1">
               <a:rPr lang="de-DE" smtClean="0"/>
-              <a:t>12.09.2020</a:t>
+              <a:t>29.10.2020</a:t>
             </a:fld>
             <a:endParaRPr lang="en-US"/>
           </a:p>
@@ -1790,7 +1791,7 @@
           <a:p>
             <a:fld id="{28E0F9FB-1E8A-4CFC-BF19-70653968A72B}" type="datetime1">
               <a:rPr lang="de-DE" smtClean="0"/>
-              <a:t>12.09.2020</a:t>
+              <a:t>29.10.2020</a:t>
             </a:fld>
             <a:endParaRPr lang="en-US"/>
           </a:p>
@@ -2041,7 +2042,7 @@
           <a:p>
             <a:fld id="{4C8791FF-7201-4729-B98B-5B802CB6FE26}" type="datetime1">
               <a:rPr lang="de-DE" smtClean="0"/>
-              <a:t>12.09.2020</a:t>
+              <a:t>29.10.2020</a:t>
             </a:fld>
             <a:endParaRPr lang="en-US"/>
           </a:p>
@@ -2355,7 +2356,7 @@
           <a:p>
             <a:fld id="{16EBDE9D-3BF1-458B-B04E-AA7056777578}" type="datetime1">
               <a:rPr lang="de-DE" smtClean="0"/>
-              <a:t>12.09.2020</a:t>
+              <a:t>29.10.2020</a:t>
             </a:fld>
             <a:endParaRPr lang="en-US"/>
           </a:p>
@@ -2696,7 +2697,7 @@
           <a:p>
             <a:fld id="{72379833-F89A-4CC5-AD26-2146F255572C}" type="datetime1">
               <a:rPr lang="de-DE" smtClean="0"/>
-              <a:t>12.09.2020</a:t>
+              <a:t>29.10.2020</a:t>
             </a:fld>
             <a:endParaRPr lang="en-US"/>
           </a:p>
@@ -3010,7 +3011,7 @@
           <a:p>
             <a:fld id="{431A2CE2-D7A9-4F80-8471-7A4DA8B72368}" type="datetime1">
               <a:rPr lang="de-DE" smtClean="0"/>
-              <a:t>12.09.2020</a:t>
+              <a:t>29.10.2020</a:t>
             </a:fld>
             <a:endParaRPr lang="en-US"/>
           </a:p>
@@ -3403,7 +3404,7 @@
           <a:p>
             <a:fld id="{4B9D6D1C-E905-4368-9630-7DD1E44954A8}" type="datetime1">
               <a:rPr lang="de-DE" smtClean="0"/>
-              <a:t>12.09.2020</a:t>
+              <a:t>29.10.2020</a:t>
             </a:fld>
             <a:endParaRPr lang="en-US"/>
           </a:p>
@@ -3573,7 +3574,7 @@
           <a:p>
             <a:fld id="{8627FA29-765F-442F-8C7E-8C4E33FBBD15}" type="datetime1">
               <a:rPr lang="de-DE" smtClean="0"/>
-              <a:t>12.09.2020</a:t>
+              <a:t>29.10.2020</a:t>
             </a:fld>
             <a:endParaRPr lang="en-US"/>
           </a:p>
@@ -3753,7 +3754,7 @@
           <a:p>
             <a:fld id="{C79E08BA-6372-4F95-AB4E-CF7226F9351B}" type="datetime1">
               <a:rPr lang="de-DE" smtClean="0"/>
-              <a:t>12.09.2020</a:t>
+              <a:t>29.10.2020</a:t>
             </a:fld>
             <a:endParaRPr lang="en-US"/>
           </a:p>
@@ -3929,7 +3930,7 @@
           <a:p>
             <a:fld id="{BBFE0E78-BD63-486A-A840-5A82EE4DABDC}" type="datetime1">
               <a:rPr lang="de-DE" smtClean="0"/>
-              <a:t>12.09.2020</a:t>
+              <a:t>29.10.2020</a:t>
             </a:fld>
             <a:endParaRPr lang="en-US"/>
           </a:p>
@@ -4058,7 +4059,7 @@
           <a:p>
             <a:fld id="{FD088E02-9980-4083-8604-339DD30750A9}" type="datetime1">
               <a:rPr lang="de-DE" smtClean="0"/>
-              <a:t>12.09.2020</a:t>
+              <a:t>29.10.2020</a:t>
             </a:fld>
             <a:endParaRPr lang="en-US"/>
           </a:p>
@@ -4400,7 +4401,7 @@
           <a:p>
             <a:fld id="{512B8740-04A0-4F0F-BA2E-747FAA8552CF}" type="datetime1">
               <a:rPr lang="de-DE" smtClean="0"/>
-              <a:t>12.09.2020</a:t>
+              <a:t>29.10.2020</a:t>
             </a:fld>
             <a:endParaRPr lang="en-US"/>
           </a:p>
@@ -4632,7 +4633,7 @@
           <a:p>
             <a:fld id="{52340480-09C1-41B7-ACEE-F79B5ACF8268}" type="datetime1">
               <a:rPr lang="de-DE" smtClean="0"/>
-              <a:t>12.09.2020</a:t>
+              <a:t>29.10.2020</a:t>
             </a:fld>
             <a:endParaRPr lang="en-US"/>
           </a:p>
@@ -5006,7 +5007,7 @@
           <a:p>
             <a:fld id="{3C76072F-ABDE-49C9-B45F-982F33145057}" type="datetime1">
               <a:rPr lang="de-DE" smtClean="0"/>
-              <a:t>12.09.2020</a:t>
+              <a:t>29.10.2020</a:t>
             </a:fld>
             <a:endParaRPr lang="en-US"/>
           </a:p>
@@ -5129,7 +5130,7 @@
           <a:p>
             <a:fld id="{FF972E03-99BD-433F-85AD-6324DFFF3902}" type="datetime1">
               <a:rPr lang="de-DE" smtClean="0"/>
-              <a:t>12.09.2020</a:t>
+              <a:t>29.10.2020</a:t>
             </a:fld>
             <a:endParaRPr lang="en-US"/>
           </a:p>
@@ -5224,7 +5225,7 @@
           <a:p>
             <a:fld id="{EB4EFE40-CAA3-420B-8D0E-DBD5AB0FE83F}" type="datetime1">
               <a:rPr lang="de-DE" smtClean="0"/>
-              <a:t>12.09.2020</a:t>
+              <a:t>29.10.2020</a:t>
             </a:fld>
             <a:endParaRPr lang="en-US"/>
           </a:p>
@@ -5479,7 +5480,7 @@
           <a:p>
             <a:fld id="{E2AC2435-A98B-4155-AB69-4F954FE6AEBB}" type="datetime1">
               <a:rPr lang="de-DE" smtClean="0"/>
-              <a:t>12.09.2020</a:t>
+              <a:t>29.10.2020</a:t>
             </a:fld>
             <a:endParaRPr lang="en-US"/>
           </a:p>
@@ -6222,7 +6223,7 @@
           <a:p>
             <a:fld id="{589A2304-41B2-49D5-86E3-82760E9ED896}" type="datetime1">
               <a:rPr lang="de-DE" smtClean="0"/>
-              <a:t>12.09.2020</a:t>
+              <a:t>29.10.2020</a:t>
             </a:fld>
             <a:endParaRPr lang="en-US"/>
           </a:p>
@@ -6847,7 +6848,7 @@
           <a:p>
             <a:fld id="{46B7071C-03FC-43DF-B990-14F749E9D9DA}" type="datetime1">
               <a:rPr lang="de-DE" smtClean="0"/>
-              <a:t>12.09.2020</a:t>
+              <a:t>29.10.2020</a:t>
             </a:fld>
             <a:endParaRPr lang="en-US" dirty="0"/>
           </a:p>
@@ -7116,7 +7117,7 @@
             <a:fld id="{5665C720-CFBA-4CD6-B44E-E52DA515AFF8}" type="datetime1">
               <a:rPr lang="de-DE" sz="1400" smtClean="0"/>
               <a:pPr/>
-              <a:t>12.09.2020</a:t>
+              <a:t>29.10.2020</a:t>
             </a:fld>
             <a:endParaRPr lang="en-US" dirty="0"/>
           </a:p>
@@ -7296,7 +7297,7 @@
           <p:cNvPr id="2" name="Title 1">
             <a:extLst>
               <a:ext uri="{FF2B5EF4-FFF2-40B4-BE49-F238E27FC236}">
-                <a16:creationId xmlns:a16="http://schemas.microsoft.com/office/drawing/2014/main" id="{A533C930-62BB-49CD-A689-73D96C0BFBBB}"/>
+                <a16:creationId xmlns:a16="http://schemas.microsoft.com/office/drawing/2014/main" id="{DD89B45D-81B8-4037-8647-E08DB7556E63}"/>
               </a:ext>
             </a:extLst>
           </p:cNvPr>
@@ -7314,546 +7315,213 @@
           <a:p>
             <a:r>
               <a:rPr lang="en-US" dirty="0"/>
-              <a:t>Aufbau</a:t>
-            </a:r>
-          </a:p>
-        </p:txBody>
-      </p:sp>
-      <p:pic>
-        <p:nvPicPr>
-          <p:cNvPr id="4" name="Picture 3">
+              <a:t>Use Case: </a:t>
+            </a:r>
+            <a:r>
+              <a:rPr lang="en-US" dirty="0" err="1"/>
+              <a:t>Registrierung</a:t>
+            </a:r>
+            <a:endParaRPr lang="en-US" dirty="0"/>
+          </a:p>
+        </p:txBody>
+      </p:sp>
+      <p:sp>
+        <p:nvSpPr>
+          <p:cNvPr id="3" name="Content Placeholder 2">
             <a:extLst>
               <a:ext uri="{FF2B5EF4-FFF2-40B4-BE49-F238E27FC236}">
-                <a16:creationId xmlns:a16="http://schemas.microsoft.com/office/drawing/2014/main" id="{AD68B0E1-41E1-4EB3-A65A-63E5C69892B2}"/>
+                <a16:creationId xmlns:a16="http://schemas.microsoft.com/office/drawing/2014/main" id="{591DF666-F25C-416A-9D7B-D66F364C5048}"/>
               </a:ext>
             </a:extLst>
           </p:cNvPr>
-          <p:cNvPicPr>
-            <a:picLocks noChangeAspect="1"/>
-          </p:cNvPicPr>
-          <p:nvPr/>
-        </p:nvPicPr>
-        <p:blipFill>
-          <a:blip r:embed="rId2">
-            <a:extLst>
-              <a:ext uri="{BEBA8EAE-BF5A-486C-A8C5-ECC9F3942E4B}">
-                <a14:imgProps xmlns:a14="http://schemas.microsoft.com/office/drawing/2010/main">
-                  <a14:imgLayer r:embed="rId3">
-                    <a14:imgEffect>
-                      <a14:backgroundRemoval t="0" b="99752" l="190" r="99621">
-                        <a14:foregroundMark x1="18009" y1="1613" x2="9573" y2="620"/>
-                        <a14:foregroundMark x1="9573" y1="620" x2="2180" y2="2978"/>
-                        <a14:foregroundMark x1="2180" y1="2978" x2="1327" y2="12903"/>
-                        <a14:foregroundMark x1="1327" y1="12903" x2="5592" y2="21464"/>
-                        <a14:foregroundMark x1="5592" y1="21464" x2="13175" y2="22333"/>
-                        <a14:foregroundMark x1="13175" y1="22333" x2="19905" y2="17246"/>
-                        <a14:foregroundMark x1="19905" y1="17246" x2="17536" y2="620"/>
-                        <a14:foregroundMark x1="3128" y1="1737" x2="4834" y2="20099"/>
-                        <a14:foregroundMark x1="4834" y1="30273" x2="14313" y2="32134"/>
-                        <a14:foregroundMark x1="18104" y1="28660" x2="8626" y2="27916"/>
-                        <a14:foregroundMark x1="38673" y1="4467" x2="46161" y2="5707"/>
-                        <a14:foregroundMark x1="46161" y1="5707" x2="49384" y2="15136"/>
-                        <a14:foregroundMark x1="49384" y1="15136" x2="42559" y2="18983"/>
-                        <a14:foregroundMark x1="42559" y1="18983" x2="39147" y2="10174"/>
-                        <a14:foregroundMark x1="39147" y1="10174" x2="39147" y2="4839"/>
-                        <a14:foregroundMark x1="24076" y1="29901" x2="38009" y2="17246"/>
-                        <a14:foregroundMark x1="38104" y1="17246" x2="36493" y2="18362"/>
-                        <a14:foregroundMark x1="37156" y1="17990" x2="23128" y2="29280"/>
-                        <a14:foregroundMark x1="14882" y1="55707" x2="29763" y2="54094"/>
-                        <a14:foregroundMark x1="29763" y1="54094" x2="33175" y2="55087"/>
-                        <a14:foregroundMark x1="41896" y1="87717" x2="46919" y2="95409"/>
-                        <a14:foregroundMark x1="46919" y1="95409" x2="54597" y2="95285"/>
-                        <a14:foregroundMark x1="54597" y1="95285" x2="61801" y2="96402"/>
-                        <a14:foregroundMark x1="68531" y1="47022" x2="69194" y2="79032"/>
-                        <a14:foregroundMark x1="69194" y1="79032" x2="74218" y2="86104"/>
-                        <a14:foregroundMark x1="74218" y1="86104" x2="81706" y2="85112"/>
-                        <a14:foregroundMark x1="81706" y1="85112" x2="89194" y2="85484"/>
-                        <a14:foregroundMark x1="89194" y1="85484" x2="93934" y2="77419"/>
-                        <a14:foregroundMark x1="93934" y1="77419" x2="93649" y2="56948"/>
-                        <a14:foregroundMark x1="93649" y1="56948" x2="90995" y2="47643"/>
-                        <a14:foregroundMark x1="90995" y1="47643" x2="68815" y2="47643"/>
-                        <a14:foregroundMark x1="95829" y1="46898" x2="95829" y2="85112"/>
-                        <a14:foregroundMark x1="95829" y1="85112" x2="93460" y2="87221"/>
-                        <a14:foregroundMark x1="55545" y1="28660" x2="47962" y2="28784"/>
-                        <a14:foregroundMark x1="47962" y1="28784" x2="45877" y2="28164"/>
-                        <a14:foregroundMark x1="29100" y1="27543" x2="59621" y2="28908"/>
-                        <a14:foregroundMark x1="59621" y1="28908" x2="51754" y2="28412"/>
-                        <a14:foregroundMark x1="51754" y1="28412" x2="59621" y2="28784"/>
-                        <a14:foregroundMark x1="59621" y1="28784" x2="61232" y2="28536"/>
-                        <a14:foregroundMark x1="69668" y1="28164" x2="77156" y2="28288"/>
-                        <a14:foregroundMark x1="77156" y1="28288" x2="88531" y2="27419"/>
-                        <a14:foregroundMark x1="67773" y1="45906" x2="52607" y2="23945"/>
-                        <a14:foregroundMark x1="52607" y1="23945" x2="50142" y2="21836"/>
-                        <a14:foregroundMark x1="46445" y1="21464" x2="49194" y2="28660"/>
-                        <a14:foregroundMark x1="50237" y1="22457" x2="55545" y2="28536"/>
-                        <a14:foregroundMark x1="42370" y1="20720" x2="39052" y2="29653"/>
-                        <a14:foregroundMark x1="40284" y1="19851" x2="37251" y2="28908"/>
-                        <a14:foregroundMark x1="49668" y1="15757" x2="69858" y2="28908"/>
-                        <a14:foregroundMark x1="69858" y1="28908" x2="70142" y2="29529"/>
-                        <a14:foregroundMark x1="48815" y1="16129" x2="62085" y2="24318"/>
-                        <a14:foregroundMark x1="62085" y1="24318" x2="49858" y2="16998"/>
-                        <a14:foregroundMark x1="73649" y1="85484" x2="68626" y2="85856"/>
-                        <a14:foregroundMark x1="89953" y1="45161" x2="89289" y2="35112"/>
-                        <a14:foregroundMark x1="89289" y1="35112" x2="84455" y2="27543"/>
-                        <a14:foregroundMark x1="84455" y1="27543" x2="67204" y2="27047"/>
-                        <a14:foregroundMark x1="22370" y1="52730" x2="1327" y2="51985"/>
-                        <a14:foregroundMark x1="14502" y1="53226" x2="6730" y2="54467"/>
-                        <a14:foregroundMark x1="6730" y1="54467" x2="284" y2="52357"/>
-                        <a14:foregroundMark x1="26161" y1="25434" x2="20284" y2="25682"/>
-                        <a14:foregroundMark x1="37536" y1="16253" x2="36398" y2="6203"/>
-                        <a14:foregroundMark x1="36398" y1="6203" x2="43128" y2="1737"/>
-                        <a14:foregroundMark x1="43128" y1="1737" x2="50521" y2="1985"/>
-                        <a14:foregroundMark x1="50521" y1="1985" x2="50806" y2="14516"/>
-                        <a14:foregroundMark x1="90237" y1="45285" x2="97156" y2="48759"/>
-                        <a14:foregroundMark x1="20474" y1="620" x2="22085" y2="10298"/>
-                        <a14:foregroundMark x1="22085" y1="10298" x2="20948" y2="22953"/>
-                        <a14:foregroundMark x1="14882" y1="56203" x2="12701" y2="86352"/>
-                        <a14:foregroundMark x1="12701" y1="86352" x2="18294" y2="93548"/>
-                        <a14:foregroundMark x1="18294" y1="93548" x2="25592" y2="92928"/>
-                        <a14:foregroundMark x1="25592" y1="92928" x2="33649" y2="92928"/>
-                        <a14:foregroundMark x1="33649" y1="92928" x2="41043" y2="91811"/>
-                        <a14:foregroundMark x1="41043" y1="91811" x2="43412" y2="92184"/>
-                        <a14:foregroundMark x1="62559" y1="90695" x2="69384" y2="94789"/>
-                        <a14:foregroundMark x1="69384" y1="94789" x2="70427" y2="99752"/>
-                        <a14:foregroundMark x1="18578" y1="93548" x2="13934" y2="88337"/>
-                        <a14:foregroundMark x1="16493" y1="92928" x2="14313" y2="88337"/>
-                        <a14:foregroundMark x1="70711" y1="26179" x2="86445" y2="27792"/>
-                        <a14:foregroundMark x1="86445" y1="27792" x2="99621" y2="49007"/>
-                        <a14:foregroundMark x1="90711" y1="33127" x2="89668" y2="27543"/>
-                        <a14:foregroundMark x1="89100" y1="28164" x2="80190" y2="26055"/>
-                        <a14:foregroundMark x1="60474" y1="20347" x2="51090" y2="14020"/>
-                        <a14:foregroundMark x1="67014" y1="47643" x2="61801" y2="39578"/>
-                        <a14:foregroundMark x1="66919" y1="25682" x2="82085" y2="24814"/>
-                        <a14:foregroundMark x1="82085" y1="24814" x2="89763" y2="25931"/>
-                        <a14:foregroundMark x1="89763" y1="25931" x2="95355" y2="36725"/>
-                        <a14:foregroundMark x1="35355" y1="51985" x2="39716" y2="60298"/>
-                        <a14:foregroundMark x1="39716" y1="60298" x2="39905" y2="88958"/>
-                        <a14:foregroundMark x1="67678" y1="88337" x2="75355" y2="88710"/>
-                        <a14:foregroundMark x1="75355" y1="88710" x2="83412" y2="87965"/>
-                        <a14:foregroundMark x1="83412" y1="87965" x2="90806" y2="88089"/>
-                        <a14:foregroundMark x1="90806" y1="88089" x2="96872" y2="82010"/>
-                        <a14:foregroundMark x1="96872" y1="82010" x2="96777" y2="52357"/>
-                        <a14:foregroundMark x1="96777" y1="52357" x2="97441" y2="49132"/>
-                        <a14:foregroundMark x1="13744" y1="89082" x2="18104" y2="95782"/>
-                        <a14:foregroundMark x1="96588" y1="83002" x2="90047" y2="88337"/>
-                        <a14:foregroundMark x1="90047" y1="88337" x2="89668" y2="88337"/>
-                        <a14:foregroundMark x1="96872" y1="83623" x2="91185" y2="89082"/>
-                        <a14:foregroundMark x1="96682" y1="83995" x2="92133" y2="88958"/>
-                        <a14:foregroundMark x1="96872" y1="85484" x2="95355" y2="92184"/>
-                        <a14:backgroundMark x1="96121" y1="92473" x2="86066" y2="99380"/>
-                        <a14:backgroundMark x1="99431" y1="90199" x2="97128" y2="91781"/>
-                        <a14:backgroundMark x1="86066" y1="99380" x2="86066" y2="99380"/>
-                      </a14:backgroundRemoval>
-                    </a14:imgEffect>
-                  </a14:imgLayer>
-                </a14:imgProps>
-              </a:ext>
-            </a:extLst>
-          </a:blip>
-          <a:stretch>
-            <a:fillRect/>
-          </a:stretch>
-        </p:blipFill>
+          <p:cNvSpPr>
+            <a:spLocks noGrp="1"/>
+          </p:cNvSpPr>
+          <p:nvPr>
+            <p:ph idx="1"/>
+          </p:nvPr>
+        </p:nvSpPr>
         <p:spPr>
           <a:xfrm>
-            <a:off x="3105754" y="936102"/>
-            <a:ext cx="5745283" cy="4389287"/>
+            <a:off x="677334" y="1590675"/>
+            <a:ext cx="8596668" cy="5162550"/>
           </a:xfrm>
-          <a:prstGeom prst="rect">
-            <a:avLst/>
-          </a:prstGeom>
         </p:spPr>
-      </p:pic>
-      <p:sp>
-        <p:nvSpPr>
-          <p:cNvPr id="5" name="TextBox 4">
+        <p:txBody>
+          <a:bodyPr>
+            <a:normAutofit lnSpcReduction="10000"/>
+          </a:bodyPr>
+          <a:lstStyle/>
+          <a:p>
+            <a:r>
+              <a:rPr lang="de-DE" dirty="0"/>
+              <a:t>Beschreibung</a:t>
+            </a:r>
+          </a:p>
+          <a:p>
+            <a:pPr marL="457200" lvl="1" indent="0">
+              <a:buNone/>
+            </a:pPr>
+            <a:r>
+              <a:rPr lang="de-DE" dirty="0"/>
+              <a:t>Dieser </a:t>
+            </a:r>
+            <a:r>
+              <a:rPr lang="de-DE" dirty="0" err="1"/>
+              <a:t>Use</a:t>
+            </a:r>
+            <a:r>
+              <a:rPr lang="de-DE" dirty="0"/>
+              <a:t> Case beschreibt wie der Benutzer sich einen Account bei </a:t>
+            </a:r>
+            <a:r>
+              <a:rPr lang="de-DE" dirty="0" err="1"/>
+              <a:t>wanderoo</a:t>
+            </a:r>
+            <a:r>
+              <a:rPr lang="de-DE" dirty="0"/>
+              <a:t> anlegt</a:t>
+            </a:r>
+          </a:p>
+          <a:p>
+            <a:r>
+              <a:rPr lang="de-DE" dirty="0"/>
+              <a:t>Beteiligte</a:t>
+            </a:r>
+          </a:p>
+          <a:p>
+            <a:pPr marL="457200" lvl="1" indent="0">
+              <a:buNone/>
+            </a:pPr>
+            <a:r>
+              <a:rPr lang="de-DE" dirty="0"/>
+              <a:t>Benutzer</a:t>
+            </a:r>
+          </a:p>
+          <a:p>
+            <a:r>
+              <a:rPr lang="de-DE" dirty="0"/>
+              <a:t>Voraussetzungen</a:t>
+            </a:r>
+          </a:p>
+          <a:p>
+            <a:pPr marL="457200" lvl="1" indent="0">
+              <a:buNone/>
+            </a:pPr>
+            <a:r>
+              <a:rPr lang="de-DE" dirty="0"/>
+              <a:t>Datenbankverbindung muss vorhanden sein</a:t>
+            </a:r>
+          </a:p>
+          <a:p>
+            <a:pPr marL="457200" lvl="1" indent="0">
+              <a:buNone/>
+            </a:pPr>
+            <a:r>
+              <a:rPr lang="de-DE" dirty="0"/>
+              <a:t>Der Benutzer darf nicht vorhanden sein</a:t>
+            </a:r>
+          </a:p>
+          <a:p>
+            <a:r>
+              <a:rPr lang="de-DE" dirty="0"/>
+              <a:t>Ereignisfluss</a:t>
+            </a:r>
+          </a:p>
+          <a:p>
+            <a:pPr marL="457200" lvl="1" indent="0">
+              <a:buNone/>
+            </a:pPr>
+            <a:r>
+              <a:rPr lang="de-DE" dirty="0"/>
+              <a:t>Im Login-Screen muss auf Registrieren gedrückt werden</a:t>
+            </a:r>
+          </a:p>
+          <a:p>
+            <a:pPr marL="457200" lvl="1" indent="0">
+              <a:buNone/>
+            </a:pPr>
+            <a:r>
+              <a:rPr lang="de-DE" dirty="0"/>
+              <a:t>Reale Benutzerdaten müssen eingegeben werden</a:t>
+            </a:r>
+          </a:p>
+          <a:p>
+            <a:pPr marL="457200" lvl="1" indent="0">
+              <a:buNone/>
+            </a:pPr>
+            <a:r>
+              <a:rPr lang="de-DE" dirty="0"/>
+              <a:t>Der Registrieren-Knopf muss gedrückt werden</a:t>
+            </a:r>
+          </a:p>
+          <a:p>
+            <a:pPr indent="-285750"/>
+            <a:r>
+              <a:rPr lang="de-DE" dirty="0"/>
+              <a:t>Nachbedingung</a:t>
+            </a:r>
+          </a:p>
+          <a:p>
+            <a:pPr marL="457200" lvl="1" indent="0">
+              <a:buNone/>
+            </a:pPr>
+            <a:r>
+              <a:rPr lang="de-DE" dirty="0"/>
+              <a:t>Erfolgreich: Registrierung abgeschlossen, Menü-Screen wird angezeigt</a:t>
+            </a:r>
+          </a:p>
+          <a:p>
+            <a:pPr marL="457200" lvl="1" indent="0">
+              <a:buNone/>
+            </a:pPr>
+            <a:r>
+              <a:rPr lang="de-DE" dirty="0"/>
+              <a:t>Fehler: </a:t>
+            </a:r>
+            <a:r>
+              <a:rPr lang="de-DE"/>
+              <a:t>Registrierung fehlgeschlagen</a:t>
+            </a:r>
+          </a:p>
+          <a:p>
+            <a:pPr marL="457200" lvl="1" indent="0">
+              <a:buNone/>
+            </a:pPr>
+            <a:endParaRPr lang="de-DE" dirty="0"/>
+          </a:p>
+        </p:txBody>
+      </p:sp>
+      <p:sp>
+        <p:nvSpPr>
+          <p:cNvPr id="4" name="Date Placeholder 3">
             <a:extLst>
               <a:ext uri="{FF2B5EF4-FFF2-40B4-BE49-F238E27FC236}">
-                <a16:creationId xmlns:a16="http://schemas.microsoft.com/office/drawing/2014/main" id="{7FDF7188-C07D-448D-A4A7-2BC551B56E6A}"/>
+                <a16:creationId xmlns:a16="http://schemas.microsoft.com/office/drawing/2014/main" id="{2AE931F4-8979-439A-A18E-8926B74A1C51}"/>
               </a:ext>
             </a:extLst>
           </p:cNvPr>
-          <p:cNvSpPr txBox="1"/>
-          <p:nvPr/>
+          <p:cNvSpPr>
+            <a:spLocks noGrp="1"/>
+          </p:cNvSpPr>
+          <p:nvPr>
+            <p:ph type="dt" sz="half" idx="10"/>
+          </p:nvPr>
         </p:nvSpPr>
         <p:spPr>
           <a:xfrm>
-            <a:off x="571500" y="5410200"/>
-            <a:ext cx="7928774" cy="646331"/>
+            <a:off x="89958" y="104775"/>
+            <a:ext cx="911939" cy="365125"/>
           </a:xfrm>
-          <a:prstGeom prst="rect">
-            <a:avLst/>
-          </a:prstGeom>
-          <a:noFill/>
         </p:spPr>
         <p:txBody>
-          <a:bodyPr wrap="none" rtlCol="0">
-            <a:spAutoFit/>
-          </a:bodyPr>
+          <a:bodyPr/>
           <a:lstStyle/>
           <a:p>
-            <a:r>
-              <a:rPr lang="en-US" dirty="0" err="1"/>
-              <a:t>Auffällig</a:t>
-            </a:r>
-            <a:r>
-              <a:rPr lang="en-US" dirty="0"/>
-              <a:t> </a:t>
-            </a:r>
-            <a:r>
-              <a:rPr lang="en-US" dirty="0" err="1"/>
-              <a:t>ist</a:t>
-            </a:r>
-            <a:r>
-              <a:rPr lang="en-US" dirty="0"/>
-              <a:t>, </a:t>
-            </a:r>
-            <a:r>
-              <a:rPr lang="en-US" dirty="0" err="1"/>
-              <a:t>dass</a:t>
-            </a:r>
-            <a:r>
-              <a:rPr lang="en-US" dirty="0"/>
-              <a:t> die </a:t>
-            </a:r>
-            <a:r>
-              <a:rPr lang="en-US" dirty="0" err="1"/>
-              <a:t>Funktionen</a:t>
-            </a:r>
-            <a:r>
-              <a:rPr lang="en-US" dirty="0"/>
-              <a:t> von den Design-Klassen </a:t>
-            </a:r>
-            <a:r>
-              <a:rPr lang="en-US" dirty="0" err="1"/>
-              <a:t>getrennt</a:t>
-            </a:r>
-            <a:r>
-              <a:rPr lang="en-US" dirty="0"/>
-              <a:t> </a:t>
-            </a:r>
-            <a:r>
-              <a:rPr lang="en-US" dirty="0" err="1"/>
-              <a:t>wurden</a:t>
-            </a:r>
-            <a:r>
-              <a:rPr lang="en-US" dirty="0"/>
-              <a:t>.</a:t>
-            </a:r>
-            <a:br>
-              <a:rPr lang="en-US" dirty="0"/>
-            </a:br>
-            <a:r>
-              <a:rPr lang="en-US" dirty="0"/>
-              <a:t>Die </a:t>
-            </a:r>
-            <a:r>
-              <a:rPr lang="en-US" dirty="0" err="1"/>
-              <a:t>Logik</a:t>
-            </a:r>
-            <a:r>
-              <a:rPr lang="en-US" dirty="0"/>
-              <a:t> </a:t>
-            </a:r>
-            <a:r>
-              <a:rPr lang="en-US" dirty="0" err="1"/>
-              <a:t>wird</a:t>
-            </a:r>
-            <a:r>
-              <a:rPr lang="en-US" dirty="0"/>
-              <a:t> in extra Klassen </a:t>
-            </a:r>
-            <a:r>
-              <a:rPr lang="en-US" dirty="0" err="1"/>
-              <a:t>implementiert</a:t>
-            </a:r>
-            <a:r>
-              <a:rPr lang="en-US" dirty="0"/>
-              <a:t>, die </a:t>
-            </a:r>
-            <a:r>
-              <a:rPr lang="en-US" dirty="0" err="1"/>
-              <a:t>getrennt</a:t>
-            </a:r>
-            <a:r>
-              <a:rPr lang="en-US" dirty="0"/>
-              <a:t> von der UI </a:t>
-            </a:r>
-            <a:r>
-              <a:rPr lang="en-US" dirty="0" err="1"/>
-              <a:t>sind</a:t>
-            </a:r>
-            <a:endParaRPr lang="en-US" dirty="0"/>
-          </a:p>
-        </p:txBody>
-      </p:sp>
-      <p:sp>
-        <p:nvSpPr>
-          <p:cNvPr id="6" name="Date Placeholder 3">
-            <a:extLst>
-              <a:ext uri="{FF2B5EF4-FFF2-40B4-BE49-F238E27FC236}">
-                <a16:creationId xmlns:a16="http://schemas.microsoft.com/office/drawing/2014/main" id="{C597FC9F-E38B-4D7C-800C-2E507A9787EC}"/>
-              </a:ext>
-            </a:extLst>
-          </p:cNvPr>
-          <p:cNvSpPr txBox="1">
-            <a:spLocks/>
-          </p:cNvSpPr>
-          <p:nvPr/>
-        </p:nvSpPr>
-        <p:spPr>
-          <a:xfrm>
-            <a:off x="677334" y="231051"/>
-            <a:ext cx="1071566" cy="378549"/>
-          </a:xfrm>
-          <a:prstGeom prst="rect">
-            <a:avLst/>
-          </a:prstGeom>
-        </p:spPr>
-        <p:txBody>
-          <a:bodyPr vert="horz" lIns="91440" tIns="45720" rIns="91440" bIns="45720" rtlCol="0" anchor="ctr"/>
-          <a:lstStyle>
-            <a:defPPr>
-              <a:defRPr lang="en-US"/>
-            </a:defPPr>
-            <a:lvl1pPr marL="0" algn="r" defTabSz="457200" rtl="0" eaLnBrk="1" latinLnBrk="0" hangingPunct="1">
-              <a:defRPr sz="900" kern="1200">
-                <a:solidFill>
-                  <a:schemeClr val="tx1">
-                    <a:tint val="75000"/>
-                  </a:schemeClr>
-                </a:solidFill>
-                <a:latin typeface="+mn-lt"/>
-                <a:ea typeface="+mn-ea"/>
-                <a:cs typeface="+mn-cs"/>
-              </a:defRPr>
-            </a:lvl1pPr>
-            <a:lvl2pPr marL="457200" algn="l" defTabSz="457200" rtl="0" eaLnBrk="1" latinLnBrk="0" hangingPunct="1">
-              <a:defRPr sz="1800" kern="1200">
-                <a:solidFill>
-                  <a:schemeClr val="tx1"/>
-                </a:solidFill>
-                <a:latin typeface="+mn-lt"/>
-                <a:ea typeface="+mn-ea"/>
-                <a:cs typeface="+mn-cs"/>
-              </a:defRPr>
-            </a:lvl2pPr>
-            <a:lvl3pPr marL="914400" algn="l" defTabSz="457200" rtl="0" eaLnBrk="1" latinLnBrk="0" hangingPunct="1">
-              <a:defRPr sz="1800" kern="1200">
-                <a:solidFill>
-                  <a:schemeClr val="tx1"/>
-                </a:solidFill>
-                <a:latin typeface="+mn-lt"/>
-                <a:ea typeface="+mn-ea"/>
-                <a:cs typeface="+mn-cs"/>
-              </a:defRPr>
-            </a:lvl3pPr>
-            <a:lvl4pPr marL="1371600" algn="l" defTabSz="457200" rtl="0" eaLnBrk="1" latinLnBrk="0" hangingPunct="1">
-              <a:defRPr sz="1800" kern="1200">
-                <a:solidFill>
-                  <a:schemeClr val="tx1"/>
-                </a:solidFill>
-                <a:latin typeface="+mn-lt"/>
-                <a:ea typeface="+mn-ea"/>
-                <a:cs typeface="+mn-cs"/>
-              </a:defRPr>
-            </a:lvl4pPr>
-            <a:lvl5pPr marL="1828800" algn="l" defTabSz="457200" rtl="0" eaLnBrk="1" latinLnBrk="0" hangingPunct="1">
-              <a:defRPr sz="1800" kern="1200">
-                <a:solidFill>
-                  <a:schemeClr val="tx1"/>
-                </a:solidFill>
-                <a:latin typeface="+mn-lt"/>
-                <a:ea typeface="+mn-ea"/>
-                <a:cs typeface="+mn-cs"/>
-              </a:defRPr>
-            </a:lvl5pPr>
-            <a:lvl6pPr marL="2286000" algn="l" defTabSz="457200" rtl="0" eaLnBrk="1" latinLnBrk="0" hangingPunct="1">
-              <a:defRPr sz="1800" kern="1200">
-                <a:solidFill>
-                  <a:schemeClr val="tx1"/>
-                </a:solidFill>
-                <a:latin typeface="+mn-lt"/>
-                <a:ea typeface="+mn-ea"/>
-                <a:cs typeface="+mn-cs"/>
-              </a:defRPr>
-            </a:lvl6pPr>
-            <a:lvl7pPr marL="2743200" algn="l" defTabSz="457200" rtl="0" eaLnBrk="1" latinLnBrk="0" hangingPunct="1">
-              <a:defRPr sz="1800" kern="1200">
-                <a:solidFill>
-                  <a:schemeClr val="tx1"/>
-                </a:solidFill>
-                <a:latin typeface="+mn-lt"/>
-                <a:ea typeface="+mn-ea"/>
-                <a:cs typeface="+mn-cs"/>
-              </a:defRPr>
-            </a:lvl7pPr>
-            <a:lvl8pPr marL="3200400" algn="l" defTabSz="457200" rtl="0" eaLnBrk="1" latinLnBrk="0" hangingPunct="1">
-              <a:defRPr sz="1800" kern="1200">
-                <a:solidFill>
-                  <a:schemeClr val="tx1"/>
-                </a:solidFill>
-                <a:latin typeface="+mn-lt"/>
-                <a:ea typeface="+mn-ea"/>
-                <a:cs typeface="+mn-cs"/>
-              </a:defRPr>
-            </a:lvl8pPr>
-            <a:lvl9pPr marL="3657600" algn="l" defTabSz="457200" rtl="0" eaLnBrk="1" latinLnBrk="0" hangingPunct="1">
-              <a:defRPr sz="1800" kern="1200">
-                <a:solidFill>
-                  <a:schemeClr val="tx1"/>
-                </a:solidFill>
-                <a:latin typeface="+mn-lt"/>
-                <a:ea typeface="+mn-ea"/>
-                <a:cs typeface="+mn-cs"/>
-              </a:defRPr>
-            </a:lvl9pPr>
-          </a:lstStyle>
-          <a:p>
-            <a:fld id="{5665C720-CFBA-4CD6-B44E-E52DA515AFF8}" type="datetime1">
-              <a:rPr lang="de-DE" sz="1400" smtClean="0"/>
-              <a:pPr/>
-              <a:t>12.09.2020</a:t>
+            <a:fld id="{BBFE0E78-BD63-486A-A840-5A82EE4DABDC}" type="datetime1">
+              <a:rPr lang="de-DE" smtClean="0"/>
+              <a:t>29.10.2020</a:t>
             </a:fld>
-            <a:endParaRPr lang="en-US" dirty="0"/>
-          </a:p>
-        </p:txBody>
-      </p:sp>
-      <p:sp>
-        <p:nvSpPr>
-          <p:cNvPr id="7" name="Date Placeholder 3">
-            <a:extLst>
-              <a:ext uri="{FF2B5EF4-FFF2-40B4-BE49-F238E27FC236}">
-                <a16:creationId xmlns:a16="http://schemas.microsoft.com/office/drawing/2014/main" id="{0F246959-6071-4609-B298-646E582C9281}"/>
-              </a:ext>
-            </a:extLst>
-          </p:cNvPr>
-          <p:cNvSpPr txBox="1">
-            <a:spLocks/>
-          </p:cNvSpPr>
-          <p:nvPr/>
-        </p:nvSpPr>
-        <p:spPr>
-          <a:xfrm>
-            <a:off x="1824033" y="231050"/>
-            <a:ext cx="5713108" cy="378549"/>
-          </a:xfrm>
-          <a:prstGeom prst="rect">
-            <a:avLst/>
-          </a:prstGeom>
-        </p:spPr>
-        <p:txBody>
-          <a:bodyPr vert="horz" lIns="91440" tIns="45720" rIns="91440" bIns="45720" rtlCol="0" anchor="ctr"/>
-          <a:lstStyle>
-            <a:defPPr>
-              <a:defRPr lang="en-US"/>
-            </a:defPPr>
-            <a:lvl1pPr marL="0" algn="r" defTabSz="457200" rtl="0" eaLnBrk="1" latinLnBrk="0" hangingPunct="1">
-              <a:defRPr sz="900" kern="1200">
-                <a:solidFill>
-                  <a:schemeClr val="tx1">
-                    <a:tint val="75000"/>
-                  </a:schemeClr>
-                </a:solidFill>
-                <a:latin typeface="+mn-lt"/>
-                <a:ea typeface="+mn-ea"/>
-                <a:cs typeface="+mn-cs"/>
-              </a:defRPr>
-            </a:lvl1pPr>
-            <a:lvl2pPr marL="457200" algn="l" defTabSz="457200" rtl="0" eaLnBrk="1" latinLnBrk="0" hangingPunct="1">
-              <a:defRPr sz="1800" kern="1200">
-                <a:solidFill>
-                  <a:schemeClr val="tx1"/>
-                </a:solidFill>
-                <a:latin typeface="+mn-lt"/>
-                <a:ea typeface="+mn-ea"/>
-                <a:cs typeface="+mn-cs"/>
-              </a:defRPr>
-            </a:lvl2pPr>
-            <a:lvl3pPr marL="914400" algn="l" defTabSz="457200" rtl="0" eaLnBrk="1" latinLnBrk="0" hangingPunct="1">
-              <a:defRPr sz="1800" kern="1200">
-                <a:solidFill>
-                  <a:schemeClr val="tx1"/>
-                </a:solidFill>
-                <a:latin typeface="+mn-lt"/>
-                <a:ea typeface="+mn-ea"/>
-                <a:cs typeface="+mn-cs"/>
-              </a:defRPr>
-            </a:lvl3pPr>
-            <a:lvl4pPr marL="1371600" algn="l" defTabSz="457200" rtl="0" eaLnBrk="1" latinLnBrk="0" hangingPunct="1">
-              <a:defRPr sz="1800" kern="1200">
-                <a:solidFill>
-                  <a:schemeClr val="tx1"/>
-                </a:solidFill>
-                <a:latin typeface="+mn-lt"/>
-                <a:ea typeface="+mn-ea"/>
-                <a:cs typeface="+mn-cs"/>
-              </a:defRPr>
-            </a:lvl4pPr>
-            <a:lvl5pPr marL="1828800" algn="l" defTabSz="457200" rtl="0" eaLnBrk="1" latinLnBrk="0" hangingPunct="1">
-              <a:defRPr sz="1800" kern="1200">
-                <a:solidFill>
-                  <a:schemeClr val="tx1"/>
-                </a:solidFill>
-                <a:latin typeface="+mn-lt"/>
-                <a:ea typeface="+mn-ea"/>
-                <a:cs typeface="+mn-cs"/>
-              </a:defRPr>
-            </a:lvl5pPr>
-            <a:lvl6pPr marL="2286000" algn="l" defTabSz="457200" rtl="0" eaLnBrk="1" latinLnBrk="0" hangingPunct="1">
-              <a:defRPr sz="1800" kern="1200">
-                <a:solidFill>
-                  <a:schemeClr val="tx1"/>
-                </a:solidFill>
-                <a:latin typeface="+mn-lt"/>
-                <a:ea typeface="+mn-ea"/>
-                <a:cs typeface="+mn-cs"/>
-              </a:defRPr>
-            </a:lvl6pPr>
-            <a:lvl7pPr marL="2743200" algn="l" defTabSz="457200" rtl="0" eaLnBrk="1" latinLnBrk="0" hangingPunct="1">
-              <a:defRPr sz="1800" kern="1200">
-                <a:solidFill>
-                  <a:schemeClr val="tx1"/>
-                </a:solidFill>
-                <a:latin typeface="+mn-lt"/>
-                <a:ea typeface="+mn-ea"/>
-                <a:cs typeface="+mn-cs"/>
-              </a:defRPr>
-            </a:lvl7pPr>
-            <a:lvl8pPr marL="3200400" algn="l" defTabSz="457200" rtl="0" eaLnBrk="1" latinLnBrk="0" hangingPunct="1">
-              <a:defRPr sz="1800" kern="1200">
-                <a:solidFill>
-                  <a:schemeClr val="tx1"/>
-                </a:solidFill>
-                <a:latin typeface="+mn-lt"/>
-                <a:ea typeface="+mn-ea"/>
-                <a:cs typeface="+mn-cs"/>
-              </a:defRPr>
-            </a:lvl8pPr>
-            <a:lvl9pPr marL="3657600" algn="l" defTabSz="457200" rtl="0" eaLnBrk="1" latinLnBrk="0" hangingPunct="1">
-              <a:defRPr sz="1800" kern="1200">
-                <a:solidFill>
-                  <a:schemeClr val="tx1"/>
-                </a:solidFill>
-                <a:latin typeface="+mn-lt"/>
-                <a:ea typeface="+mn-ea"/>
-                <a:cs typeface="+mn-cs"/>
-              </a:defRPr>
-            </a:lvl9pPr>
-          </a:lstStyle>
-          <a:p>
-            <a:r>
-              <a:rPr lang="de-DE" sz="1400" dirty="0"/>
-              <a:t>Veronika Taranek, Philipp </a:t>
-            </a:r>
-            <a:r>
-              <a:rPr lang="de-DE" sz="1400" dirty="0" err="1"/>
-              <a:t>Fenesan</a:t>
-            </a:r>
-            <a:r>
-              <a:rPr lang="de-DE" sz="1400" dirty="0"/>
-              <a:t>, Nicolas Geppert, Lukas Werner</a:t>
-            </a:r>
             <a:endParaRPr lang="en-US" dirty="0"/>
           </a:p>
         </p:txBody>
@@ -7861,7 +7529,7 @@
     </p:spTree>
     <p:extLst>
       <p:ext uri="{BB962C8B-B14F-4D97-AF65-F5344CB8AC3E}">
-        <p14:creationId xmlns:p14="http://schemas.microsoft.com/office/powerpoint/2010/main" val="870046311"/>
+        <p14:creationId xmlns:p14="http://schemas.microsoft.com/office/powerpoint/2010/main" val="1534354980"/>
       </p:ext>
     </p:extLst>
   </p:cSld>
@@ -7893,6 +7561,497 @@
           <p:cNvPr id="2" name="Title 1">
             <a:extLst>
               <a:ext uri="{FF2B5EF4-FFF2-40B4-BE49-F238E27FC236}">
+                <a16:creationId xmlns:a16="http://schemas.microsoft.com/office/drawing/2014/main" id="{A533C930-62BB-49CD-A689-73D96C0BFBBB}"/>
+              </a:ext>
+            </a:extLst>
+          </p:cNvPr>
+          <p:cNvSpPr>
+            <a:spLocks noGrp="1"/>
+          </p:cNvSpPr>
+          <p:nvPr>
+            <p:ph type="title"/>
+          </p:nvPr>
+        </p:nvSpPr>
+        <p:spPr/>
+        <p:txBody>
+          <a:bodyPr/>
+          <a:lstStyle/>
+          <a:p>
+            <a:r>
+              <a:rPr lang="en-US" dirty="0"/>
+              <a:t>Aufbau</a:t>
+            </a:r>
+          </a:p>
+        </p:txBody>
+      </p:sp>
+      <p:sp>
+        <p:nvSpPr>
+          <p:cNvPr id="5" name="TextBox 4">
+            <a:extLst>
+              <a:ext uri="{FF2B5EF4-FFF2-40B4-BE49-F238E27FC236}">
+                <a16:creationId xmlns:a16="http://schemas.microsoft.com/office/drawing/2014/main" id="{7FDF7188-C07D-448D-A4A7-2BC551B56E6A}"/>
+              </a:ext>
+            </a:extLst>
+          </p:cNvPr>
+          <p:cNvSpPr txBox="1"/>
+          <p:nvPr/>
+        </p:nvSpPr>
+        <p:spPr>
+          <a:xfrm>
+            <a:off x="571500" y="5410200"/>
+            <a:ext cx="7928774" cy="646331"/>
+          </a:xfrm>
+          <a:prstGeom prst="rect">
+            <a:avLst/>
+          </a:prstGeom>
+          <a:noFill/>
+        </p:spPr>
+        <p:txBody>
+          <a:bodyPr wrap="none" rtlCol="0">
+            <a:spAutoFit/>
+          </a:bodyPr>
+          <a:lstStyle/>
+          <a:p>
+            <a:r>
+              <a:rPr lang="en-US" dirty="0" err="1"/>
+              <a:t>Auffällig</a:t>
+            </a:r>
+            <a:r>
+              <a:rPr lang="en-US" dirty="0"/>
+              <a:t> </a:t>
+            </a:r>
+            <a:r>
+              <a:rPr lang="en-US" dirty="0" err="1"/>
+              <a:t>ist</a:t>
+            </a:r>
+            <a:r>
+              <a:rPr lang="en-US" dirty="0"/>
+              <a:t>, </a:t>
+            </a:r>
+            <a:r>
+              <a:rPr lang="en-US" dirty="0" err="1"/>
+              <a:t>dass</a:t>
+            </a:r>
+            <a:r>
+              <a:rPr lang="en-US" dirty="0"/>
+              <a:t> die </a:t>
+            </a:r>
+            <a:r>
+              <a:rPr lang="en-US" dirty="0" err="1"/>
+              <a:t>Funktionen</a:t>
+            </a:r>
+            <a:r>
+              <a:rPr lang="en-US" dirty="0"/>
+              <a:t> von den Design-Klassen </a:t>
+            </a:r>
+            <a:r>
+              <a:rPr lang="en-US" dirty="0" err="1"/>
+              <a:t>getrennt</a:t>
+            </a:r>
+            <a:r>
+              <a:rPr lang="en-US" dirty="0"/>
+              <a:t> </a:t>
+            </a:r>
+            <a:r>
+              <a:rPr lang="en-US" dirty="0" err="1"/>
+              <a:t>wurden</a:t>
+            </a:r>
+            <a:r>
+              <a:rPr lang="en-US" dirty="0"/>
+              <a:t>.</a:t>
+            </a:r>
+            <a:br>
+              <a:rPr lang="en-US" dirty="0"/>
+            </a:br>
+            <a:r>
+              <a:rPr lang="en-US" dirty="0"/>
+              <a:t>Die </a:t>
+            </a:r>
+            <a:r>
+              <a:rPr lang="en-US" dirty="0" err="1"/>
+              <a:t>Logik</a:t>
+            </a:r>
+            <a:r>
+              <a:rPr lang="en-US" dirty="0"/>
+              <a:t> </a:t>
+            </a:r>
+            <a:r>
+              <a:rPr lang="en-US" dirty="0" err="1"/>
+              <a:t>wird</a:t>
+            </a:r>
+            <a:r>
+              <a:rPr lang="en-US" dirty="0"/>
+              <a:t> in extra Klassen </a:t>
+            </a:r>
+            <a:r>
+              <a:rPr lang="en-US" dirty="0" err="1"/>
+              <a:t>implementiert</a:t>
+            </a:r>
+            <a:r>
+              <a:rPr lang="en-US" dirty="0"/>
+              <a:t>, die </a:t>
+            </a:r>
+            <a:r>
+              <a:rPr lang="en-US" dirty="0" err="1"/>
+              <a:t>getrennt</a:t>
+            </a:r>
+            <a:r>
+              <a:rPr lang="en-US" dirty="0"/>
+              <a:t> von der UI </a:t>
+            </a:r>
+            <a:r>
+              <a:rPr lang="en-US" dirty="0" err="1"/>
+              <a:t>sind</a:t>
+            </a:r>
+            <a:endParaRPr lang="en-US" dirty="0"/>
+          </a:p>
+        </p:txBody>
+      </p:sp>
+      <p:sp>
+        <p:nvSpPr>
+          <p:cNvPr id="6" name="Date Placeholder 3">
+            <a:extLst>
+              <a:ext uri="{FF2B5EF4-FFF2-40B4-BE49-F238E27FC236}">
+                <a16:creationId xmlns:a16="http://schemas.microsoft.com/office/drawing/2014/main" id="{C597FC9F-E38B-4D7C-800C-2E507A9787EC}"/>
+              </a:ext>
+            </a:extLst>
+          </p:cNvPr>
+          <p:cNvSpPr txBox="1">
+            <a:spLocks/>
+          </p:cNvSpPr>
+          <p:nvPr/>
+        </p:nvSpPr>
+        <p:spPr>
+          <a:xfrm>
+            <a:off x="677334" y="231051"/>
+            <a:ext cx="1071566" cy="378549"/>
+          </a:xfrm>
+          <a:prstGeom prst="rect">
+            <a:avLst/>
+          </a:prstGeom>
+        </p:spPr>
+        <p:txBody>
+          <a:bodyPr vert="horz" lIns="91440" tIns="45720" rIns="91440" bIns="45720" rtlCol="0" anchor="ctr"/>
+          <a:lstStyle>
+            <a:defPPr>
+              <a:defRPr lang="en-US"/>
+            </a:defPPr>
+            <a:lvl1pPr marL="0" algn="r" defTabSz="457200" rtl="0" eaLnBrk="1" latinLnBrk="0" hangingPunct="1">
+              <a:defRPr sz="900" kern="1200">
+                <a:solidFill>
+                  <a:schemeClr val="tx1">
+                    <a:tint val="75000"/>
+                  </a:schemeClr>
+                </a:solidFill>
+                <a:latin typeface="+mn-lt"/>
+                <a:ea typeface="+mn-ea"/>
+                <a:cs typeface="+mn-cs"/>
+              </a:defRPr>
+            </a:lvl1pPr>
+            <a:lvl2pPr marL="457200" algn="l" defTabSz="457200" rtl="0" eaLnBrk="1" latinLnBrk="0" hangingPunct="1">
+              <a:defRPr sz="1800" kern="1200">
+                <a:solidFill>
+                  <a:schemeClr val="tx1"/>
+                </a:solidFill>
+                <a:latin typeface="+mn-lt"/>
+                <a:ea typeface="+mn-ea"/>
+                <a:cs typeface="+mn-cs"/>
+              </a:defRPr>
+            </a:lvl2pPr>
+            <a:lvl3pPr marL="914400" algn="l" defTabSz="457200" rtl="0" eaLnBrk="1" latinLnBrk="0" hangingPunct="1">
+              <a:defRPr sz="1800" kern="1200">
+                <a:solidFill>
+                  <a:schemeClr val="tx1"/>
+                </a:solidFill>
+                <a:latin typeface="+mn-lt"/>
+                <a:ea typeface="+mn-ea"/>
+                <a:cs typeface="+mn-cs"/>
+              </a:defRPr>
+            </a:lvl3pPr>
+            <a:lvl4pPr marL="1371600" algn="l" defTabSz="457200" rtl="0" eaLnBrk="1" latinLnBrk="0" hangingPunct="1">
+              <a:defRPr sz="1800" kern="1200">
+                <a:solidFill>
+                  <a:schemeClr val="tx1"/>
+                </a:solidFill>
+                <a:latin typeface="+mn-lt"/>
+                <a:ea typeface="+mn-ea"/>
+                <a:cs typeface="+mn-cs"/>
+              </a:defRPr>
+            </a:lvl4pPr>
+            <a:lvl5pPr marL="1828800" algn="l" defTabSz="457200" rtl="0" eaLnBrk="1" latinLnBrk="0" hangingPunct="1">
+              <a:defRPr sz="1800" kern="1200">
+                <a:solidFill>
+                  <a:schemeClr val="tx1"/>
+                </a:solidFill>
+                <a:latin typeface="+mn-lt"/>
+                <a:ea typeface="+mn-ea"/>
+                <a:cs typeface="+mn-cs"/>
+              </a:defRPr>
+            </a:lvl5pPr>
+            <a:lvl6pPr marL="2286000" algn="l" defTabSz="457200" rtl="0" eaLnBrk="1" latinLnBrk="0" hangingPunct="1">
+              <a:defRPr sz="1800" kern="1200">
+                <a:solidFill>
+                  <a:schemeClr val="tx1"/>
+                </a:solidFill>
+                <a:latin typeface="+mn-lt"/>
+                <a:ea typeface="+mn-ea"/>
+                <a:cs typeface="+mn-cs"/>
+              </a:defRPr>
+            </a:lvl6pPr>
+            <a:lvl7pPr marL="2743200" algn="l" defTabSz="457200" rtl="0" eaLnBrk="1" latinLnBrk="0" hangingPunct="1">
+              <a:defRPr sz="1800" kern="1200">
+                <a:solidFill>
+                  <a:schemeClr val="tx1"/>
+                </a:solidFill>
+                <a:latin typeface="+mn-lt"/>
+                <a:ea typeface="+mn-ea"/>
+                <a:cs typeface="+mn-cs"/>
+              </a:defRPr>
+            </a:lvl7pPr>
+            <a:lvl8pPr marL="3200400" algn="l" defTabSz="457200" rtl="0" eaLnBrk="1" latinLnBrk="0" hangingPunct="1">
+              <a:defRPr sz="1800" kern="1200">
+                <a:solidFill>
+                  <a:schemeClr val="tx1"/>
+                </a:solidFill>
+                <a:latin typeface="+mn-lt"/>
+                <a:ea typeface="+mn-ea"/>
+                <a:cs typeface="+mn-cs"/>
+              </a:defRPr>
+            </a:lvl8pPr>
+            <a:lvl9pPr marL="3657600" algn="l" defTabSz="457200" rtl="0" eaLnBrk="1" latinLnBrk="0" hangingPunct="1">
+              <a:defRPr sz="1800" kern="1200">
+                <a:solidFill>
+                  <a:schemeClr val="tx1"/>
+                </a:solidFill>
+                <a:latin typeface="+mn-lt"/>
+                <a:ea typeface="+mn-ea"/>
+                <a:cs typeface="+mn-cs"/>
+              </a:defRPr>
+            </a:lvl9pPr>
+          </a:lstStyle>
+          <a:p>
+            <a:fld id="{5665C720-CFBA-4CD6-B44E-E52DA515AFF8}" type="datetime1">
+              <a:rPr lang="de-DE" sz="1400" smtClean="0"/>
+              <a:pPr/>
+              <a:t>29.10.2020</a:t>
+            </a:fld>
+            <a:endParaRPr lang="en-US" dirty="0"/>
+          </a:p>
+        </p:txBody>
+      </p:sp>
+      <p:sp>
+        <p:nvSpPr>
+          <p:cNvPr id="7" name="Date Placeholder 3">
+            <a:extLst>
+              <a:ext uri="{FF2B5EF4-FFF2-40B4-BE49-F238E27FC236}">
+                <a16:creationId xmlns:a16="http://schemas.microsoft.com/office/drawing/2014/main" id="{0F246959-6071-4609-B298-646E582C9281}"/>
+              </a:ext>
+            </a:extLst>
+          </p:cNvPr>
+          <p:cNvSpPr txBox="1">
+            <a:spLocks/>
+          </p:cNvSpPr>
+          <p:nvPr/>
+        </p:nvSpPr>
+        <p:spPr>
+          <a:xfrm>
+            <a:off x="1824033" y="231050"/>
+            <a:ext cx="5713108" cy="378549"/>
+          </a:xfrm>
+          <a:prstGeom prst="rect">
+            <a:avLst/>
+          </a:prstGeom>
+        </p:spPr>
+        <p:txBody>
+          <a:bodyPr vert="horz" lIns="91440" tIns="45720" rIns="91440" bIns="45720" rtlCol="0" anchor="ctr"/>
+          <a:lstStyle>
+            <a:defPPr>
+              <a:defRPr lang="en-US"/>
+            </a:defPPr>
+            <a:lvl1pPr marL="0" algn="r" defTabSz="457200" rtl="0" eaLnBrk="1" latinLnBrk="0" hangingPunct="1">
+              <a:defRPr sz="900" kern="1200">
+                <a:solidFill>
+                  <a:schemeClr val="tx1">
+                    <a:tint val="75000"/>
+                  </a:schemeClr>
+                </a:solidFill>
+                <a:latin typeface="+mn-lt"/>
+                <a:ea typeface="+mn-ea"/>
+                <a:cs typeface="+mn-cs"/>
+              </a:defRPr>
+            </a:lvl1pPr>
+            <a:lvl2pPr marL="457200" algn="l" defTabSz="457200" rtl="0" eaLnBrk="1" latinLnBrk="0" hangingPunct="1">
+              <a:defRPr sz="1800" kern="1200">
+                <a:solidFill>
+                  <a:schemeClr val="tx1"/>
+                </a:solidFill>
+                <a:latin typeface="+mn-lt"/>
+                <a:ea typeface="+mn-ea"/>
+                <a:cs typeface="+mn-cs"/>
+              </a:defRPr>
+            </a:lvl2pPr>
+            <a:lvl3pPr marL="914400" algn="l" defTabSz="457200" rtl="0" eaLnBrk="1" latinLnBrk="0" hangingPunct="1">
+              <a:defRPr sz="1800" kern="1200">
+                <a:solidFill>
+                  <a:schemeClr val="tx1"/>
+                </a:solidFill>
+                <a:latin typeface="+mn-lt"/>
+                <a:ea typeface="+mn-ea"/>
+                <a:cs typeface="+mn-cs"/>
+              </a:defRPr>
+            </a:lvl3pPr>
+            <a:lvl4pPr marL="1371600" algn="l" defTabSz="457200" rtl="0" eaLnBrk="1" latinLnBrk="0" hangingPunct="1">
+              <a:defRPr sz="1800" kern="1200">
+                <a:solidFill>
+                  <a:schemeClr val="tx1"/>
+                </a:solidFill>
+                <a:latin typeface="+mn-lt"/>
+                <a:ea typeface="+mn-ea"/>
+                <a:cs typeface="+mn-cs"/>
+              </a:defRPr>
+            </a:lvl4pPr>
+            <a:lvl5pPr marL="1828800" algn="l" defTabSz="457200" rtl="0" eaLnBrk="1" latinLnBrk="0" hangingPunct="1">
+              <a:defRPr sz="1800" kern="1200">
+                <a:solidFill>
+                  <a:schemeClr val="tx1"/>
+                </a:solidFill>
+                <a:latin typeface="+mn-lt"/>
+                <a:ea typeface="+mn-ea"/>
+                <a:cs typeface="+mn-cs"/>
+              </a:defRPr>
+            </a:lvl5pPr>
+            <a:lvl6pPr marL="2286000" algn="l" defTabSz="457200" rtl="0" eaLnBrk="1" latinLnBrk="0" hangingPunct="1">
+              <a:defRPr sz="1800" kern="1200">
+                <a:solidFill>
+                  <a:schemeClr val="tx1"/>
+                </a:solidFill>
+                <a:latin typeface="+mn-lt"/>
+                <a:ea typeface="+mn-ea"/>
+                <a:cs typeface="+mn-cs"/>
+              </a:defRPr>
+            </a:lvl6pPr>
+            <a:lvl7pPr marL="2743200" algn="l" defTabSz="457200" rtl="0" eaLnBrk="1" latinLnBrk="0" hangingPunct="1">
+              <a:defRPr sz="1800" kern="1200">
+                <a:solidFill>
+                  <a:schemeClr val="tx1"/>
+                </a:solidFill>
+                <a:latin typeface="+mn-lt"/>
+                <a:ea typeface="+mn-ea"/>
+                <a:cs typeface="+mn-cs"/>
+              </a:defRPr>
+            </a:lvl7pPr>
+            <a:lvl8pPr marL="3200400" algn="l" defTabSz="457200" rtl="0" eaLnBrk="1" latinLnBrk="0" hangingPunct="1">
+              <a:defRPr sz="1800" kern="1200">
+                <a:solidFill>
+                  <a:schemeClr val="tx1"/>
+                </a:solidFill>
+                <a:latin typeface="+mn-lt"/>
+                <a:ea typeface="+mn-ea"/>
+                <a:cs typeface="+mn-cs"/>
+              </a:defRPr>
+            </a:lvl8pPr>
+            <a:lvl9pPr marL="3657600" algn="l" defTabSz="457200" rtl="0" eaLnBrk="1" latinLnBrk="0" hangingPunct="1">
+              <a:defRPr sz="1800" kern="1200">
+                <a:solidFill>
+                  <a:schemeClr val="tx1"/>
+                </a:solidFill>
+                <a:latin typeface="+mn-lt"/>
+                <a:ea typeface="+mn-ea"/>
+                <a:cs typeface="+mn-cs"/>
+              </a:defRPr>
+            </a:lvl9pPr>
+          </a:lstStyle>
+          <a:p>
+            <a:r>
+              <a:rPr lang="de-DE" sz="1400" dirty="0"/>
+              <a:t>Veronika Taranek, Philipp </a:t>
+            </a:r>
+            <a:r>
+              <a:rPr lang="de-DE" sz="1400" dirty="0" err="1"/>
+              <a:t>Fenesan</a:t>
+            </a:r>
+            <a:r>
+              <a:rPr lang="de-DE" sz="1400" dirty="0"/>
+              <a:t>, Nicolas Geppert, Lukas Werner</a:t>
+            </a:r>
+            <a:endParaRPr lang="en-US" dirty="0"/>
+          </a:p>
+        </p:txBody>
+      </p:sp>
+      <p:sp>
+        <p:nvSpPr>
+          <p:cNvPr id="3" name="TextBox 2">
+            <a:extLst>
+              <a:ext uri="{FF2B5EF4-FFF2-40B4-BE49-F238E27FC236}">
+                <a16:creationId xmlns:a16="http://schemas.microsoft.com/office/drawing/2014/main" id="{5BCAFD94-9DAE-40DB-ABC1-EA97278FB175}"/>
+              </a:ext>
+            </a:extLst>
+          </p:cNvPr>
+          <p:cNvSpPr txBox="1"/>
+          <p:nvPr/>
+        </p:nvSpPr>
+        <p:spPr>
+          <a:xfrm>
+            <a:off x="1524000" y="1930400"/>
+            <a:ext cx="4572000" cy="369332"/>
+          </a:xfrm>
+          <a:prstGeom prst="rect">
+            <a:avLst/>
+          </a:prstGeom>
+          <a:noFill/>
+        </p:spPr>
+        <p:txBody>
+          <a:bodyPr wrap="square" rtlCol="0">
+            <a:spAutoFit/>
+          </a:bodyPr>
+          <a:lstStyle/>
+          <a:p>
+            <a:r>
+              <a:rPr lang="en-US" dirty="0" err="1"/>
+              <a:t>neues</a:t>
+            </a:r>
+            <a:r>
+              <a:rPr lang="en-US" dirty="0"/>
+              <a:t> UML</a:t>
+            </a:r>
+          </a:p>
+        </p:txBody>
+      </p:sp>
+    </p:spTree>
+    <p:extLst>
+      <p:ext uri="{BB962C8B-B14F-4D97-AF65-F5344CB8AC3E}">
+        <p14:creationId xmlns:p14="http://schemas.microsoft.com/office/powerpoint/2010/main" val="870046311"/>
+      </p:ext>
+    </p:extLst>
+  </p:cSld>
+  <p:clrMapOvr>
+    <a:masterClrMapping/>
+  </p:clrMapOvr>
+</p:sld>
+</file>
+
+<file path=ppt/slides/slide13.xml><?xml version="1.0" encoding="utf-8"?>
+<p:sld xmlns:a="http://schemas.openxmlformats.org/drawingml/2006/main" xmlns:r="http://schemas.openxmlformats.org/officeDocument/2006/relationships" xmlns:p="http://schemas.openxmlformats.org/presentationml/2006/main">
+  <p:cSld>
+    <p:spTree>
+      <p:nvGrpSpPr>
+        <p:cNvPr id="1" name=""/>
+        <p:cNvGrpSpPr/>
+        <p:nvPr/>
+      </p:nvGrpSpPr>
+      <p:grpSpPr>
+        <a:xfrm>
+          <a:off x="0" y="0"/>
+          <a:ext cx="0" cy="0"/>
+          <a:chOff x="0" y="0"/>
+          <a:chExt cx="0" cy="0"/>
+        </a:xfrm>
+      </p:grpSpPr>
+      <p:sp>
+        <p:nvSpPr>
+          <p:cNvPr id="2" name="Title 1">
+            <a:extLst>
+              <a:ext uri="{FF2B5EF4-FFF2-40B4-BE49-F238E27FC236}">
                 <a16:creationId xmlns:a16="http://schemas.microsoft.com/office/drawing/2014/main" id="{BFFE73E4-B193-441D-8A54-09AA7DF89A89}"/>
               </a:ext>
             </a:extLst>
@@ -7935,8 +8094,8 @@
         </p:nvSpPr>
         <p:spPr>
           <a:xfrm>
-            <a:off x="677334" y="3657601"/>
-            <a:ext cx="8596668" cy="2383762"/>
+            <a:off x="677334" y="4720561"/>
+            <a:ext cx="8596668" cy="1320801"/>
           </a:xfrm>
         </p:spPr>
         <p:txBody>
@@ -8106,36 +8265,6 @@
           </a:p>
         </p:txBody>
       </p:sp>
-      <p:pic>
-        <p:nvPicPr>
-          <p:cNvPr id="4" name="Picture 3">
-            <a:extLst>
-              <a:ext uri="{FF2B5EF4-FFF2-40B4-BE49-F238E27FC236}">
-                <a16:creationId xmlns:a16="http://schemas.microsoft.com/office/drawing/2014/main" id="{66089CA0-A29D-43F4-A41A-874B20FB4C08}"/>
-              </a:ext>
-            </a:extLst>
-          </p:cNvPr>
-          <p:cNvPicPr>
-            <a:picLocks noChangeAspect="1"/>
-          </p:cNvPicPr>
-          <p:nvPr/>
-        </p:nvPicPr>
-        <p:blipFill>
-          <a:blip r:embed="rId2"/>
-          <a:stretch>
-            <a:fillRect/>
-          </a:stretch>
-        </p:blipFill>
-        <p:spPr>
-          <a:xfrm>
-            <a:off x="571500" y="1526194"/>
-            <a:ext cx="8596668" cy="1935537"/>
-          </a:xfrm>
-          <a:prstGeom prst="rect">
-            <a:avLst/>
-          </a:prstGeom>
-        </p:spPr>
-      </p:pic>
       <p:sp>
         <p:nvSpPr>
           <p:cNvPr id="6" name="Date Placeholder 3">
@@ -8262,7 +8391,7 @@
             <a:fld id="{5665C720-CFBA-4CD6-B44E-E52DA515AFF8}" type="datetime1">
               <a:rPr lang="de-DE" sz="1400" smtClean="0"/>
               <a:pPr/>
-              <a:t>12.09.2020</a:t>
+              <a:t>29.10.2020</a:t>
             </a:fld>
             <a:endParaRPr lang="en-US" dirty="0"/>
           </a:p>
@@ -8404,6 +8533,45 @@
               <a:t>, Nicolas Geppert, Lukas Werner</a:t>
             </a:r>
             <a:endParaRPr lang="en-US" dirty="0"/>
+          </a:p>
+        </p:txBody>
+      </p:sp>
+      <p:sp>
+        <p:nvSpPr>
+          <p:cNvPr id="5" name="TextBox 4">
+            <a:extLst>
+              <a:ext uri="{FF2B5EF4-FFF2-40B4-BE49-F238E27FC236}">
+                <a16:creationId xmlns:a16="http://schemas.microsoft.com/office/drawing/2014/main" id="{C50338CC-BAF4-4233-B337-6673376B0790}"/>
+              </a:ext>
+            </a:extLst>
+          </p:cNvPr>
+          <p:cNvSpPr txBox="1"/>
+          <p:nvPr/>
+        </p:nvSpPr>
+        <p:spPr>
+          <a:xfrm>
+            <a:off x="1748900" y="1930400"/>
+            <a:ext cx="6490225" cy="369332"/>
+          </a:xfrm>
+          <a:prstGeom prst="rect">
+            <a:avLst/>
+          </a:prstGeom>
+          <a:noFill/>
+        </p:spPr>
+        <p:txBody>
+          <a:bodyPr wrap="square" rtlCol="0">
+            <a:spAutoFit/>
+          </a:bodyPr>
+          <a:lstStyle/>
+          <a:p>
+            <a:r>
+              <a:rPr lang="en-US" dirty="0" err="1"/>
+              <a:t>Platzhalter</a:t>
+            </a:r>
+            <a:r>
+              <a:rPr lang="en-US" dirty="0"/>
+              <a:t> ERD</a:t>
+            </a:r>
           </a:p>
         </p:txBody>
       </p:sp>
@@ -9694,7 +9862,7 @@
           <a:p>
             <a:fld id="{BBFE0E78-BD63-486A-A840-5A82EE4DABDC}" type="datetime1">
               <a:rPr lang="de-DE" smtClean="0"/>
-              <a:t>12.09.2020</a:t>
+              <a:t>29.10.2020</a:t>
             </a:fld>
             <a:endParaRPr lang="en-US"/>
           </a:p>
@@ -9799,166 +9967,6 @@
       </p:sp>
       <p:sp>
         <p:nvSpPr>
-          <p:cNvPr id="4" name="Date Placeholder 3">
-            <a:extLst>
-              <a:ext uri="{FF2B5EF4-FFF2-40B4-BE49-F238E27FC236}">
-                <a16:creationId xmlns:a16="http://schemas.microsoft.com/office/drawing/2014/main" id="{DE37B9A3-0F35-4331-9CF4-7C8C418C9074}"/>
-              </a:ext>
-            </a:extLst>
-          </p:cNvPr>
-          <p:cNvSpPr>
-            <a:spLocks noGrp="1"/>
-          </p:cNvSpPr>
-          <p:nvPr>
-            <p:ph type="dt" sz="half" idx="10"/>
-          </p:nvPr>
-        </p:nvSpPr>
-        <p:spPr/>
-        <p:txBody>
-          <a:bodyPr/>
-          <a:lstStyle/>
-          <a:p>
-            <a:fld id="{BBFE0E78-BD63-486A-A840-5A82EE4DABDC}" type="datetime1">
-              <a:rPr lang="de-DE" smtClean="0"/>
-              <a:t>12.09.2020</a:t>
-            </a:fld>
-            <a:endParaRPr lang="en-US"/>
-          </a:p>
-        </p:txBody>
-      </p:sp>
-      <p:sp>
-        <p:nvSpPr>
-          <p:cNvPr id="5" name="Date Placeholder 3">
-            <a:extLst>
-              <a:ext uri="{FF2B5EF4-FFF2-40B4-BE49-F238E27FC236}">
-                <a16:creationId xmlns:a16="http://schemas.microsoft.com/office/drawing/2014/main" id="{F036473C-832A-401F-BE2D-60EF28E22C6E}"/>
-              </a:ext>
-            </a:extLst>
-          </p:cNvPr>
-          <p:cNvSpPr txBox="1">
-            <a:spLocks/>
-          </p:cNvSpPr>
-          <p:nvPr/>
-        </p:nvSpPr>
-        <p:spPr>
-          <a:xfrm>
-            <a:off x="677334" y="231051"/>
-            <a:ext cx="1071566" cy="378549"/>
-          </a:xfrm>
-          <a:prstGeom prst="rect">
-            <a:avLst/>
-          </a:prstGeom>
-        </p:spPr>
-        <p:txBody>
-          <a:bodyPr vert="horz" lIns="91440" tIns="45720" rIns="91440" bIns="45720" rtlCol="0" anchor="ctr"/>
-          <a:lstStyle>
-            <a:defPPr>
-              <a:defRPr lang="en-US"/>
-            </a:defPPr>
-            <a:lvl1pPr marL="0" algn="r" defTabSz="457200" rtl="0" eaLnBrk="1" latinLnBrk="0" hangingPunct="1">
-              <a:defRPr sz="900" kern="1200">
-                <a:solidFill>
-                  <a:schemeClr val="tx1">
-                    <a:tint val="75000"/>
-                  </a:schemeClr>
-                </a:solidFill>
-                <a:latin typeface="+mn-lt"/>
-                <a:ea typeface="+mn-ea"/>
-                <a:cs typeface="+mn-cs"/>
-              </a:defRPr>
-            </a:lvl1pPr>
-            <a:lvl2pPr marL="457200" algn="l" defTabSz="457200" rtl="0" eaLnBrk="1" latinLnBrk="0" hangingPunct="1">
-              <a:defRPr sz="1800" kern="1200">
-                <a:solidFill>
-                  <a:schemeClr val="tx1"/>
-                </a:solidFill>
-                <a:latin typeface="+mn-lt"/>
-                <a:ea typeface="+mn-ea"/>
-                <a:cs typeface="+mn-cs"/>
-              </a:defRPr>
-            </a:lvl2pPr>
-            <a:lvl3pPr marL="914400" algn="l" defTabSz="457200" rtl="0" eaLnBrk="1" latinLnBrk="0" hangingPunct="1">
-              <a:defRPr sz="1800" kern="1200">
-                <a:solidFill>
-                  <a:schemeClr val="tx1"/>
-                </a:solidFill>
-                <a:latin typeface="+mn-lt"/>
-                <a:ea typeface="+mn-ea"/>
-                <a:cs typeface="+mn-cs"/>
-              </a:defRPr>
-            </a:lvl3pPr>
-            <a:lvl4pPr marL="1371600" algn="l" defTabSz="457200" rtl="0" eaLnBrk="1" latinLnBrk="0" hangingPunct="1">
-              <a:defRPr sz="1800" kern="1200">
-                <a:solidFill>
-                  <a:schemeClr val="tx1"/>
-                </a:solidFill>
-                <a:latin typeface="+mn-lt"/>
-                <a:ea typeface="+mn-ea"/>
-                <a:cs typeface="+mn-cs"/>
-              </a:defRPr>
-            </a:lvl4pPr>
-            <a:lvl5pPr marL="1828800" algn="l" defTabSz="457200" rtl="0" eaLnBrk="1" latinLnBrk="0" hangingPunct="1">
-              <a:defRPr sz="1800" kern="1200">
-                <a:solidFill>
-                  <a:schemeClr val="tx1"/>
-                </a:solidFill>
-                <a:latin typeface="+mn-lt"/>
-                <a:ea typeface="+mn-ea"/>
-                <a:cs typeface="+mn-cs"/>
-              </a:defRPr>
-            </a:lvl5pPr>
-            <a:lvl6pPr marL="2286000" algn="l" defTabSz="457200" rtl="0" eaLnBrk="1" latinLnBrk="0" hangingPunct="1">
-              <a:defRPr sz="1800" kern="1200">
-                <a:solidFill>
-                  <a:schemeClr val="tx1"/>
-                </a:solidFill>
-                <a:latin typeface="+mn-lt"/>
-                <a:ea typeface="+mn-ea"/>
-                <a:cs typeface="+mn-cs"/>
-              </a:defRPr>
-            </a:lvl6pPr>
-            <a:lvl7pPr marL="2743200" algn="l" defTabSz="457200" rtl="0" eaLnBrk="1" latinLnBrk="0" hangingPunct="1">
-              <a:defRPr sz="1800" kern="1200">
-                <a:solidFill>
-                  <a:schemeClr val="tx1"/>
-                </a:solidFill>
-                <a:latin typeface="+mn-lt"/>
-                <a:ea typeface="+mn-ea"/>
-                <a:cs typeface="+mn-cs"/>
-              </a:defRPr>
-            </a:lvl7pPr>
-            <a:lvl8pPr marL="3200400" algn="l" defTabSz="457200" rtl="0" eaLnBrk="1" latinLnBrk="0" hangingPunct="1">
-              <a:defRPr sz="1800" kern="1200">
-                <a:solidFill>
-                  <a:schemeClr val="tx1"/>
-                </a:solidFill>
-                <a:latin typeface="+mn-lt"/>
-                <a:ea typeface="+mn-ea"/>
-                <a:cs typeface="+mn-cs"/>
-              </a:defRPr>
-            </a:lvl8pPr>
-            <a:lvl9pPr marL="3657600" algn="l" defTabSz="457200" rtl="0" eaLnBrk="1" latinLnBrk="0" hangingPunct="1">
-              <a:defRPr sz="1800" kern="1200">
-                <a:solidFill>
-                  <a:schemeClr val="tx1"/>
-                </a:solidFill>
-                <a:latin typeface="+mn-lt"/>
-                <a:ea typeface="+mn-ea"/>
-                <a:cs typeface="+mn-cs"/>
-              </a:defRPr>
-            </a:lvl9pPr>
-          </a:lstStyle>
-          <a:p>
-            <a:r>
-              <a:rPr lang="de-DE" sz="1400" dirty="0"/>
-              <a:t>11.09.2020</a:t>
-            </a:r>
-            <a:endParaRPr lang="en-US" dirty="0"/>
-          </a:p>
-        </p:txBody>
-      </p:sp>
-      <p:sp>
-        <p:nvSpPr>
           <p:cNvPr id="6" name="Date Placeholder 3">
             <a:extLst>
               <a:ext uri="{FF2B5EF4-FFF2-40B4-BE49-F238E27FC236}">
@@ -10126,6 +10134,138 @@
           </a:prstGeom>
         </p:spPr>
       </p:pic>
+      <p:sp>
+        <p:nvSpPr>
+          <p:cNvPr id="8" name="Date Placeholder 3">
+            <a:extLst>
+              <a:ext uri="{FF2B5EF4-FFF2-40B4-BE49-F238E27FC236}">
+                <a16:creationId xmlns:a16="http://schemas.microsoft.com/office/drawing/2014/main" id="{C9EFB6BC-B127-482E-A576-5989AAE55916}"/>
+              </a:ext>
+            </a:extLst>
+          </p:cNvPr>
+          <p:cNvSpPr txBox="1">
+            <a:spLocks/>
+          </p:cNvSpPr>
+          <p:nvPr/>
+        </p:nvSpPr>
+        <p:spPr>
+          <a:xfrm>
+            <a:off x="677334" y="231051"/>
+            <a:ext cx="1071566" cy="378549"/>
+          </a:xfrm>
+          <a:prstGeom prst="rect">
+            <a:avLst/>
+          </a:prstGeom>
+        </p:spPr>
+        <p:txBody>
+          <a:bodyPr vert="horz" lIns="91440" tIns="45720" rIns="91440" bIns="45720" rtlCol="0" anchor="ctr"/>
+          <a:lstStyle>
+            <a:defPPr>
+              <a:defRPr lang="en-US"/>
+            </a:defPPr>
+            <a:lvl1pPr marL="0" algn="r" defTabSz="457200" rtl="0" eaLnBrk="1" latinLnBrk="0" hangingPunct="1">
+              <a:defRPr sz="900" kern="1200">
+                <a:solidFill>
+                  <a:schemeClr val="tx1">
+                    <a:tint val="75000"/>
+                  </a:schemeClr>
+                </a:solidFill>
+                <a:latin typeface="+mn-lt"/>
+                <a:ea typeface="+mn-ea"/>
+                <a:cs typeface="+mn-cs"/>
+              </a:defRPr>
+            </a:lvl1pPr>
+            <a:lvl2pPr marL="457200" algn="l" defTabSz="457200" rtl="0" eaLnBrk="1" latinLnBrk="0" hangingPunct="1">
+              <a:defRPr sz="1800" kern="1200">
+                <a:solidFill>
+                  <a:schemeClr val="tx1"/>
+                </a:solidFill>
+                <a:latin typeface="+mn-lt"/>
+                <a:ea typeface="+mn-ea"/>
+                <a:cs typeface="+mn-cs"/>
+              </a:defRPr>
+            </a:lvl2pPr>
+            <a:lvl3pPr marL="914400" algn="l" defTabSz="457200" rtl="0" eaLnBrk="1" latinLnBrk="0" hangingPunct="1">
+              <a:defRPr sz="1800" kern="1200">
+                <a:solidFill>
+                  <a:schemeClr val="tx1"/>
+                </a:solidFill>
+                <a:latin typeface="+mn-lt"/>
+                <a:ea typeface="+mn-ea"/>
+                <a:cs typeface="+mn-cs"/>
+              </a:defRPr>
+            </a:lvl3pPr>
+            <a:lvl4pPr marL="1371600" algn="l" defTabSz="457200" rtl="0" eaLnBrk="1" latinLnBrk="0" hangingPunct="1">
+              <a:defRPr sz="1800" kern="1200">
+                <a:solidFill>
+                  <a:schemeClr val="tx1"/>
+                </a:solidFill>
+                <a:latin typeface="+mn-lt"/>
+                <a:ea typeface="+mn-ea"/>
+                <a:cs typeface="+mn-cs"/>
+              </a:defRPr>
+            </a:lvl4pPr>
+            <a:lvl5pPr marL="1828800" algn="l" defTabSz="457200" rtl="0" eaLnBrk="1" latinLnBrk="0" hangingPunct="1">
+              <a:defRPr sz="1800" kern="1200">
+                <a:solidFill>
+                  <a:schemeClr val="tx1"/>
+                </a:solidFill>
+                <a:latin typeface="+mn-lt"/>
+                <a:ea typeface="+mn-ea"/>
+                <a:cs typeface="+mn-cs"/>
+              </a:defRPr>
+            </a:lvl5pPr>
+            <a:lvl6pPr marL="2286000" algn="l" defTabSz="457200" rtl="0" eaLnBrk="1" latinLnBrk="0" hangingPunct="1">
+              <a:defRPr sz="1800" kern="1200">
+                <a:solidFill>
+                  <a:schemeClr val="tx1"/>
+                </a:solidFill>
+                <a:latin typeface="+mn-lt"/>
+                <a:ea typeface="+mn-ea"/>
+                <a:cs typeface="+mn-cs"/>
+              </a:defRPr>
+            </a:lvl6pPr>
+            <a:lvl7pPr marL="2743200" algn="l" defTabSz="457200" rtl="0" eaLnBrk="1" latinLnBrk="0" hangingPunct="1">
+              <a:defRPr sz="1800" kern="1200">
+                <a:solidFill>
+                  <a:schemeClr val="tx1"/>
+                </a:solidFill>
+                <a:latin typeface="+mn-lt"/>
+                <a:ea typeface="+mn-ea"/>
+                <a:cs typeface="+mn-cs"/>
+              </a:defRPr>
+            </a:lvl7pPr>
+            <a:lvl8pPr marL="3200400" algn="l" defTabSz="457200" rtl="0" eaLnBrk="1" latinLnBrk="0" hangingPunct="1">
+              <a:defRPr sz="1800" kern="1200">
+                <a:solidFill>
+                  <a:schemeClr val="tx1"/>
+                </a:solidFill>
+                <a:latin typeface="+mn-lt"/>
+                <a:ea typeface="+mn-ea"/>
+                <a:cs typeface="+mn-cs"/>
+              </a:defRPr>
+            </a:lvl8pPr>
+            <a:lvl9pPr marL="3657600" algn="l" defTabSz="457200" rtl="0" eaLnBrk="1" latinLnBrk="0" hangingPunct="1">
+              <a:defRPr sz="1800" kern="1200">
+                <a:solidFill>
+                  <a:schemeClr val="tx1"/>
+                </a:solidFill>
+                <a:latin typeface="+mn-lt"/>
+                <a:ea typeface="+mn-ea"/>
+                <a:cs typeface="+mn-cs"/>
+              </a:defRPr>
+            </a:lvl9pPr>
+          </a:lstStyle>
+          <a:p>
+            <a:fld id="{5665C720-CFBA-4CD6-B44E-E52DA515AFF8}" type="datetime1">
+              <a:rPr lang="de-DE" sz="1400" smtClean="0"/>
+              <a:pPr/>
+              <a:t>29.10.2020</a:t>
+            </a:fld>
+            <a:endParaRPr lang="en-US" dirty="0"/>
+          </a:p>
+        </p:txBody>
+      </p:sp>
     </p:spTree>
     <p:extLst>
       <p:ext uri="{BB962C8B-B14F-4D97-AF65-F5344CB8AC3E}">
@@ -10585,7 +10725,7 @@
             <a:fld id="{5665C720-CFBA-4CD6-B44E-E52DA515AFF8}" type="datetime1">
               <a:rPr lang="de-DE" sz="1400" smtClean="0"/>
               <a:pPr/>
-              <a:t>12.09.2020</a:t>
+              <a:t>29.10.2020</a:t>
             </a:fld>
             <a:endParaRPr lang="en-US" dirty="0"/>
           </a:p>
@@ -11280,7 +11420,7 @@
             <a:fld id="{5665C720-CFBA-4CD6-B44E-E52DA515AFF8}" type="datetime1">
               <a:rPr lang="de-DE" sz="1400" smtClean="0"/>
               <a:pPr/>
-              <a:t>12.09.2020</a:t>
+              <a:t>29.10.2020</a:t>
             </a:fld>
             <a:endParaRPr lang="en-US" dirty="0"/>
           </a:p>
@@ -11507,7 +11647,7 @@
         </p:nvSpPr>
         <p:spPr>
           <a:xfrm>
-            <a:off x="1750348" y="2404534"/>
+            <a:off x="1748900" y="2861734"/>
             <a:ext cx="7766936" cy="1646302"/>
           </a:xfrm>
         </p:spPr>
@@ -11648,7 +11788,7 @@
             <a:fld id="{5665C720-CFBA-4CD6-B44E-E52DA515AFF8}" type="datetime1">
               <a:rPr lang="de-DE" sz="1400" smtClean="0"/>
               <a:pPr/>
-              <a:t>12.09.2020</a:t>
+              <a:t>29.10.2020</a:t>
             </a:fld>
             <a:endParaRPr lang="en-US" dirty="0"/>
           </a:p>
@@ -12537,7 +12677,7 @@
             <a:fld id="{5665C720-CFBA-4CD6-B44E-E52DA515AFF8}" type="datetime1">
               <a:rPr lang="de-DE" sz="1400" smtClean="0"/>
               <a:pPr/>
-              <a:t>12.09.2020</a:t>
+              <a:t>29.10.2020</a:t>
             </a:fld>
             <a:endParaRPr lang="en-US" dirty="0"/>
           </a:p>

</xml_diff>

<commit_message>
Presentation Use Case Update
</commit_message>
<xml_diff>
--- a/presentation/wanderoo – Gruppe 3.pptx
+++ b/presentation/wanderoo – Gruppe 3.pptx
@@ -5,7 +5,7 @@
     <p:sldMasterId id="2147483660" r:id="rId1"/>
   </p:sldMasterIdLst>
   <p:notesMasterIdLst>
-    <p:notesMasterId r:id="rId15"/>
+    <p:notesMasterId r:id="rId17"/>
   </p:notesMasterIdLst>
   <p:sldIdLst>
     <p:sldId id="256" r:id="rId2"/>
@@ -19,8 +19,10 @@
     <p:sldId id="261" r:id="rId10"/>
     <p:sldId id="263" r:id="rId11"/>
     <p:sldId id="269" r:id="rId12"/>
-    <p:sldId id="264" r:id="rId13"/>
-    <p:sldId id="265" r:id="rId14"/>
+    <p:sldId id="270" r:id="rId13"/>
+    <p:sldId id="271" r:id="rId14"/>
+    <p:sldId id="264" r:id="rId15"/>
+    <p:sldId id="265" r:id="rId16"/>
   </p:sldIdLst>
   <p:sldSz cx="12192000" cy="6858000"/>
   <p:notesSz cx="6858000" cy="9144000"/>
@@ -209,7 +211,7 @@
           <a:p>
             <a:fld id="{91C987E9-D846-45D7-B0BA-09A404DDD18F}" type="datetimeFigureOut">
               <a:rPr lang="en-US" smtClean="0"/>
-              <a:t>10/29/2020</a:t>
+              <a:t>10/31/2020</a:t>
             </a:fld>
             <a:endParaRPr lang="en-US"/>
           </a:p>
@@ -1528,7 +1530,7 @@
           <a:p>
             <a:fld id="{F7B45734-1697-4AB7-959A-59021CEE7C63}" type="datetime1">
               <a:rPr lang="de-DE" smtClean="0"/>
-              <a:t>29.10.2020</a:t>
+              <a:t>31.10.2020</a:t>
             </a:fld>
             <a:endParaRPr lang="en-US"/>
           </a:p>
@@ -1791,7 +1793,7 @@
           <a:p>
             <a:fld id="{28E0F9FB-1E8A-4CFC-BF19-70653968A72B}" type="datetime1">
               <a:rPr lang="de-DE" smtClean="0"/>
-              <a:t>29.10.2020</a:t>
+              <a:t>31.10.2020</a:t>
             </a:fld>
             <a:endParaRPr lang="en-US"/>
           </a:p>
@@ -2042,7 +2044,7 @@
           <a:p>
             <a:fld id="{4C8791FF-7201-4729-B98B-5B802CB6FE26}" type="datetime1">
               <a:rPr lang="de-DE" smtClean="0"/>
-              <a:t>29.10.2020</a:t>
+              <a:t>31.10.2020</a:t>
             </a:fld>
             <a:endParaRPr lang="en-US"/>
           </a:p>
@@ -2356,7 +2358,7 @@
           <a:p>
             <a:fld id="{16EBDE9D-3BF1-458B-B04E-AA7056777578}" type="datetime1">
               <a:rPr lang="de-DE" smtClean="0"/>
-              <a:t>29.10.2020</a:t>
+              <a:t>31.10.2020</a:t>
             </a:fld>
             <a:endParaRPr lang="en-US"/>
           </a:p>
@@ -2697,7 +2699,7 @@
           <a:p>
             <a:fld id="{72379833-F89A-4CC5-AD26-2146F255572C}" type="datetime1">
               <a:rPr lang="de-DE" smtClean="0"/>
-              <a:t>29.10.2020</a:t>
+              <a:t>31.10.2020</a:t>
             </a:fld>
             <a:endParaRPr lang="en-US"/>
           </a:p>
@@ -3011,7 +3013,7 @@
           <a:p>
             <a:fld id="{431A2CE2-D7A9-4F80-8471-7A4DA8B72368}" type="datetime1">
               <a:rPr lang="de-DE" smtClean="0"/>
-              <a:t>29.10.2020</a:t>
+              <a:t>31.10.2020</a:t>
             </a:fld>
             <a:endParaRPr lang="en-US"/>
           </a:p>
@@ -3404,7 +3406,7 @@
           <a:p>
             <a:fld id="{4B9D6D1C-E905-4368-9630-7DD1E44954A8}" type="datetime1">
               <a:rPr lang="de-DE" smtClean="0"/>
-              <a:t>29.10.2020</a:t>
+              <a:t>31.10.2020</a:t>
             </a:fld>
             <a:endParaRPr lang="en-US"/>
           </a:p>
@@ -3574,7 +3576,7 @@
           <a:p>
             <a:fld id="{8627FA29-765F-442F-8C7E-8C4E33FBBD15}" type="datetime1">
               <a:rPr lang="de-DE" smtClean="0"/>
-              <a:t>29.10.2020</a:t>
+              <a:t>31.10.2020</a:t>
             </a:fld>
             <a:endParaRPr lang="en-US"/>
           </a:p>
@@ -3754,7 +3756,7 @@
           <a:p>
             <a:fld id="{C79E08BA-6372-4F95-AB4E-CF7226F9351B}" type="datetime1">
               <a:rPr lang="de-DE" smtClean="0"/>
-              <a:t>29.10.2020</a:t>
+              <a:t>31.10.2020</a:t>
             </a:fld>
             <a:endParaRPr lang="en-US"/>
           </a:p>
@@ -3930,7 +3932,7 @@
           <a:p>
             <a:fld id="{BBFE0E78-BD63-486A-A840-5A82EE4DABDC}" type="datetime1">
               <a:rPr lang="de-DE" smtClean="0"/>
-              <a:t>29.10.2020</a:t>
+              <a:t>31.10.2020</a:t>
             </a:fld>
             <a:endParaRPr lang="en-US"/>
           </a:p>
@@ -4059,7 +4061,7 @@
           <a:p>
             <a:fld id="{FD088E02-9980-4083-8604-339DD30750A9}" type="datetime1">
               <a:rPr lang="de-DE" smtClean="0"/>
-              <a:t>29.10.2020</a:t>
+              <a:t>31.10.2020</a:t>
             </a:fld>
             <a:endParaRPr lang="en-US"/>
           </a:p>
@@ -4401,7 +4403,7 @@
           <a:p>
             <a:fld id="{512B8740-04A0-4F0F-BA2E-747FAA8552CF}" type="datetime1">
               <a:rPr lang="de-DE" smtClean="0"/>
-              <a:t>29.10.2020</a:t>
+              <a:t>31.10.2020</a:t>
             </a:fld>
             <a:endParaRPr lang="en-US"/>
           </a:p>
@@ -4633,7 +4635,7 @@
           <a:p>
             <a:fld id="{52340480-09C1-41B7-ACEE-F79B5ACF8268}" type="datetime1">
               <a:rPr lang="de-DE" smtClean="0"/>
-              <a:t>29.10.2020</a:t>
+              <a:t>31.10.2020</a:t>
             </a:fld>
             <a:endParaRPr lang="en-US"/>
           </a:p>
@@ -5007,7 +5009,7 @@
           <a:p>
             <a:fld id="{3C76072F-ABDE-49C9-B45F-982F33145057}" type="datetime1">
               <a:rPr lang="de-DE" smtClean="0"/>
-              <a:t>29.10.2020</a:t>
+              <a:t>31.10.2020</a:t>
             </a:fld>
             <a:endParaRPr lang="en-US"/>
           </a:p>
@@ -5130,7 +5132,7 @@
           <a:p>
             <a:fld id="{FF972E03-99BD-433F-85AD-6324DFFF3902}" type="datetime1">
               <a:rPr lang="de-DE" smtClean="0"/>
-              <a:t>29.10.2020</a:t>
+              <a:t>31.10.2020</a:t>
             </a:fld>
             <a:endParaRPr lang="en-US"/>
           </a:p>
@@ -5225,7 +5227,7 @@
           <a:p>
             <a:fld id="{EB4EFE40-CAA3-420B-8D0E-DBD5AB0FE83F}" type="datetime1">
               <a:rPr lang="de-DE" smtClean="0"/>
-              <a:t>29.10.2020</a:t>
+              <a:t>31.10.2020</a:t>
             </a:fld>
             <a:endParaRPr lang="en-US"/>
           </a:p>
@@ -5480,7 +5482,7 @@
           <a:p>
             <a:fld id="{E2AC2435-A98B-4155-AB69-4F954FE6AEBB}" type="datetime1">
               <a:rPr lang="de-DE" smtClean="0"/>
-              <a:t>29.10.2020</a:t>
+              <a:t>31.10.2020</a:t>
             </a:fld>
             <a:endParaRPr lang="en-US"/>
           </a:p>
@@ -6223,7 +6225,7 @@
           <a:p>
             <a:fld id="{589A2304-41B2-49D5-86E3-82760E9ED896}" type="datetime1">
               <a:rPr lang="de-DE" smtClean="0"/>
-              <a:t>29.10.2020</a:t>
+              <a:t>31.10.2020</a:t>
             </a:fld>
             <a:endParaRPr lang="en-US"/>
           </a:p>
@@ -6848,7 +6850,7 @@
           <a:p>
             <a:fld id="{46B7071C-03FC-43DF-B990-14F749E9D9DA}" type="datetime1">
               <a:rPr lang="de-DE" smtClean="0"/>
-              <a:t>29.10.2020</a:t>
+              <a:t>31.10.2020</a:t>
             </a:fld>
             <a:endParaRPr lang="en-US" dirty="0"/>
           </a:p>
@@ -7117,7 +7119,7 @@
             <a:fld id="{5665C720-CFBA-4CD6-B44E-E52DA515AFF8}" type="datetime1">
               <a:rPr lang="de-DE" sz="1400" smtClean="0"/>
               <a:pPr/>
-              <a:t>29.10.2020</a:t>
+              <a:t>31.10.2020</a:t>
             </a:fld>
             <a:endParaRPr lang="en-US" dirty="0"/>
           </a:p>
@@ -7308,7 +7310,12 @@
             <p:ph type="title"/>
           </p:nvPr>
         </p:nvSpPr>
-        <p:spPr/>
+        <p:spPr>
+          <a:xfrm>
+            <a:off x="677334" y="609598"/>
+            <a:ext cx="8596668" cy="1181101"/>
+          </a:xfrm>
+        </p:spPr>
         <p:txBody>
           <a:bodyPr/>
           <a:lstStyle/>
@@ -7343,18 +7350,21 @@
         </p:nvSpPr>
         <p:spPr>
           <a:xfrm>
-            <a:off x="677334" y="1590675"/>
-            <a:ext cx="8596668" cy="5162550"/>
+            <a:off x="677334" y="1352550"/>
+            <a:ext cx="8596668" cy="5400675"/>
           </a:xfrm>
         </p:spPr>
         <p:txBody>
           <a:bodyPr>
-            <a:normAutofit lnSpcReduction="10000"/>
+            <a:normAutofit/>
           </a:bodyPr>
           <a:lstStyle/>
           <a:p>
-            <a:r>
-              <a:rPr lang="de-DE" dirty="0"/>
+            <a:pPr marL="0" indent="0">
+              <a:buNone/>
+            </a:pPr>
+            <a:r>
+              <a:rPr lang="de-DE" b="1" dirty="0"/>
               <a:t>Beschreibung</a:t>
             </a:r>
           </a:p>
@@ -7384,8 +7394,11 @@
             </a:r>
           </a:p>
           <a:p>
-            <a:r>
-              <a:rPr lang="de-DE" dirty="0"/>
+            <a:pPr marL="0" indent="0">
+              <a:buNone/>
+            </a:pPr>
+            <a:r>
+              <a:rPr lang="de-DE" b="1" dirty="0"/>
               <a:t>Beteiligte</a:t>
             </a:r>
           </a:p>
@@ -7399,8 +7412,11 @@
             </a:r>
           </a:p>
           <a:p>
-            <a:r>
-              <a:rPr lang="de-DE" dirty="0"/>
+            <a:pPr marL="0" indent="0">
+              <a:buNone/>
+            </a:pPr>
+            <a:r>
+              <a:rPr lang="de-DE" b="1" dirty="0"/>
               <a:t>Voraussetzungen</a:t>
             </a:r>
           </a:p>
@@ -7423,8 +7439,11 @@
             </a:r>
           </a:p>
           <a:p>
-            <a:r>
-              <a:rPr lang="de-DE" dirty="0"/>
+            <a:pPr marL="0" indent="0">
+              <a:buNone/>
+            </a:pPr>
+            <a:r>
+              <a:rPr lang="de-DE" b="1" dirty="0"/>
               <a:t>Ereignisfluss</a:t>
             </a:r>
           </a:p>
@@ -7456,9 +7475,11 @@
             </a:r>
           </a:p>
           <a:p>
-            <a:pPr indent="-285750"/>
-            <a:r>
-              <a:rPr lang="de-DE" dirty="0"/>
+            <a:pPr marL="57150" indent="0">
+              <a:buNone/>
+            </a:pPr>
+            <a:r>
+              <a:rPr lang="de-DE" b="1" dirty="0"/>
               <a:t>Nachbedingung</a:t>
             </a:r>
           </a:p>
@@ -7477,11 +7498,7 @@
             </a:pPr>
             <a:r>
               <a:rPr lang="de-DE" dirty="0"/>
-              <a:t>Fehler: </a:t>
-            </a:r>
-            <a:r>
-              <a:rPr lang="de-DE"/>
-              <a:t>Registrierung fehlgeschlagen</a:t>
+              <a:t>Fehler: Registrierung fehlgeschlagen</a:t>
             </a:r>
           </a:p>
           <a:p>
@@ -7494,34 +7511,271 @@
       </p:sp>
       <p:sp>
         <p:nvSpPr>
-          <p:cNvPr id="4" name="Date Placeholder 3">
+          <p:cNvPr id="5" name="Date Placeholder 3">
             <a:extLst>
               <a:ext uri="{FF2B5EF4-FFF2-40B4-BE49-F238E27FC236}">
-                <a16:creationId xmlns:a16="http://schemas.microsoft.com/office/drawing/2014/main" id="{2AE931F4-8979-439A-A18E-8926B74A1C51}"/>
+                <a16:creationId xmlns:a16="http://schemas.microsoft.com/office/drawing/2014/main" id="{4C14AB97-C542-4790-9263-C13620CBC6CD}"/>
               </a:ext>
             </a:extLst>
           </p:cNvPr>
-          <p:cNvSpPr>
-            <a:spLocks noGrp="1"/>
-          </p:cNvSpPr>
-          <p:nvPr>
-            <p:ph type="dt" sz="half" idx="10"/>
-          </p:nvPr>
+          <p:cNvSpPr txBox="1">
+            <a:spLocks/>
+          </p:cNvSpPr>
+          <p:nvPr/>
         </p:nvSpPr>
         <p:spPr>
           <a:xfrm>
-            <a:off x="89958" y="104775"/>
-            <a:ext cx="911939" cy="365125"/>
+            <a:off x="677334" y="231051"/>
+            <a:ext cx="1071566" cy="378549"/>
           </a:xfrm>
+          <a:prstGeom prst="rect">
+            <a:avLst/>
+          </a:prstGeom>
         </p:spPr>
         <p:txBody>
-          <a:bodyPr/>
-          <a:lstStyle/>
-          <a:p>
-            <a:fld id="{BBFE0E78-BD63-486A-A840-5A82EE4DABDC}" type="datetime1">
-              <a:rPr lang="de-DE" smtClean="0"/>
-              <a:t>29.10.2020</a:t>
+          <a:bodyPr vert="horz" lIns="91440" tIns="45720" rIns="91440" bIns="45720" rtlCol="0" anchor="ctr"/>
+          <a:lstStyle>
+            <a:defPPr>
+              <a:defRPr lang="en-US"/>
+            </a:defPPr>
+            <a:lvl1pPr marL="0" algn="r" defTabSz="457200" rtl="0" eaLnBrk="1" latinLnBrk="0" hangingPunct="1">
+              <a:defRPr sz="900" kern="1200">
+                <a:solidFill>
+                  <a:schemeClr val="tx1">
+                    <a:tint val="75000"/>
+                  </a:schemeClr>
+                </a:solidFill>
+                <a:latin typeface="+mn-lt"/>
+                <a:ea typeface="+mn-ea"/>
+                <a:cs typeface="+mn-cs"/>
+              </a:defRPr>
+            </a:lvl1pPr>
+            <a:lvl2pPr marL="457200" algn="l" defTabSz="457200" rtl="0" eaLnBrk="1" latinLnBrk="0" hangingPunct="1">
+              <a:defRPr sz="1800" kern="1200">
+                <a:solidFill>
+                  <a:schemeClr val="tx1"/>
+                </a:solidFill>
+                <a:latin typeface="+mn-lt"/>
+                <a:ea typeface="+mn-ea"/>
+                <a:cs typeface="+mn-cs"/>
+              </a:defRPr>
+            </a:lvl2pPr>
+            <a:lvl3pPr marL="914400" algn="l" defTabSz="457200" rtl="0" eaLnBrk="1" latinLnBrk="0" hangingPunct="1">
+              <a:defRPr sz="1800" kern="1200">
+                <a:solidFill>
+                  <a:schemeClr val="tx1"/>
+                </a:solidFill>
+                <a:latin typeface="+mn-lt"/>
+                <a:ea typeface="+mn-ea"/>
+                <a:cs typeface="+mn-cs"/>
+              </a:defRPr>
+            </a:lvl3pPr>
+            <a:lvl4pPr marL="1371600" algn="l" defTabSz="457200" rtl="0" eaLnBrk="1" latinLnBrk="0" hangingPunct="1">
+              <a:defRPr sz="1800" kern="1200">
+                <a:solidFill>
+                  <a:schemeClr val="tx1"/>
+                </a:solidFill>
+                <a:latin typeface="+mn-lt"/>
+                <a:ea typeface="+mn-ea"/>
+                <a:cs typeface="+mn-cs"/>
+              </a:defRPr>
+            </a:lvl4pPr>
+            <a:lvl5pPr marL="1828800" algn="l" defTabSz="457200" rtl="0" eaLnBrk="1" latinLnBrk="0" hangingPunct="1">
+              <a:defRPr sz="1800" kern="1200">
+                <a:solidFill>
+                  <a:schemeClr val="tx1"/>
+                </a:solidFill>
+                <a:latin typeface="+mn-lt"/>
+                <a:ea typeface="+mn-ea"/>
+                <a:cs typeface="+mn-cs"/>
+              </a:defRPr>
+            </a:lvl5pPr>
+            <a:lvl6pPr marL="2286000" algn="l" defTabSz="457200" rtl="0" eaLnBrk="1" latinLnBrk="0" hangingPunct="1">
+              <a:defRPr sz="1800" kern="1200">
+                <a:solidFill>
+                  <a:schemeClr val="tx1"/>
+                </a:solidFill>
+                <a:latin typeface="+mn-lt"/>
+                <a:ea typeface="+mn-ea"/>
+                <a:cs typeface="+mn-cs"/>
+              </a:defRPr>
+            </a:lvl6pPr>
+            <a:lvl7pPr marL="2743200" algn="l" defTabSz="457200" rtl="0" eaLnBrk="1" latinLnBrk="0" hangingPunct="1">
+              <a:defRPr sz="1800" kern="1200">
+                <a:solidFill>
+                  <a:schemeClr val="tx1"/>
+                </a:solidFill>
+                <a:latin typeface="+mn-lt"/>
+                <a:ea typeface="+mn-ea"/>
+                <a:cs typeface="+mn-cs"/>
+              </a:defRPr>
+            </a:lvl7pPr>
+            <a:lvl8pPr marL="3200400" algn="l" defTabSz="457200" rtl="0" eaLnBrk="1" latinLnBrk="0" hangingPunct="1">
+              <a:defRPr sz="1800" kern="1200">
+                <a:solidFill>
+                  <a:schemeClr val="tx1"/>
+                </a:solidFill>
+                <a:latin typeface="+mn-lt"/>
+                <a:ea typeface="+mn-ea"/>
+                <a:cs typeface="+mn-cs"/>
+              </a:defRPr>
+            </a:lvl8pPr>
+            <a:lvl9pPr marL="3657600" algn="l" defTabSz="457200" rtl="0" eaLnBrk="1" latinLnBrk="0" hangingPunct="1">
+              <a:defRPr sz="1800" kern="1200">
+                <a:solidFill>
+                  <a:schemeClr val="tx1"/>
+                </a:solidFill>
+                <a:latin typeface="+mn-lt"/>
+                <a:ea typeface="+mn-ea"/>
+                <a:cs typeface="+mn-cs"/>
+              </a:defRPr>
+            </a:lvl9pPr>
+          </a:lstStyle>
+          <a:p>
+            <a:fld id="{5665C720-CFBA-4CD6-B44E-E52DA515AFF8}" type="datetime1">
+              <a:rPr lang="de-DE" sz="1400" smtClean="0"/>
+              <a:pPr/>
+              <a:t>31.10.2020</a:t>
             </a:fld>
+            <a:endParaRPr lang="en-US" dirty="0"/>
+          </a:p>
+        </p:txBody>
+      </p:sp>
+      <p:sp>
+        <p:nvSpPr>
+          <p:cNvPr id="6" name="Date Placeholder 3">
+            <a:extLst>
+              <a:ext uri="{FF2B5EF4-FFF2-40B4-BE49-F238E27FC236}">
+                <a16:creationId xmlns:a16="http://schemas.microsoft.com/office/drawing/2014/main" id="{FBE73F23-8D21-495D-8D7C-2DE7277152E1}"/>
+              </a:ext>
+            </a:extLst>
+          </p:cNvPr>
+          <p:cNvSpPr txBox="1">
+            <a:spLocks/>
+          </p:cNvSpPr>
+          <p:nvPr/>
+        </p:nvSpPr>
+        <p:spPr>
+          <a:xfrm>
+            <a:off x="1824033" y="231050"/>
+            <a:ext cx="5713108" cy="378549"/>
+          </a:xfrm>
+          <a:prstGeom prst="rect">
+            <a:avLst/>
+          </a:prstGeom>
+        </p:spPr>
+        <p:txBody>
+          <a:bodyPr vert="horz" lIns="91440" tIns="45720" rIns="91440" bIns="45720" rtlCol="0" anchor="ctr"/>
+          <a:lstStyle>
+            <a:defPPr>
+              <a:defRPr lang="en-US"/>
+            </a:defPPr>
+            <a:lvl1pPr marL="0" algn="r" defTabSz="457200" rtl="0" eaLnBrk="1" latinLnBrk="0" hangingPunct="1">
+              <a:defRPr sz="900" kern="1200">
+                <a:solidFill>
+                  <a:schemeClr val="tx1">
+                    <a:tint val="75000"/>
+                  </a:schemeClr>
+                </a:solidFill>
+                <a:latin typeface="+mn-lt"/>
+                <a:ea typeface="+mn-ea"/>
+                <a:cs typeface="+mn-cs"/>
+              </a:defRPr>
+            </a:lvl1pPr>
+            <a:lvl2pPr marL="457200" algn="l" defTabSz="457200" rtl="0" eaLnBrk="1" latinLnBrk="0" hangingPunct="1">
+              <a:defRPr sz="1800" kern="1200">
+                <a:solidFill>
+                  <a:schemeClr val="tx1"/>
+                </a:solidFill>
+                <a:latin typeface="+mn-lt"/>
+                <a:ea typeface="+mn-ea"/>
+                <a:cs typeface="+mn-cs"/>
+              </a:defRPr>
+            </a:lvl2pPr>
+            <a:lvl3pPr marL="914400" algn="l" defTabSz="457200" rtl="0" eaLnBrk="1" latinLnBrk="0" hangingPunct="1">
+              <a:defRPr sz="1800" kern="1200">
+                <a:solidFill>
+                  <a:schemeClr val="tx1"/>
+                </a:solidFill>
+                <a:latin typeface="+mn-lt"/>
+                <a:ea typeface="+mn-ea"/>
+                <a:cs typeface="+mn-cs"/>
+              </a:defRPr>
+            </a:lvl3pPr>
+            <a:lvl4pPr marL="1371600" algn="l" defTabSz="457200" rtl="0" eaLnBrk="1" latinLnBrk="0" hangingPunct="1">
+              <a:defRPr sz="1800" kern="1200">
+                <a:solidFill>
+                  <a:schemeClr val="tx1"/>
+                </a:solidFill>
+                <a:latin typeface="+mn-lt"/>
+                <a:ea typeface="+mn-ea"/>
+                <a:cs typeface="+mn-cs"/>
+              </a:defRPr>
+            </a:lvl4pPr>
+            <a:lvl5pPr marL="1828800" algn="l" defTabSz="457200" rtl="0" eaLnBrk="1" latinLnBrk="0" hangingPunct="1">
+              <a:defRPr sz="1800" kern="1200">
+                <a:solidFill>
+                  <a:schemeClr val="tx1"/>
+                </a:solidFill>
+                <a:latin typeface="+mn-lt"/>
+                <a:ea typeface="+mn-ea"/>
+                <a:cs typeface="+mn-cs"/>
+              </a:defRPr>
+            </a:lvl5pPr>
+            <a:lvl6pPr marL="2286000" algn="l" defTabSz="457200" rtl="0" eaLnBrk="1" latinLnBrk="0" hangingPunct="1">
+              <a:defRPr sz="1800" kern="1200">
+                <a:solidFill>
+                  <a:schemeClr val="tx1"/>
+                </a:solidFill>
+                <a:latin typeface="+mn-lt"/>
+                <a:ea typeface="+mn-ea"/>
+                <a:cs typeface="+mn-cs"/>
+              </a:defRPr>
+            </a:lvl6pPr>
+            <a:lvl7pPr marL="2743200" algn="l" defTabSz="457200" rtl="0" eaLnBrk="1" latinLnBrk="0" hangingPunct="1">
+              <a:defRPr sz="1800" kern="1200">
+                <a:solidFill>
+                  <a:schemeClr val="tx1"/>
+                </a:solidFill>
+                <a:latin typeface="+mn-lt"/>
+                <a:ea typeface="+mn-ea"/>
+                <a:cs typeface="+mn-cs"/>
+              </a:defRPr>
+            </a:lvl7pPr>
+            <a:lvl8pPr marL="3200400" algn="l" defTabSz="457200" rtl="0" eaLnBrk="1" latinLnBrk="0" hangingPunct="1">
+              <a:defRPr sz="1800" kern="1200">
+                <a:solidFill>
+                  <a:schemeClr val="tx1"/>
+                </a:solidFill>
+                <a:latin typeface="+mn-lt"/>
+                <a:ea typeface="+mn-ea"/>
+                <a:cs typeface="+mn-cs"/>
+              </a:defRPr>
+            </a:lvl8pPr>
+            <a:lvl9pPr marL="3657600" algn="l" defTabSz="457200" rtl="0" eaLnBrk="1" latinLnBrk="0" hangingPunct="1">
+              <a:defRPr sz="1800" kern="1200">
+                <a:solidFill>
+                  <a:schemeClr val="tx1"/>
+                </a:solidFill>
+                <a:latin typeface="+mn-lt"/>
+                <a:ea typeface="+mn-ea"/>
+                <a:cs typeface="+mn-cs"/>
+              </a:defRPr>
+            </a:lvl9pPr>
+          </a:lstStyle>
+          <a:p>
+            <a:r>
+              <a:rPr lang="de-DE" sz="1400" dirty="0"/>
+              <a:t>Veronika Taranek, Philipp </a:t>
+            </a:r>
+            <a:r>
+              <a:rPr lang="de-DE" sz="1400" dirty="0" err="1"/>
+              <a:t>Fenesan</a:t>
+            </a:r>
+            <a:r>
+              <a:rPr lang="de-DE" sz="1400" dirty="0"/>
+              <a:t>, Nicolas Geppert, Lukas Werner</a:t>
+            </a:r>
             <a:endParaRPr lang="en-US" dirty="0"/>
           </a:p>
         </p:txBody>
@@ -7561,7 +7815,7 @@
           <p:cNvPr id="2" name="Title 1">
             <a:extLst>
               <a:ext uri="{FF2B5EF4-FFF2-40B4-BE49-F238E27FC236}">
-                <a16:creationId xmlns:a16="http://schemas.microsoft.com/office/drawing/2014/main" id="{A533C930-62BB-49CD-A689-73D96C0BFBBB}"/>
+                <a16:creationId xmlns:a16="http://schemas.microsoft.com/office/drawing/2014/main" id="{DD89B45D-81B8-4037-8647-E08DB7556E63}"/>
               </a:ext>
             </a:extLst>
           </p:cNvPr>
@@ -7572,147 +7826,239 @@
             <p:ph type="title"/>
           </p:nvPr>
         </p:nvSpPr>
-        <p:spPr/>
+        <p:spPr>
+          <a:xfrm>
+            <a:off x="677334" y="609598"/>
+            <a:ext cx="8596668" cy="1181101"/>
+          </a:xfrm>
+        </p:spPr>
         <p:txBody>
           <a:bodyPr/>
           <a:lstStyle/>
           <a:p>
             <a:r>
               <a:rPr lang="en-US" dirty="0"/>
-              <a:t>Aufbau</a:t>
-            </a:r>
-          </a:p>
-        </p:txBody>
-      </p:sp>
-      <p:sp>
-        <p:nvSpPr>
-          <p:cNvPr id="5" name="TextBox 4">
+              <a:t>Use Case: Mein </a:t>
+            </a:r>
+            <a:r>
+              <a:rPr lang="en-US" dirty="0" err="1"/>
+              <a:t>Profil</a:t>
+            </a:r>
+            <a:endParaRPr lang="en-US" dirty="0"/>
+          </a:p>
+        </p:txBody>
+      </p:sp>
+      <p:sp>
+        <p:nvSpPr>
+          <p:cNvPr id="3" name="Content Placeholder 2">
             <a:extLst>
               <a:ext uri="{FF2B5EF4-FFF2-40B4-BE49-F238E27FC236}">
-                <a16:creationId xmlns:a16="http://schemas.microsoft.com/office/drawing/2014/main" id="{7FDF7188-C07D-448D-A4A7-2BC551B56E6A}"/>
+                <a16:creationId xmlns:a16="http://schemas.microsoft.com/office/drawing/2014/main" id="{591DF666-F25C-416A-9D7B-D66F364C5048}"/>
               </a:ext>
             </a:extLst>
           </p:cNvPr>
-          <p:cNvSpPr txBox="1"/>
-          <p:nvPr/>
+          <p:cNvSpPr>
+            <a:spLocks noGrp="1"/>
+          </p:cNvSpPr>
+          <p:nvPr>
+            <p:ph idx="1"/>
+          </p:nvPr>
         </p:nvSpPr>
         <p:spPr>
           <a:xfrm>
-            <a:off x="571500" y="5410200"/>
-            <a:ext cx="7928774" cy="646331"/>
+            <a:off x="677334" y="1352551"/>
+            <a:ext cx="8596668" cy="5505450"/>
           </a:xfrm>
-          <a:prstGeom prst="rect">
-            <a:avLst/>
-          </a:prstGeom>
-          <a:noFill/>
         </p:spPr>
         <p:txBody>
-          <a:bodyPr wrap="none" rtlCol="0">
-            <a:spAutoFit/>
+          <a:bodyPr>
+            <a:normAutofit fontScale="70000" lnSpcReduction="20000"/>
           </a:bodyPr>
           <a:lstStyle/>
           <a:p>
-            <a:r>
-              <a:rPr lang="en-US" dirty="0" err="1"/>
-              <a:t>Auffällig</a:t>
-            </a:r>
-            <a:r>
-              <a:rPr lang="en-US" dirty="0"/>
-              <a:t> </a:t>
-            </a:r>
-            <a:r>
-              <a:rPr lang="en-US" dirty="0" err="1"/>
-              <a:t>ist</a:t>
-            </a:r>
-            <a:r>
-              <a:rPr lang="en-US" dirty="0"/>
-              <a:t>, </a:t>
-            </a:r>
-            <a:r>
-              <a:rPr lang="en-US" dirty="0" err="1"/>
-              <a:t>dass</a:t>
-            </a:r>
-            <a:r>
-              <a:rPr lang="en-US" dirty="0"/>
-              <a:t> die </a:t>
-            </a:r>
-            <a:r>
-              <a:rPr lang="en-US" dirty="0" err="1"/>
-              <a:t>Funktionen</a:t>
-            </a:r>
-            <a:r>
-              <a:rPr lang="en-US" dirty="0"/>
-              <a:t> von den Design-Klassen </a:t>
-            </a:r>
-            <a:r>
-              <a:rPr lang="en-US" dirty="0" err="1"/>
-              <a:t>getrennt</a:t>
-            </a:r>
-            <a:r>
-              <a:rPr lang="en-US" dirty="0"/>
-              <a:t> </a:t>
-            </a:r>
-            <a:r>
-              <a:rPr lang="en-US" dirty="0" err="1"/>
-              <a:t>wurden</a:t>
-            </a:r>
-            <a:r>
-              <a:rPr lang="en-US" dirty="0"/>
-              <a:t>.</a:t>
-            </a:r>
-            <a:br>
-              <a:rPr lang="en-US" dirty="0"/>
-            </a:br>
-            <a:r>
-              <a:rPr lang="en-US" dirty="0"/>
-              <a:t>Die </a:t>
-            </a:r>
-            <a:r>
-              <a:rPr lang="en-US" dirty="0" err="1"/>
-              <a:t>Logik</a:t>
-            </a:r>
-            <a:r>
-              <a:rPr lang="en-US" dirty="0"/>
-              <a:t> </a:t>
-            </a:r>
-            <a:r>
-              <a:rPr lang="en-US" dirty="0" err="1"/>
-              <a:t>wird</a:t>
-            </a:r>
-            <a:r>
-              <a:rPr lang="en-US" dirty="0"/>
-              <a:t> in extra Klassen </a:t>
-            </a:r>
-            <a:r>
-              <a:rPr lang="en-US" dirty="0" err="1"/>
-              <a:t>implementiert</a:t>
-            </a:r>
-            <a:r>
-              <a:rPr lang="en-US" dirty="0"/>
-              <a:t>, die </a:t>
-            </a:r>
-            <a:r>
-              <a:rPr lang="en-US" dirty="0" err="1"/>
-              <a:t>getrennt</a:t>
-            </a:r>
-            <a:r>
-              <a:rPr lang="en-US" dirty="0"/>
-              <a:t> von der UI </a:t>
-            </a:r>
-            <a:r>
-              <a:rPr lang="en-US" dirty="0" err="1"/>
-              <a:t>sind</a:t>
-            </a:r>
-            <a:endParaRPr lang="en-US" dirty="0"/>
-          </a:p>
-        </p:txBody>
-      </p:sp>
-      <p:sp>
-        <p:nvSpPr>
-          <p:cNvPr id="6" name="Date Placeholder 3">
+            <a:pPr marL="0" indent="0">
+              <a:buNone/>
+            </a:pPr>
+            <a:r>
+              <a:rPr lang="de-DE" sz="2100" b="1" dirty="0"/>
+              <a:t>Beschreibung</a:t>
+            </a:r>
+          </a:p>
+          <a:p>
+            <a:pPr marL="457200" lvl="1" indent="0">
+              <a:buNone/>
+            </a:pPr>
+            <a:r>
+              <a:rPr lang="de-DE" sz="1800" dirty="0"/>
+              <a:t>Dieser </a:t>
+            </a:r>
+            <a:r>
+              <a:rPr lang="de-DE" sz="1800" dirty="0" err="1"/>
+              <a:t>Use</a:t>
+            </a:r>
+            <a:r>
+              <a:rPr lang="de-DE" sz="1800" dirty="0"/>
+              <a:t> Case beschreibt wie der Benutzer seine Einstellungen über Mein Profil individualisieren kann</a:t>
+            </a:r>
+          </a:p>
+          <a:p>
+            <a:pPr marL="0" indent="0">
+              <a:buNone/>
+            </a:pPr>
+            <a:r>
+              <a:rPr lang="de-DE" sz="2100" b="1" dirty="0"/>
+              <a:t>Beteiligte</a:t>
+            </a:r>
+          </a:p>
+          <a:p>
+            <a:pPr marL="457200" lvl="1" indent="0">
+              <a:buNone/>
+            </a:pPr>
+            <a:r>
+              <a:rPr lang="de-DE" sz="1800" dirty="0"/>
+              <a:t>Benutzer</a:t>
+            </a:r>
+          </a:p>
+          <a:p>
+            <a:pPr marL="0" indent="0">
+              <a:buNone/>
+            </a:pPr>
+            <a:r>
+              <a:rPr lang="de-DE" sz="2100" b="1" dirty="0"/>
+              <a:t>Voraussetzungen</a:t>
+            </a:r>
+          </a:p>
+          <a:p>
+            <a:pPr marL="457200" lvl="1" indent="0">
+              <a:buNone/>
+            </a:pPr>
+            <a:r>
+              <a:rPr lang="de-DE" sz="1800" dirty="0"/>
+              <a:t>Datenbankverbindung muss vorhanden sein</a:t>
+            </a:r>
+          </a:p>
+          <a:p>
+            <a:pPr marL="457200" lvl="1" indent="0">
+              <a:buNone/>
+            </a:pPr>
+            <a:r>
+              <a:rPr lang="de-DE" sz="1800" dirty="0"/>
+              <a:t>Der Benutzer muss erfolgreich eingeloggt sein</a:t>
+            </a:r>
+          </a:p>
+          <a:p>
+            <a:pPr marL="0" indent="0">
+              <a:buNone/>
+            </a:pPr>
+            <a:r>
+              <a:rPr lang="de-DE" sz="2100" b="1" dirty="0"/>
+              <a:t>Ereignisfluss</a:t>
+            </a:r>
+          </a:p>
+          <a:p>
+            <a:pPr marL="457200" lvl="1" indent="0">
+              <a:buNone/>
+            </a:pPr>
+            <a:r>
+              <a:rPr lang="de-DE" sz="1800" dirty="0"/>
+              <a:t>Im Menu Screen muss auf Mein Profil gedrückt werden</a:t>
+            </a:r>
+          </a:p>
+          <a:p>
+            <a:pPr marL="457200" lvl="1" indent="0">
+              <a:buNone/>
+            </a:pPr>
+            <a:r>
+              <a:rPr lang="de-DE" sz="1800" dirty="0"/>
+              <a:t>Der Profil Bearbeiten-Button muss gedrückt werden</a:t>
+            </a:r>
+          </a:p>
+          <a:p>
+            <a:pPr marL="457200" lvl="1" indent="0">
+              <a:buNone/>
+            </a:pPr>
+            <a:r>
+              <a:rPr lang="de-DE" sz="1800" dirty="0"/>
+              <a:t>Der Benutzername und die E-Mail-Adresse kann über die Texteingabe geändert werden</a:t>
+            </a:r>
+          </a:p>
+          <a:p>
+            <a:pPr marL="457200" lvl="1" indent="0">
+              <a:buNone/>
+            </a:pPr>
+            <a:r>
+              <a:rPr lang="de-DE" sz="1800" dirty="0"/>
+              <a:t>Das Level kann über die Combobox verändert werden</a:t>
+            </a:r>
+          </a:p>
+          <a:p>
+            <a:pPr marL="457200" lvl="1" indent="0">
+              <a:buNone/>
+            </a:pPr>
+            <a:r>
+              <a:rPr lang="de-DE" sz="1800" dirty="0"/>
+              <a:t>Über den Neues Profilbild-Button kann ein neues Profilbild angelegt werden</a:t>
+            </a:r>
+          </a:p>
+          <a:p>
+            <a:pPr marL="457200" lvl="1" indent="0">
+              <a:buNone/>
+            </a:pPr>
+            <a:r>
+              <a:rPr lang="de-DE" sz="1800" dirty="0"/>
+              <a:t>Über den Passwort ändern-Button kann das Passwort geändert werden</a:t>
+            </a:r>
+          </a:p>
+          <a:p>
+            <a:pPr marL="457200" lvl="1" indent="0">
+              <a:buNone/>
+            </a:pPr>
+            <a:r>
+              <a:rPr lang="de-DE" sz="1800" dirty="0"/>
+              <a:t>Die Änderungen werden nur gespeichert, wenn nach der Eingabe der Speichern-Button betätigt wird</a:t>
+            </a:r>
+          </a:p>
+          <a:p>
+            <a:pPr marL="57150" indent="0">
+              <a:buNone/>
+            </a:pPr>
+            <a:r>
+              <a:rPr lang="de-DE" sz="2100" b="1" dirty="0"/>
+              <a:t>Nachbedingung</a:t>
+            </a:r>
+          </a:p>
+          <a:p>
+            <a:pPr marL="457200" lvl="1" indent="0">
+              <a:buNone/>
+            </a:pPr>
+            <a:r>
+              <a:rPr lang="de-DE" sz="1800" dirty="0"/>
+              <a:t>Erfolgreich: Die Änderungen werden im Mein Profil-Screen angezeigt</a:t>
+            </a:r>
+          </a:p>
+          <a:p>
+            <a:pPr marL="457200" lvl="1" indent="0">
+              <a:buNone/>
+            </a:pPr>
+            <a:r>
+              <a:rPr lang="de-DE" sz="1800" dirty="0"/>
+              <a:t>Fehler: Die Änderungen konnten nicht übernommen werden und es werden veraltete Daten im Mein Profil-Screen angezeigt</a:t>
+            </a:r>
+          </a:p>
+          <a:p>
+            <a:pPr marL="457200" lvl="1" indent="0">
+              <a:buNone/>
+            </a:pPr>
+            <a:endParaRPr lang="de-DE" dirty="0"/>
+          </a:p>
+        </p:txBody>
+      </p:sp>
+      <p:sp>
+        <p:nvSpPr>
+          <p:cNvPr id="5" name="Date Placeholder 3">
             <a:extLst>
               <a:ext uri="{FF2B5EF4-FFF2-40B4-BE49-F238E27FC236}">
-                <a16:creationId xmlns:a16="http://schemas.microsoft.com/office/drawing/2014/main" id="{C597FC9F-E38B-4D7C-800C-2E507A9787EC}"/>
+                <a16:creationId xmlns:a16="http://schemas.microsoft.com/office/drawing/2014/main" id="{4C14AB97-C542-4790-9263-C13620CBC6CD}"/>
               </a:ext>
             </a:extLst>
           </p:cNvPr>
@@ -7833,7 +8179,7 @@
             <a:fld id="{5665C720-CFBA-4CD6-B44E-E52DA515AFF8}" type="datetime1">
               <a:rPr lang="de-DE" sz="1400" smtClean="0"/>
               <a:pPr/>
-              <a:t>29.10.2020</a:t>
+              <a:t>31.10.2020</a:t>
             </a:fld>
             <a:endParaRPr lang="en-US" dirty="0"/>
           </a:p>
@@ -7841,10 +8187,10 @@
       </p:sp>
       <p:sp>
         <p:nvSpPr>
-          <p:cNvPr id="7" name="Date Placeholder 3">
+          <p:cNvPr id="6" name="Date Placeholder 3">
             <a:extLst>
               <a:ext uri="{FF2B5EF4-FFF2-40B4-BE49-F238E27FC236}">
-                <a16:creationId xmlns:a16="http://schemas.microsoft.com/office/drawing/2014/main" id="{0F246959-6071-4609-B298-646E582C9281}"/>
+                <a16:creationId xmlns:a16="http://schemas.microsoft.com/office/drawing/2014/main" id="{FBE73F23-8D21-495D-8D7C-2DE7277152E1}"/>
               </a:ext>
             </a:extLst>
           </p:cNvPr>
@@ -7978,49 +8324,10 @@
           </a:p>
         </p:txBody>
       </p:sp>
-      <p:sp>
-        <p:nvSpPr>
-          <p:cNvPr id="3" name="TextBox 2">
-            <a:extLst>
-              <a:ext uri="{FF2B5EF4-FFF2-40B4-BE49-F238E27FC236}">
-                <a16:creationId xmlns:a16="http://schemas.microsoft.com/office/drawing/2014/main" id="{5BCAFD94-9DAE-40DB-ABC1-EA97278FB175}"/>
-              </a:ext>
-            </a:extLst>
-          </p:cNvPr>
-          <p:cNvSpPr txBox="1"/>
-          <p:nvPr/>
-        </p:nvSpPr>
-        <p:spPr>
-          <a:xfrm>
-            <a:off x="1524000" y="1930400"/>
-            <a:ext cx="4572000" cy="369332"/>
-          </a:xfrm>
-          <a:prstGeom prst="rect">
-            <a:avLst/>
-          </a:prstGeom>
-          <a:noFill/>
-        </p:spPr>
-        <p:txBody>
-          <a:bodyPr wrap="square" rtlCol="0">
-            <a:spAutoFit/>
-          </a:bodyPr>
-          <a:lstStyle/>
-          <a:p>
-            <a:r>
-              <a:rPr lang="en-US" dirty="0" err="1"/>
-              <a:t>neues</a:t>
-            </a:r>
-            <a:r>
-              <a:rPr lang="en-US" dirty="0"/>
-              <a:t> UML</a:t>
-            </a:r>
-          </a:p>
-        </p:txBody>
-      </p:sp>
     </p:spTree>
     <p:extLst>
       <p:ext uri="{BB962C8B-B14F-4D97-AF65-F5344CB8AC3E}">
-        <p14:creationId xmlns:p14="http://schemas.microsoft.com/office/powerpoint/2010/main" val="870046311"/>
+        <p14:creationId xmlns:p14="http://schemas.microsoft.com/office/powerpoint/2010/main" val="4289056068"/>
       </p:ext>
     </p:extLst>
   </p:cSld>
@@ -8052,6 +8359,1005 @@
           <p:cNvPr id="2" name="Title 1">
             <a:extLst>
               <a:ext uri="{FF2B5EF4-FFF2-40B4-BE49-F238E27FC236}">
+                <a16:creationId xmlns:a16="http://schemas.microsoft.com/office/drawing/2014/main" id="{DD89B45D-81B8-4037-8647-E08DB7556E63}"/>
+              </a:ext>
+            </a:extLst>
+          </p:cNvPr>
+          <p:cNvSpPr>
+            <a:spLocks noGrp="1"/>
+          </p:cNvSpPr>
+          <p:nvPr>
+            <p:ph type="title"/>
+          </p:nvPr>
+        </p:nvSpPr>
+        <p:spPr>
+          <a:xfrm>
+            <a:off x="677334" y="609598"/>
+            <a:ext cx="8596668" cy="1181101"/>
+          </a:xfrm>
+        </p:spPr>
+        <p:txBody>
+          <a:bodyPr/>
+          <a:lstStyle/>
+          <a:p>
+            <a:r>
+              <a:rPr lang="en-US" dirty="0"/>
+              <a:t>Use Case: </a:t>
+            </a:r>
+            <a:r>
+              <a:rPr lang="en-US" dirty="0" err="1"/>
+              <a:t>Karte</a:t>
+            </a:r>
+            <a:endParaRPr lang="en-US" dirty="0"/>
+          </a:p>
+        </p:txBody>
+      </p:sp>
+      <p:sp>
+        <p:nvSpPr>
+          <p:cNvPr id="3" name="Content Placeholder 2">
+            <a:extLst>
+              <a:ext uri="{FF2B5EF4-FFF2-40B4-BE49-F238E27FC236}">
+                <a16:creationId xmlns:a16="http://schemas.microsoft.com/office/drawing/2014/main" id="{591DF666-F25C-416A-9D7B-D66F364C5048}"/>
+              </a:ext>
+            </a:extLst>
+          </p:cNvPr>
+          <p:cNvSpPr>
+            <a:spLocks noGrp="1"/>
+          </p:cNvSpPr>
+          <p:nvPr>
+            <p:ph idx="1"/>
+          </p:nvPr>
+        </p:nvSpPr>
+        <p:spPr>
+          <a:xfrm>
+            <a:off x="677334" y="1352550"/>
+            <a:ext cx="8596668" cy="5400675"/>
+          </a:xfrm>
+        </p:spPr>
+        <p:txBody>
+          <a:bodyPr>
+            <a:normAutofit lnSpcReduction="10000"/>
+          </a:bodyPr>
+          <a:lstStyle/>
+          <a:p>
+            <a:pPr marL="0" indent="0">
+              <a:buNone/>
+            </a:pPr>
+            <a:r>
+              <a:rPr lang="de-DE" b="1" dirty="0"/>
+              <a:t>Beschreibung</a:t>
+            </a:r>
+          </a:p>
+          <a:p>
+            <a:pPr marL="457200" lvl="1" indent="0">
+              <a:buNone/>
+            </a:pPr>
+            <a:r>
+              <a:rPr lang="de-DE" dirty="0"/>
+              <a:t>Dieser </a:t>
+            </a:r>
+            <a:r>
+              <a:rPr lang="de-DE" dirty="0" err="1"/>
+              <a:t>Use</a:t>
+            </a:r>
+            <a:r>
+              <a:rPr lang="de-DE" dirty="0"/>
+              <a:t> Case beschreibt wie der Benutzer seine Wanderroute konfigurieren kann</a:t>
+            </a:r>
+          </a:p>
+          <a:p>
+            <a:pPr marL="0" indent="0">
+              <a:buNone/>
+            </a:pPr>
+            <a:r>
+              <a:rPr lang="de-DE" b="1" dirty="0"/>
+              <a:t>Beteiligte</a:t>
+            </a:r>
+          </a:p>
+          <a:p>
+            <a:pPr marL="457200" lvl="1" indent="0">
+              <a:buNone/>
+            </a:pPr>
+            <a:r>
+              <a:rPr lang="de-DE" dirty="0"/>
+              <a:t>Benutzer</a:t>
+            </a:r>
+          </a:p>
+          <a:p>
+            <a:pPr marL="0" indent="0">
+              <a:buNone/>
+            </a:pPr>
+            <a:r>
+              <a:rPr lang="de-DE" b="1" dirty="0"/>
+              <a:t>Voraussetzungen</a:t>
+            </a:r>
+          </a:p>
+          <a:p>
+            <a:pPr marL="457200" lvl="1" indent="0">
+              <a:buNone/>
+            </a:pPr>
+            <a:r>
+              <a:rPr lang="de-DE" dirty="0"/>
+              <a:t>Datenbankverbindung muss vorhanden sein</a:t>
+            </a:r>
+          </a:p>
+          <a:p>
+            <a:pPr marL="457200" lvl="1" indent="0">
+              <a:buNone/>
+            </a:pPr>
+            <a:r>
+              <a:rPr lang="de-DE" dirty="0"/>
+              <a:t>Der Benutzer muss erfolgreich eingeloggt sein</a:t>
+            </a:r>
+          </a:p>
+          <a:p>
+            <a:pPr marL="0" indent="0">
+              <a:buNone/>
+            </a:pPr>
+            <a:r>
+              <a:rPr lang="de-DE" b="1" dirty="0"/>
+              <a:t>Ereignisfluss</a:t>
+            </a:r>
+          </a:p>
+          <a:p>
+            <a:pPr marL="457200" lvl="1" indent="0">
+              <a:buNone/>
+            </a:pPr>
+            <a:r>
+              <a:rPr lang="de-DE" dirty="0"/>
+              <a:t>Im Menü-Screen muss auf den Karte-Button gedrückt werden</a:t>
+            </a:r>
+          </a:p>
+          <a:p>
+            <a:pPr marL="457200" lvl="1" indent="0">
+              <a:buNone/>
+            </a:pPr>
+            <a:r>
+              <a:rPr lang="de-DE" dirty="0"/>
+              <a:t>Der Benutzer kann über die Textfelder die Routenlänge und den gewünschten Höhenunterschied für seine Wanderroute angeben</a:t>
+            </a:r>
+          </a:p>
+          <a:p>
+            <a:pPr marL="457200" lvl="1" indent="0">
+              <a:buNone/>
+            </a:pPr>
+            <a:r>
+              <a:rPr lang="de-DE" dirty="0"/>
+              <a:t>Um die Änderungen zu speichern, muss der Bestätigen-Button betätigt werden</a:t>
+            </a:r>
+          </a:p>
+          <a:p>
+            <a:pPr marL="57150" indent="0">
+              <a:buNone/>
+            </a:pPr>
+            <a:r>
+              <a:rPr lang="de-DE" b="1" dirty="0"/>
+              <a:t>Nachbedingung</a:t>
+            </a:r>
+          </a:p>
+          <a:p>
+            <a:pPr marL="457200" lvl="1" indent="0">
+              <a:buNone/>
+            </a:pPr>
+            <a:r>
+              <a:rPr lang="de-DE" dirty="0"/>
+              <a:t>Erfolgreich: Wanderroutenlänge und Höhenunterschied wird gespeichert</a:t>
+            </a:r>
+          </a:p>
+          <a:p>
+            <a:pPr marL="457200" lvl="1" indent="0">
+              <a:buNone/>
+            </a:pPr>
+            <a:r>
+              <a:rPr lang="de-DE" dirty="0"/>
+              <a:t>Fehler: Wanderroutenlänge und Höhenunterschied kann nicht gespeichert werden</a:t>
+            </a:r>
+          </a:p>
+          <a:p>
+            <a:pPr marL="457200" lvl="1" indent="0">
+              <a:buNone/>
+            </a:pPr>
+            <a:endParaRPr lang="de-DE" dirty="0"/>
+          </a:p>
+        </p:txBody>
+      </p:sp>
+      <p:sp>
+        <p:nvSpPr>
+          <p:cNvPr id="5" name="Date Placeholder 3">
+            <a:extLst>
+              <a:ext uri="{FF2B5EF4-FFF2-40B4-BE49-F238E27FC236}">
+                <a16:creationId xmlns:a16="http://schemas.microsoft.com/office/drawing/2014/main" id="{4C14AB97-C542-4790-9263-C13620CBC6CD}"/>
+              </a:ext>
+            </a:extLst>
+          </p:cNvPr>
+          <p:cNvSpPr txBox="1">
+            <a:spLocks/>
+          </p:cNvSpPr>
+          <p:nvPr/>
+        </p:nvSpPr>
+        <p:spPr>
+          <a:xfrm>
+            <a:off x="677334" y="231051"/>
+            <a:ext cx="1071566" cy="378549"/>
+          </a:xfrm>
+          <a:prstGeom prst="rect">
+            <a:avLst/>
+          </a:prstGeom>
+        </p:spPr>
+        <p:txBody>
+          <a:bodyPr vert="horz" lIns="91440" tIns="45720" rIns="91440" bIns="45720" rtlCol="0" anchor="ctr"/>
+          <a:lstStyle>
+            <a:defPPr>
+              <a:defRPr lang="en-US"/>
+            </a:defPPr>
+            <a:lvl1pPr marL="0" algn="r" defTabSz="457200" rtl="0" eaLnBrk="1" latinLnBrk="0" hangingPunct="1">
+              <a:defRPr sz="900" kern="1200">
+                <a:solidFill>
+                  <a:schemeClr val="tx1">
+                    <a:tint val="75000"/>
+                  </a:schemeClr>
+                </a:solidFill>
+                <a:latin typeface="+mn-lt"/>
+                <a:ea typeface="+mn-ea"/>
+                <a:cs typeface="+mn-cs"/>
+              </a:defRPr>
+            </a:lvl1pPr>
+            <a:lvl2pPr marL="457200" algn="l" defTabSz="457200" rtl="0" eaLnBrk="1" latinLnBrk="0" hangingPunct="1">
+              <a:defRPr sz="1800" kern="1200">
+                <a:solidFill>
+                  <a:schemeClr val="tx1"/>
+                </a:solidFill>
+                <a:latin typeface="+mn-lt"/>
+                <a:ea typeface="+mn-ea"/>
+                <a:cs typeface="+mn-cs"/>
+              </a:defRPr>
+            </a:lvl2pPr>
+            <a:lvl3pPr marL="914400" algn="l" defTabSz="457200" rtl="0" eaLnBrk="1" latinLnBrk="0" hangingPunct="1">
+              <a:defRPr sz="1800" kern="1200">
+                <a:solidFill>
+                  <a:schemeClr val="tx1"/>
+                </a:solidFill>
+                <a:latin typeface="+mn-lt"/>
+                <a:ea typeface="+mn-ea"/>
+                <a:cs typeface="+mn-cs"/>
+              </a:defRPr>
+            </a:lvl3pPr>
+            <a:lvl4pPr marL="1371600" algn="l" defTabSz="457200" rtl="0" eaLnBrk="1" latinLnBrk="0" hangingPunct="1">
+              <a:defRPr sz="1800" kern="1200">
+                <a:solidFill>
+                  <a:schemeClr val="tx1"/>
+                </a:solidFill>
+                <a:latin typeface="+mn-lt"/>
+                <a:ea typeface="+mn-ea"/>
+                <a:cs typeface="+mn-cs"/>
+              </a:defRPr>
+            </a:lvl4pPr>
+            <a:lvl5pPr marL="1828800" algn="l" defTabSz="457200" rtl="0" eaLnBrk="1" latinLnBrk="0" hangingPunct="1">
+              <a:defRPr sz="1800" kern="1200">
+                <a:solidFill>
+                  <a:schemeClr val="tx1"/>
+                </a:solidFill>
+                <a:latin typeface="+mn-lt"/>
+                <a:ea typeface="+mn-ea"/>
+                <a:cs typeface="+mn-cs"/>
+              </a:defRPr>
+            </a:lvl5pPr>
+            <a:lvl6pPr marL="2286000" algn="l" defTabSz="457200" rtl="0" eaLnBrk="1" latinLnBrk="0" hangingPunct="1">
+              <a:defRPr sz="1800" kern="1200">
+                <a:solidFill>
+                  <a:schemeClr val="tx1"/>
+                </a:solidFill>
+                <a:latin typeface="+mn-lt"/>
+                <a:ea typeface="+mn-ea"/>
+                <a:cs typeface="+mn-cs"/>
+              </a:defRPr>
+            </a:lvl6pPr>
+            <a:lvl7pPr marL="2743200" algn="l" defTabSz="457200" rtl="0" eaLnBrk="1" latinLnBrk="0" hangingPunct="1">
+              <a:defRPr sz="1800" kern="1200">
+                <a:solidFill>
+                  <a:schemeClr val="tx1"/>
+                </a:solidFill>
+                <a:latin typeface="+mn-lt"/>
+                <a:ea typeface="+mn-ea"/>
+                <a:cs typeface="+mn-cs"/>
+              </a:defRPr>
+            </a:lvl7pPr>
+            <a:lvl8pPr marL="3200400" algn="l" defTabSz="457200" rtl="0" eaLnBrk="1" latinLnBrk="0" hangingPunct="1">
+              <a:defRPr sz="1800" kern="1200">
+                <a:solidFill>
+                  <a:schemeClr val="tx1"/>
+                </a:solidFill>
+                <a:latin typeface="+mn-lt"/>
+                <a:ea typeface="+mn-ea"/>
+                <a:cs typeface="+mn-cs"/>
+              </a:defRPr>
+            </a:lvl8pPr>
+            <a:lvl9pPr marL="3657600" algn="l" defTabSz="457200" rtl="0" eaLnBrk="1" latinLnBrk="0" hangingPunct="1">
+              <a:defRPr sz="1800" kern="1200">
+                <a:solidFill>
+                  <a:schemeClr val="tx1"/>
+                </a:solidFill>
+                <a:latin typeface="+mn-lt"/>
+                <a:ea typeface="+mn-ea"/>
+                <a:cs typeface="+mn-cs"/>
+              </a:defRPr>
+            </a:lvl9pPr>
+          </a:lstStyle>
+          <a:p>
+            <a:fld id="{5665C720-CFBA-4CD6-B44E-E52DA515AFF8}" type="datetime1">
+              <a:rPr lang="de-DE" sz="1400" smtClean="0"/>
+              <a:pPr/>
+              <a:t>31.10.2020</a:t>
+            </a:fld>
+            <a:endParaRPr lang="en-US" dirty="0"/>
+          </a:p>
+        </p:txBody>
+      </p:sp>
+      <p:sp>
+        <p:nvSpPr>
+          <p:cNvPr id="6" name="Date Placeholder 3">
+            <a:extLst>
+              <a:ext uri="{FF2B5EF4-FFF2-40B4-BE49-F238E27FC236}">
+                <a16:creationId xmlns:a16="http://schemas.microsoft.com/office/drawing/2014/main" id="{FBE73F23-8D21-495D-8D7C-2DE7277152E1}"/>
+              </a:ext>
+            </a:extLst>
+          </p:cNvPr>
+          <p:cNvSpPr txBox="1">
+            <a:spLocks/>
+          </p:cNvSpPr>
+          <p:nvPr/>
+        </p:nvSpPr>
+        <p:spPr>
+          <a:xfrm>
+            <a:off x="1824033" y="231050"/>
+            <a:ext cx="5713108" cy="378549"/>
+          </a:xfrm>
+          <a:prstGeom prst="rect">
+            <a:avLst/>
+          </a:prstGeom>
+        </p:spPr>
+        <p:txBody>
+          <a:bodyPr vert="horz" lIns="91440" tIns="45720" rIns="91440" bIns="45720" rtlCol="0" anchor="ctr"/>
+          <a:lstStyle>
+            <a:defPPr>
+              <a:defRPr lang="en-US"/>
+            </a:defPPr>
+            <a:lvl1pPr marL="0" algn="r" defTabSz="457200" rtl="0" eaLnBrk="1" latinLnBrk="0" hangingPunct="1">
+              <a:defRPr sz="900" kern="1200">
+                <a:solidFill>
+                  <a:schemeClr val="tx1">
+                    <a:tint val="75000"/>
+                  </a:schemeClr>
+                </a:solidFill>
+                <a:latin typeface="+mn-lt"/>
+                <a:ea typeface="+mn-ea"/>
+                <a:cs typeface="+mn-cs"/>
+              </a:defRPr>
+            </a:lvl1pPr>
+            <a:lvl2pPr marL="457200" algn="l" defTabSz="457200" rtl="0" eaLnBrk="1" latinLnBrk="0" hangingPunct="1">
+              <a:defRPr sz="1800" kern="1200">
+                <a:solidFill>
+                  <a:schemeClr val="tx1"/>
+                </a:solidFill>
+                <a:latin typeface="+mn-lt"/>
+                <a:ea typeface="+mn-ea"/>
+                <a:cs typeface="+mn-cs"/>
+              </a:defRPr>
+            </a:lvl2pPr>
+            <a:lvl3pPr marL="914400" algn="l" defTabSz="457200" rtl="0" eaLnBrk="1" latinLnBrk="0" hangingPunct="1">
+              <a:defRPr sz="1800" kern="1200">
+                <a:solidFill>
+                  <a:schemeClr val="tx1"/>
+                </a:solidFill>
+                <a:latin typeface="+mn-lt"/>
+                <a:ea typeface="+mn-ea"/>
+                <a:cs typeface="+mn-cs"/>
+              </a:defRPr>
+            </a:lvl3pPr>
+            <a:lvl4pPr marL="1371600" algn="l" defTabSz="457200" rtl="0" eaLnBrk="1" latinLnBrk="0" hangingPunct="1">
+              <a:defRPr sz="1800" kern="1200">
+                <a:solidFill>
+                  <a:schemeClr val="tx1"/>
+                </a:solidFill>
+                <a:latin typeface="+mn-lt"/>
+                <a:ea typeface="+mn-ea"/>
+                <a:cs typeface="+mn-cs"/>
+              </a:defRPr>
+            </a:lvl4pPr>
+            <a:lvl5pPr marL="1828800" algn="l" defTabSz="457200" rtl="0" eaLnBrk="1" latinLnBrk="0" hangingPunct="1">
+              <a:defRPr sz="1800" kern="1200">
+                <a:solidFill>
+                  <a:schemeClr val="tx1"/>
+                </a:solidFill>
+                <a:latin typeface="+mn-lt"/>
+                <a:ea typeface="+mn-ea"/>
+                <a:cs typeface="+mn-cs"/>
+              </a:defRPr>
+            </a:lvl5pPr>
+            <a:lvl6pPr marL="2286000" algn="l" defTabSz="457200" rtl="0" eaLnBrk="1" latinLnBrk="0" hangingPunct="1">
+              <a:defRPr sz="1800" kern="1200">
+                <a:solidFill>
+                  <a:schemeClr val="tx1"/>
+                </a:solidFill>
+                <a:latin typeface="+mn-lt"/>
+                <a:ea typeface="+mn-ea"/>
+                <a:cs typeface="+mn-cs"/>
+              </a:defRPr>
+            </a:lvl6pPr>
+            <a:lvl7pPr marL="2743200" algn="l" defTabSz="457200" rtl="0" eaLnBrk="1" latinLnBrk="0" hangingPunct="1">
+              <a:defRPr sz="1800" kern="1200">
+                <a:solidFill>
+                  <a:schemeClr val="tx1"/>
+                </a:solidFill>
+                <a:latin typeface="+mn-lt"/>
+                <a:ea typeface="+mn-ea"/>
+                <a:cs typeface="+mn-cs"/>
+              </a:defRPr>
+            </a:lvl7pPr>
+            <a:lvl8pPr marL="3200400" algn="l" defTabSz="457200" rtl="0" eaLnBrk="1" latinLnBrk="0" hangingPunct="1">
+              <a:defRPr sz="1800" kern="1200">
+                <a:solidFill>
+                  <a:schemeClr val="tx1"/>
+                </a:solidFill>
+                <a:latin typeface="+mn-lt"/>
+                <a:ea typeface="+mn-ea"/>
+                <a:cs typeface="+mn-cs"/>
+              </a:defRPr>
+            </a:lvl8pPr>
+            <a:lvl9pPr marL="3657600" algn="l" defTabSz="457200" rtl="0" eaLnBrk="1" latinLnBrk="0" hangingPunct="1">
+              <a:defRPr sz="1800" kern="1200">
+                <a:solidFill>
+                  <a:schemeClr val="tx1"/>
+                </a:solidFill>
+                <a:latin typeface="+mn-lt"/>
+                <a:ea typeface="+mn-ea"/>
+                <a:cs typeface="+mn-cs"/>
+              </a:defRPr>
+            </a:lvl9pPr>
+          </a:lstStyle>
+          <a:p>
+            <a:r>
+              <a:rPr lang="de-DE" sz="1400" dirty="0"/>
+              <a:t>Veronika Taranek, Philipp </a:t>
+            </a:r>
+            <a:r>
+              <a:rPr lang="de-DE" sz="1400" dirty="0" err="1"/>
+              <a:t>Fenesan</a:t>
+            </a:r>
+            <a:r>
+              <a:rPr lang="de-DE" sz="1400" dirty="0"/>
+              <a:t>, Nicolas Geppert, Lukas Werner</a:t>
+            </a:r>
+            <a:endParaRPr lang="en-US" dirty="0"/>
+          </a:p>
+        </p:txBody>
+      </p:sp>
+    </p:spTree>
+    <p:extLst>
+      <p:ext uri="{BB962C8B-B14F-4D97-AF65-F5344CB8AC3E}">
+        <p14:creationId xmlns:p14="http://schemas.microsoft.com/office/powerpoint/2010/main" val="1940434735"/>
+      </p:ext>
+    </p:extLst>
+  </p:cSld>
+  <p:clrMapOvr>
+    <a:masterClrMapping/>
+  </p:clrMapOvr>
+</p:sld>
+</file>
+
+<file path=ppt/slides/slide14.xml><?xml version="1.0" encoding="utf-8"?>
+<p:sld xmlns:a="http://schemas.openxmlformats.org/drawingml/2006/main" xmlns:r="http://schemas.openxmlformats.org/officeDocument/2006/relationships" xmlns:p="http://schemas.openxmlformats.org/presentationml/2006/main">
+  <p:cSld>
+    <p:spTree>
+      <p:nvGrpSpPr>
+        <p:cNvPr id="1" name=""/>
+        <p:cNvGrpSpPr/>
+        <p:nvPr/>
+      </p:nvGrpSpPr>
+      <p:grpSpPr>
+        <a:xfrm>
+          <a:off x="0" y="0"/>
+          <a:ext cx="0" cy="0"/>
+          <a:chOff x="0" y="0"/>
+          <a:chExt cx="0" cy="0"/>
+        </a:xfrm>
+      </p:grpSpPr>
+      <p:sp>
+        <p:nvSpPr>
+          <p:cNvPr id="2" name="Title 1">
+            <a:extLst>
+              <a:ext uri="{FF2B5EF4-FFF2-40B4-BE49-F238E27FC236}">
+                <a16:creationId xmlns:a16="http://schemas.microsoft.com/office/drawing/2014/main" id="{A533C930-62BB-49CD-A689-73D96C0BFBBB}"/>
+              </a:ext>
+            </a:extLst>
+          </p:cNvPr>
+          <p:cNvSpPr>
+            <a:spLocks noGrp="1"/>
+          </p:cNvSpPr>
+          <p:nvPr>
+            <p:ph type="title"/>
+          </p:nvPr>
+        </p:nvSpPr>
+        <p:spPr/>
+        <p:txBody>
+          <a:bodyPr/>
+          <a:lstStyle/>
+          <a:p>
+            <a:r>
+              <a:rPr lang="en-US" dirty="0"/>
+              <a:t>Aufbau</a:t>
+            </a:r>
+          </a:p>
+        </p:txBody>
+      </p:sp>
+      <p:sp>
+        <p:nvSpPr>
+          <p:cNvPr id="5" name="TextBox 4">
+            <a:extLst>
+              <a:ext uri="{FF2B5EF4-FFF2-40B4-BE49-F238E27FC236}">
+                <a16:creationId xmlns:a16="http://schemas.microsoft.com/office/drawing/2014/main" id="{7FDF7188-C07D-448D-A4A7-2BC551B56E6A}"/>
+              </a:ext>
+            </a:extLst>
+          </p:cNvPr>
+          <p:cNvSpPr txBox="1"/>
+          <p:nvPr/>
+        </p:nvSpPr>
+        <p:spPr>
+          <a:xfrm>
+            <a:off x="571500" y="5410200"/>
+            <a:ext cx="7928774" cy="646331"/>
+          </a:xfrm>
+          <a:prstGeom prst="rect">
+            <a:avLst/>
+          </a:prstGeom>
+          <a:noFill/>
+        </p:spPr>
+        <p:txBody>
+          <a:bodyPr wrap="none" rtlCol="0">
+            <a:spAutoFit/>
+          </a:bodyPr>
+          <a:lstStyle/>
+          <a:p>
+            <a:r>
+              <a:rPr lang="en-US" dirty="0" err="1"/>
+              <a:t>Auffällig</a:t>
+            </a:r>
+            <a:r>
+              <a:rPr lang="en-US" dirty="0"/>
+              <a:t> </a:t>
+            </a:r>
+            <a:r>
+              <a:rPr lang="en-US" dirty="0" err="1"/>
+              <a:t>ist</a:t>
+            </a:r>
+            <a:r>
+              <a:rPr lang="en-US" dirty="0"/>
+              <a:t>, </a:t>
+            </a:r>
+            <a:r>
+              <a:rPr lang="en-US" dirty="0" err="1"/>
+              <a:t>dass</a:t>
+            </a:r>
+            <a:r>
+              <a:rPr lang="en-US" dirty="0"/>
+              <a:t> die </a:t>
+            </a:r>
+            <a:r>
+              <a:rPr lang="en-US" dirty="0" err="1"/>
+              <a:t>Funktionen</a:t>
+            </a:r>
+            <a:r>
+              <a:rPr lang="en-US" dirty="0"/>
+              <a:t> von den Design-Klassen </a:t>
+            </a:r>
+            <a:r>
+              <a:rPr lang="en-US" dirty="0" err="1"/>
+              <a:t>getrennt</a:t>
+            </a:r>
+            <a:r>
+              <a:rPr lang="en-US" dirty="0"/>
+              <a:t> </a:t>
+            </a:r>
+            <a:r>
+              <a:rPr lang="en-US" dirty="0" err="1"/>
+              <a:t>wurden</a:t>
+            </a:r>
+            <a:r>
+              <a:rPr lang="en-US" dirty="0"/>
+              <a:t>.</a:t>
+            </a:r>
+            <a:br>
+              <a:rPr lang="en-US" dirty="0"/>
+            </a:br>
+            <a:r>
+              <a:rPr lang="en-US" dirty="0"/>
+              <a:t>Die </a:t>
+            </a:r>
+            <a:r>
+              <a:rPr lang="en-US" dirty="0" err="1"/>
+              <a:t>Logik</a:t>
+            </a:r>
+            <a:r>
+              <a:rPr lang="en-US" dirty="0"/>
+              <a:t> </a:t>
+            </a:r>
+            <a:r>
+              <a:rPr lang="en-US" dirty="0" err="1"/>
+              <a:t>wird</a:t>
+            </a:r>
+            <a:r>
+              <a:rPr lang="en-US" dirty="0"/>
+              <a:t> in extra Klassen </a:t>
+            </a:r>
+            <a:r>
+              <a:rPr lang="en-US" dirty="0" err="1"/>
+              <a:t>implementiert</a:t>
+            </a:r>
+            <a:r>
+              <a:rPr lang="en-US" dirty="0"/>
+              <a:t>, die </a:t>
+            </a:r>
+            <a:r>
+              <a:rPr lang="en-US" dirty="0" err="1"/>
+              <a:t>getrennt</a:t>
+            </a:r>
+            <a:r>
+              <a:rPr lang="en-US" dirty="0"/>
+              <a:t> von der UI </a:t>
+            </a:r>
+            <a:r>
+              <a:rPr lang="en-US" dirty="0" err="1"/>
+              <a:t>sind</a:t>
+            </a:r>
+            <a:endParaRPr lang="en-US" dirty="0"/>
+          </a:p>
+        </p:txBody>
+      </p:sp>
+      <p:sp>
+        <p:nvSpPr>
+          <p:cNvPr id="6" name="Date Placeholder 3">
+            <a:extLst>
+              <a:ext uri="{FF2B5EF4-FFF2-40B4-BE49-F238E27FC236}">
+                <a16:creationId xmlns:a16="http://schemas.microsoft.com/office/drawing/2014/main" id="{C597FC9F-E38B-4D7C-800C-2E507A9787EC}"/>
+              </a:ext>
+            </a:extLst>
+          </p:cNvPr>
+          <p:cNvSpPr txBox="1">
+            <a:spLocks/>
+          </p:cNvSpPr>
+          <p:nvPr/>
+        </p:nvSpPr>
+        <p:spPr>
+          <a:xfrm>
+            <a:off x="677334" y="231051"/>
+            <a:ext cx="1071566" cy="378549"/>
+          </a:xfrm>
+          <a:prstGeom prst="rect">
+            <a:avLst/>
+          </a:prstGeom>
+        </p:spPr>
+        <p:txBody>
+          <a:bodyPr vert="horz" lIns="91440" tIns="45720" rIns="91440" bIns="45720" rtlCol="0" anchor="ctr"/>
+          <a:lstStyle>
+            <a:defPPr>
+              <a:defRPr lang="en-US"/>
+            </a:defPPr>
+            <a:lvl1pPr marL="0" algn="r" defTabSz="457200" rtl="0" eaLnBrk="1" latinLnBrk="0" hangingPunct="1">
+              <a:defRPr sz="900" kern="1200">
+                <a:solidFill>
+                  <a:schemeClr val="tx1">
+                    <a:tint val="75000"/>
+                  </a:schemeClr>
+                </a:solidFill>
+                <a:latin typeface="+mn-lt"/>
+                <a:ea typeface="+mn-ea"/>
+                <a:cs typeface="+mn-cs"/>
+              </a:defRPr>
+            </a:lvl1pPr>
+            <a:lvl2pPr marL="457200" algn="l" defTabSz="457200" rtl="0" eaLnBrk="1" latinLnBrk="0" hangingPunct="1">
+              <a:defRPr sz="1800" kern="1200">
+                <a:solidFill>
+                  <a:schemeClr val="tx1"/>
+                </a:solidFill>
+                <a:latin typeface="+mn-lt"/>
+                <a:ea typeface="+mn-ea"/>
+                <a:cs typeface="+mn-cs"/>
+              </a:defRPr>
+            </a:lvl2pPr>
+            <a:lvl3pPr marL="914400" algn="l" defTabSz="457200" rtl="0" eaLnBrk="1" latinLnBrk="0" hangingPunct="1">
+              <a:defRPr sz="1800" kern="1200">
+                <a:solidFill>
+                  <a:schemeClr val="tx1"/>
+                </a:solidFill>
+                <a:latin typeface="+mn-lt"/>
+                <a:ea typeface="+mn-ea"/>
+                <a:cs typeface="+mn-cs"/>
+              </a:defRPr>
+            </a:lvl3pPr>
+            <a:lvl4pPr marL="1371600" algn="l" defTabSz="457200" rtl="0" eaLnBrk="1" latinLnBrk="0" hangingPunct="1">
+              <a:defRPr sz="1800" kern="1200">
+                <a:solidFill>
+                  <a:schemeClr val="tx1"/>
+                </a:solidFill>
+                <a:latin typeface="+mn-lt"/>
+                <a:ea typeface="+mn-ea"/>
+                <a:cs typeface="+mn-cs"/>
+              </a:defRPr>
+            </a:lvl4pPr>
+            <a:lvl5pPr marL="1828800" algn="l" defTabSz="457200" rtl="0" eaLnBrk="1" latinLnBrk="0" hangingPunct="1">
+              <a:defRPr sz="1800" kern="1200">
+                <a:solidFill>
+                  <a:schemeClr val="tx1"/>
+                </a:solidFill>
+                <a:latin typeface="+mn-lt"/>
+                <a:ea typeface="+mn-ea"/>
+                <a:cs typeface="+mn-cs"/>
+              </a:defRPr>
+            </a:lvl5pPr>
+            <a:lvl6pPr marL="2286000" algn="l" defTabSz="457200" rtl="0" eaLnBrk="1" latinLnBrk="0" hangingPunct="1">
+              <a:defRPr sz="1800" kern="1200">
+                <a:solidFill>
+                  <a:schemeClr val="tx1"/>
+                </a:solidFill>
+                <a:latin typeface="+mn-lt"/>
+                <a:ea typeface="+mn-ea"/>
+                <a:cs typeface="+mn-cs"/>
+              </a:defRPr>
+            </a:lvl6pPr>
+            <a:lvl7pPr marL="2743200" algn="l" defTabSz="457200" rtl="0" eaLnBrk="1" latinLnBrk="0" hangingPunct="1">
+              <a:defRPr sz="1800" kern="1200">
+                <a:solidFill>
+                  <a:schemeClr val="tx1"/>
+                </a:solidFill>
+                <a:latin typeface="+mn-lt"/>
+                <a:ea typeface="+mn-ea"/>
+                <a:cs typeface="+mn-cs"/>
+              </a:defRPr>
+            </a:lvl7pPr>
+            <a:lvl8pPr marL="3200400" algn="l" defTabSz="457200" rtl="0" eaLnBrk="1" latinLnBrk="0" hangingPunct="1">
+              <a:defRPr sz="1800" kern="1200">
+                <a:solidFill>
+                  <a:schemeClr val="tx1"/>
+                </a:solidFill>
+                <a:latin typeface="+mn-lt"/>
+                <a:ea typeface="+mn-ea"/>
+                <a:cs typeface="+mn-cs"/>
+              </a:defRPr>
+            </a:lvl8pPr>
+            <a:lvl9pPr marL="3657600" algn="l" defTabSz="457200" rtl="0" eaLnBrk="1" latinLnBrk="0" hangingPunct="1">
+              <a:defRPr sz="1800" kern="1200">
+                <a:solidFill>
+                  <a:schemeClr val="tx1"/>
+                </a:solidFill>
+                <a:latin typeface="+mn-lt"/>
+                <a:ea typeface="+mn-ea"/>
+                <a:cs typeface="+mn-cs"/>
+              </a:defRPr>
+            </a:lvl9pPr>
+          </a:lstStyle>
+          <a:p>
+            <a:fld id="{5665C720-CFBA-4CD6-B44E-E52DA515AFF8}" type="datetime1">
+              <a:rPr lang="de-DE" sz="1400" smtClean="0"/>
+              <a:pPr/>
+              <a:t>31.10.2020</a:t>
+            </a:fld>
+            <a:endParaRPr lang="en-US" dirty="0"/>
+          </a:p>
+        </p:txBody>
+      </p:sp>
+      <p:sp>
+        <p:nvSpPr>
+          <p:cNvPr id="7" name="Date Placeholder 3">
+            <a:extLst>
+              <a:ext uri="{FF2B5EF4-FFF2-40B4-BE49-F238E27FC236}">
+                <a16:creationId xmlns:a16="http://schemas.microsoft.com/office/drawing/2014/main" id="{0F246959-6071-4609-B298-646E582C9281}"/>
+              </a:ext>
+            </a:extLst>
+          </p:cNvPr>
+          <p:cNvSpPr txBox="1">
+            <a:spLocks/>
+          </p:cNvSpPr>
+          <p:nvPr/>
+        </p:nvSpPr>
+        <p:spPr>
+          <a:xfrm>
+            <a:off x="1824033" y="231050"/>
+            <a:ext cx="5713108" cy="378549"/>
+          </a:xfrm>
+          <a:prstGeom prst="rect">
+            <a:avLst/>
+          </a:prstGeom>
+        </p:spPr>
+        <p:txBody>
+          <a:bodyPr vert="horz" lIns="91440" tIns="45720" rIns="91440" bIns="45720" rtlCol="0" anchor="ctr"/>
+          <a:lstStyle>
+            <a:defPPr>
+              <a:defRPr lang="en-US"/>
+            </a:defPPr>
+            <a:lvl1pPr marL="0" algn="r" defTabSz="457200" rtl="0" eaLnBrk="1" latinLnBrk="0" hangingPunct="1">
+              <a:defRPr sz="900" kern="1200">
+                <a:solidFill>
+                  <a:schemeClr val="tx1">
+                    <a:tint val="75000"/>
+                  </a:schemeClr>
+                </a:solidFill>
+                <a:latin typeface="+mn-lt"/>
+                <a:ea typeface="+mn-ea"/>
+                <a:cs typeface="+mn-cs"/>
+              </a:defRPr>
+            </a:lvl1pPr>
+            <a:lvl2pPr marL="457200" algn="l" defTabSz="457200" rtl="0" eaLnBrk="1" latinLnBrk="0" hangingPunct="1">
+              <a:defRPr sz="1800" kern="1200">
+                <a:solidFill>
+                  <a:schemeClr val="tx1"/>
+                </a:solidFill>
+                <a:latin typeface="+mn-lt"/>
+                <a:ea typeface="+mn-ea"/>
+                <a:cs typeface="+mn-cs"/>
+              </a:defRPr>
+            </a:lvl2pPr>
+            <a:lvl3pPr marL="914400" algn="l" defTabSz="457200" rtl="0" eaLnBrk="1" latinLnBrk="0" hangingPunct="1">
+              <a:defRPr sz="1800" kern="1200">
+                <a:solidFill>
+                  <a:schemeClr val="tx1"/>
+                </a:solidFill>
+                <a:latin typeface="+mn-lt"/>
+                <a:ea typeface="+mn-ea"/>
+                <a:cs typeface="+mn-cs"/>
+              </a:defRPr>
+            </a:lvl3pPr>
+            <a:lvl4pPr marL="1371600" algn="l" defTabSz="457200" rtl="0" eaLnBrk="1" latinLnBrk="0" hangingPunct="1">
+              <a:defRPr sz="1800" kern="1200">
+                <a:solidFill>
+                  <a:schemeClr val="tx1"/>
+                </a:solidFill>
+                <a:latin typeface="+mn-lt"/>
+                <a:ea typeface="+mn-ea"/>
+                <a:cs typeface="+mn-cs"/>
+              </a:defRPr>
+            </a:lvl4pPr>
+            <a:lvl5pPr marL="1828800" algn="l" defTabSz="457200" rtl="0" eaLnBrk="1" latinLnBrk="0" hangingPunct="1">
+              <a:defRPr sz="1800" kern="1200">
+                <a:solidFill>
+                  <a:schemeClr val="tx1"/>
+                </a:solidFill>
+                <a:latin typeface="+mn-lt"/>
+                <a:ea typeface="+mn-ea"/>
+                <a:cs typeface="+mn-cs"/>
+              </a:defRPr>
+            </a:lvl5pPr>
+            <a:lvl6pPr marL="2286000" algn="l" defTabSz="457200" rtl="0" eaLnBrk="1" latinLnBrk="0" hangingPunct="1">
+              <a:defRPr sz="1800" kern="1200">
+                <a:solidFill>
+                  <a:schemeClr val="tx1"/>
+                </a:solidFill>
+                <a:latin typeface="+mn-lt"/>
+                <a:ea typeface="+mn-ea"/>
+                <a:cs typeface="+mn-cs"/>
+              </a:defRPr>
+            </a:lvl6pPr>
+            <a:lvl7pPr marL="2743200" algn="l" defTabSz="457200" rtl="0" eaLnBrk="1" latinLnBrk="0" hangingPunct="1">
+              <a:defRPr sz="1800" kern="1200">
+                <a:solidFill>
+                  <a:schemeClr val="tx1"/>
+                </a:solidFill>
+                <a:latin typeface="+mn-lt"/>
+                <a:ea typeface="+mn-ea"/>
+                <a:cs typeface="+mn-cs"/>
+              </a:defRPr>
+            </a:lvl7pPr>
+            <a:lvl8pPr marL="3200400" algn="l" defTabSz="457200" rtl="0" eaLnBrk="1" latinLnBrk="0" hangingPunct="1">
+              <a:defRPr sz="1800" kern="1200">
+                <a:solidFill>
+                  <a:schemeClr val="tx1"/>
+                </a:solidFill>
+                <a:latin typeface="+mn-lt"/>
+                <a:ea typeface="+mn-ea"/>
+                <a:cs typeface="+mn-cs"/>
+              </a:defRPr>
+            </a:lvl8pPr>
+            <a:lvl9pPr marL="3657600" algn="l" defTabSz="457200" rtl="0" eaLnBrk="1" latinLnBrk="0" hangingPunct="1">
+              <a:defRPr sz="1800" kern="1200">
+                <a:solidFill>
+                  <a:schemeClr val="tx1"/>
+                </a:solidFill>
+                <a:latin typeface="+mn-lt"/>
+                <a:ea typeface="+mn-ea"/>
+                <a:cs typeface="+mn-cs"/>
+              </a:defRPr>
+            </a:lvl9pPr>
+          </a:lstStyle>
+          <a:p>
+            <a:r>
+              <a:rPr lang="de-DE" sz="1400" dirty="0"/>
+              <a:t>Veronika Taranek, Philipp </a:t>
+            </a:r>
+            <a:r>
+              <a:rPr lang="de-DE" sz="1400" dirty="0" err="1"/>
+              <a:t>Fenesan</a:t>
+            </a:r>
+            <a:r>
+              <a:rPr lang="de-DE" sz="1400" dirty="0"/>
+              <a:t>, Nicolas Geppert, Lukas Werner</a:t>
+            </a:r>
+            <a:endParaRPr lang="en-US" dirty="0"/>
+          </a:p>
+        </p:txBody>
+      </p:sp>
+      <p:sp>
+        <p:nvSpPr>
+          <p:cNvPr id="3" name="TextBox 2">
+            <a:extLst>
+              <a:ext uri="{FF2B5EF4-FFF2-40B4-BE49-F238E27FC236}">
+                <a16:creationId xmlns:a16="http://schemas.microsoft.com/office/drawing/2014/main" id="{5BCAFD94-9DAE-40DB-ABC1-EA97278FB175}"/>
+              </a:ext>
+            </a:extLst>
+          </p:cNvPr>
+          <p:cNvSpPr txBox="1"/>
+          <p:nvPr/>
+        </p:nvSpPr>
+        <p:spPr>
+          <a:xfrm>
+            <a:off x="1524000" y="1930400"/>
+            <a:ext cx="4572000" cy="369332"/>
+          </a:xfrm>
+          <a:prstGeom prst="rect">
+            <a:avLst/>
+          </a:prstGeom>
+          <a:noFill/>
+        </p:spPr>
+        <p:txBody>
+          <a:bodyPr wrap="square" rtlCol="0">
+            <a:spAutoFit/>
+          </a:bodyPr>
+          <a:lstStyle/>
+          <a:p>
+            <a:r>
+              <a:rPr lang="en-US" dirty="0" err="1"/>
+              <a:t>neues</a:t>
+            </a:r>
+            <a:r>
+              <a:rPr lang="en-US" dirty="0"/>
+              <a:t> UML</a:t>
+            </a:r>
+          </a:p>
+        </p:txBody>
+      </p:sp>
+    </p:spTree>
+    <p:extLst>
+      <p:ext uri="{BB962C8B-B14F-4D97-AF65-F5344CB8AC3E}">
+        <p14:creationId xmlns:p14="http://schemas.microsoft.com/office/powerpoint/2010/main" val="870046311"/>
+      </p:ext>
+    </p:extLst>
+  </p:cSld>
+  <p:clrMapOvr>
+    <a:masterClrMapping/>
+  </p:clrMapOvr>
+</p:sld>
+</file>
+
+<file path=ppt/slides/slide15.xml><?xml version="1.0" encoding="utf-8"?>
+<p:sld xmlns:a="http://schemas.openxmlformats.org/drawingml/2006/main" xmlns:r="http://schemas.openxmlformats.org/officeDocument/2006/relationships" xmlns:p="http://schemas.openxmlformats.org/presentationml/2006/main">
+  <p:cSld>
+    <p:spTree>
+      <p:nvGrpSpPr>
+        <p:cNvPr id="1" name=""/>
+        <p:cNvGrpSpPr/>
+        <p:nvPr/>
+      </p:nvGrpSpPr>
+      <p:grpSpPr>
+        <a:xfrm>
+          <a:off x="0" y="0"/>
+          <a:ext cx="0" cy="0"/>
+          <a:chOff x="0" y="0"/>
+          <a:chExt cx="0" cy="0"/>
+        </a:xfrm>
+      </p:grpSpPr>
+      <p:sp>
+        <p:nvSpPr>
+          <p:cNvPr id="2" name="Title 1">
+            <a:extLst>
+              <a:ext uri="{FF2B5EF4-FFF2-40B4-BE49-F238E27FC236}">
                 <a16:creationId xmlns:a16="http://schemas.microsoft.com/office/drawing/2014/main" id="{BFFE73E4-B193-441D-8A54-09AA7DF89A89}"/>
               </a:ext>
             </a:extLst>
@@ -8261,138 +9567,6 @@
               <a:rPr lang="en-US" dirty="0" err="1"/>
               <a:t>wurde</a:t>
             </a:r>
-            <a:endParaRPr lang="en-US" dirty="0"/>
-          </a:p>
-        </p:txBody>
-      </p:sp>
-      <p:sp>
-        <p:nvSpPr>
-          <p:cNvPr id="6" name="Date Placeholder 3">
-            <a:extLst>
-              <a:ext uri="{FF2B5EF4-FFF2-40B4-BE49-F238E27FC236}">
-                <a16:creationId xmlns:a16="http://schemas.microsoft.com/office/drawing/2014/main" id="{5A155018-75BB-467E-9C0B-72C18B696E77}"/>
-              </a:ext>
-            </a:extLst>
-          </p:cNvPr>
-          <p:cNvSpPr txBox="1">
-            <a:spLocks/>
-          </p:cNvSpPr>
-          <p:nvPr/>
-        </p:nvSpPr>
-        <p:spPr>
-          <a:xfrm>
-            <a:off x="677334" y="231051"/>
-            <a:ext cx="1071566" cy="378549"/>
-          </a:xfrm>
-          <a:prstGeom prst="rect">
-            <a:avLst/>
-          </a:prstGeom>
-        </p:spPr>
-        <p:txBody>
-          <a:bodyPr vert="horz" lIns="91440" tIns="45720" rIns="91440" bIns="45720" rtlCol="0" anchor="ctr"/>
-          <a:lstStyle>
-            <a:defPPr>
-              <a:defRPr lang="en-US"/>
-            </a:defPPr>
-            <a:lvl1pPr marL="0" algn="r" defTabSz="457200" rtl="0" eaLnBrk="1" latinLnBrk="0" hangingPunct="1">
-              <a:defRPr sz="900" kern="1200">
-                <a:solidFill>
-                  <a:schemeClr val="tx1">
-                    <a:tint val="75000"/>
-                  </a:schemeClr>
-                </a:solidFill>
-                <a:latin typeface="+mn-lt"/>
-                <a:ea typeface="+mn-ea"/>
-                <a:cs typeface="+mn-cs"/>
-              </a:defRPr>
-            </a:lvl1pPr>
-            <a:lvl2pPr marL="457200" algn="l" defTabSz="457200" rtl="0" eaLnBrk="1" latinLnBrk="0" hangingPunct="1">
-              <a:defRPr sz="1800" kern="1200">
-                <a:solidFill>
-                  <a:schemeClr val="tx1"/>
-                </a:solidFill>
-                <a:latin typeface="+mn-lt"/>
-                <a:ea typeface="+mn-ea"/>
-                <a:cs typeface="+mn-cs"/>
-              </a:defRPr>
-            </a:lvl2pPr>
-            <a:lvl3pPr marL="914400" algn="l" defTabSz="457200" rtl="0" eaLnBrk="1" latinLnBrk="0" hangingPunct="1">
-              <a:defRPr sz="1800" kern="1200">
-                <a:solidFill>
-                  <a:schemeClr val="tx1"/>
-                </a:solidFill>
-                <a:latin typeface="+mn-lt"/>
-                <a:ea typeface="+mn-ea"/>
-                <a:cs typeface="+mn-cs"/>
-              </a:defRPr>
-            </a:lvl3pPr>
-            <a:lvl4pPr marL="1371600" algn="l" defTabSz="457200" rtl="0" eaLnBrk="1" latinLnBrk="0" hangingPunct="1">
-              <a:defRPr sz="1800" kern="1200">
-                <a:solidFill>
-                  <a:schemeClr val="tx1"/>
-                </a:solidFill>
-                <a:latin typeface="+mn-lt"/>
-                <a:ea typeface="+mn-ea"/>
-                <a:cs typeface="+mn-cs"/>
-              </a:defRPr>
-            </a:lvl4pPr>
-            <a:lvl5pPr marL="1828800" algn="l" defTabSz="457200" rtl="0" eaLnBrk="1" latinLnBrk="0" hangingPunct="1">
-              <a:defRPr sz="1800" kern="1200">
-                <a:solidFill>
-                  <a:schemeClr val="tx1"/>
-                </a:solidFill>
-                <a:latin typeface="+mn-lt"/>
-                <a:ea typeface="+mn-ea"/>
-                <a:cs typeface="+mn-cs"/>
-              </a:defRPr>
-            </a:lvl5pPr>
-            <a:lvl6pPr marL="2286000" algn="l" defTabSz="457200" rtl="0" eaLnBrk="1" latinLnBrk="0" hangingPunct="1">
-              <a:defRPr sz="1800" kern="1200">
-                <a:solidFill>
-                  <a:schemeClr val="tx1"/>
-                </a:solidFill>
-                <a:latin typeface="+mn-lt"/>
-                <a:ea typeface="+mn-ea"/>
-                <a:cs typeface="+mn-cs"/>
-              </a:defRPr>
-            </a:lvl6pPr>
-            <a:lvl7pPr marL="2743200" algn="l" defTabSz="457200" rtl="0" eaLnBrk="1" latinLnBrk="0" hangingPunct="1">
-              <a:defRPr sz="1800" kern="1200">
-                <a:solidFill>
-                  <a:schemeClr val="tx1"/>
-                </a:solidFill>
-                <a:latin typeface="+mn-lt"/>
-                <a:ea typeface="+mn-ea"/>
-                <a:cs typeface="+mn-cs"/>
-              </a:defRPr>
-            </a:lvl7pPr>
-            <a:lvl8pPr marL="3200400" algn="l" defTabSz="457200" rtl="0" eaLnBrk="1" latinLnBrk="0" hangingPunct="1">
-              <a:defRPr sz="1800" kern="1200">
-                <a:solidFill>
-                  <a:schemeClr val="tx1"/>
-                </a:solidFill>
-                <a:latin typeface="+mn-lt"/>
-                <a:ea typeface="+mn-ea"/>
-                <a:cs typeface="+mn-cs"/>
-              </a:defRPr>
-            </a:lvl8pPr>
-            <a:lvl9pPr marL="3657600" algn="l" defTabSz="457200" rtl="0" eaLnBrk="1" latinLnBrk="0" hangingPunct="1">
-              <a:defRPr sz="1800" kern="1200">
-                <a:solidFill>
-                  <a:schemeClr val="tx1"/>
-                </a:solidFill>
-                <a:latin typeface="+mn-lt"/>
-                <a:ea typeface="+mn-ea"/>
-                <a:cs typeface="+mn-cs"/>
-              </a:defRPr>
-            </a:lvl9pPr>
-          </a:lstStyle>
-          <a:p>
-            <a:fld id="{5665C720-CFBA-4CD6-B44E-E52DA515AFF8}" type="datetime1">
-              <a:rPr lang="de-DE" sz="1400" smtClean="0"/>
-              <a:pPr/>
-              <a:t>29.10.2020</a:t>
-            </a:fld>
             <a:endParaRPr lang="en-US" dirty="0"/>
           </a:p>
         </p:txBody>
@@ -8572,6 +9746,138 @@
               <a:rPr lang="en-US" dirty="0"/>
               <a:t> ERD</a:t>
             </a:r>
+          </a:p>
+        </p:txBody>
+      </p:sp>
+      <p:sp>
+        <p:nvSpPr>
+          <p:cNvPr id="9" name="Date Placeholder 3">
+            <a:extLst>
+              <a:ext uri="{FF2B5EF4-FFF2-40B4-BE49-F238E27FC236}">
+                <a16:creationId xmlns:a16="http://schemas.microsoft.com/office/drawing/2014/main" id="{334A33EB-02E1-40B2-B774-9C5BABFD0FC7}"/>
+              </a:ext>
+            </a:extLst>
+          </p:cNvPr>
+          <p:cNvSpPr txBox="1">
+            <a:spLocks/>
+          </p:cNvSpPr>
+          <p:nvPr/>
+        </p:nvSpPr>
+        <p:spPr>
+          <a:xfrm>
+            <a:off x="677334" y="231051"/>
+            <a:ext cx="1071566" cy="378549"/>
+          </a:xfrm>
+          <a:prstGeom prst="rect">
+            <a:avLst/>
+          </a:prstGeom>
+        </p:spPr>
+        <p:txBody>
+          <a:bodyPr vert="horz" lIns="91440" tIns="45720" rIns="91440" bIns="45720" rtlCol="0" anchor="ctr"/>
+          <a:lstStyle>
+            <a:defPPr>
+              <a:defRPr lang="en-US"/>
+            </a:defPPr>
+            <a:lvl1pPr marL="0" algn="r" defTabSz="457200" rtl="0" eaLnBrk="1" latinLnBrk="0" hangingPunct="1">
+              <a:defRPr sz="900" kern="1200">
+                <a:solidFill>
+                  <a:schemeClr val="tx1">
+                    <a:tint val="75000"/>
+                  </a:schemeClr>
+                </a:solidFill>
+                <a:latin typeface="+mn-lt"/>
+                <a:ea typeface="+mn-ea"/>
+                <a:cs typeface="+mn-cs"/>
+              </a:defRPr>
+            </a:lvl1pPr>
+            <a:lvl2pPr marL="457200" algn="l" defTabSz="457200" rtl="0" eaLnBrk="1" latinLnBrk="0" hangingPunct="1">
+              <a:defRPr sz="1800" kern="1200">
+                <a:solidFill>
+                  <a:schemeClr val="tx1"/>
+                </a:solidFill>
+                <a:latin typeface="+mn-lt"/>
+                <a:ea typeface="+mn-ea"/>
+                <a:cs typeface="+mn-cs"/>
+              </a:defRPr>
+            </a:lvl2pPr>
+            <a:lvl3pPr marL="914400" algn="l" defTabSz="457200" rtl="0" eaLnBrk="1" latinLnBrk="0" hangingPunct="1">
+              <a:defRPr sz="1800" kern="1200">
+                <a:solidFill>
+                  <a:schemeClr val="tx1"/>
+                </a:solidFill>
+                <a:latin typeface="+mn-lt"/>
+                <a:ea typeface="+mn-ea"/>
+                <a:cs typeface="+mn-cs"/>
+              </a:defRPr>
+            </a:lvl3pPr>
+            <a:lvl4pPr marL="1371600" algn="l" defTabSz="457200" rtl="0" eaLnBrk="1" latinLnBrk="0" hangingPunct="1">
+              <a:defRPr sz="1800" kern="1200">
+                <a:solidFill>
+                  <a:schemeClr val="tx1"/>
+                </a:solidFill>
+                <a:latin typeface="+mn-lt"/>
+                <a:ea typeface="+mn-ea"/>
+                <a:cs typeface="+mn-cs"/>
+              </a:defRPr>
+            </a:lvl4pPr>
+            <a:lvl5pPr marL="1828800" algn="l" defTabSz="457200" rtl="0" eaLnBrk="1" latinLnBrk="0" hangingPunct="1">
+              <a:defRPr sz="1800" kern="1200">
+                <a:solidFill>
+                  <a:schemeClr val="tx1"/>
+                </a:solidFill>
+                <a:latin typeface="+mn-lt"/>
+                <a:ea typeface="+mn-ea"/>
+                <a:cs typeface="+mn-cs"/>
+              </a:defRPr>
+            </a:lvl5pPr>
+            <a:lvl6pPr marL="2286000" algn="l" defTabSz="457200" rtl="0" eaLnBrk="1" latinLnBrk="0" hangingPunct="1">
+              <a:defRPr sz="1800" kern="1200">
+                <a:solidFill>
+                  <a:schemeClr val="tx1"/>
+                </a:solidFill>
+                <a:latin typeface="+mn-lt"/>
+                <a:ea typeface="+mn-ea"/>
+                <a:cs typeface="+mn-cs"/>
+              </a:defRPr>
+            </a:lvl6pPr>
+            <a:lvl7pPr marL="2743200" algn="l" defTabSz="457200" rtl="0" eaLnBrk="1" latinLnBrk="0" hangingPunct="1">
+              <a:defRPr sz="1800" kern="1200">
+                <a:solidFill>
+                  <a:schemeClr val="tx1"/>
+                </a:solidFill>
+                <a:latin typeface="+mn-lt"/>
+                <a:ea typeface="+mn-ea"/>
+                <a:cs typeface="+mn-cs"/>
+              </a:defRPr>
+            </a:lvl7pPr>
+            <a:lvl8pPr marL="3200400" algn="l" defTabSz="457200" rtl="0" eaLnBrk="1" latinLnBrk="0" hangingPunct="1">
+              <a:defRPr sz="1800" kern="1200">
+                <a:solidFill>
+                  <a:schemeClr val="tx1"/>
+                </a:solidFill>
+                <a:latin typeface="+mn-lt"/>
+                <a:ea typeface="+mn-ea"/>
+                <a:cs typeface="+mn-cs"/>
+              </a:defRPr>
+            </a:lvl8pPr>
+            <a:lvl9pPr marL="3657600" algn="l" defTabSz="457200" rtl="0" eaLnBrk="1" latinLnBrk="0" hangingPunct="1">
+              <a:defRPr sz="1800" kern="1200">
+                <a:solidFill>
+                  <a:schemeClr val="tx1"/>
+                </a:solidFill>
+                <a:latin typeface="+mn-lt"/>
+                <a:ea typeface="+mn-ea"/>
+                <a:cs typeface="+mn-cs"/>
+              </a:defRPr>
+            </a:lvl9pPr>
+          </a:lstStyle>
+          <a:p>
+            <a:fld id="{5665C720-CFBA-4CD6-B44E-E52DA515AFF8}" type="datetime1">
+              <a:rPr lang="de-DE" sz="1400" smtClean="0"/>
+              <a:pPr/>
+              <a:t>31.10.2020</a:t>
+            </a:fld>
+            <a:endParaRPr lang="en-US" dirty="0"/>
           </a:p>
         </p:txBody>
       </p:sp>
@@ -9862,7 +11168,7 @@
           <a:p>
             <a:fld id="{BBFE0E78-BD63-486A-A840-5A82EE4DABDC}" type="datetime1">
               <a:rPr lang="de-DE" smtClean="0"/>
-              <a:t>29.10.2020</a:t>
+              <a:t>31.10.2020</a:t>
             </a:fld>
             <a:endParaRPr lang="en-US"/>
           </a:p>
@@ -10260,7 +11566,7 @@
             <a:fld id="{5665C720-CFBA-4CD6-B44E-E52DA515AFF8}" type="datetime1">
               <a:rPr lang="de-DE" sz="1400" smtClean="0"/>
               <a:pPr/>
-              <a:t>29.10.2020</a:t>
+              <a:t>31.10.2020</a:t>
             </a:fld>
             <a:endParaRPr lang="en-US" dirty="0"/>
           </a:p>
@@ -10725,7 +12031,7 @@
             <a:fld id="{5665C720-CFBA-4CD6-B44E-E52DA515AFF8}" type="datetime1">
               <a:rPr lang="de-DE" sz="1400" smtClean="0"/>
               <a:pPr/>
-              <a:t>29.10.2020</a:t>
+              <a:t>31.10.2020</a:t>
             </a:fld>
             <a:endParaRPr lang="en-US" dirty="0"/>
           </a:p>
@@ -11420,7 +12726,7 @@
             <a:fld id="{5665C720-CFBA-4CD6-B44E-E52DA515AFF8}" type="datetime1">
               <a:rPr lang="de-DE" sz="1400" smtClean="0"/>
               <a:pPr/>
-              <a:t>29.10.2020</a:t>
+              <a:t>31.10.2020</a:t>
             </a:fld>
             <a:endParaRPr lang="en-US" dirty="0"/>
           </a:p>
@@ -11788,7 +13094,7 @@
             <a:fld id="{5665C720-CFBA-4CD6-B44E-E52DA515AFF8}" type="datetime1">
               <a:rPr lang="de-DE" sz="1400" smtClean="0"/>
               <a:pPr/>
-              <a:t>29.10.2020</a:t>
+              <a:t>31.10.2020</a:t>
             </a:fld>
             <a:endParaRPr lang="en-US" dirty="0"/>
           </a:p>
@@ -12677,7 +13983,7 @@
             <a:fld id="{5665C720-CFBA-4CD6-B44E-E52DA515AFF8}" type="datetime1">
               <a:rPr lang="de-DE" sz="1400" smtClean="0"/>
               <a:pPr/>
-              <a:t>29.10.2020</a:t>
+              <a:t>31.10.2020</a:t>
             </a:fld>
             <a:endParaRPr lang="en-US" dirty="0"/>
           </a:p>

</xml_diff>

<commit_message>
presentation + ERD update
</commit_message>
<xml_diff>
--- a/presentation/wanderoo – Gruppe 3.pptx
+++ b/presentation/wanderoo – Gruppe 3.pptx
@@ -5,7 +5,7 @@
     <p:sldMasterId id="2147483660" r:id="rId1"/>
   </p:sldMasterIdLst>
   <p:notesMasterIdLst>
-    <p:notesMasterId r:id="rId19"/>
+    <p:notesMasterId r:id="rId24"/>
   </p:notesMasterIdLst>
   <p:sldIdLst>
     <p:sldId id="256" r:id="rId2"/>
@@ -22,9 +22,14 @@
     <p:sldId id="265" r:id="rId13"/>
     <p:sldId id="263" r:id="rId14"/>
     <p:sldId id="269" r:id="rId15"/>
-    <p:sldId id="270" r:id="rId16"/>
-    <p:sldId id="271" r:id="rId17"/>
-    <p:sldId id="264" r:id="rId18"/>
+    <p:sldId id="277" r:id="rId16"/>
+    <p:sldId id="275" r:id="rId17"/>
+    <p:sldId id="270" r:id="rId18"/>
+    <p:sldId id="271" r:id="rId19"/>
+    <p:sldId id="276" r:id="rId20"/>
+    <p:sldId id="278" r:id="rId21"/>
+    <p:sldId id="279" r:id="rId22"/>
+    <p:sldId id="280" r:id="rId23"/>
   </p:sldIdLst>
   <p:sldSz cx="12192000" cy="6858000"/>
   <p:notesSz cx="6858000" cy="9144000"/>
@@ -371,7 +376,7 @@
           <a:p>
             <a:fld id="{E9848302-4D0B-44CA-8F00-816E91755838}" type="slidenum">
               <a:rPr lang="en-US" smtClean="0"/>
-              <a:t>‹Nr.›</a:t>
+              <a:t>‹#›</a:t>
             </a:fld>
             <a:endParaRPr lang="en-US"/>
           </a:p>
@@ -1574,7 +1579,7 @@
           <a:p>
             <a:fld id="{55605263-C902-48DB-AA98-994A2984047F}" type="slidenum">
               <a:rPr lang="en-US" smtClean="0"/>
-              <a:t>‹Nr.›</a:t>
+              <a:t>‹#›</a:t>
             </a:fld>
             <a:endParaRPr lang="en-US"/>
           </a:p>
@@ -1837,7 +1842,7 @@
           <a:p>
             <a:fld id="{55605263-C902-48DB-AA98-994A2984047F}" type="slidenum">
               <a:rPr lang="en-US" smtClean="0"/>
-              <a:t>‹Nr.›</a:t>
+              <a:t>‹#›</a:t>
             </a:fld>
             <a:endParaRPr lang="en-US"/>
           </a:p>
@@ -2088,7 +2093,7 @@
           <a:p>
             <a:fld id="{55605263-C902-48DB-AA98-994A2984047F}" type="slidenum">
               <a:rPr lang="en-US" smtClean="0"/>
-              <a:t>‹Nr.›</a:t>
+              <a:t>‹#›</a:t>
             </a:fld>
             <a:endParaRPr lang="en-US"/>
           </a:p>
@@ -2402,7 +2407,7 @@
           <a:p>
             <a:fld id="{55605263-C902-48DB-AA98-994A2984047F}" type="slidenum">
               <a:rPr lang="en-US" smtClean="0"/>
-              <a:t>‹Nr.›</a:t>
+              <a:t>‹#›</a:t>
             </a:fld>
             <a:endParaRPr lang="en-US"/>
           </a:p>
@@ -2743,7 +2748,7 @@
           <a:p>
             <a:fld id="{55605263-C902-48DB-AA98-994A2984047F}" type="slidenum">
               <a:rPr lang="en-US" smtClean="0"/>
-              <a:t>‹Nr.›</a:t>
+              <a:t>‹#›</a:t>
             </a:fld>
             <a:endParaRPr lang="en-US"/>
           </a:p>
@@ -3057,7 +3062,7 @@
           <a:p>
             <a:fld id="{55605263-C902-48DB-AA98-994A2984047F}" type="slidenum">
               <a:rPr lang="en-US" smtClean="0"/>
-              <a:t>‹Nr.›</a:t>
+              <a:t>‹#›</a:t>
             </a:fld>
             <a:endParaRPr lang="en-US"/>
           </a:p>
@@ -3450,7 +3455,7 @@
           <a:p>
             <a:fld id="{55605263-C902-48DB-AA98-994A2984047F}" type="slidenum">
               <a:rPr lang="en-US" smtClean="0"/>
-              <a:t>‹Nr.›</a:t>
+              <a:t>‹#›</a:t>
             </a:fld>
             <a:endParaRPr lang="en-US"/>
           </a:p>
@@ -3620,7 +3625,7 @@
           <a:p>
             <a:fld id="{55605263-C902-48DB-AA98-994A2984047F}" type="slidenum">
               <a:rPr lang="en-US" smtClean="0"/>
-              <a:t>‹Nr.›</a:t>
+              <a:t>‹#›</a:t>
             </a:fld>
             <a:endParaRPr lang="en-US"/>
           </a:p>
@@ -3800,7 +3805,7 @@
           <a:p>
             <a:fld id="{55605263-C902-48DB-AA98-994A2984047F}" type="slidenum">
               <a:rPr lang="en-US" smtClean="0"/>
-              <a:t>‹Nr.›</a:t>
+              <a:t>‹#›</a:t>
             </a:fld>
             <a:endParaRPr lang="en-US"/>
           </a:p>
@@ -3976,7 +3981,7 @@
           <a:p>
             <a:fld id="{55605263-C902-48DB-AA98-994A2984047F}" type="slidenum">
               <a:rPr lang="en-US" smtClean="0"/>
-              <a:t>‹Nr.›</a:t>
+              <a:t>‹#›</a:t>
             </a:fld>
             <a:endParaRPr lang="en-US"/>
           </a:p>
@@ -4117,7 +4122,7 @@
           <a:p>
             <a:fld id="{55605263-C902-48DB-AA98-994A2984047F}" type="slidenum">
               <a:rPr lang="en-US" smtClean="0"/>
-              <a:t>‹Nr.›</a:t>
+              <a:t>‹#›</a:t>
             </a:fld>
             <a:endParaRPr lang="en-US"/>
           </a:p>
@@ -4447,7 +4452,7 @@
           <a:p>
             <a:fld id="{55605263-C902-48DB-AA98-994A2984047F}" type="slidenum">
               <a:rPr lang="en-US" smtClean="0"/>
-              <a:t>‹Nr.›</a:t>
+              <a:t>‹#›</a:t>
             </a:fld>
             <a:endParaRPr lang="en-US"/>
           </a:p>
@@ -4679,7 +4684,7 @@
           <a:p>
             <a:fld id="{55605263-C902-48DB-AA98-994A2984047F}" type="slidenum">
               <a:rPr lang="en-US" smtClean="0"/>
-              <a:t>‹Nr.›</a:t>
+              <a:t>‹#›</a:t>
             </a:fld>
             <a:endParaRPr lang="en-US"/>
           </a:p>
@@ -5053,7 +5058,7 @@
           <a:p>
             <a:fld id="{55605263-C902-48DB-AA98-994A2984047F}" type="slidenum">
               <a:rPr lang="en-US" smtClean="0"/>
-              <a:t>‹Nr.›</a:t>
+              <a:t>‹#›</a:t>
             </a:fld>
             <a:endParaRPr lang="en-US"/>
           </a:p>
@@ -5176,7 +5181,7 @@
           <a:p>
             <a:fld id="{55605263-C902-48DB-AA98-994A2984047F}" type="slidenum">
               <a:rPr lang="en-US" smtClean="0"/>
-              <a:t>‹Nr.›</a:t>
+              <a:t>‹#›</a:t>
             </a:fld>
             <a:endParaRPr lang="en-US"/>
           </a:p>
@@ -5271,7 +5276,7 @@
           <a:p>
             <a:fld id="{55605263-C902-48DB-AA98-994A2984047F}" type="slidenum">
               <a:rPr lang="en-US" smtClean="0"/>
-              <a:t>‹Nr.›</a:t>
+              <a:t>‹#›</a:t>
             </a:fld>
             <a:endParaRPr lang="en-US"/>
           </a:p>
@@ -5526,7 +5531,7 @@
           <a:p>
             <a:fld id="{55605263-C902-48DB-AA98-994A2984047F}" type="slidenum">
               <a:rPr lang="en-US" smtClean="0"/>
-              <a:t>‹Nr.›</a:t>
+              <a:t>‹#›</a:t>
             </a:fld>
             <a:endParaRPr lang="en-US"/>
           </a:p>
@@ -6303,7 +6308,7 @@
           <a:p>
             <a:fld id="{55605263-C902-48DB-AA98-994A2984047F}" type="slidenum">
               <a:rPr lang="en-US" smtClean="0"/>
-              <a:t>‹Nr.›</a:t>
+              <a:t>‹#›</a:t>
             </a:fld>
             <a:endParaRPr lang="en-US"/>
           </a:p>
@@ -7495,14 +7500,13 @@
         </p:nvPicPr>
         <p:blipFill>
           <a:blip r:embed="rId2"/>
-          <a:stretch>
-            <a:fillRect/>
-          </a:stretch>
+          <a:srcRect/>
+          <a:stretch/>
         </p:blipFill>
         <p:spPr>
           <a:xfrm>
-            <a:off x="799814" y="1284068"/>
-            <a:ext cx="5062993" cy="4278228"/>
+            <a:off x="800895" y="1284068"/>
+            <a:ext cx="5060830" cy="4278228"/>
           </a:xfrm>
           <a:prstGeom prst="rect">
             <a:avLst/>
@@ -8369,69 +8373,6 @@
             </a:r>
           </a:p>
           <a:p>
-            <a:pPr marL="0" indent="0">
-              <a:buNone/>
-            </a:pPr>
-            <a:r>
-              <a:rPr lang="de-DE" b="1" dirty="0"/>
-              <a:t>Ereignisfluss</a:t>
-            </a:r>
-          </a:p>
-          <a:p>
-            <a:pPr marL="457200" lvl="1" indent="0">
-              <a:buNone/>
-            </a:pPr>
-            <a:r>
-              <a:rPr lang="de-DE" dirty="0"/>
-              <a:t>Im Login-Screen muss auf Registrieren gedrückt werden</a:t>
-            </a:r>
-          </a:p>
-          <a:p>
-            <a:pPr marL="457200" lvl="1" indent="0">
-              <a:buNone/>
-            </a:pPr>
-            <a:r>
-              <a:rPr lang="de-DE" dirty="0"/>
-              <a:t>Reale Benutzerdaten müssen eingegeben werden</a:t>
-            </a:r>
-          </a:p>
-          <a:p>
-            <a:pPr marL="457200" lvl="1" indent="0">
-              <a:buNone/>
-            </a:pPr>
-            <a:r>
-              <a:rPr lang="de-DE" dirty="0"/>
-              <a:t>Der Registrieren-Knopf muss gedrückt werden</a:t>
-            </a:r>
-          </a:p>
-          <a:p>
-            <a:pPr marL="57150" indent="0">
-              <a:buNone/>
-            </a:pPr>
-            <a:r>
-              <a:rPr lang="de-DE" b="1" dirty="0"/>
-              <a:t>Nachbedingung</a:t>
-            </a:r>
-          </a:p>
-          <a:p>
-            <a:pPr marL="457200" lvl="1" indent="0">
-              <a:buNone/>
-            </a:pPr>
-            <a:r>
-              <a:rPr lang="de-DE" dirty="0"/>
-              <a:t>Erfolgreich: Registrierung abgeschlossen, Menü-Screen wird angezeigt</a:t>
-            </a:r>
-          </a:p>
-          <a:p>
-            <a:pPr marL="457200" lvl="1" indent="0">
-              <a:buNone/>
-            </a:pPr>
-            <a:r>
-              <a:rPr lang="de-DE" dirty="0"/>
-              <a:t>Fehler: Registrierung fehlgeschlagen</a:t>
-            </a:r>
-          </a:p>
-          <a:p>
             <a:pPr marL="457200" lvl="1" indent="0">
               <a:buNone/>
             </a:pPr>
@@ -8768,11 +8709,11 @@
           <a:p>
             <a:r>
               <a:rPr lang="en-US" dirty="0"/>
-              <a:t>Use Case: Mein </a:t>
+              <a:t>Use Case: </a:t>
             </a:r>
             <a:r>
               <a:rPr lang="en-US" dirty="0" err="1"/>
-              <a:t>Profil</a:t>
+              <a:t>Registrierung</a:t>
             </a:r>
             <a:endParaRPr lang="en-US" dirty="0"/>
           </a:p>
@@ -8796,13 +8737,13 @@
         </p:nvSpPr>
         <p:spPr>
           <a:xfrm>
-            <a:off x="677334" y="1352551"/>
-            <a:ext cx="8596668" cy="5505450"/>
+            <a:off x="677334" y="1352550"/>
+            <a:ext cx="8596668" cy="5400675"/>
           </a:xfrm>
         </p:spPr>
         <p:txBody>
           <a:bodyPr>
-            <a:normAutofit fontScale="70000" lnSpcReduction="20000"/>
+            <a:normAutofit/>
           </a:bodyPr>
           <a:lstStyle/>
           <a:p>
@@ -8810,8 +8751,8 @@
               <a:buNone/>
             </a:pPr>
             <a:r>
-              <a:rPr lang="de-DE" sz="2100" b="1" dirty="0"/>
-              <a:t>Beschreibung</a:t>
+              <a:rPr lang="de-DE" b="1" dirty="0"/>
+              <a:t>Ereignisfluss</a:t>
             </a:r>
           </a:p>
           <a:p>
@@ -8819,25 +8760,17 @@
               <a:buNone/>
             </a:pPr>
             <a:r>
-              <a:rPr lang="de-DE" sz="1800" dirty="0"/>
-              <a:t>Dieser </a:t>
-            </a:r>
-            <a:r>
-              <a:rPr lang="de-DE" sz="1800" dirty="0" err="1"/>
-              <a:t>Use</a:t>
-            </a:r>
-            <a:r>
-              <a:rPr lang="de-DE" sz="1800" dirty="0"/>
-              <a:t> Case beschreibt wie der Benutzer seine Einstellungen über Mein Profil individualisieren kann</a:t>
-            </a:r>
-          </a:p>
-          <a:p>
-            <a:pPr marL="0" indent="0">
+              <a:rPr lang="de-DE" dirty="0"/>
+              <a:t>Im Login-Screen muss auf Registrieren gedrückt werden</a:t>
+            </a:r>
+          </a:p>
+          <a:p>
+            <a:pPr marL="457200" lvl="1" indent="0">
               <a:buNone/>
             </a:pPr>
             <a:r>
-              <a:rPr lang="de-DE" sz="2100" b="1" dirty="0"/>
-              <a:t>Beteiligte</a:t>
+              <a:rPr lang="de-DE" dirty="0"/>
+              <a:t>Reale Benutzerdaten müssen eingegeben werden</a:t>
             </a:r>
           </a:p>
           <a:p>
@@ -8845,17 +8778,17 @@
               <a:buNone/>
             </a:pPr>
             <a:r>
-              <a:rPr lang="de-DE" sz="1800" dirty="0"/>
-              <a:t>Benutzer</a:t>
-            </a:r>
-          </a:p>
-          <a:p>
-            <a:pPr marL="0" indent="0">
+              <a:rPr lang="de-DE" dirty="0"/>
+              <a:t>Der Registrieren-Knopf muss gedrückt werden</a:t>
+            </a:r>
+          </a:p>
+          <a:p>
+            <a:pPr marL="57150" indent="0">
               <a:buNone/>
             </a:pPr>
             <a:r>
-              <a:rPr lang="de-DE" sz="2100" b="1" dirty="0"/>
-              <a:t>Voraussetzungen</a:t>
+              <a:rPr lang="de-DE" b="1" dirty="0"/>
+              <a:t>Nachbedingung</a:t>
             </a:r>
           </a:p>
           <a:p>
@@ -8863,8 +8796,8 @@
               <a:buNone/>
             </a:pPr>
             <a:r>
-              <a:rPr lang="de-DE" sz="1800" dirty="0"/>
-              <a:t>Datenbankverbindung muss vorhanden sein</a:t>
+              <a:rPr lang="de-DE" dirty="0"/>
+              <a:t>Erfolgreich: Registrierung abgeschlossen, Menü-Screen wird angezeigt</a:t>
             </a:r>
           </a:p>
           <a:p>
@@ -8872,107 +8805,8 @@
               <a:buNone/>
             </a:pPr>
             <a:r>
-              <a:rPr lang="de-DE" sz="1800" dirty="0"/>
-              <a:t>Der Benutzer muss erfolgreich eingeloggt sein</a:t>
-            </a:r>
-          </a:p>
-          <a:p>
-            <a:pPr marL="0" indent="0">
-              <a:buNone/>
-            </a:pPr>
-            <a:r>
-              <a:rPr lang="de-DE" sz="2100" b="1" dirty="0"/>
-              <a:t>Ereignisfluss</a:t>
-            </a:r>
-          </a:p>
-          <a:p>
-            <a:pPr marL="457200" lvl="1" indent="0">
-              <a:buNone/>
-            </a:pPr>
-            <a:r>
-              <a:rPr lang="de-DE" sz="1800" dirty="0"/>
-              <a:t>Im Menu Screen muss auf Mein Profil gedrückt werden</a:t>
-            </a:r>
-          </a:p>
-          <a:p>
-            <a:pPr marL="457200" lvl="1" indent="0">
-              <a:buNone/>
-            </a:pPr>
-            <a:r>
-              <a:rPr lang="de-DE" sz="1800" dirty="0"/>
-              <a:t>Der Profil Bearbeiten-Button muss gedrückt werden</a:t>
-            </a:r>
-          </a:p>
-          <a:p>
-            <a:pPr marL="457200" lvl="1" indent="0">
-              <a:buNone/>
-            </a:pPr>
-            <a:r>
-              <a:rPr lang="de-DE" sz="1800" dirty="0"/>
-              <a:t>Der Benutzername und die E-Mail-Adresse kann über die Texteingabe geändert werden</a:t>
-            </a:r>
-          </a:p>
-          <a:p>
-            <a:pPr marL="457200" lvl="1" indent="0">
-              <a:buNone/>
-            </a:pPr>
-            <a:r>
-              <a:rPr lang="de-DE" sz="1800" dirty="0"/>
-              <a:t>Das Level kann über die Combobox verändert werden</a:t>
-            </a:r>
-          </a:p>
-          <a:p>
-            <a:pPr marL="457200" lvl="1" indent="0">
-              <a:buNone/>
-            </a:pPr>
-            <a:r>
-              <a:rPr lang="de-DE" sz="1800" dirty="0"/>
-              <a:t>Über den Neues Profilbild-Button kann ein neues Profilbild angelegt werden</a:t>
-            </a:r>
-          </a:p>
-          <a:p>
-            <a:pPr marL="457200" lvl="1" indent="0">
-              <a:buNone/>
-            </a:pPr>
-            <a:r>
-              <a:rPr lang="de-DE" sz="1800" dirty="0"/>
-              <a:t>Über den Passwort ändern-Button kann das Passwort geändert werden</a:t>
-            </a:r>
-          </a:p>
-          <a:p>
-            <a:pPr marL="457200" lvl="1" indent="0">
-              <a:buNone/>
-            </a:pPr>
-            <a:r>
-              <a:rPr lang="de-DE" sz="1800" dirty="0"/>
-              <a:t>Die Änderungen werden nur gespeichert, wenn nach der Eingabe der Speichern-Button betätigt wird</a:t>
-            </a:r>
-          </a:p>
-          <a:p>
-            <a:pPr marL="57150" indent="0">
-              <a:buNone/>
-            </a:pPr>
-            <a:r>
-              <a:rPr lang="de-DE" sz="2100" b="1" dirty="0"/>
-              <a:t>Nachbedingung</a:t>
-            </a:r>
-          </a:p>
-          <a:p>
-            <a:pPr marL="457200" lvl="1" indent="0">
-              <a:buNone/>
-            </a:pPr>
-            <a:r>
-              <a:rPr lang="de-DE" sz="1800" dirty="0"/>
-              <a:t>Erfolgreich: Die Änderungen werden im Mein Profil-Screen angezeigt</a:t>
-            </a:r>
-          </a:p>
-          <a:p>
-            <a:pPr marL="457200" lvl="1" indent="0">
-              <a:buNone/>
-            </a:pPr>
-            <a:r>
-              <a:rPr lang="de-DE" sz="1800" dirty="0"/>
-              <a:t>Fehler: Die Änderungen konnten nicht übernommen werden und es werden veraltete Daten im Mein Profil-Screen angezeigt</a:t>
+              <a:rPr lang="de-DE" dirty="0"/>
+              <a:t>Fehler: Registrierung fehlgeschlagen</a:t>
             </a:r>
           </a:p>
           <a:p>
@@ -9257,7 +9091,7 @@
     </p:spTree>
     <p:extLst>
       <p:ext uri="{BB962C8B-B14F-4D97-AF65-F5344CB8AC3E}">
-        <p14:creationId xmlns:p14="http://schemas.microsoft.com/office/powerpoint/2010/main" val="4289056068"/>
+        <p14:creationId xmlns:p14="http://schemas.microsoft.com/office/powerpoint/2010/main" val="4250805025"/>
       </p:ext>
     </p:extLst>
   </p:cSld>
@@ -9312,11 +9146,11 @@
           <a:p>
             <a:r>
               <a:rPr lang="en-US" dirty="0"/>
-              <a:t>Use Case: </a:t>
+              <a:t>Use Case: Mein </a:t>
             </a:r>
             <a:r>
               <a:rPr lang="en-US" dirty="0" err="1"/>
-              <a:t>Karte</a:t>
+              <a:t>Profil</a:t>
             </a:r>
             <a:endParaRPr lang="en-US" dirty="0"/>
           </a:p>
@@ -9340,13 +9174,13 @@
         </p:nvSpPr>
         <p:spPr>
           <a:xfrm>
-            <a:off x="677334" y="1352550"/>
-            <a:ext cx="8596668" cy="5400675"/>
+            <a:off x="677334" y="1352551"/>
+            <a:ext cx="8596668" cy="5505450"/>
           </a:xfrm>
         </p:spPr>
         <p:txBody>
           <a:bodyPr>
-            <a:normAutofit lnSpcReduction="10000"/>
+            <a:normAutofit/>
           </a:bodyPr>
           <a:lstStyle/>
           <a:p>
@@ -9354,7 +9188,7 @@
               <a:buNone/>
             </a:pPr>
             <a:r>
-              <a:rPr lang="de-DE" b="1" dirty="0"/>
+              <a:rPr lang="de-DE" sz="2100" b="1" dirty="0"/>
               <a:t>Beschreibung</a:t>
             </a:r>
           </a:p>
@@ -9363,16 +9197,16 @@
               <a:buNone/>
             </a:pPr>
             <a:r>
-              <a:rPr lang="de-DE" dirty="0"/>
+              <a:rPr lang="de-DE" sz="1800" dirty="0"/>
               <a:t>Dieser </a:t>
             </a:r>
             <a:r>
-              <a:rPr lang="de-DE" dirty="0" err="1"/>
+              <a:rPr lang="de-DE" sz="1800" dirty="0" err="1"/>
               <a:t>Use</a:t>
             </a:r>
             <a:r>
-              <a:rPr lang="de-DE" dirty="0"/>
-              <a:t> Case beschreibt wie der Benutzer seine Wanderroute konfigurieren kann</a:t>
+              <a:rPr lang="de-DE" sz="1800" dirty="0"/>
+              <a:t> Case beschreibt wie der Benutzer seine Einstellungen über Mein Profil individualisieren kann</a:t>
             </a:r>
           </a:p>
           <a:p>
@@ -9380,7 +9214,7 @@
               <a:buNone/>
             </a:pPr>
             <a:r>
-              <a:rPr lang="de-DE" b="1" dirty="0"/>
+              <a:rPr lang="de-DE" sz="2100" b="1" dirty="0"/>
               <a:t>Beteiligte</a:t>
             </a:r>
           </a:p>
@@ -9389,7 +9223,7 @@
               <a:buNone/>
             </a:pPr>
             <a:r>
-              <a:rPr lang="de-DE" dirty="0"/>
+              <a:rPr lang="de-DE" sz="1800" dirty="0"/>
               <a:t>Benutzer</a:t>
             </a:r>
           </a:p>
@@ -9398,7 +9232,7 @@
               <a:buNone/>
             </a:pPr>
             <a:r>
-              <a:rPr lang="de-DE" b="1" dirty="0"/>
+              <a:rPr lang="de-DE" sz="2100" b="1" dirty="0"/>
               <a:t>Voraussetzungen</a:t>
             </a:r>
           </a:p>
@@ -9407,7 +9241,7 @@
               <a:buNone/>
             </a:pPr>
             <a:r>
-              <a:rPr lang="de-DE" dirty="0"/>
+              <a:rPr lang="de-DE" sz="1800" dirty="0"/>
               <a:t>Datenbankverbindung muss vorhanden sein</a:t>
             </a:r>
           </a:p>
@@ -9416,71 +9250,8 @@
               <a:buNone/>
             </a:pPr>
             <a:r>
-              <a:rPr lang="de-DE" dirty="0"/>
+              <a:rPr lang="de-DE" sz="1800" dirty="0"/>
               <a:t>Der Benutzer muss erfolgreich eingeloggt sein</a:t>
-            </a:r>
-          </a:p>
-          <a:p>
-            <a:pPr marL="0" indent="0">
-              <a:buNone/>
-            </a:pPr>
-            <a:r>
-              <a:rPr lang="de-DE" b="1" dirty="0"/>
-              <a:t>Ereignisfluss</a:t>
-            </a:r>
-          </a:p>
-          <a:p>
-            <a:pPr marL="457200" lvl="1" indent="0">
-              <a:buNone/>
-            </a:pPr>
-            <a:r>
-              <a:rPr lang="de-DE" dirty="0"/>
-              <a:t>Im Menü-Screen muss auf den Karte-Button gedrückt werden</a:t>
-            </a:r>
-          </a:p>
-          <a:p>
-            <a:pPr marL="457200" lvl="1" indent="0">
-              <a:buNone/>
-            </a:pPr>
-            <a:r>
-              <a:rPr lang="de-DE" dirty="0"/>
-              <a:t>Der Benutzer kann über die Textfelder die Routenlänge und den gewünschten Höhenunterschied für seine Wanderroute angeben</a:t>
-            </a:r>
-          </a:p>
-          <a:p>
-            <a:pPr marL="457200" lvl="1" indent="0">
-              <a:buNone/>
-            </a:pPr>
-            <a:r>
-              <a:rPr lang="de-DE" dirty="0"/>
-              <a:t>Um die Änderungen zu speichern, muss der Bestätigen-Button betätigt werden</a:t>
-            </a:r>
-          </a:p>
-          <a:p>
-            <a:pPr marL="57150" indent="0">
-              <a:buNone/>
-            </a:pPr>
-            <a:r>
-              <a:rPr lang="de-DE" b="1" dirty="0"/>
-              <a:t>Nachbedingung</a:t>
-            </a:r>
-          </a:p>
-          <a:p>
-            <a:pPr marL="457200" lvl="1" indent="0">
-              <a:buNone/>
-            </a:pPr>
-            <a:r>
-              <a:rPr lang="de-DE" dirty="0"/>
-              <a:t>Erfolgreich: Wanderroutenlänge und Höhenunterschied wird gespeichert</a:t>
-            </a:r>
-          </a:p>
-          <a:p>
-            <a:pPr marL="457200" lvl="1" indent="0">
-              <a:buNone/>
-            </a:pPr>
-            <a:r>
-              <a:rPr lang="de-DE" dirty="0"/>
-              <a:t>Fehler: Wanderroutenlänge und Höhenunterschied kann nicht gespeichert werden</a:t>
             </a:r>
           </a:p>
           <a:p>
@@ -9765,7 +9536,7 @@
     </p:spTree>
     <p:extLst>
       <p:ext uri="{BB962C8B-B14F-4D97-AF65-F5344CB8AC3E}">
-        <p14:creationId xmlns:p14="http://schemas.microsoft.com/office/powerpoint/2010/main" val="1940434735"/>
+        <p14:creationId xmlns:p14="http://schemas.microsoft.com/office/powerpoint/2010/main" val="3208265644"/>
       </p:ext>
     </p:extLst>
   </p:cSld>
@@ -9797,7 +9568,7 @@
           <p:cNvPr id="2" name="Title 1">
             <a:extLst>
               <a:ext uri="{FF2B5EF4-FFF2-40B4-BE49-F238E27FC236}">
-                <a16:creationId xmlns:a16="http://schemas.microsoft.com/office/drawing/2014/main" id="{A533C930-62BB-49CD-A689-73D96C0BFBBB}"/>
+                <a16:creationId xmlns:a16="http://schemas.microsoft.com/office/drawing/2014/main" id="{DD89B45D-81B8-4037-8647-E08DB7556E63}"/>
               </a:ext>
             </a:extLst>
           </p:cNvPr>
@@ -9808,147 +9579,168 @@
             <p:ph type="title"/>
           </p:nvPr>
         </p:nvSpPr>
-        <p:spPr/>
+        <p:spPr>
+          <a:xfrm>
+            <a:off x="677334" y="609598"/>
+            <a:ext cx="8596668" cy="1181101"/>
+          </a:xfrm>
+        </p:spPr>
         <p:txBody>
           <a:bodyPr/>
           <a:lstStyle/>
           <a:p>
             <a:r>
               <a:rPr lang="en-US" dirty="0"/>
-              <a:t>Aufbau</a:t>
-            </a:r>
-          </a:p>
-        </p:txBody>
-      </p:sp>
-      <p:sp>
-        <p:nvSpPr>
-          <p:cNvPr id="5" name="TextBox 4">
+              <a:t>Use Case: Mein </a:t>
+            </a:r>
+            <a:r>
+              <a:rPr lang="en-US" dirty="0" err="1"/>
+              <a:t>Profil</a:t>
+            </a:r>
+            <a:endParaRPr lang="en-US" dirty="0"/>
+          </a:p>
+        </p:txBody>
+      </p:sp>
+      <p:sp>
+        <p:nvSpPr>
+          <p:cNvPr id="3" name="Content Placeholder 2">
             <a:extLst>
               <a:ext uri="{FF2B5EF4-FFF2-40B4-BE49-F238E27FC236}">
-                <a16:creationId xmlns:a16="http://schemas.microsoft.com/office/drawing/2014/main" id="{7FDF7188-C07D-448D-A4A7-2BC551B56E6A}"/>
+                <a16:creationId xmlns:a16="http://schemas.microsoft.com/office/drawing/2014/main" id="{591DF666-F25C-416A-9D7B-D66F364C5048}"/>
               </a:ext>
             </a:extLst>
           </p:cNvPr>
-          <p:cNvSpPr txBox="1"/>
-          <p:nvPr/>
+          <p:cNvSpPr>
+            <a:spLocks noGrp="1"/>
+          </p:cNvSpPr>
+          <p:nvPr>
+            <p:ph idx="1"/>
+          </p:nvPr>
         </p:nvSpPr>
         <p:spPr>
           <a:xfrm>
-            <a:off x="677334" y="1662618"/>
-            <a:ext cx="7928774" cy="646331"/>
+            <a:off x="677334" y="1352551"/>
+            <a:ext cx="8596668" cy="5505450"/>
           </a:xfrm>
-          <a:prstGeom prst="rect">
-            <a:avLst/>
-          </a:prstGeom>
-          <a:noFill/>
         </p:spPr>
         <p:txBody>
-          <a:bodyPr wrap="none" rtlCol="0">
-            <a:spAutoFit/>
+          <a:bodyPr>
+            <a:normAutofit/>
           </a:bodyPr>
           <a:lstStyle/>
           <a:p>
-            <a:r>
-              <a:rPr lang="en-US" dirty="0" err="1"/>
-              <a:t>Auffällig</a:t>
-            </a:r>
-            <a:r>
-              <a:rPr lang="en-US" dirty="0"/>
-              <a:t> </a:t>
-            </a:r>
-            <a:r>
-              <a:rPr lang="en-US" dirty="0" err="1"/>
-              <a:t>ist</a:t>
-            </a:r>
-            <a:r>
-              <a:rPr lang="en-US" dirty="0"/>
-              <a:t>, </a:t>
-            </a:r>
-            <a:r>
-              <a:rPr lang="en-US" dirty="0" err="1"/>
-              <a:t>dass</a:t>
-            </a:r>
-            <a:r>
-              <a:rPr lang="en-US" dirty="0"/>
-              <a:t> die </a:t>
-            </a:r>
-            <a:r>
-              <a:rPr lang="en-US" dirty="0" err="1"/>
-              <a:t>Funktionen</a:t>
-            </a:r>
-            <a:r>
-              <a:rPr lang="en-US" dirty="0"/>
-              <a:t> von den Design-Klassen </a:t>
-            </a:r>
-            <a:r>
-              <a:rPr lang="en-US" dirty="0" err="1"/>
-              <a:t>getrennt</a:t>
-            </a:r>
-            <a:r>
-              <a:rPr lang="en-US" dirty="0"/>
-              <a:t> </a:t>
-            </a:r>
-            <a:r>
-              <a:rPr lang="en-US" dirty="0" err="1"/>
-              <a:t>wurden</a:t>
-            </a:r>
-            <a:r>
-              <a:rPr lang="en-US" dirty="0"/>
-              <a:t>.</a:t>
-            </a:r>
-            <a:br>
-              <a:rPr lang="en-US" dirty="0"/>
-            </a:br>
-            <a:r>
-              <a:rPr lang="en-US" dirty="0"/>
-              <a:t>Die </a:t>
-            </a:r>
-            <a:r>
-              <a:rPr lang="en-US" dirty="0" err="1"/>
-              <a:t>Logik</a:t>
-            </a:r>
-            <a:r>
-              <a:rPr lang="en-US" dirty="0"/>
-              <a:t> </a:t>
-            </a:r>
-            <a:r>
-              <a:rPr lang="en-US" dirty="0" err="1"/>
-              <a:t>wird</a:t>
-            </a:r>
-            <a:r>
-              <a:rPr lang="en-US" dirty="0"/>
-              <a:t> in extra Klassen </a:t>
-            </a:r>
-            <a:r>
-              <a:rPr lang="en-US" dirty="0" err="1"/>
-              <a:t>implementiert</a:t>
-            </a:r>
-            <a:r>
-              <a:rPr lang="en-US" dirty="0"/>
-              <a:t>, die </a:t>
-            </a:r>
-            <a:r>
-              <a:rPr lang="en-US" dirty="0" err="1"/>
-              <a:t>getrennt</a:t>
-            </a:r>
-            <a:r>
-              <a:rPr lang="en-US" dirty="0"/>
-              <a:t> von der UI </a:t>
-            </a:r>
-            <a:r>
-              <a:rPr lang="en-US" dirty="0" err="1"/>
-              <a:t>sind</a:t>
-            </a:r>
-            <a:endParaRPr lang="en-US" dirty="0"/>
-          </a:p>
-        </p:txBody>
-      </p:sp>
-      <p:sp>
-        <p:nvSpPr>
-          <p:cNvPr id="6" name="Date Placeholder 3">
+            <a:pPr marL="0" indent="0">
+              <a:buNone/>
+            </a:pPr>
+            <a:r>
+              <a:rPr lang="de-DE" sz="2100" b="1" dirty="0"/>
+              <a:t>Ereignisfluss</a:t>
+            </a:r>
+          </a:p>
+          <a:p>
+            <a:pPr marL="457200" lvl="1" indent="0">
+              <a:buNone/>
+            </a:pPr>
+            <a:r>
+              <a:rPr lang="de-DE" sz="1800" dirty="0"/>
+              <a:t>Im Menu Screen muss auf Mein Profil gedrückt werden</a:t>
+            </a:r>
+          </a:p>
+          <a:p>
+            <a:pPr marL="457200" lvl="1" indent="0">
+              <a:buNone/>
+            </a:pPr>
+            <a:r>
+              <a:rPr lang="de-DE" sz="1800" dirty="0"/>
+              <a:t>Der Profil Bearbeiten-Button muss gedrückt werden</a:t>
+            </a:r>
+          </a:p>
+          <a:p>
+            <a:pPr marL="457200" lvl="1" indent="0">
+              <a:buNone/>
+            </a:pPr>
+            <a:r>
+              <a:rPr lang="de-DE" sz="1800" dirty="0"/>
+              <a:t>Der Benutzername und die E-Mail-Adresse kann über die Texteingabe geändert werden</a:t>
+            </a:r>
+          </a:p>
+          <a:p>
+            <a:pPr marL="457200" lvl="1" indent="0">
+              <a:buNone/>
+            </a:pPr>
+            <a:r>
+              <a:rPr lang="de-DE" sz="1800" dirty="0"/>
+              <a:t>Das Level kann über die Combobox verändert werden</a:t>
+            </a:r>
+          </a:p>
+          <a:p>
+            <a:pPr marL="457200" lvl="1" indent="0">
+              <a:buNone/>
+            </a:pPr>
+            <a:r>
+              <a:rPr lang="de-DE" sz="1800" dirty="0"/>
+              <a:t>Über den Neues Profilbild-Button kann ein neues Profilbild angelegt werden</a:t>
+            </a:r>
+          </a:p>
+          <a:p>
+            <a:pPr marL="457200" lvl="1" indent="0">
+              <a:buNone/>
+            </a:pPr>
+            <a:r>
+              <a:rPr lang="de-DE" sz="1800" dirty="0"/>
+              <a:t>Über den Passwort ändern-Button kann das Passwort geändert werden</a:t>
+            </a:r>
+          </a:p>
+          <a:p>
+            <a:pPr marL="457200" lvl="1" indent="0">
+              <a:buNone/>
+            </a:pPr>
+            <a:r>
+              <a:rPr lang="de-DE" sz="1800" dirty="0"/>
+              <a:t>Die Änderungen werden nur gespeichert, wenn nach der Eingabe der Speichern-Button betätigt wird</a:t>
+            </a:r>
+          </a:p>
+          <a:p>
+            <a:pPr marL="57150" indent="0">
+              <a:buNone/>
+            </a:pPr>
+            <a:r>
+              <a:rPr lang="de-DE" sz="2100" b="1" dirty="0"/>
+              <a:t>Nachbedingung</a:t>
+            </a:r>
+          </a:p>
+          <a:p>
+            <a:pPr marL="457200" lvl="1" indent="0">
+              <a:buNone/>
+            </a:pPr>
+            <a:r>
+              <a:rPr lang="de-DE" sz="1800" dirty="0"/>
+              <a:t>Erfolgreich: Die Änderungen werden im Mein Profil-Screen angezeigt</a:t>
+            </a:r>
+          </a:p>
+          <a:p>
+            <a:pPr marL="457200" lvl="1" indent="0">
+              <a:buNone/>
+            </a:pPr>
+            <a:r>
+              <a:rPr lang="de-DE" sz="1800" dirty="0"/>
+              <a:t>Fehler: Die Änderungen konnten nicht übernommen werden und es werden veraltete Daten im Mein Profil-Screen angezeigt</a:t>
+            </a:r>
+          </a:p>
+          <a:p>
+            <a:pPr marL="457200" lvl="1" indent="0">
+              <a:buNone/>
+            </a:pPr>
+            <a:endParaRPr lang="de-DE" dirty="0"/>
+          </a:p>
+        </p:txBody>
+      </p:sp>
+      <p:sp>
+        <p:nvSpPr>
+          <p:cNvPr id="5" name="Date Placeholder 3">
             <a:extLst>
               <a:ext uri="{FF2B5EF4-FFF2-40B4-BE49-F238E27FC236}">
-                <a16:creationId xmlns:a16="http://schemas.microsoft.com/office/drawing/2014/main" id="{C597FC9F-E38B-4D7C-800C-2E507A9787EC}"/>
+                <a16:creationId xmlns:a16="http://schemas.microsoft.com/office/drawing/2014/main" id="{4C14AB97-C542-4790-9263-C13620CBC6CD}"/>
               </a:ext>
             </a:extLst>
           </p:cNvPr>
@@ -10077,10 +9869,10 @@
       </p:sp>
       <p:sp>
         <p:nvSpPr>
-          <p:cNvPr id="7" name="Date Placeholder 3">
+          <p:cNvPr id="6" name="Date Placeholder 3">
             <a:extLst>
               <a:ext uri="{FF2B5EF4-FFF2-40B4-BE49-F238E27FC236}">
-                <a16:creationId xmlns:a16="http://schemas.microsoft.com/office/drawing/2014/main" id="{0F246959-6071-4609-B298-646E582C9281}"/>
+                <a16:creationId xmlns:a16="http://schemas.microsoft.com/office/drawing/2014/main" id="{FBE73F23-8D21-495D-8D7C-2DE7277152E1}"/>
               </a:ext>
             </a:extLst>
           </p:cNvPr>
@@ -10217,7 +10009,889 @@
     </p:spTree>
     <p:extLst>
       <p:ext uri="{BB962C8B-B14F-4D97-AF65-F5344CB8AC3E}">
-        <p14:creationId xmlns:p14="http://schemas.microsoft.com/office/powerpoint/2010/main" val="870046311"/>
+        <p14:creationId xmlns:p14="http://schemas.microsoft.com/office/powerpoint/2010/main" val="4289056068"/>
+      </p:ext>
+    </p:extLst>
+  </p:cSld>
+  <p:clrMapOvr>
+    <a:masterClrMapping/>
+  </p:clrMapOvr>
+</p:sld>
+</file>
+
+<file path=ppt/slides/slide18.xml><?xml version="1.0" encoding="utf-8"?>
+<p:sld xmlns:a="http://schemas.openxmlformats.org/drawingml/2006/main" xmlns:r="http://schemas.openxmlformats.org/officeDocument/2006/relationships" xmlns:p="http://schemas.openxmlformats.org/presentationml/2006/main">
+  <p:cSld>
+    <p:spTree>
+      <p:nvGrpSpPr>
+        <p:cNvPr id="1" name=""/>
+        <p:cNvGrpSpPr/>
+        <p:nvPr/>
+      </p:nvGrpSpPr>
+      <p:grpSpPr>
+        <a:xfrm>
+          <a:off x="0" y="0"/>
+          <a:ext cx="0" cy="0"/>
+          <a:chOff x="0" y="0"/>
+          <a:chExt cx="0" cy="0"/>
+        </a:xfrm>
+      </p:grpSpPr>
+      <p:sp>
+        <p:nvSpPr>
+          <p:cNvPr id="2" name="Title 1">
+            <a:extLst>
+              <a:ext uri="{FF2B5EF4-FFF2-40B4-BE49-F238E27FC236}">
+                <a16:creationId xmlns:a16="http://schemas.microsoft.com/office/drawing/2014/main" id="{DD89B45D-81B8-4037-8647-E08DB7556E63}"/>
+              </a:ext>
+            </a:extLst>
+          </p:cNvPr>
+          <p:cNvSpPr>
+            <a:spLocks noGrp="1"/>
+          </p:cNvSpPr>
+          <p:nvPr>
+            <p:ph type="title"/>
+          </p:nvPr>
+        </p:nvSpPr>
+        <p:spPr>
+          <a:xfrm>
+            <a:off x="677334" y="609598"/>
+            <a:ext cx="8596668" cy="1181101"/>
+          </a:xfrm>
+        </p:spPr>
+        <p:txBody>
+          <a:bodyPr/>
+          <a:lstStyle/>
+          <a:p>
+            <a:r>
+              <a:rPr lang="en-US" dirty="0"/>
+              <a:t>Use Case: </a:t>
+            </a:r>
+            <a:r>
+              <a:rPr lang="en-US" dirty="0" err="1"/>
+              <a:t>Karte</a:t>
+            </a:r>
+            <a:endParaRPr lang="en-US" dirty="0"/>
+          </a:p>
+        </p:txBody>
+      </p:sp>
+      <p:sp>
+        <p:nvSpPr>
+          <p:cNvPr id="3" name="Content Placeholder 2">
+            <a:extLst>
+              <a:ext uri="{FF2B5EF4-FFF2-40B4-BE49-F238E27FC236}">
+                <a16:creationId xmlns:a16="http://schemas.microsoft.com/office/drawing/2014/main" id="{591DF666-F25C-416A-9D7B-D66F364C5048}"/>
+              </a:ext>
+            </a:extLst>
+          </p:cNvPr>
+          <p:cNvSpPr>
+            <a:spLocks noGrp="1"/>
+          </p:cNvSpPr>
+          <p:nvPr>
+            <p:ph idx="1"/>
+          </p:nvPr>
+        </p:nvSpPr>
+        <p:spPr>
+          <a:xfrm>
+            <a:off x="677334" y="1352550"/>
+            <a:ext cx="8596668" cy="5400675"/>
+          </a:xfrm>
+        </p:spPr>
+        <p:txBody>
+          <a:bodyPr>
+            <a:normAutofit/>
+          </a:bodyPr>
+          <a:lstStyle/>
+          <a:p>
+            <a:pPr marL="0" indent="0">
+              <a:buNone/>
+            </a:pPr>
+            <a:r>
+              <a:rPr lang="de-DE" b="1" dirty="0"/>
+              <a:t>Beschreibung</a:t>
+            </a:r>
+          </a:p>
+          <a:p>
+            <a:pPr marL="457200" lvl="1" indent="0">
+              <a:buNone/>
+            </a:pPr>
+            <a:r>
+              <a:rPr lang="de-DE" dirty="0"/>
+              <a:t>Dieser </a:t>
+            </a:r>
+            <a:r>
+              <a:rPr lang="de-DE" dirty="0" err="1"/>
+              <a:t>Use</a:t>
+            </a:r>
+            <a:r>
+              <a:rPr lang="de-DE" dirty="0"/>
+              <a:t> Case beschreibt wie der Benutzer seine Wanderroute konfigurieren kann</a:t>
+            </a:r>
+          </a:p>
+          <a:p>
+            <a:pPr marL="0" indent="0">
+              <a:buNone/>
+            </a:pPr>
+            <a:r>
+              <a:rPr lang="de-DE" b="1" dirty="0"/>
+              <a:t>Beteiligte</a:t>
+            </a:r>
+          </a:p>
+          <a:p>
+            <a:pPr marL="457200" lvl="1" indent="0">
+              <a:buNone/>
+            </a:pPr>
+            <a:r>
+              <a:rPr lang="de-DE" dirty="0"/>
+              <a:t>Benutzer</a:t>
+            </a:r>
+          </a:p>
+          <a:p>
+            <a:pPr marL="0" indent="0">
+              <a:buNone/>
+            </a:pPr>
+            <a:r>
+              <a:rPr lang="de-DE" b="1" dirty="0"/>
+              <a:t>Voraussetzungen</a:t>
+            </a:r>
+          </a:p>
+          <a:p>
+            <a:pPr marL="457200" lvl="1" indent="0">
+              <a:buNone/>
+            </a:pPr>
+            <a:r>
+              <a:rPr lang="de-DE" dirty="0"/>
+              <a:t>Datenbankverbindung muss vorhanden sein</a:t>
+            </a:r>
+          </a:p>
+          <a:p>
+            <a:pPr marL="457200" lvl="1" indent="0">
+              <a:buNone/>
+            </a:pPr>
+            <a:r>
+              <a:rPr lang="de-DE" dirty="0"/>
+              <a:t>Der Benutzer muss erfolgreich eingeloggt sein</a:t>
+            </a:r>
+          </a:p>
+          <a:p>
+            <a:pPr marL="457200" lvl="1" indent="0">
+              <a:buNone/>
+            </a:pPr>
+            <a:endParaRPr lang="de-DE" dirty="0"/>
+          </a:p>
+        </p:txBody>
+      </p:sp>
+      <p:sp>
+        <p:nvSpPr>
+          <p:cNvPr id="5" name="Date Placeholder 3">
+            <a:extLst>
+              <a:ext uri="{FF2B5EF4-FFF2-40B4-BE49-F238E27FC236}">
+                <a16:creationId xmlns:a16="http://schemas.microsoft.com/office/drawing/2014/main" id="{4C14AB97-C542-4790-9263-C13620CBC6CD}"/>
+              </a:ext>
+            </a:extLst>
+          </p:cNvPr>
+          <p:cNvSpPr txBox="1">
+            <a:spLocks/>
+          </p:cNvSpPr>
+          <p:nvPr/>
+        </p:nvSpPr>
+        <p:spPr>
+          <a:xfrm>
+            <a:off x="677334" y="231051"/>
+            <a:ext cx="1071566" cy="378549"/>
+          </a:xfrm>
+          <a:prstGeom prst="rect">
+            <a:avLst/>
+          </a:prstGeom>
+        </p:spPr>
+        <p:txBody>
+          <a:bodyPr vert="horz" lIns="91440" tIns="45720" rIns="91440" bIns="45720" rtlCol="0" anchor="ctr"/>
+          <a:lstStyle>
+            <a:defPPr>
+              <a:defRPr lang="en-US"/>
+            </a:defPPr>
+            <a:lvl1pPr marL="0" algn="r" defTabSz="457200" rtl="0" eaLnBrk="1" latinLnBrk="0" hangingPunct="1">
+              <a:defRPr sz="900" kern="1200">
+                <a:solidFill>
+                  <a:schemeClr val="tx1">
+                    <a:tint val="75000"/>
+                  </a:schemeClr>
+                </a:solidFill>
+                <a:latin typeface="+mn-lt"/>
+                <a:ea typeface="+mn-ea"/>
+                <a:cs typeface="+mn-cs"/>
+              </a:defRPr>
+            </a:lvl1pPr>
+            <a:lvl2pPr marL="457200" algn="l" defTabSz="457200" rtl="0" eaLnBrk="1" latinLnBrk="0" hangingPunct="1">
+              <a:defRPr sz="1800" kern="1200">
+                <a:solidFill>
+                  <a:schemeClr val="tx1"/>
+                </a:solidFill>
+                <a:latin typeface="+mn-lt"/>
+                <a:ea typeface="+mn-ea"/>
+                <a:cs typeface="+mn-cs"/>
+              </a:defRPr>
+            </a:lvl2pPr>
+            <a:lvl3pPr marL="914400" algn="l" defTabSz="457200" rtl="0" eaLnBrk="1" latinLnBrk="0" hangingPunct="1">
+              <a:defRPr sz="1800" kern="1200">
+                <a:solidFill>
+                  <a:schemeClr val="tx1"/>
+                </a:solidFill>
+                <a:latin typeface="+mn-lt"/>
+                <a:ea typeface="+mn-ea"/>
+                <a:cs typeface="+mn-cs"/>
+              </a:defRPr>
+            </a:lvl3pPr>
+            <a:lvl4pPr marL="1371600" algn="l" defTabSz="457200" rtl="0" eaLnBrk="1" latinLnBrk="0" hangingPunct="1">
+              <a:defRPr sz="1800" kern="1200">
+                <a:solidFill>
+                  <a:schemeClr val="tx1"/>
+                </a:solidFill>
+                <a:latin typeface="+mn-lt"/>
+                <a:ea typeface="+mn-ea"/>
+                <a:cs typeface="+mn-cs"/>
+              </a:defRPr>
+            </a:lvl4pPr>
+            <a:lvl5pPr marL="1828800" algn="l" defTabSz="457200" rtl="0" eaLnBrk="1" latinLnBrk="0" hangingPunct="1">
+              <a:defRPr sz="1800" kern="1200">
+                <a:solidFill>
+                  <a:schemeClr val="tx1"/>
+                </a:solidFill>
+                <a:latin typeface="+mn-lt"/>
+                <a:ea typeface="+mn-ea"/>
+                <a:cs typeface="+mn-cs"/>
+              </a:defRPr>
+            </a:lvl5pPr>
+            <a:lvl6pPr marL="2286000" algn="l" defTabSz="457200" rtl="0" eaLnBrk="1" latinLnBrk="0" hangingPunct="1">
+              <a:defRPr sz="1800" kern="1200">
+                <a:solidFill>
+                  <a:schemeClr val="tx1"/>
+                </a:solidFill>
+                <a:latin typeface="+mn-lt"/>
+                <a:ea typeface="+mn-ea"/>
+                <a:cs typeface="+mn-cs"/>
+              </a:defRPr>
+            </a:lvl6pPr>
+            <a:lvl7pPr marL="2743200" algn="l" defTabSz="457200" rtl="0" eaLnBrk="1" latinLnBrk="0" hangingPunct="1">
+              <a:defRPr sz="1800" kern="1200">
+                <a:solidFill>
+                  <a:schemeClr val="tx1"/>
+                </a:solidFill>
+                <a:latin typeface="+mn-lt"/>
+                <a:ea typeface="+mn-ea"/>
+                <a:cs typeface="+mn-cs"/>
+              </a:defRPr>
+            </a:lvl7pPr>
+            <a:lvl8pPr marL="3200400" algn="l" defTabSz="457200" rtl="0" eaLnBrk="1" latinLnBrk="0" hangingPunct="1">
+              <a:defRPr sz="1800" kern="1200">
+                <a:solidFill>
+                  <a:schemeClr val="tx1"/>
+                </a:solidFill>
+                <a:latin typeface="+mn-lt"/>
+                <a:ea typeface="+mn-ea"/>
+                <a:cs typeface="+mn-cs"/>
+              </a:defRPr>
+            </a:lvl8pPr>
+            <a:lvl9pPr marL="3657600" algn="l" defTabSz="457200" rtl="0" eaLnBrk="1" latinLnBrk="0" hangingPunct="1">
+              <a:defRPr sz="1800" kern="1200">
+                <a:solidFill>
+                  <a:schemeClr val="tx1"/>
+                </a:solidFill>
+                <a:latin typeface="+mn-lt"/>
+                <a:ea typeface="+mn-ea"/>
+                <a:cs typeface="+mn-cs"/>
+              </a:defRPr>
+            </a:lvl9pPr>
+          </a:lstStyle>
+          <a:p>
+            <a:fld id="{5665C720-CFBA-4CD6-B44E-E52DA515AFF8}" type="datetime1">
+              <a:rPr lang="de-DE" sz="1400" smtClean="0"/>
+              <a:pPr/>
+              <a:t>02.11.2020</a:t>
+            </a:fld>
+            <a:endParaRPr lang="en-US" dirty="0"/>
+          </a:p>
+        </p:txBody>
+      </p:sp>
+      <p:sp>
+        <p:nvSpPr>
+          <p:cNvPr id="6" name="Date Placeholder 3">
+            <a:extLst>
+              <a:ext uri="{FF2B5EF4-FFF2-40B4-BE49-F238E27FC236}">
+                <a16:creationId xmlns:a16="http://schemas.microsoft.com/office/drawing/2014/main" id="{FBE73F23-8D21-495D-8D7C-2DE7277152E1}"/>
+              </a:ext>
+            </a:extLst>
+          </p:cNvPr>
+          <p:cNvSpPr txBox="1">
+            <a:spLocks/>
+          </p:cNvSpPr>
+          <p:nvPr/>
+        </p:nvSpPr>
+        <p:spPr>
+          <a:xfrm>
+            <a:off x="1824033" y="231050"/>
+            <a:ext cx="5713108" cy="378549"/>
+          </a:xfrm>
+          <a:prstGeom prst="rect">
+            <a:avLst/>
+          </a:prstGeom>
+        </p:spPr>
+        <p:txBody>
+          <a:bodyPr vert="horz" lIns="91440" tIns="45720" rIns="91440" bIns="45720" rtlCol="0" anchor="ctr"/>
+          <a:lstStyle>
+            <a:defPPr>
+              <a:defRPr lang="en-US"/>
+            </a:defPPr>
+            <a:lvl1pPr marL="0" algn="r" defTabSz="457200" rtl="0" eaLnBrk="1" latinLnBrk="0" hangingPunct="1">
+              <a:defRPr sz="900" kern="1200">
+                <a:solidFill>
+                  <a:schemeClr val="tx1">
+                    <a:tint val="75000"/>
+                  </a:schemeClr>
+                </a:solidFill>
+                <a:latin typeface="+mn-lt"/>
+                <a:ea typeface="+mn-ea"/>
+                <a:cs typeface="+mn-cs"/>
+              </a:defRPr>
+            </a:lvl1pPr>
+            <a:lvl2pPr marL="457200" algn="l" defTabSz="457200" rtl="0" eaLnBrk="1" latinLnBrk="0" hangingPunct="1">
+              <a:defRPr sz="1800" kern="1200">
+                <a:solidFill>
+                  <a:schemeClr val="tx1"/>
+                </a:solidFill>
+                <a:latin typeface="+mn-lt"/>
+                <a:ea typeface="+mn-ea"/>
+                <a:cs typeface="+mn-cs"/>
+              </a:defRPr>
+            </a:lvl2pPr>
+            <a:lvl3pPr marL="914400" algn="l" defTabSz="457200" rtl="0" eaLnBrk="1" latinLnBrk="0" hangingPunct="1">
+              <a:defRPr sz="1800" kern="1200">
+                <a:solidFill>
+                  <a:schemeClr val="tx1"/>
+                </a:solidFill>
+                <a:latin typeface="+mn-lt"/>
+                <a:ea typeface="+mn-ea"/>
+                <a:cs typeface="+mn-cs"/>
+              </a:defRPr>
+            </a:lvl3pPr>
+            <a:lvl4pPr marL="1371600" algn="l" defTabSz="457200" rtl="0" eaLnBrk="1" latinLnBrk="0" hangingPunct="1">
+              <a:defRPr sz="1800" kern="1200">
+                <a:solidFill>
+                  <a:schemeClr val="tx1"/>
+                </a:solidFill>
+                <a:latin typeface="+mn-lt"/>
+                <a:ea typeface="+mn-ea"/>
+                <a:cs typeface="+mn-cs"/>
+              </a:defRPr>
+            </a:lvl4pPr>
+            <a:lvl5pPr marL="1828800" algn="l" defTabSz="457200" rtl="0" eaLnBrk="1" latinLnBrk="0" hangingPunct="1">
+              <a:defRPr sz="1800" kern="1200">
+                <a:solidFill>
+                  <a:schemeClr val="tx1"/>
+                </a:solidFill>
+                <a:latin typeface="+mn-lt"/>
+                <a:ea typeface="+mn-ea"/>
+                <a:cs typeface="+mn-cs"/>
+              </a:defRPr>
+            </a:lvl5pPr>
+            <a:lvl6pPr marL="2286000" algn="l" defTabSz="457200" rtl="0" eaLnBrk="1" latinLnBrk="0" hangingPunct="1">
+              <a:defRPr sz="1800" kern="1200">
+                <a:solidFill>
+                  <a:schemeClr val="tx1"/>
+                </a:solidFill>
+                <a:latin typeface="+mn-lt"/>
+                <a:ea typeface="+mn-ea"/>
+                <a:cs typeface="+mn-cs"/>
+              </a:defRPr>
+            </a:lvl6pPr>
+            <a:lvl7pPr marL="2743200" algn="l" defTabSz="457200" rtl="0" eaLnBrk="1" latinLnBrk="0" hangingPunct="1">
+              <a:defRPr sz="1800" kern="1200">
+                <a:solidFill>
+                  <a:schemeClr val="tx1"/>
+                </a:solidFill>
+                <a:latin typeface="+mn-lt"/>
+                <a:ea typeface="+mn-ea"/>
+                <a:cs typeface="+mn-cs"/>
+              </a:defRPr>
+            </a:lvl7pPr>
+            <a:lvl8pPr marL="3200400" algn="l" defTabSz="457200" rtl="0" eaLnBrk="1" latinLnBrk="0" hangingPunct="1">
+              <a:defRPr sz="1800" kern="1200">
+                <a:solidFill>
+                  <a:schemeClr val="tx1"/>
+                </a:solidFill>
+                <a:latin typeface="+mn-lt"/>
+                <a:ea typeface="+mn-ea"/>
+                <a:cs typeface="+mn-cs"/>
+              </a:defRPr>
+            </a:lvl8pPr>
+            <a:lvl9pPr marL="3657600" algn="l" defTabSz="457200" rtl="0" eaLnBrk="1" latinLnBrk="0" hangingPunct="1">
+              <a:defRPr sz="1800" kern="1200">
+                <a:solidFill>
+                  <a:schemeClr val="tx1"/>
+                </a:solidFill>
+                <a:latin typeface="+mn-lt"/>
+                <a:ea typeface="+mn-ea"/>
+                <a:cs typeface="+mn-cs"/>
+              </a:defRPr>
+            </a:lvl9pPr>
+          </a:lstStyle>
+          <a:p>
+            <a:r>
+              <a:rPr lang="de-DE" sz="1400" dirty="0"/>
+              <a:t>Veronika Taranek, Philipp </a:t>
+            </a:r>
+            <a:r>
+              <a:rPr lang="de-DE" sz="1400" dirty="0" err="1"/>
+              <a:t>Fenesan</a:t>
+            </a:r>
+            <a:r>
+              <a:rPr lang="de-DE" sz="1400" dirty="0"/>
+              <a:t>, Nicolas Geppert, Lukas Werner</a:t>
+            </a:r>
+            <a:endParaRPr lang="en-US" dirty="0"/>
+          </a:p>
+        </p:txBody>
+      </p:sp>
+    </p:spTree>
+    <p:extLst>
+      <p:ext uri="{BB962C8B-B14F-4D97-AF65-F5344CB8AC3E}">
+        <p14:creationId xmlns:p14="http://schemas.microsoft.com/office/powerpoint/2010/main" val="1940434735"/>
+      </p:ext>
+    </p:extLst>
+  </p:cSld>
+  <p:clrMapOvr>
+    <a:masterClrMapping/>
+  </p:clrMapOvr>
+</p:sld>
+</file>
+
+<file path=ppt/slides/slide19.xml><?xml version="1.0" encoding="utf-8"?>
+<p:sld xmlns:a="http://schemas.openxmlformats.org/drawingml/2006/main" xmlns:r="http://schemas.openxmlformats.org/officeDocument/2006/relationships" xmlns:p="http://schemas.openxmlformats.org/presentationml/2006/main">
+  <p:cSld>
+    <p:spTree>
+      <p:nvGrpSpPr>
+        <p:cNvPr id="1" name=""/>
+        <p:cNvGrpSpPr/>
+        <p:nvPr/>
+      </p:nvGrpSpPr>
+      <p:grpSpPr>
+        <a:xfrm>
+          <a:off x="0" y="0"/>
+          <a:ext cx="0" cy="0"/>
+          <a:chOff x="0" y="0"/>
+          <a:chExt cx="0" cy="0"/>
+        </a:xfrm>
+      </p:grpSpPr>
+      <p:sp>
+        <p:nvSpPr>
+          <p:cNvPr id="2" name="Title 1">
+            <a:extLst>
+              <a:ext uri="{FF2B5EF4-FFF2-40B4-BE49-F238E27FC236}">
+                <a16:creationId xmlns:a16="http://schemas.microsoft.com/office/drawing/2014/main" id="{DD89B45D-81B8-4037-8647-E08DB7556E63}"/>
+              </a:ext>
+            </a:extLst>
+          </p:cNvPr>
+          <p:cNvSpPr>
+            <a:spLocks noGrp="1"/>
+          </p:cNvSpPr>
+          <p:nvPr>
+            <p:ph type="title"/>
+          </p:nvPr>
+        </p:nvSpPr>
+        <p:spPr>
+          <a:xfrm>
+            <a:off x="677334" y="609598"/>
+            <a:ext cx="8596668" cy="1181101"/>
+          </a:xfrm>
+        </p:spPr>
+        <p:txBody>
+          <a:bodyPr/>
+          <a:lstStyle/>
+          <a:p>
+            <a:r>
+              <a:rPr lang="en-US" dirty="0"/>
+              <a:t>Use Case: </a:t>
+            </a:r>
+            <a:r>
+              <a:rPr lang="en-US" dirty="0" err="1"/>
+              <a:t>Karte</a:t>
+            </a:r>
+            <a:endParaRPr lang="en-US" dirty="0"/>
+          </a:p>
+        </p:txBody>
+      </p:sp>
+      <p:sp>
+        <p:nvSpPr>
+          <p:cNvPr id="3" name="Content Placeholder 2">
+            <a:extLst>
+              <a:ext uri="{FF2B5EF4-FFF2-40B4-BE49-F238E27FC236}">
+                <a16:creationId xmlns:a16="http://schemas.microsoft.com/office/drawing/2014/main" id="{591DF666-F25C-416A-9D7B-D66F364C5048}"/>
+              </a:ext>
+            </a:extLst>
+          </p:cNvPr>
+          <p:cNvSpPr>
+            <a:spLocks noGrp="1"/>
+          </p:cNvSpPr>
+          <p:nvPr>
+            <p:ph idx="1"/>
+          </p:nvPr>
+        </p:nvSpPr>
+        <p:spPr>
+          <a:xfrm>
+            <a:off x="677334" y="1352550"/>
+            <a:ext cx="8596668" cy="5400675"/>
+          </a:xfrm>
+        </p:spPr>
+        <p:txBody>
+          <a:bodyPr>
+            <a:normAutofit/>
+          </a:bodyPr>
+          <a:lstStyle/>
+          <a:p>
+            <a:pPr marL="0" indent="0">
+              <a:buNone/>
+            </a:pPr>
+            <a:r>
+              <a:rPr lang="de-DE" b="1" dirty="0"/>
+              <a:t>Ereignisfluss</a:t>
+            </a:r>
+          </a:p>
+          <a:p>
+            <a:pPr marL="457200" lvl="1" indent="0">
+              <a:buNone/>
+            </a:pPr>
+            <a:r>
+              <a:rPr lang="de-DE" dirty="0"/>
+              <a:t>Im Menü-Screen muss auf den Karte-Button gedrückt werden</a:t>
+            </a:r>
+          </a:p>
+          <a:p>
+            <a:pPr marL="457200" lvl="1" indent="0">
+              <a:buNone/>
+            </a:pPr>
+            <a:r>
+              <a:rPr lang="de-DE" dirty="0"/>
+              <a:t>Der Benutzer kann über die Textfelder die Routenlänge und den gewünschten Höhenunterschied für seine Wanderroute angeben</a:t>
+            </a:r>
+          </a:p>
+          <a:p>
+            <a:pPr marL="457200" lvl="1" indent="0">
+              <a:buNone/>
+            </a:pPr>
+            <a:r>
+              <a:rPr lang="de-DE" dirty="0"/>
+              <a:t>Um die Änderungen zu speichern, muss der Bestätigen-Button betätigt werden</a:t>
+            </a:r>
+          </a:p>
+          <a:p>
+            <a:pPr marL="57150" indent="0">
+              <a:buNone/>
+            </a:pPr>
+            <a:r>
+              <a:rPr lang="de-DE" b="1" dirty="0"/>
+              <a:t>Nachbedingung</a:t>
+            </a:r>
+          </a:p>
+          <a:p>
+            <a:pPr marL="457200" lvl="1" indent="0">
+              <a:buNone/>
+            </a:pPr>
+            <a:r>
+              <a:rPr lang="de-DE" dirty="0"/>
+              <a:t>Erfolgreich: Wanderroutenlänge und Höhenunterschied wird gespeichert</a:t>
+            </a:r>
+          </a:p>
+          <a:p>
+            <a:pPr marL="457200" lvl="1" indent="0">
+              <a:buNone/>
+            </a:pPr>
+            <a:r>
+              <a:rPr lang="de-DE" dirty="0"/>
+              <a:t>Fehler: Wanderroutenlänge und Höhenunterschied kann nicht gespeichert werden</a:t>
+            </a:r>
+          </a:p>
+          <a:p>
+            <a:pPr marL="457200" lvl="1" indent="0">
+              <a:buNone/>
+            </a:pPr>
+            <a:endParaRPr lang="de-DE" dirty="0"/>
+          </a:p>
+        </p:txBody>
+      </p:sp>
+      <p:sp>
+        <p:nvSpPr>
+          <p:cNvPr id="5" name="Date Placeholder 3">
+            <a:extLst>
+              <a:ext uri="{FF2B5EF4-FFF2-40B4-BE49-F238E27FC236}">
+                <a16:creationId xmlns:a16="http://schemas.microsoft.com/office/drawing/2014/main" id="{4C14AB97-C542-4790-9263-C13620CBC6CD}"/>
+              </a:ext>
+            </a:extLst>
+          </p:cNvPr>
+          <p:cNvSpPr txBox="1">
+            <a:spLocks/>
+          </p:cNvSpPr>
+          <p:nvPr/>
+        </p:nvSpPr>
+        <p:spPr>
+          <a:xfrm>
+            <a:off x="677334" y="231051"/>
+            <a:ext cx="1071566" cy="378549"/>
+          </a:xfrm>
+          <a:prstGeom prst="rect">
+            <a:avLst/>
+          </a:prstGeom>
+        </p:spPr>
+        <p:txBody>
+          <a:bodyPr vert="horz" lIns="91440" tIns="45720" rIns="91440" bIns="45720" rtlCol="0" anchor="ctr"/>
+          <a:lstStyle>
+            <a:defPPr>
+              <a:defRPr lang="en-US"/>
+            </a:defPPr>
+            <a:lvl1pPr marL="0" algn="r" defTabSz="457200" rtl="0" eaLnBrk="1" latinLnBrk="0" hangingPunct="1">
+              <a:defRPr sz="900" kern="1200">
+                <a:solidFill>
+                  <a:schemeClr val="tx1">
+                    <a:tint val="75000"/>
+                  </a:schemeClr>
+                </a:solidFill>
+                <a:latin typeface="+mn-lt"/>
+                <a:ea typeface="+mn-ea"/>
+                <a:cs typeface="+mn-cs"/>
+              </a:defRPr>
+            </a:lvl1pPr>
+            <a:lvl2pPr marL="457200" algn="l" defTabSz="457200" rtl="0" eaLnBrk="1" latinLnBrk="0" hangingPunct="1">
+              <a:defRPr sz="1800" kern="1200">
+                <a:solidFill>
+                  <a:schemeClr val="tx1"/>
+                </a:solidFill>
+                <a:latin typeface="+mn-lt"/>
+                <a:ea typeface="+mn-ea"/>
+                <a:cs typeface="+mn-cs"/>
+              </a:defRPr>
+            </a:lvl2pPr>
+            <a:lvl3pPr marL="914400" algn="l" defTabSz="457200" rtl="0" eaLnBrk="1" latinLnBrk="0" hangingPunct="1">
+              <a:defRPr sz="1800" kern="1200">
+                <a:solidFill>
+                  <a:schemeClr val="tx1"/>
+                </a:solidFill>
+                <a:latin typeface="+mn-lt"/>
+                <a:ea typeface="+mn-ea"/>
+                <a:cs typeface="+mn-cs"/>
+              </a:defRPr>
+            </a:lvl3pPr>
+            <a:lvl4pPr marL="1371600" algn="l" defTabSz="457200" rtl="0" eaLnBrk="1" latinLnBrk="0" hangingPunct="1">
+              <a:defRPr sz="1800" kern="1200">
+                <a:solidFill>
+                  <a:schemeClr val="tx1"/>
+                </a:solidFill>
+                <a:latin typeface="+mn-lt"/>
+                <a:ea typeface="+mn-ea"/>
+                <a:cs typeface="+mn-cs"/>
+              </a:defRPr>
+            </a:lvl4pPr>
+            <a:lvl5pPr marL="1828800" algn="l" defTabSz="457200" rtl="0" eaLnBrk="1" latinLnBrk="0" hangingPunct="1">
+              <a:defRPr sz="1800" kern="1200">
+                <a:solidFill>
+                  <a:schemeClr val="tx1"/>
+                </a:solidFill>
+                <a:latin typeface="+mn-lt"/>
+                <a:ea typeface="+mn-ea"/>
+                <a:cs typeface="+mn-cs"/>
+              </a:defRPr>
+            </a:lvl5pPr>
+            <a:lvl6pPr marL="2286000" algn="l" defTabSz="457200" rtl="0" eaLnBrk="1" latinLnBrk="0" hangingPunct="1">
+              <a:defRPr sz="1800" kern="1200">
+                <a:solidFill>
+                  <a:schemeClr val="tx1"/>
+                </a:solidFill>
+                <a:latin typeface="+mn-lt"/>
+                <a:ea typeface="+mn-ea"/>
+                <a:cs typeface="+mn-cs"/>
+              </a:defRPr>
+            </a:lvl6pPr>
+            <a:lvl7pPr marL="2743200" algn="l" defTabSz="457200" rtl="0" eaLnBrk="1" latinLnBrk="0" hangingPunct="1">
+              <a:defRPr sz="1800" kern="1200">
+                <a:solidFill>
+                  <a:schemeClr val="tx1"/>
+                </a:solidFill>
+                <a:latin typeface="+mn-lt"/>
+                <a:ea typeface="+mn-ea"/>
+                <a:cs typeface="+mn-cs"/>
+              </a:defRPr>
+            </a:lvl7pPr>
+            <a:lvl8pPr marL="3200400" algn="l" defTabSz="457200" rtl="0" eaLnBrk="1" latinLnBrk="0" hangingPunct="1">
+              <a:defRPr sz="1800" kern="1200">
+                <a:solidFill>
+                  <a:schemeClr val="tx1"/>
+                </a:solidFill>
+                <a:latin typeface="+mn-lt"/>
+                <a:ea typeface="+mn-ea"/>
+                <a:cs typeface="+mn-cs"/>
+              </a:defRPr>
+            </a:lvl8pPr>
+            <a:lvl9pPr marL="3657600" algn="l" defTabSz="457200" rtl="0" eaLnBrk="1" latinLnBrk="0" hangingPunct="1">
+              <a:defRPr sz="1800" kern="1200">
+                <a:solidFill>
+                  <a:schemeClr val="tx1"/>
+                </a:solidFill>
+                <a:latin typeface="+mn-lt"/>
+                <a:ea typeface="+mn-ea"/>
+                <a:cs typeface="+mn-cs"/>
+              </a:defRPr>
+            </a:lvl9pPr>
+          </a:lstStyle>
+          <a:p>
+            <a:fld id="{5665C720-CFBA-4CD6-B44E-E52DA515AFF8}" type="datetime1">
+              <a:rPr lang="de-DE" sz="1400" smtClean="0"/>
+              <a:pPr/>
+              <a:t>02.11.2020</a:t>
+            </a:fld>
+            <a:endParaRPr lang="en-US" dirty="0"/>
+          </a:p>
+        </p:txBody>
+      </p:sp>
+      <p:sp>
+        <p:nvSpPr>
+          <p:cNvPr id="6" name="Date Placeholder 3">
+            <a:extLst>
+              <a:ext uri="{FF2B5EF4-FFF2-40B4-BE49-F238E27FC236}">
+                <a16:creationId xmlns:a16="http://schemas.microsoft.com/office/drawing/2014/main" id="{FBE73F23-8D21-495D-8D7C-2DE7277152E1}"/>
+              </a:ext>
+            </a:extLst>
+          </p:cNvPr>
+          <p:cNvSpPr txBox="1">
+            <a:spLocks/>
+          </p:cNvSpPr>
+          <p:nvPr/>
+        </p:nvSpPr>
+        <p:spPr>
+          <a:xfrm>
+            <a:off x="1824033" y="231050"/>
+            <a:ext cx="5713108" cy="378549"/>
+          </a:xfrm>
+          <a:prstGeom prst="rect">
+            <a:avLst/>
+          </a:prstGeom>
+        </p:spPr>
+        <p:txBody>
+          <a:bodyPr vert="horz" lIns="91440" tIns="45720" rIns="91440" bIns="45720" rtlCol="0" anchor="ctr"/>
+          <a:lstStyle>
+            <a:defPPr>
+              <a:defRPr lang="en-US"/>
+            </a:defPPr>
+            <a:lvl1pPr marL="0" algn="r" defTabSz="457200" rtl="0" eaLnBrk="1" latinLnBrk="0" hangingPunct="1">
+              <a:defRPr sz="900" kern="1200">
+                <a:solidFill>
+                  <a:schemeClr val="tx1">
+                    <a:tint val="75000"/>
+                  </a:schemeClr>
+                </a:solidFill>
+                <a:latin typeface="+mn-lt"/>
+                <a:ea typeface="+mn-ea"/>
+                <a:cs typeface="+mn-cs"/>
+              </a:defRPr>
+            </a:lvl1pPr>
+            <a:lvl2pPr marL="457200" algn="l" defTabSz="457200" rtl="0" eaLnBrk="1" latinLnBrk="0" hangingPunct="1">
+              <a:defRPr sz="1800" kern="1200">
+                <a:solidFill>
+                  <a:schemeClr val="tx1"/>
+                </a:solidFill>
+                <a:latin typeface="+mn-lt"/>
+                <a:ea typeface="+mn-ea"/>
+                <a:cs typeface="+mn-cs"/>
+              </a:defRPr>
+            </a:lvl2pPr>
+            <a:lvl3pPr marL="914400" algn="l" defTabSz="457200" rtl="0" eaLnBrk="1" latinLnBrk="0" hangingPunct="1">
+              <a:defRPr sz="1800" kern="1200">
+                <a:solidFill>
+                  <a:schemeClr val="tx1"/>
+                </a:solidFill>
+                <a:latin typeface="+mn-lt"/>
+                <a:ea typeface="+mn-ea"/>
+                <a:cs typeface="+mn-cs"/>
+              </a:defRPr>
+            </a:lvl3pPr>
+            <a:lvl4pPr marL="1371600" algn="l" defTabSz="457200" rtl="0" eaLnBrk="1" latinLnBrk="0" hangingPunct="1">
+              <a:defRPr sz="1800" kern="1200">
+                <a:solidFill>
+                  <a:schemeClr val="tx1"/>
+                </a:solidFill>
+                <a:latin typeface="+mn-lt"/>
+                <a:ea typeface="+mn-ea"/>
+                <a:cs typeface="+mn-cs"/>
+              </a:defRPr>
+            </a:lvl4pPr>
+            <a:lvl5pPr marL="1828800" algn="l" defTabSz="457200" rtl="0" eaLnBrk="1" latinLnBrk="0" hangingPunct="1">
+              <a:defRPr sz="1800" kern="1200">
+                <a:solidFill>
+                  <a:schemeClr val="tx1"/>
+                </a:solidFill>
+                <a:latin typeface="+mn-lt"/>
+                <a:ea typeface="+mn-ea"/>
+                <a:cs typeface="+mn-cs"/>
+              </a:defRPr>
+            </a:lvl5pPr>
+            <a:lvl6pPr marL="2286000" algn="l" defTabSz="457200" rtl="0" eaLnBrk="1" latinLnBrk="0" hangingPunct="1">
+              <a:defRPr sz="1800" kern="1200">
+                <a:solidFill>
+                  <a:schemeClr val="tx1"/>
+                </a:solidFill>
+                <a:latin typeface="+mn-lt"/>
+                <a:ea typeface="+mn-ea"/>
+                <a:cs typeface="+mn-cs"/>
+              </a:defRPr>
+            </a:lvl6pPr>
+            <a:lvl7pPr marL="2743200" algn="l" defTabSz="457200" rtl="0" eaLnBrk="1" latinLnBrk="0" hangingPunct="1">
+              <a:defRPr sz="1800" kern="1200">
+                <a:solidFill>
+                  <a:schemeClr val="tx1"/>
+                </a:solidFill>
+                <a:latin typeface="+mn-lt"/>
+                <a:ea typeface="+mn-ea"/>
+                <a:cs typeface="+mn-cs"/>
+              </a:defRPr>
+            </a:lvl7pPr>
+            <a:lvl8pPr marL="3200400" algn="l" defTabSz="457200" rtl="0" eaLnBrk="1" latinLnBrk="0" hangingPunct="1">
+              <a:defRPr sz="1800" kern="1200">
+                <a:solidFill>
+                  <a:schemeClr val="tx1"/>
+                </a:solidFill>
+                <a:latin typeface="+mn-lt"/>
+                <a:ea typeface="+mn-ea"/>
+                <a:cs typeface="+mn-cs"/>
+              </a:defRPr>
+            </a:lvl8pPr>
+            <a:lvl9pPr marL="3657600" algn="l" defTabSz="457200" rtl="0" eaLnBrk="1" latinLnBrk="0" hangingPunct="1">
+              <a:defRPr sz="1800" kern="1200">
+                <a:solidFill>
+                  <a:schemeClr val="tx1"/>
+                </a:solidFill>
+                <a:latin typeface="+mn-lt"/>
+                <a:ea typeface="+mn-ea"/>
+                <a:cs typeface="+mn-cs"/>
+              </a:defRPr>
+            </a:lvl9pPr>
+          </a:lstStyle>
+          <a:p>
+            <a:r>
+              <a:rPr lang="de-DE" sz="1400" dirty="0"/>
+              <a:t>Veronika Taranek, Philipp </a:t>
+            </a:r>
+            <a:r>
+              <a:rPr lang="de-DE" sz="1400" dirty="0" err="1"/>
+              <a:t>Fenesan</a:t>
+            </a:r>
+            <a:r>
+              <a:rPr lang="de-DE" sz="1400" dirty="0"/>
+              <a:t>, Nicolas Geppert, Lukas Werner</a:t>
+            </a:r>
+            <a:endParaRPr lang="en-US" dirty="0"/>
+          </a:p>
+        </p:txBody>
+      </p:sp>
+    </p:spTree>
+    <p:extLst>
+      <p:ext uri="{BB962C8B-B14F-4D97-AF65-F5344CB8AC3E}">
+        <p14:creationId xmlns:p14="http://schemas.microsoft.com/office/powerpoint/2010/main" val="2172040229"/>
       </p:ext>
     </p:extLst>
   </p:cSld>
@@ -10536,6 +11210,1245 @@
     <p:extLst>
       <p:ext uri="{BB962C8B-B14F-4D97-AF65-F5344CB8AC3E}">
         <p14:creationId xmlns:p14="http://schemas.microsoft.com/office/powerpoint/2010/main" val="2502311815"/>
+      </p:ext>
+    </p:extLst>
+  </p:cSld>
+  <p:clrMapOvr>
+    <a:masterClrMapping/>
+  </p:clrMapOvr>
+</p:sld>
+</file>
+
+<file path=ppt/slides/slide20.xml><?xml version="1.0" encoding="utf-8"?>
+<p:sld xmlns:a="http://schemas.openxmlformats.org/drawingml/2006/main" xmlns:r="http://schemas.openxmlformats.org/officeDocument/2006/relationships" xmlns:p="http://schemas.openxmlformats.org/presentationml/2006/main">
+  <p:cSld>
+    <p:spTree>
+      <p:nvGrpSpPr>
+        <p:cNvPr id="1" name=""/>
+        <p:cNvGrpSpPr/>
+        <p:nvPr/>
+      </p:nvGrpSpPr>
+      <p:grpSpPr>
+        <a:xfrm>
+          <a:off x="0" y="0"/>
+          <a:ext cx="0" cy="0"/>
+          <a:chOff x="0" y="0"/>
+          <a:chExt cx="0" cy="0"/>
+        </a:xfrm>
+      </p:grpSpPr>
+      <p:sp>
+        <p:nvSpPr>
+          <p:cNvPr id="2" name="Title 1">
+            <a:extLst>
+              <a:ext uri="{FF2B5EF4-FFF2-40B4-BE49-F238E27FC236}">
+                <a16:creationId xmlns:a16="http://schemas.microsoft.com/office/drawing/2014/main" id="{DD89B45D-81B8-4037-8647-E08DB7556E63}"/>
+              </a:ext>
+            </a:extLst>
+          </p:cNvPr>
+          <p:cNvSpPr>
+            <a:spLocks noGrp="1"/>
+          </p:cNvSpPr>
+          <p:nvPr>
+            <p:ph type="title"/>
+          </p:nvPr>
+        </p:nvSpPr>
+        <p:spPr>
+          <a:xfrm>
+            <a:off x="677334" y="609598"/>
+            <a:ext cx="8596668" cy="1181101"/>
+          </a:xfrm>
+        </p:spPr>
+        <p:txBody>
+          <a:bodyPr/>
+          <a:lstStyle/>
+          <a:p>
+            <a:r>
+              <a:rPr lang="en-US" dirty="0"/>
+              <a:t>Use Case: Exception-Handling</a:t>
+            </a:r>
+          </a:p>
+        </p:txBody>
+      </p:sp>
+      <p:sp>
+        <p:nvSpPr>
+          <p:cNvPr id="3" name="Content Placeholder 2">
+            <a:extLst>
+              <a:ext uri="{FF2B5EF4-FFF2-40B4-BE49-F238E27FC236}">
+                <a16:creationId xmlns:a16="http://schemas.microsoft.com/office/drawing/2014/main" id="{591DF666-F25C-416A-9D7B-D66F364C5048}"/>
+              </a:ext>
+            </a:extLst>
+          </p:cNvPr>
+          <p:cNvSpPr>
+            <a:spLocks noGrp="1"/>
+          </p:cNvSpPr>
+          <p:nvPr>
+            <p:ph idx="1"/>
+          </p:nvPr>
+        </p:nvSpPr>
+        <p:spPr>
+          <a:xfrm>
+            <a:off x="677334" y="1352550"/>
+            <a:ext cx="8596668" cy="5400675"/>
+          </a:xfrm>
+        </p:spPr>
+        <p:txBody>
+          <a:bodyPr>
+            <a:normAutofit/>
+          </a:bodyPr>
+          <a:lstStyle/>
+          <a:p>
+            <a:pPr marL="0" indent="0">
+              <a:buNone/>
+            </a:pPr>
+            <a:r>
+              <a:rPr lang="de-DE" b="1" dirty="0"/>
+              <a:t>Beschreibung</a:t>
+            </a:r>
+          </a:p>
+          <a:p>
+            <a:pPr marL="457200" lvl="1" indent="0">
+              <a:buNone/>
+            </a:pPr>
+            <a:r>
+              <a:rPr lang="de-DE" dirty="0"/>
+              <a:t>Dieser </a:t>
+            </a:r>
+            <a:r>
+              <a:rPr lang="de-DE" dirty="0" err="1"/>
+              <a:t>Use</a:t>
+            </a:r>
+            <a:r>
+              <a:rPr lang="de-DE" dirty="0"/>
+              <a:t> Case beschreibt das </a:t>
+            </a:r>
+            <a:r>
+              <a:rPr lang="de-DE" dirty="0" err="1"/>
+              <a:t>Exception</a:t>
+            </a:r>
+            <a:r>
+              <a:rPr lang="de-DE" dirty="0"/>
+              <a:t>-Handling bei fehlender Datenbankverbindung und falschen Log-In-Daten</a:t>
+            </a:r>
+          </a:p>
+          <a:p>
+            <a:pPr marL="0" indent="0">
+              <a:buNone/>
+            </a:pPr>
+            <a:r>
+              <a:rPr lang="de-DE" b="1" dirty="0"/>
+              <a:t>Beteiligte</a:t>
+            </a:r>
+          </a:p>
+          <a:p>
+            <a:pPr marL="457200" lvl="1" indent="0">
+              <a:buNone/>
+            </a:pPr>
+            <a:r>
+              <a:rPr lang="de-DE" dirty="0"/>
+              <a:t>Benutzer</a:t>
+            </a:r>
+          </a:p>
+          <a:p>
+            <a:pPr marL="0" indent="0">
+              <a:buNone/>
+            </a:pPr>
+            <a:r>
+              <a:rPr lang="de-DE" b="1" dirty="0"/>
+              <a:t>Voraussetzungen</a:t>
+            </a:r>
+          </a:p>
+          <a:p>
+            <a:pPr marL="457200" lvl="1" indent="0">
+              <a:buNone/>
+            </a:pPr>
+            <a:r>
+              <a:rPr lang="de-DE" dirty="0"/>
+              <a:t>Datenbankverbindung darf nicht vorhanden sein</a:t>
+            </a:r>
+          </a:p>
+          <a:p>
+            <a:pPr marL="457200" lvl="1" indent="0">
+              <a:buNone/>
+            </a:pPr>
+            <a:r>
+              <a:rPr lang="de-DE" dirty="0"/>
+              <a:t>Der Benutzer gibt falsche Daten im Log-In an</a:t>
+            </a:r>
+          </a:p>
+          <a:p>
+            <a:pPr marL="457200" lvl="1" indent="0">
+              <a:buNone/>
+            </a:pPr>
+            <a:endParaRPr lang="de-DE" dirty="0"/>
+          </a:p>
+        </p:txBody>
+      </p:sp>
+      <p:sp>
+        <p:nvSpPr>
+          <p:cNvPr id="5" name="Date Placeholder 3">
+            <a:extLst>
+              <a:ext uri="{FF2B5EF4-FFF2-40B4-BE49-F238E27FC236}">
+                <a16:creationId xmlns:a16="http://schemas.microsoft.com/office/drawing/2014/main" id="{4C14AB97-C542-4790-9263-C13620CBC6CD}"/>
+              </a:ext>
+            </a:extLst>
+          </p:cNvPr>
+          <p:cNvSpPr txBox="1">
+            <a:spLocks/>
+          </p:cNvSpPr>
+          <p:nvPr/>
+        </p:nvSpPr>
+        <p:spPr>
+          <a:xfrm>
+            <a:off x="677334" y="231051"/>
+            <a:ext cx="1071566" cy="378549"/>
+          </a:xfrm>
+          <a:prstGeom prst="rect">
+            <a:avLst/>
+          </a:prstGeom>
+        </p:spPr>
+        <p:txBody>
+          <a:bodyPr vert="horz" lIns="91440" tIns="45720" rIns="91440" bIns="45720" rtlCol="0" anchor="ctr"/>
+          <a:lstStyle>
+            <a:defPPr>
+              <a:defRPr lang="en-US"/>
+            </a:defPPr>
+            <a:lvl1pPr marL="0" algn="r" defTabSz="457200" rtl="0" eaLnBrk="1" latinLnBrk="0" hangingPunct="1">
+              <a:defRPr sz="900" kern="1200">
+                <a:solidFill>
+                  <a:schemeClr val="tx1">
+                    <a:tint val="75000"/>
+                  </a:schemeClr>
+                </a:solidFill>
+                <a:latin typeface="+mn-lt"/>
+                <a:ea typeface="+mn-ea"/>
+                <a:cs typeface="+mn-cs"/>
+              </a:defRPr>
+            </a:lvl1pPr>
+            <a:lvl2pPr marL="457200" algn="l" defTabSz="457200" rtl="0" eaLnBrk="1" latinLnBrk="0" hangingPunct="1">
+              <a:defRPr sz="1800" kern="1200">
+                <a:solidFill>
+                  <a:schemeClr val="tx1"/>
+                </a:solidFill>
+                <a:latin typeface="+mn-lt"/>
+                <a:ea typeface="+mn-ea"/>
+                <a:cs typeface="+mn-cs"/>
+              </a:defRPr>
+            </a:lvl2pPr>
+            <a:lvl3pPr marL="914400" algn="l" defTabSz="457200" rtl="0" eaLnBrk="1" latinLnBrk="0" hangingPunct="1">
+              <a:defRPr sz="1800" kern="1200">
+                <a:solidFill>
+                  <a:schemeClr val="tx1"/>
+                </a:solidFill>
+                <a:latin typeface="+mn-lt"/>
+                <a:ea typeface="+mn-ea"/>
+                <a:cs typeface="+mn-cs"/>
+              </a:defRPr>
+            </a:lvl3pPr>
+            <a:lvl4pPr marL="1371600" algn="l" defTabSz="457200" rtl="0" eaLnBrk="1" latinLnBrk="0" hangingPunct="1">
+              <a:defRPr sz="1800" kern="1200">
+                <a:solidFill>
+                  <a:schemeClr val="tx1"/>
+                </a:solidFill>
+                <a:latin typeface="+mn-lt"/>
+                <a:ea typeface="+mn-ea"/>
+                <a:cs typeface="+mn-cs"/>
+              </a:defRPr>
+            </a:lvl4pPr>
+            <a:lvl5pPr marL="1828800" algn="l" defTabSz="457200" rtl="0" eaLnBrk="1" latinLnBrk="0" hangingPunct="1">
+              <a:defRPr sz="1800" kern="1200">
+                <a:solidFill>
+                  <a:schemeClr val="tx1"/>
+                </a:solidFill>
+                <a:latin typeface="+mn-lt"/>
+                <a:ea typeface="+mn-ea"/>
+                <a:cs typeface="+mn-cs"/>
+              </a:defRPr>
+            </a:lvl5pPr>
+            <a:lvl6pPr marL="2286000" algn="l" defTabSz="457200" rtl="0" eaLnBrk="1" latinLnBrk="0" hangingPunct="1">
+              <a:defRPr sz="1800" kern="1200">
+                <a:solidFill>
+                  <a:schemeClr val="tx1"/>
+                </a:solidFill>
+                <a:latin typeface="+mn-lt"/>
+                <a:ea typeface="+mn-ea"/>
+                <a:cs typeface="+mn-cs"/>
+              </a:defRPr>
+            </a:lvl6pPr>
+            <a:lvl7pPr marL="2743200" algn="l" defTabSz="457200" rtl="0" eaLnBrk="1" latinLnBrk="0" hangingPunct="1">
+              <a:defRPr sz="1800" kern="1200">
+                <a:solidFill>
+                  <a:schemeClr val="tx1"/>
+                </a:solidFill>
+                <a:latin typeface="+mn-lt"/>
+                <a:ea typeface="+mn-ea"/>
+                <a:cs typeface="+mn-cs"/>
+              </a:defRPr>
+            </a:lvl7pPr>
+            <a:lvl8pPr marL="3200400" algn="l" defTabSz="457200" rtl="0" eaLnBrk="1" latinLnBrk="0" hangingPunct="1">
+              <a:defRPr sz="1800" kern="1200">
+                <a:solidFill>
+                  <a:schemeClr val="tx1"/>
+                </a:solidFill>
+                <a:latin typeface="+mn-lt"/>
+                <a:ea typeface="+mn-ea"/>
+                <a:cs typeface="+mn-cs"/>
+              </a:defRPr>
+            </a:lvl8pPr>
+            <a:lvl9pPr marL="3657600" algn="l" defTabSz="457200" rtl="0" eaLnBrk="1" latinLnBrk="0" hangingPunct="1">
+              <a:defRPr sz="1800" kern="1200">
+                <a:solidFill>
+                  <a:schemeClr val="tx1"/>
+                </a:solidFill>
+                <a:latin typeface="+mn-lt"/>
+                <a:ea typeface="+mn-ea"/>
+                <a:cs typeface="+mn-cs"/>
+              </a:defRPr>
+            </a:lvl9pPr>
+          </a:lstStyle>
+          <a:p>
+            <a:fld id="{5665C720-CFBA-4CD6-B44E-E52DA515AFF8}" type="datetime1">
+              <a:rPr lang="de-DE" sz="1400" smtClean="0"/>
+              <a:pPr/>
+              <a:t>02.11.2020</a:t>
+            </a:fld>
+            <a:endParaRPr lang="en-US" dirty="0"/>
+          </a:p>
+        </p:txBody>
+      </p:sp>
+      <p:sp>
+        <p:nvSpPr>
+          <p:cNvPr id="6" name="Date Placeholder 3">
+            <a:extLst>
+              <a:ext uri="{FF2B5EF4-FFF2-40B4-BE49-F238E27FC236}">
+                <a16:creationId xmlns:a16="http://schemas.microsoft.com/office/drawing/2014/main" id="{FBE73F23-8D21-495D-8D7C-2DE7277152E1}"/>
+              </a:ext>
+            </a:extLst>
+          </p:cNvPr>
+          <p:cNvSpPr txBox="1">
+            <a:spLocks/>
+          </p:cNvSpPr>
+          <p:nvPr/>
+        </p:nvSpPr>
+        <p:spPr>
+          <a:xfrm>
+            <a:off x="1824033" y="231050"/>
+            <a:ext cx="5713108" cy="378549"/>
+          </a:xfrm>
+          <a:prstGeom prst="rect">
+            <a:avLst/>
+          </a:prstGeom>
+        </p:spPr>
+        <p:txBody>
+          <a:bodyPr vert="horz" lIns="91440" tIns="45720" rIns="91440" bIns="45720" rtlCol="0" anchor="ctr"/>
+          <a:lstStyle>
+            <a:defPPr>
+              <a:defRPr lang="en-US"/>
+            </a:defPPr>
+            <a:lvl1pPr marL="0" algn="r" defTabSz="457200" rtl="0" eaLnBrk="1" latinLnBrk="0" hangingPunct="1">
+              <a:defRPr sz="900" kern="1200">
+                <a:solidFill>
+                  <a:schemeClr val="tx1">
+                    <a:tint val="75000"/>
+                  </a:schemeClr>
+                </a:solidFill>
+                <a:latin typeface="+mn-lt"/>
+                <a:ea typeface="+mn-ea"/>
+                <a:cs typeface="+mn-cs"/>
+              </a:defRPr>
+            </a:lvl1pPr>
+            <a:lvl2pPr marL="457200" algn="l" defTabSz="457200" rtl="0" eaLnBrk="1" latinLnBrk="0" hangingPunct="1">
+              <a:defRPr sz="1800" kern="1200">
+                <a:solidFill>
+                  <a:schemeClr val="tx1"/>
+                </a:solidFill>
+                <a:latin typeface="+mn-lt"/>
+                <a:ea typeface="+mn-ea"/>
+                <a:cs typeface="+mn-cs"/>
+              </a:defRPr>
+            </a:lvl2pPr>
+            <a:lvl3pPr marL="914400" algn="l" defTabSz="457200" rtl="0" eaLnBrk="1" latinLnBrk="0" hangingPunct="1">
+              <a:defRPr sz="1800" kern="1200">
+                <a:solidFill>
+                  <a:schemeClr val="tx1"/>
+                </a:solidFill>
+                <a:latin typeface="+mn-lt"/>
+                <a:ea typeface="+mn-ea"/>
+                <a:cs typeface="+mn-cs"/>
+              </a:defRPr>
+            </a:lvl3pPr>
+            <a:lvl4pPr marL="1371600" algn="l" defTabSz="457200" rtl="0" eaLnBrk="1" latinLnBrk="0" hangingPunct="1">
+              <a:defRPr sz="1800" kern="1200">
+                <a:solidFill>
+                  <a:schemeClr val="tx1"/>
+                </a:solidFill>
+                <a:latin typeface="+mn-lt"/>
+                <a:ea typeface="+mn-ea"/>
+                <a:cs typeface="+mn-cs"/>
+              </a:defRPr>
+            </a:lvl4pPr>
+            <a:lvl5pPr marL="1828800" algn="l" defTabSz="457200" rtl="0" eaLnBrk="1" latinLnBrk="0" hangingPunct="1">
+              <a:defRPr sz="1800" kern="1200">
+                <a:solidFill>
+                  <a:schemeClr val="tx1"/>
+                </a:solidFill>
+                <a:latin typeface="+mn-lt"/>
+                <a:ea typeface="+mn-ea"/>
+                <a:cs typeface="+mn-cs"/>
+              </a:defRPr>
+            </a:lvl5pPr>
+            <a:lvl6pPr marL="2286000" algn="l" defTabSz="457200" rtl="0" eaLnBrk="1" latinLnBrk="0" hangingPunct="1">
+              <a:defRPr sz="1800" kern="1200">
+                <a:solidFill>
+                  <a:schemeClr val="tx1"/>
+                </a:solidFill>
+                <a:latin typeface="+mn-lt"/>
+                <a:ea typeface="+mn-ea"/>
+                <a:cs typeface="+mn-cs"/>
+              </a:defRPr>
+            </a:lvl6pPr>
+            <a:lvl7pPr marL="2743200" algn="l" defTabSz="457200" rtl="0" eaLnBrk="1" latinLnBrk="0" hangingPunct="1">
+              <a:defRPr sz="1800" kern="1200">
+                <a:solidFill>
+                  <a:schemeClr val="tx1"/>
+                </a:solidFill>
+                <a:latin typeface="+mn-lt"/>
+                <a:ea typeface="+mn-ea"/>
+                <a:cs typeface="+mn-cs"/>
+              </a:defRPr>
+            </a:lvl7pPr>
+            <a:lvl8pPr marL="3200400" algn="l" defTabSz="457200" rtl="0" eaLnBrk="1" latinLnBrk="0" hangingPunct="1">
+              <a:defRPr sz="1800" kern="1200">
+                <a:solidFill>
+                  <a:schemeClr val="tx1"/>
+                </a:solidFill>
+                <a:latin typeface="+mn-lt"/>
+                <a:ea typeface="+mn-ea"/>
+                <a:cs typeface="+mn-cs"/>
+              </a:defRPr>
+            </a:lvl8pPr>
+            <a:lvl9pPr marL="3657600" algn="l" defTabSz="457200" rtl="0" eaLnBrk="1" latinLnBrk="0" hangingPunct="1">
+              <a:defRPr sz="1800" kern="1200">
+                <a:solidFill>
+                  <a:schemeClr val="tx1"/>
+                </a:solidFill>
+                <a:latin typeface="+mn-lt"/>
+                <a:ea typeface="+mn-ea"/>
+                <a:cs typeface="+mn-cs"/>
+              </a:defRPr>
+            </a:lvl9pPr>
+          </a:lstStyle>
+          <a:p>
+            <a:r>
+              <a:rPr lang="de-DE" sz="1400" dirty="0"/>
+              <a:t>Veronika Taranek, Philipp </a:t>
+            </a:r>
+            <a:r>
+              <a:rPr lang="de-DE" sz="1400" dirty="0" err="1"/>
+              <a:t>Fenesan</a:t>
+            </a:r>
+            <a:r>
+              <a:rPr lang="de-DE" sz="1400" dirty="0"/>
+              <a:t>, Nicolas Geppert, Lukas Werner</a:t>
+            </a:r>
+            <a:endParaRPr lang="en-US" dirty="0"/>
+          </a:p>
+        </p:txBody>
+      </p:sp>
+    </p:spTree>
+    <p:extLst>
+      <p:ext uri="{BB962C8B-B14F-4D97-AF65-F5344CB8AC3E}">
+        <p14:creationId xmlns:p14="http://schemas.microsoft.com/office/powerpoint/2010/main" val="3983617968"/>
+      </p:ext>
+    </p:extLst>
+  </p:cSld>
+  <p:clrMapOvr>
+    <a:masterClrMapping/>
+  </p:clrMapOvr>
+</p:sld>
+</file>
+
+<file path=ppt/slides/slide21.xml><?xml version="1.0" encoding="utf-8"?>
+<p:sld xmlns:a="http://schemas.openxmlformats.org/drawingml/2006/main" xmlns:r="http://schemas.openxmlformats.org/officeDocument/2006/relationships" xmlns:p="http://schemas.openxmlformats.org/presentationml/2006/main">
+  <p:cSld>
+    <p:spTree>
+      <p:nvGrpSpPr>
+        <p:cNvPr id="1" name=""/>
+        <p:cNvGrpSpPr/>
+        <p:nvPr/>
+      </p:nvGrpSpPr>
+      <p:grpSpPr>
+        <a:xfrm>
+          <a:off x="0" y="0"/>
+          <a:ext cx="0" cy="0"/>
+          <a:chOff x="0" y="0"/>
+          <a:chExt cx="0" cy="0"/>
+        </a:xfrm>
+      </p:grpSpPr>
+      <p:sp>
+        <p:nvSpPr>
+          <p:cNvPr id="2" name="Title 1">
+            <a:extLst>
+              <a:ext uri="{FF2B5EF4-FFF2-40B4-BE49-F238E27FC236}">
+                <a16:creationId xmlns:a16="http://schemas.microsoft.com/office/drawing/2014/main" id="{DD89B45D-81B8-4037-8647-E08DB7556E63}"/>
+              </a:ext>
+            </a:extLst>
+          </p:cNvPr>
+          <p:cNvSpPr>
+            <a:spLocks noGrp="1"/>
+          </p:cNvSpPr>
+          <p:nvPr>
+            <p:ph type="title"/>
+          </p:nvPr>
+        </p:nvSpPr>
+        <p:spPr>
+          <a:xfrm>
+            <a:off x="677334" y="609598"/>
+            <a:ext cx="8596668" cy="1181101"/>
+          </a:xfrm>
+        </p:spPr>
+        <p:txBody>
+          <a:bodyPr/>
+          <a:lstStyle/>
+          <a:p>
+            <a:r>
+              <a:rPr lang="en-US" dirty="0"/>
+              <a:t>Use Case: Exception-Handling</a:t>
+            </a:r>
+          </a:p>
+        </p:txBody>
+      </p:sp>
+      <p:sp>
+        <p:nvSpPr>
+          <p:cNvPr id="3" name="Content Placeholder 2">
+            <a:extLst>
+              <a:ext uri="{FF2B5EF4-FFF2-40B4-BE49-F238E27FC236}">
+                <a16:creationId xmlns:a16="http://schemas.microsoft.com/office/drawing/2014/main" id="{591DF666-F25C-416A-9D7B-D66F364C5048}"/>
+              </a:ext>
+            </a:extLst>
+          </p:cNvPr>
+          <p:cNvSpPr>
+            <a:spLocks noGrp="1"/>
+          </p:cNvSpPr>
+          <p:nvPr>
+            <p:ph idx="1"/>
+          </p:nvPr>
+        </p:nvSpPr>
+        <p:spPr>
+          <a:xfrm>
+            <a:off x="677334" y="1352550"/>
+            <a:ext cx="8596668" cy="5400675"/>
+          </a:xfrm>
+        </p:spPr>
+        <p:txBody>
+          <a:bodyPr>
+            <a:normAutofit/>
+          </a:bodyPr>
+          <a:lstStyle/>
+          <a:p>
+            <a:pPr marL="0" indent="0">
+              <a:buNone/>
+            </a:pPr>
+            <a:r>
+              <a:rPr lang="de-DE" b="1" dirty="0"/>
+              <a:t>Ereignisfluss</a:t>
+            </a:r>
+          </a:p>
+          <a:p>
+            <a:pPr marL="457200" lvl="1" indent="0">
+              <a:buNone/>
+            </a:pPr>
+            <a:r>
+              <a:rPr lang="de-DE" dirty="0"/>
+              <a:t>Die Applikation wird gestartet</a:t>
+            </a:r>
+          </a:p>
+          <a:p>
+            <a:pPr marL="457200" lvl="1" indent="0">
+              <a:buNone/>
+            </a:pPr>
+            <a:r>
+              <a:rPr lang="de-DE" dirty="0"/>
+              <a:t>Der Log-In-Screen öffnet sich</a:t>
+            </a:r>
+          </a:p>
+          <a:p>
+            <a:pPr marL="457200" lvl="1" indent="0">
+              <a:buNone/>
+            </a:pPr>
+            <a:r>
+              <a:rPr lang="de-DE" dirty="0"/>
+              <a:t>Der Benutzer gibt falsche Daten ein</a:t>
+            </a:r>
+          </a:p>
+          <a:p>
+            <a:pPr marL="57150" indent="0">
+              <a:buNone/>
+            </a:pPr>
+            <a:r>
+              <a:rPr lang="de-DE" b="1" dirty="0"/>
+              <a:t>Nachbedingung</a:t>
+            </a:r>
+          </a:p>
+          <a:p>
+            <a:pPr marL="457200" lvl="1" indent="0">
+              <a:buNone/>
+            </a:pPr>
+            <a:r>
+              <a:rPr lang="de-DE" dirty="0"/>
+              <a:t>Erfolgreich bei nicht verbundener Datenbank: Der Screen wird weiß und es wird ausgegeben, dass die Verbindung zur Datenbank nicht hergestellt werden konnte</a:t>
+            </a:r>
+          </a:p>
+          <a:p>
+            <a:pPr marL="457200" lvl="1" indent="0">
+              <a:buNone/>
+            </a:pPr>
+            <a:r>
+              <a:rPr lang="de-DE" dirty="0"/>
+              <a:t>Fehler bei nicht verbundener Datenbank: Der Log-In-Screen wird angezeigt</a:t>
+            </a:r>
+          </a:p>
+          <a:p>
+            <a:pPr marL="457200" lvl="1" indent="0">
+              <a:buNone/>
+            </a:pPr>
+            <a:r>
+              <a:rPr lang="de-DE" dirty="0"/>
+              <a:t>Erfolgreich bei falschen Eingaben: Roter Text wird angezeigt: Falscher Benutzername (bei falschem Benutzernamen als Eingabefehler)</a:t>
+            </a:r>
+          </a:p>
+          <a:p>
+            <a:pPr marL="457200" lvl="1" indent="0">
+              <a:buNone/>
+            </a:pPr>
+            <a:r>
+              <a:rPr lang="de-DE" dirty="0"/>
+              <a:t>Fehler bei falschen Eingaben: Der Menu-Screen wird angezeigt</a:t>
+            </a:r>
+          </a:p>
+          <a:p>
+            <a:pPr marL="457200" lvl="1" indent="0">
+              <a:buNone/>
+            </a:pPr>
+            <a:endParaRPr lang="de-DE" dirty="0"/>
+          </a:p>
+        </p:txBody>
+      </p:sp>
+      <p:sp>
+        <p:nvSpPr>
+          <p:cNvPr id="5" name="Date Placeholder 3">
+            <a:extLst>
+              <a:ext uri="{FF2B5EF4-FFF2-40B4-BE49-F238E27FC236}">
+                <a16:creationId xmlns:a16="http://schemas.microsoft.com/office/drawing/2014/main" id="{4C14AB97-C542-4790-9263-C13620CBC6CD}"/>
+              </a:ext>
+            </a:extLst>
+          </p:cNvPr>
+          <p:cNvSpPr txBox="1">
+            <a:spLocks/>
+          </p:cNvSpPr>
+          <p:nvPr/>
+        </p:nvSpPr>
+        <p:spPr>
+          <a:xfrm>
+            <a:off x="677334" y="231051"/>
+            <a:ext cx="1071566" cy="378549"/>
+          </a:xfrm>
+          <a:prstGeom prst="rect">
+            <a:avLst/>
+          </a:prstGeom>
+        </p:spPr>
+        <p:txBody>
+          <a:bodyPr vert="horz" lIns="91440" tIns="45720" rIns="91440" bIns="45720" rtlCol="0" anchor="ctr"/>
+          <a:lstStyle>
+            <a:defPPr>
+              <a:defRPr lang="en-US"/>
+            </a:defPPr>
+            <a:lvl1pPr marL="0" algn="r" defTabSz="457200" rtl="0" eaLnBrk="1" latinLnBrk="0" hangingPunct="1">
+              <a:defRPr sz="900" kern="1200">
+                <a:solidFill>
+                  <a:schemeClr val="tx1">
+                    <a:tint val="75000"/>
+                  </a:schemeClr>
+                </a:solidFill>
+                <a:latin typeface="+mn-lt"/>
+                <a:ea typeface="+mn-ea"/>
+                <a:cs typeface="+mn-cs"/>
+              </a:defRPr>
+            </a:lvl1pPr>
+            <a:lvl2pPr marL="457200" algn="l" defTabSz="457200" rtl="0" eaLnBrk="1" latinLnBrk="0" hangingPunct="1">
+              <a:defRPr sz="1800" kern="1200">
+                <a:solidFill>
+                  <a:schemeClr val="tx1"/>
+                </a:solidFill>
+                <a:latin typeface="+mn-lt"/>
+                <a:ea typeface="+mn-ea"/>
+                <a:cs typeface="+mn-cs"/>
+              </a:defRPr>
+            </a:lvl2pPr>
+            <a:lvl3pPr marL="914400" algn="l" defTabSz="457200" rtl="0" eaLnBrk="1" latinLnBrk="0" hangingPunct="1">
+              <a:defRPr sz="1800" kern="1200">
+                <a:solidFill>
+                  <a:schemeClr val="tx1"/>
+                </a:solidFill>
+                <a:latin typeface="+mn-lt"/>
+                <a:ea typeface="+mn-ea"/>
+                <a:cs typeface="+mn-cs"/>
+              </a:defRPr>
+            </a:lvl3pPr>
+            <a:lvl4pPr marL="1371600" algn="l" defTabSz="457200" rtl="0" eaLnBrk="1" latinLnBrk="0" hangingPunct="1">
+              <a:defRPr sz="1800" kern="1200">
+                <a:solidFill>
+                  <a:schemeClr val="tx1"/>
+                </a:solidFill>
+                <a:latin typeface="+mn-lt"/>
+                <a:ea typeface="+mn-ea"/>
+                <a:cs typeface="+mn-cs"/>
+              </a:defRPr>
+            </a:lvl4pPr>
+            <a:lvl5pPr marL="1828800" algn="l" defTabSz="457200" rtl="0" eaLnBrk="1" latinLnBrk="0" hangingPunct="1">
+              <a:defRPr sz="1800" kern="1200">
+                <a:solidFill>
+                  <a:schemeClr val="tx1"/>
+                </a:solidFill>
+                <a:latin typeface="+mn-lt"/>
+                <a:ea typeface="+mn-ea"/>
+                <a:cs typeface="+mn-cs"/>
+              </a:defRPr>
+            </a:lvl5pPr>
+            <a:lvl6pPr marL="2286000" algn="l" defTabSz="457200" rtl="0" eaLnBrk="1" latinLnBrk="0" hangingPunct="1">
+              <a:defRPr sz="1800" kern="1200">
+                <a:solidFill>
+                  <a:schemeClr val="tx1"/>
+                </a:solidFill>
+                <a:latin typeface="+mn-lt"/>
+                <a:ea typeface="+mn-ea"/>
+                <a:cs typeface="+mn-cs"/>
+              </a:defRPr>
+            </a:lvl6pPr>
+            <a:lvl7pPr marL="2743200" algn="l" defTabSz="457200" rtl="0" eaLnBrk="1" latinLnBrk="0" hangingPunct="1">
+              <a:defRPr sz="1800" kern="1200">
+                <a:solidFill>
+                  <a:schemeClr val="tx1"/>
+                </a:solidFill>
+                <a:latin typeface="+mn-lt"/>
+                <a:ea typeface="+mn-ea"/>
+                <a:cs typeface="+mn-cs"/>
+              </a:defRPr>
+            </a:lvl7pPr>
+            <a:lvl8pPr marL="3200400" algn="l" defTabSz="457200" rtl="0" eaLnBrk="1" latinLnBrk="0" hangingPunct="1">
+              <a:defRPr sz="1800" kern="1200">
+                <a:solidFill>
+                  <a:schemeClr val="tx1"/>
+                </a:solidFill>
+                <a:latin typeface="+mn-lt"/>
+                <a:ea typeface="+mn-ea"/>
+                <a:cs typeface="+mn-cs"/>
+              </a:defRPr>
+            </a:lvl8pPr>
+            <a:lvl9pPr marL="3657600" algn="l" defTabSz="457200" rtl="0" eaLnBrk="1" latinLnBrk="0" hangingPunct="1">
+              <a:defRPr sz="1800" kern="1200">
+                <a:solidFill>
+                  <a:schemeClr val="tx1"/>
+                </a:solidFill>
+                <a:latin typeface="+mn-lt"/>
+                <a:ea typeface="+mn-ea"/>
+                <a:cs typeface="+mn-cs"/>
+              </a:defRPr>
+            </a:lvl9pPr>
+          </a:lstStyle>
+          <a:p>
+            <a:fld id="{5665C720-CFBA-4CD6-B44E-E52DA515AFF8}" type="datetime1">
+              <a:rPr lang="de-DE" sz="1400" smtClean="0"/>
+              <a:pPr/>
+              <a:t>02.11.2020</a:t>
+            </a:fld>
+            <a:endParaRPr lang="en-US" dirty="0"/>
+          </a:p>
+        </p:txBody>
+      </p:sp>
+      <p:sp>
+        <p:nvSpPr>
+          <p:cNvPr id="6" name="Date Placeholder 3">
+            <a:extLst>
+              <a:ext uri="{FF2B5EF4-FFF2-40B4-BE49-F238E27FC236}">
+                <a16:creationId xmlns:a16="http://schemas.microsoft.com/office/drawing/2014/main" id="{FBE73F23-8D21-495D-8D7C-2DE7277152E1}"/>
+              </a:ext>
+            </a:extLst>
+          </p:cNvPr>
+          <p:cNvSpPr txBox="1">
+            <a:spLocks/>
+          </p:cNvSpPr>
+          <p:nvPr/>
+        </p:nvSpPr>
+        <p:spPr>
+          <a:xfrm>
+            <a:off x="1824033" y="231050"/>
+            <a:ext cx="5713108" cy="378549"/>
+          </a:xfrm>
+          <a:prstGeom prst="rect">
+            <a:avLst/>
+          </a:prstGeom>
+        </p:spPr>
+        <p:txBody>
+          <a:bodyPr vert="horz" lIns="91440" tIns="45720" rIns="91440" bIns="45720" rtlCol="0" anchor="ctr"/>
+          <a:lstStyle>
+            <a:defPPr>
+              <a:defRPr lang="en-US"/>
+            </a:defPPr>
+            <a:lvl1pPr marL="0" algn="r" defTabSz="457200" rtl="0" eaLnBrk="1" latinLnBrk="0" hangingPunct="1">
+              <a:defRPr sz="900" kern="1200">
+                <a:solidFill>
+                  <a:schemeClr val="tx1">
+                    <a:tint val="75000"/>
+                  </a:schemeClr>
+                </a:solidFill>
+                <a:latin typeface="+mn-lt"/>
+                <a:ea typeface="+mn-ea"/>
+                <a:cs typeface="+mn-cs"/>
+              </a:defRPr>
+            </a:lvl1pPr>
+            <a:lvl2pPr marL="457200" algn="l" defTabSz="457200" rtl="0" eaLnBrk="1" latinLnBrk="0" hangingPunct="1">
+              <a:defRPr sz="1800" kern="1200">
+                <a:solidFill>
+                  <a:schemeClr val="tx1"/>
+                </a:solidFill>
+                <a:latin typeface="+mn-lt"/>
+                <a:ea typeface="+mn-ea"/>
+                <a:cs typeface="+mn-cs"/>
+              </a:defRPr>
+            </a:lvl2pPr>
+            <a:lvl3pPr marL="914400" algn="l" defTabSz="457200" rtl="0" eaLnBrk="1" latinLnBrk="0" hangingPunct="1">
+              <a:defRPr sz="1800" kern="1200">
+                <a:solidFill>
+                  <a:schemeClr val="tx1"/>
+                </a:solidFill>
+                <a:latin typeface="+mn-lt"/>
+                <a:ea typeface="+mn-ea"/>
+                <a:cs typeface="+mn-cs"/>
+              </a:defRPr>
+            </a:lvl3pPr>
+            <a:lvl4pPr marL="1371600" algn="l" defTabSz="457200" rtl="0" eaLnBrk="1" latinLnBrk="0" hangingPunct="1">
+              <a:defRPr sz="1800" kern="1200">
+                <a:solidFill>
+                  <a:schemeClr val="tx1"/>
+                </a:solidFill>
+                <a:latin typeface="+mn-lt"/>
+                <a:ea typeface="+mn-ea"/>
+                <a:cs typeface="+mn-cs"/>
+              </a:defRPr>
+            </a:lvl4pPr>
+            <a:lvl5pPr marL="1828800" algn="l" defTabSz="457200" rtl="0" eaLnBrk="1" latinLnBrk="0" hangingPunct="1">
+              <a:defRPr sz="1800" kern="1200">
+                <a:solidFill>
+                  <a:schemeClr val="tx1"/>
+                </a:solidFill>
+                <a:latin typeface="+mn-lt"/>
+                <a:ea typeface="+mn-ea"/>
+                <a:cs typeface="+mn-cs"/>
+              </a:defRPr>
+            </a:lvl5pPr>
+            <a:lvl6pPr marL="2286000" algn="l" defTabSz="457200" rtl="0" eaLnBrk="1" latinLnBrk="0" hangingPunct="1">
+              <a:defRPr sz="1800" kern="1200">
+                <a:solidFill>
+                  <a:schemeClr val="tx1"/>
+                </a:solidFill>
+                <a:latin typeface="+mn-lt"/>
+                <a:ea typeface="+mn-ea"/>
+                <a:cs typeface="+mn-cs"/>
+              </a:defRPr>
+            </a:lvl6pPr>
+            <a:lvl7pPr marL="2743200" algn="l" defTabSz="457200" rtl="0" eaLnBrk="1" latinLnBrk="0" hangingPunct="1">
+              <a:defRPr sz="1800" kern="1200">
+                <a:solidFill>
+                  <a:schemeClr val="tx1"/>
+                </a:solidFill>
+                <a:latin typeface="+mn-lt"/>
+                <a:ea typeface="+mn-ea"/>
+                <a:cs typeface="+mn-cs"/>
+              </a:defRPr>
+            </a:lvl7pPr>
+            <a:lvl8pPr marL="3200400" algn="l" defTabSz="457200" rtl="0" eaLnBrk="1" latinLnBrk="0" hangingPunct="1">
+              <a:defRPr sz="1800" kern="1200">
+                <a:solidFill>
+                  <a:schemeClr val="tx1"/>
+                </a:solidFill>
+                <a:latin typeface="+mn-lt"/>
+                <a:ea typeface="+mn-ea"/>
+                <a:cs typeface="+mn-cs"/>
+              </a:defRPr>
+            </a:lvl8pPr>
+            <a:lvl9pPr marL="3657600" algn="l" defTabSz="457200" rtl="0" eaLnBrk="1" latinLnBrk="0" hangingPunct="1">
+              <a:defRPr sz="1800" kern="1200">
+                <a:solidFill>
+                  <a:schemeClr val="tx1"/>
+                </a:solidFill>
+                <a:latin typeface="+mn-lt"/>
+                <a:ea typeface="+mn-ea"/>
+                <a:cs typeface="+mn-cs"/>
+              </a:defRPr>
+            </a:lvl9pPr>
+          </a:lstStyle>
+          <a:p>
+            <a:r>
+              <a:rPr lang="de-DE" sz="1400" dirty="0"/>
+              <a:t>Veronika Taranek, Philipp </a:t>
+            </a:r>
+            <a:r>
+              <a:rPr lang="de-DE" sz="1400" dirty="0" err="1"/>
+              <a:t>Fenesan</a:t>
+            </a:r>
+            <a:r>
+              <a:rPr lang="de-DE" sz="1400" dirty="0"/>
+              <a:t>, Nicolas Geppert, Lukas Werner</a:t>
+            </a:r>
+            <a:endParaRPr lang="en-US" dirty="0"/>
+          </a:p>
+        </p:txBody>
+      </p:sp>
+    </p:spTree>
+    <p:extLst>
+      <p:ext uri="{BB962C8B-B14F-4D97-AF65-F5344CB8AC3E}">
+        <p14:creationId xmlns:p14="http://schemas.microsoft.com/office/powerpoint/2010/main" val="699817145"/>
+      </p:ext>
+    </p:extLst>
+  </p:cSld>
+  <p:clrMapOvr>
+    <a:masterClrMapping/>
+  </p:clrMapOvr>
+</p:sld>
+</file>
+
+<file path=ppt/slides/slide22.xml><?xml version="1.0" encoding="utf-8"?>
+<p:sld xmlns:a="http://schemas.openxmlformats.org/drawingml/2006/main" xmlns:r="http://schemas.openxmlformats.org/officeDocument/2006/relationships" xmlns:p="http://schemas.openxmlformats.org/presentationml/2006/main">
+  <p:cSld>
+    <p:spTree>
+      <p:nvGrpSpPr>
+        <p:cNvPr id="1" name=""/>
+        <p:cNvGrpSpPr/>
+        <p:nvPr/>
+      </p:nvGrpSpPr>
+      <p:grpSpPr>
+        <a:xfrm>
+          <a:off x="0" y="0"/>
+          <a:ext cx="0" cy="0"/>
+          <a:chOff x="0" y="0"/>
+          <a:chExt cx="0" cy="0"/>
+        </a:xfrm>
+      </p:grpSpPr>
+      <p:sp>
+        <p:nvSpPr>
+          <p:cNvPr id="2" name="Title 1">
+            <a:extLst>
+              <a:ext uri="{FF2B5EF4-FFF2-40B4-BE49-F238E27FC236}">
+                <a16:creationId xmlns:a16="http://schemas.microsoft.com/office/drawing/2014/main" id="{F9F93E65-E2C5-4910-B614-28FAF037FACC}"/>
+              </a:ext>
+            </a:extLst>
+          </p:cNvPr>
+          <p:cNvSpPr>
+            <a:spLocks noGrp="1"/>
+          </p:cNvSpPr>
+          <p:nvPr>
+            <p:ph type="ctrTitle"/>
+          </p:nvPr>
+        </p:nvSpPr>
+        <p:spPr/>
+        <p:txBody>
+          <a:bodyPr/>
+          <a:lstStyle/>
+          <a:p>
+            <a:r>
+              <a:rPr lang="en-US" dirty="0" err="1"/>
+              <a:t>Vielen</a:t>
+            </a:r>
+            <a:r>
+              <a:rPr lang="en-US" dirty="0"/>
+              <a:t> Dank </a:t>
+            </a:r>
+            <a:r>
+              <a:rPr lang="en-US" dirty="0" err="1"/>
+              <a:t>für</a:t>
+            </a:r>
+            <a:r>
+              <a:rPr lang="en-US" dirty="0"/>
+              <a:t> </a:t>
+            </a:r>
+            <a:r>
+              <a:rPr lang="en-US" dirty="0" err="1"/>
+              <a:t>Ihre</a:t>
+            </a:r>
+            <a:r>
+              <a:rPr lang="en-US" dirty="0"/>
+              <a:t> </a:t>
+            </a:r>
+            <a:r>
+              <a:rPr lang="en-US" dirty="0" err="1"/>
+              <a:t>Aufmerksamkeit</a:t>
+            </a:r>
+            <a:r>
+              <a:rPr lang="en-US" dirty="0"/>
+              <a:t>!</a:t>
+            </a:r>
+          </a:p>
+        </p:txBody>
+      </p:sp>
+      <p:sp>
+        <p:nvSpPr>
+          <p:cNvPr id="3" name="Subtitle 2">
+            <a:extLst>
+              <a:ext uri="{FF2B5EF4-FFF2-40B4-BE49-F238E27FC236}">
+                <a16:creationId xmlns:a16="http://schemas.microsoft.com/office/drawing/2014/main" id="{41146A61-9AD4-4D27-A779-3F68A3742FED}"/>
+              </a:ext>
+            </a:extLst>
+          </p:cNvPr>
+          <p:cNvSpPr>
+            <a:spLocks noGrp="1"/>
+          </p:cNvSpPr>
+          <p:nvPr>
+            <p:ph type="subTitle" idx="1"/>
+          </p:nvPr>
+        </p:nvSpPr>
+        <p:spPr>
+          <a:xfrm>
+            <a:off x="1507067" y="4050833"/>
+            <a:ext cx="7766936" cy="1896961"/>
+          </a:xfrm>
+        </p:spPr>
+        <p:txBody>
+          <a:bodyPr>
+            <a:normAutofit fontScale="92500" lnSpcReduction="20000"/>
+          </a:bodyPr>
+          <a:lstStyle/>
+          <a:p>
+            <a:pPr algn="l"/>
+            <a:r>
+              <a:rPr lang="en-US" dirty="0"/>
+              <a:t>Bei </a:t>
+            </a:r>
+            <a:r>
+              <a:rPr lang="en-US" dirty="0" err="1"/>
+              <a:t>Fragen</a:t>
+            </a:r>
+            <a:r>
+              <a:rPr lang="en-US" dirty="0"/>
+              <a:t>:</a:t>
+            </a:r>
+          </a:p>
+          <a:p>
+            <a:pPr algn="l"/>
+            <a:br>
+              <a:rPr lang="en-US" dirty="0"/>
+            </a:br>
+            <a:r>
+              <a:rPr lang="en-US" dirty="0"/>
+              <a:t>Veronika Taranek: </a:t>
+            </a:r>
+            <a:r>
+              <a:rPr lang="en-US" dirty="0">
+                <a:hlinkClick r:id="rId2"/>
+              </a:rPr>
+              <a:t>veronika.taranek@studmail.hwg-lu.de</a:t>
+            </a:r>
+            <a:endParaRPr lang="en-US" dirty="0"/>
+          </a:p>
+          <a:p>
+            <a:pPr algn="l"/>
+            <a:r>
+              <a:rPr lang="en-US" dirty="0"/>
+              <a:t>Philipp </a:t>
+            </a:r>
+            <a:r>
+              <a:rPr lang="en-US" dirty="0" err="1"/>
+              <a:t>Fenesan</a:t>
+            </a:r>
+            <a:r>
+              <a:rPr lang="en-US" dirty="0"/>
+              <a:t>: </a:t>
+            </a:r>
+            <a:r>
+              <a:rPr lang="en-US" dirty="0">
+                <a:hlinkClick r:id="rId3"/>
+              </a:rPr>
+              <a:t>philipp.fenesan@studmail.hwg-lu.de</a:t>
+            </a:r>
+            <a:endParaRPr lang="en-US" dirty="0"/>
+          </a:p>
+          <a:p>
+            <a:pPr algn="l"/>
+            <a:r>
+              <a:rPr lang="en-US" dirty="0"/>
+              <a:t>Nicolas </a:t>
+            </a:r>
+            <a:r>
+              <a:rPr lang="en-US" dirty="0" err="1"/>
+              <a:t>Geppert</a:t>
+            </a:r>
+            <a:r>
+              <a:rPr lang="en-US" dirty="0"/>
+              <a:t>: </a:t>
+            </a:r>
+            <a:r>
+              <a:rPr lang="en-US" dirty="0">
+                <a:hlinkClick r:id="rId4"/>
+              </a:rPr>
+              <a:t>nicolas.geppert@studmail.hwg-lu.de</a:t>
+            </a:r>
+            <a:endParaRPr lang="en-US" dirty="0"/>
+          </a:p>
+          <a:p>
+            <a:pPr algn="l"/>
+            <a:r>
+              <a:rPr lang="en-US" dirty="0"/>
+              <a:t>Lukas Werner: </a:t>
+            </a:r>
+            <a:r>
+              <a:rPr lang="en-US" dirty="0">
+                <a:hlinkClick r:id="rId5"/>
+              </a:rPr>
+              <a:t>lukas.werner@studmail.hwg-lu.de</a:t>
+            </a:r>
+            <a:endParaRPr lang="en-US" dirty="0"/>
+          </a:p>
+          <a:p>
+            <a:pPr algn="l"/>
+            <a:endParaRPr lang="en-US" dirty="0"/>
+          </a:p>
+        </p:txBody>
+      </p:sp>
+      <p:sp>
+        <p:nvSpPr>
+          <p:cNvPr id="5" name="Date Placeholder 3">
+            <a:extLst>
+              <a:ext uri="{FF2B5EF4-FFF2-40B4-BE49-F238E27FC236}">
+                <a16:creationId xmlns:a16="http://schemas.microsoft.com/office/drawing/2014/main" id="{ECE0BE53-C40D-4BC4-BE86-D2CD12DD4BA9}"/>
+              </a:ext>
+            </a:extLst>
+          </p:cNvPr>
+          <p:cNvSpPr txBox="1">
+            <a:spLocks/>
+          </p:cNvSpPr>
+          <p:nvPr/>
+        </p:nvSpPr>
+        <p:spPr>
+          <a:xfrm>
+            <a:off x="752835" y="239440"/>
+            <a:ext cx="1071566" cy="378549"/>
+          </a:xfrm>
+          <a:prstGeom prst="rect">
+            <a:avLst/>
+          </a:prstGeom>
+        </p:spPr>
+        <p:txBody>
+          <a:bodyPr vert="horz" lIns="91440" tIns="45720" rIns="91440" bIns="45720" rtlCol="0" anchor="ctr"/>
+          <a:lstStyle>
+            <a:defPPr>
+              <a:defRPr lang="en-US"/>
+            </a:defPPr>
+            <a:lvl1pPr marL="0" algn="r" defTabSz="457200" rtl="0" eaLnBrk="1" latinLnBrk="0" hangingPunct="1">
+              <a:defRPr sz="900" kern="1200">
+                <a:solidFill>
+                  <a:schemeClr val="tx1">
+                    <a:tint val="75000"/>
+                  </a:schemeClr>
+                </a:solidFill>
+                <a:latin typeface="+mn-lt"/>
+                <a:ea typeface="+mn-ea"/>
+                <a:cs typeface="+mn-cs"/>
+              </a:defRPr>
+            </a:lvl1pPr>
+            <a:lvl2pPr marL="457200" algn="l" defTabSz="457200" rtl="0" eaLnBrk="1" latinLnBrk="0" hangingPunct="1">
+              <a:defRPr sz="1800" kern="1200">
+                <a:solidFill>
+                  <a:schemeClr val="tx1"/>
+                </a:solidFill>
+                <a:latin typeface="+mn-lt"/>
+                <a:ea typeface="+mn-ea"/>
+                <a:cs typeface="+mn-cs"/>
+              </a:defRPr>
+            </a:lvl2pPr>
+            <a:lvl3pPr marL="914400" algn="l" defTabSz="457200" rtl="0" eaLnBrk="1" latinLnBrk="0" hangingPunct="1">
+              <a:defRPr sz="1800" kern="1200">
+                <a:solidFill>
+                  <a:schemeClr val="tx1"/>
+                </a:solidFill>
+                <a:latin typeface="+mn-lt"/>
+                <a:ea typeface="+mn-ea"/>
+                <a:cs typeface="+mn-cs"/>
+              </a:defRPr>
+            </a:lvl3pPr>
+            <a:lvl4pPr marL="1371600" algn="l" defTabSz="457200" rtl="0" eaLnBrk="1" latinLnBrk="0" hangingPunct="1">
+              <a:defRPr sz="1800" kern="1200">
+                <a:solidFill>
+                  <a:schemeClr val="tx1"/>
+                </a:solidFill>
+                <a:latin typeface="+mn-lt"/>
+                <a:ea typeface="+mn-ea"/>
+                <a:cs typeface="+mn-cs"/>
+              </a:defRPr>
+            </a:lvl4pPr>
+            <a:lvl5pPr marL="1828800" algn="l" defTabSz="457200" rtl="0" eaLnBrk="1" latinLnBrk="0" hangingPunct="1">
+              <a:defRPr sz="1800" kern="1200">
+                <a:solidFill>
+                  <a:schemeClr val="tx1"/>
+                </a:solidFill>
+                <a:latin typeface="+mn-lt"/>
+                <a:ea typeface="+mn-ea"/>
+                <a:cs typeface="+mn-cs"/>
+              </a:defRPr>
+            </a:lvl5pPr>
+            <a:lvl6pPr marL="2286000" algn="l" defTabSz="457200" rtl="0" eaLnBrk="1" latinLnBrk="0" hangingPunct="1">
+              <a:defRPr sz="1800" kern="1200">
+                <a:solidFill>
+                  <a:schemeClr val="tx1"/>
+                </a:solidFill>
+                <a:latin typeface="+mn-lt"/>
+                <a:ea typeface="+mn-ea"/>
+                <a:cs typeface="+mn-cs"/>
+              </a:defRPr>
+            </a:lvl6pPr>
+            <a:lvl7pPr marL="2743200" algn="l" defTabSz="457200" rtl="0" eaLnBrk="1" latinLnBrk="0" hangingPunct="1">
+              <a:defRPr sz="1800" kern="1200">
+                <a:solidFill>
+                  <a:schemeClr val="tx1"/>
+                </a:solidFill>
+                <a:latin typeface="+mn-lt"/>
+                <a:ea typeface="+mn-ea"/>
+                <a:cs typeface="+mn-cs"/>
+              </a:defRPr>
+            </a:lvl7pPr>
+            <a:lvl8pPr marL="3200400" algn="l" defTabSz="457200" rtl="0" eaLnBrk="1" latinLnBrk="0" hangingPunct="1">
+              <a:defRPr sz="1800" kern="1200">
+                <a:solidFill>
+                  <a:schemeClr val="tx1"/>
+                </a:solidFill>
+                <a:latin typeface="+mn-lt"/>
+                <a:ea typeface="+mn-ea"/>
+                <a:cs typeface="+mn-cs"/>
+              </a:defRPr>
+            </a:lvl8pPr>
+            <a:lvl9pPr marL="3657600" algn="l" defTabSz="457200" rtl="0" eaLnBrk="1" latinLnBrk="0" hangingPunct="1">
+              <a:defRPr sz="1800" kern="1200">
+                <a:solidFill>
+                  <a:schemeClr val="tx1"/>
+                </a:solidFill>
+                <a:latin typeface="+mn-lt"/>
+                <a:ea typeface="+mn-ea"/>
+                <a:cs typeface="+mn-cs"/>
+              </a:defRPr>
+            </a:lvl9pPr>
+          </a:lstStyle>
+          <a:p>
+            <a:fld id="{5665C720-CFBA-4CD6-B44E-E52DA515AFF8}" type="datetime1">
+              <a:rPr lang="de-DE" sz="1400" smtClean="0"/>
+              <a:pPr/>
+              <a:t>02.11.2020</a:t>
+            </a:fld>
+            <a:endParaRPr lang="en-US" dirty="0"/>
+          </a:p>
+        </p:txBody>
+      </p:sp>
+    </p:spTree>
+    <p:extLst>
+      <p:ext uri="{BB962C8B-B14F-4D97-AF65-F5344CB8AC3E}">
+        <p14:creationId xmlns:p14="http://schemas.microsoft.com/office/powerpoint/2010/main" val="1825384497"/>
       </p:ext>
     </p:extLst>
   </p:cSld>

</xml_diff>